<commit_message>
finish the first stage
</commit_message>
<xml_diff>
--- a/doc/VUV and EUV irradiation of CH4 + NH3.pptx
+++ b/doc/VUV and EUV irradiation of CH4 + NH3.pptx
@@ -34,9 +34,9 @@
     <p:sldId id="265" r:id="rId22"/>
     <p:sldId id="281" r:id="rId23"/>
     <p:sldId id="272" r:id="rId24"/>
-    <p:sldId id="267" r:id="rId25"/>
-    <p:sldId id="282" r:id="rId26"/>
-    <p:sldId id="280" r:id="rId27"/>
+    <p:sldId id="282" r:id="rId25"/>
+    <p:sldId id="280" r:id="rId26"/>
+    <p:sldId id="267" r:id="rId27"/>
     <p:sldId id="288" r:id="rId28"/>
     <p:sldId id="274" r:id="rId29"/>
     <p:sldId id="271" r:id="rId30"/>
@@ -842,28 +842,34 @@
           <a:bodyPr/>
           <a:lstStyle/>
           <a:p>
+            <a:pPr marL="0" marR="0" indent="0" algn="l" defTabSz="914400" rtl="0" eaLnBrk="1" fontAlgn="auto" latinLnBrk="0" hangingPunct="1">
+              <a:lnSpc>
+                <a:spcPct val="100000"/>
+              </a:lnSpc>
+              <a:spcBef>
+                <a:spcPts val="0"/>
+              </a:spcBef>
+              <a:spcAft>
+                <a:spcPts val="0"/>
+              </a:spcAft>
+              <a:buClrTx/>
+              <a:buSzTx/>
+              <a:buFontTx/>
+              <a:buNone/>
+              <a:tabLst/>
+              <a:defRPr/>
+            </a:pPr>
             <a:r>
               <a:rPr lang="en-HK" dirty="0" smtClean="0"/>
-              <a:t>The detection of methylamine during our</a:t>
+              <a:t>By VUV irradiations, all of our results</a:t>
             </a:r>
             <a:r>
               <a:rPr lang="en-HK" baseline="0" dirty="0" smtClean="0"/>
-              <a:t> warmup phase, confirms that CN- is produced through this mechanism, which also suggests that the non-detection of </a:t>
-            </a:r>
-            <a:r>
-              <a:rPr lang="en-HK" baseline="0" dirty="0" err="1" smtClean="0"/>
-              <a:t>Kundu’s</a:t>
-            </a:r>
-            <a:r>
-              <a:rPr lang="en-HK" baseline="0" dirty="0" smtClean="0"/>
-              <a:t> experiments should be due to the ice thickness, they have only a few monolayers </a:t>
-            </a:r>
-          </a:p>
-          <a:p>
-            <a:r>
-              <a:rPr lang="en-HK" baseline="0" dirty="0" smtClean="0"/>
-              <a:t>CH4: 6-7 ML NH3: 4-5 ML. Next, we will now look at the second result: relations of photo-products variating the relative proportions of ice mixtures.</a:t>
-            </a:r>
+              <a:t> belongs to a one step mechanism because all of our fitting has a k2&gt;1</a:t>
+            </a:r>
+            <a:endParaRPr lang="en-US" dirty="0" smtClean="0"/>
+          </a:p>
+          <a:p>
             <a:endParaRPr lang="en-US" dirty="0"/>
           </a:p>
         </p:txBody>
@@ -885,6 +891,112 @@
           <a:p>
             <a:fld id="{874434F2-FA75-4BA9-89CC-608830E041CF}" type="slidenum">
               <a:rPr lang="en-US" smtClean="0"/>
+              <a:t>19</a:t>
+            </a:fld>
+            <a:endParaRPr lang="en-US"/>
+          </a:p>
+        </p:txBody>
+      </p:sp>
+    </p:spTree>
+    <p:extLst>
+      <p:ext uri="{BB962C8B-B14F-4D97-AF65-F5344CB8AC3E}">
+        <p14:creationId xmlns:p14="http://schemas.microsoft.com/office/powerpoint/2010/main" val="779149219"/>
+      </p:ext>
+    </p:extLst>
+  </p:cSld>
+  <p:clrMapOvr>
+    <a:masterClrMapping/>
+  </p:clrMapOvr>
+</p:notes>
+</file>
+
+<file path=ppt/notesSlides/notesSlide11.xml><?xml version="1.0" encoding="utf-8"?>
+<p:notes xmlns:a="http://schemas.openxmlformats.org/drawingml/2006/main" xmlns:r="http://schemas.openxmlformats.org/officeDocument/2006/relationships" xmlns:p="http://schemas.openxmlformats.org/presentationml/2006/main">
+  <p:cSld>
+    <p:spTree>
+      <p:nvGrpSpPr>
+        <p:cNvPr id="1" name=""/>
+        <p:cNvGrpSpPr/>
+        <p:nvPr/>
+      </p:nvGrpSpPr>
+      <p:grpSpPr>
+        <a:xfrm>
+          <a:off x="0" y="0"/>
+          <a:ext cx="0" cy="0"/>
+          <a:chOff x="0" y="0"/>
+          <a:chExt cx="0" cy="0"/>
+        </a:xfrm>
+      </p:grpSpPr>
+      <p:sp>
+        <p:nvSpPr>
+          <p:cNvPr id="2" name="投影片圖像版面配置區 1"/>
+          <p:cNvSpPr>
+            <a:spLocks noGrp="1" noRot="1" noChangeAspect="1"/>
+          </p:cNvSpPr>
+          <p:nvPr>
+            <p:ph type="sldImg"/>
+          </p:nvPr>
+        </p:nvSpPr>
+        <p:spPr/>
+      </p:sp>
+      <p:sp>
+        <p:nvSpPr>
+          <p:cNvPr id="3" name="備忘稿版面配置區 2"/>
+          <p:cNvSpPr>
+            <a:spLocks noGrp="1"/>
+          </p:cNvSpPr>
+          <p:nvPr>
+            <p:ph type="body" idx="1"/>
+          </p:nvPr>
+        </p:nvSpPr>
+        <p:spPr/>
+        <p:txBody>
+          <a:bodyPr/>
+          <a:lstStyle/>
+          <a:p>
+            <a:r>
+              <a:rPr lang="en-HK" dirty="0" smtClean="0"/>
+              <a:t>The detection of methylamine during our</a:t>
+            </a:r>
+            <a:r>
+              <a:rPr lang="en-HK" baseline="0" dirty="0" smtClean="0"/>
+              <a:t> warmup phase, confirms that CN- is produced through this mechanism, which also suggests that the non-detection of </a:t>
+            </a:r>
+            <a:r>
+              <a:rPr lang="en-HK" baseline="0" dirty="0" err="1" smtClean="0"/>
+              <a:t>Kundu’s</a:t>
+            </a:r>
+            <a:r>
+              <a:rPr lang="en-HK" baseline="0" dirty="0" smtClean="0"/>
+              <a:t> experiments should be due to the ice thickness, they have only a few monolayers </a:t>
+            </a:r>
+          </a:p>
+          <a:p>
+            <a:r>
+              <a:rPr lang="en-HK" baseline="0" dirty="0" smtClean="0"/>
+              <a:t>CH4: 6-7 ML NH3: 4-5 ML. Next, we will now look at the second result: relations of photo-products variating the relative proportions of ice mixtures.</a:t>
+            </a:r>
+            <a:endParaRPr lang="en-US" dirty="0"/>
+          </a:p>
+        </p:txBody>
+      </p:sp>
+      <p:sp>
+        <p:nvSpPr>
+          <p:cNvPr id="4" name="投影片編號版面配置區 3"/>
+          <p:cNvSpPr>
+            <a:spLocks noGrp="1"/>
+          </p:cNvSpPr>
+          <p:nvPr>
+            <p:ph type="sldNum" sz="quarter" idx="10"/>
+          </p:nvPr>
+        </p:nvSpPr>
+        <p:spPr/>
+        <p:txBody>
+          <a:bodyPr/>
+          <a:lstStyle/>
+          <a:p>
+            <a:fld id="{874434F2-FA75-4BA9-89CC-608830E041CF}" type="slidenum">
+              <a:rPr lang="en-US" smtClean="0"/>
               <a:t>20</a:t>
             </a:fld>
             <a:endParaRPr lang="en-US"/>
@@ -904,7 +1016,7 @@
 </p:notes>
 </file>
 
-<file path=ppt/notesSlides/notesSlide11.xml><?xml version="1.0" encoding="utf-8"?>
+<file path=ppt/notesSlides/notesSlide12.xml><?xml version="1.0" encoding="utf-8"?>
 <p:notes xmlns:a="http://schemas.openxmlformats.org/drawingml/2006/main" xmlns:r="http://schemas.openxmlformats.org/officeDocument/2006/relationships" xmlns:p="http://schemas.openxmlformats.org/presentationml/2006/main">
   <p:cSld>
     <p:spTree>
@@ -1351,17 +1463,15 @@
           <a:p>
             <a:r>
               <a:rPr lang="en-HK" dirty="0" smtClean="0"/>
-              <a:t>3 systems:</a:t>
-            </a:r>
-            <a:r>
-              <a:rPr lang="en-HK" baseline="0" dirty="0" smtClean="0"/>
-              <a:t> main chamber, detection system and gas-mixing system</a:t>
-            </a:r>
-          </a:p>
-          <a:p>
-            <a:r>
-              <a:rPr lang="en-HK" baseline="0" dirty="0" smtClean="0"/>
-              <a:t>IR path and VUV path</a:t>
+              <a:t>NH3 </a:t>
+            </a:r>
+            <a:r>
+              <a:rPr lang="en-HK" dirty="0" err="1" smtClean="0"/>
+              <a:t>conlumn</a:t>
+            </a:r>
+            <a:r>
+              <a:rPr lang="en-HK" dirty="0" smtClean="0"/>
+              <a:t> density is fixed</a:t>
             </a:r>
             <a:endParaRPr lang="en-US" dirty="0"/>
           </a:p>
@@ -1384,7 +1494,7 @@
           <a:p>
             <a:fld id="{874434F2-FA75-4BA9-89CC-608830E041CF}" type="slidenum">
               <a:rPr lang="en-US" smtClean="0"/>
-              <a:t>13</a:t>
+              <a:t>12</a:t>
             </a:fld>
             <a:endParaRPr lang="en-US"/>
           </a:p>
@@ -1393,7 +1503,7 @@
     </p:spTree>
     <p:extLst>
       <p:ext uri="{BB962C8B-B14F-4D97-AF65-F5344CB8AC3E}">
-        <p14:creationId xmlns:p14="http://schemas.microsoft.com/office/powerpoint/2010/main" val="4098894582"/>
+        <p14:creationId xmlns:p14="http://schemas.microsoft.com/office/powerpoint/2010/main" val="3545042707"/>
       </p:ext>
     </p:extLst>
   </p:cSld>
@@ -1447,6 +1557,20 @@
           <a:bodyPr/>
           <a:lstStyle/>
           <a:p>
+            <a:r>
+              <a:rPr lang="en-HK" dirty="0" smtClean="0"/>
+              <a:t>3 systems:</a:t>
+            </a:r>
+            <a:r>
+              <a:rPr lang="en-HK" baseline="0" dirty="0" smtClean="0"/>
+              <a:t> main chamber, detection system and gas-mixing system</a:t>
+            </a:r>
+          </a:p>
+          <a:p>
+            <a:r>
+              <a:rPr lang="en-HK" baseline="0" dirty="0" smtClean="0"/>
+              <a:t>IR path and VUV path</a:t>
+            </a:r>
             <a:endParaRPr lang="en-US" dirty="0"/>
           </a:p>
         </p:txBody>
@@ -1468,6 +1592,90 @@
           <a:p>
             <a:fld id="{874434F2-FA75-4BA9-89CC-608830E041CF}" type="slidenum">
               <a:rPr lang="en-US" smtClean="0"/>
+              <a:t>13</a:t>
+            </a:fld>
+            <a:endParaRPr lang="en-US"/>
+          </a:p>
+        </p:txBody>
+      </p:sp>
+    </p:spTree>
+    <p:extLst>
+      <p:ext uri="{BB962C8B-B14F-4D97-AF65-F5344CB8AC3E}">
+        <p14:creationId xmlns:p14="http://schemas.microsoft.com/office/powerpoint/2010/main" val="4098894582"/>
+      </p:ext>
+    </p:extLst>
+  </p:cSld>
+  <p:clrMapOvr>
+    <a:masterClrMapping/>
+  </p:clrMapOvr>
+</p:notes>
+</file>
+
+<file path=ppt/notesSlides/notesSlide7.xml><?xml version="1.0" encoding="utf-8"?>
+<p:notes xmlns:a="http://schemas.openxmlformats.org/drawingml/2006/main" xmlns:r="http://schemas.openxmlformats.org/officeDocument/2006/relationships" xmlns:p="http://schemas.openxmlformats.org/presentationml/2006/main">
+  <p:cSld>
+    <p:spTree>
+      <p:nvGrpSpPr>
+        <p:cNvPr id="1" name=""/>
+        <p:cNvGrpSpPr/>
+        <p:nvPr/>
+      </p:nvGrpSpPr>
+      <p:grpSpPr>
+        <a:xfrm>
+          <a:off x="0" y="0"/>
+          <a:ext cx="0" cy="0"/>
+          <a:chOff x="0" y="0"/>
+          <a:chExt cx="0" cy="0"/>
+        </a:xfrm>
+      </p:grpSpPr>
+      <p:sp>
+        <p:nvSpPr>
+          <p:cNvPr id="2" name="投影片圖像版面配置區 1"/>
+          <p:cNvSpPr>
+            <a:spLocks noGrp="1" noRot="1" noChangeAspect="1"/>
+          </p:cNvSpPr>
+          <p:nvPr>
+            <p:ph type="sldImg"/>
+          </p:nvPr>
+        </p:nvSpPr>
+        <p:spPr/>
+      </p:sp>
+      <p:sp>
+        <p:nvSpPr>
+          <p:cNvPr id="3" name="備忘稿版面配置區 2"/>
+          <p:cNvSpPr>
+            <a:spLocks noGrp="1"/>
+          </p:cNvSpPr>
+          <p:nvPr>
+            <p:ph type="body" idx="1"/>
+          </p:nvPr>
+        </p:nvSpPr>
+        <p:spPr/>
+        <p:txBody>
+          <a:bodyPr/>
+          <a:lstStyle/>
+          <a:p>
+            <a:endParaRPr lang="en-US" dirty="0"/>
+          </a:p>
+        </p:txBody>
+      </p:sp>
+      <p:sp>
+        <p:nvSpPr>
+          <p:cNvPr id="4" name="投影片編號版面配置區 3"/>
+          <p:cNvSpPr>
+            <a:spLocks noGrp="1"/>
+          </p:cNvSpPr>
+          <p:nvPr>
+            <p:ph type="sldNum" sz="quarter" idx="10"/>
+          </p:nvPr>
+        </p:nvSpPr>
+        <p:spPr/>
+        <p:txBody>
+          <a:bodyPr/>
+          <a:lstStyle/>
+          <a:p>
+            <a:fld id="{874434F2-FA75-4BA9-89CC-608830E041CF}" type="slidenum">
+              <a:rPr lang="en-US" smtClean="0"/>
               <a:t>15</a:t>
             </a:fld>
             <a:endParaRPr lang="en-US"/>
@@ -1487,7 +1695,7 @@
 </p:notes>
 </file>
 
-<file path=ppt/notesSlides/notesSlide7.xml><?xml version="1.0" encoding="utf-8"?>
+<file path=ppt/notesSlides/notesSlide8.xml><?xml version="1.0" encoding="utf-8"?>
 <p:notes xmlns:a="http://schemas.openxmlformats.org/drawingml/2006/main" xmlns:r="http://schemas.openxmlformats.org/officeDocument/2006/relationships" xmlns:p="http://schemas.openxmlformats.org/presentationml/2006/main">
   <p:cSld>
     <p:spTree>
@@ -1634,104 +1842,6 @@
 </p:notes>
 </file>
 
-<file path=ppt/notesSlides/notesSlide8.xml><?xml version="1.0" encoding="utf-8"?>
-<p:notes xmlns:a="http://schemas.openxmlformats.org/drawingml/2006/main" xmlns:r="http://schemas.openxmlformats.org/officeDocument/2006/relationships" xmlns:p="http://schemas.openxmlformats.org/presentationml/2006/main">
-  <p:cSld>
-    <p:spTree>
-      <p:nvGrpSpPr>
-        <p:cNvPr id="1" name=""/>
-        <p:cNvGrpSpPr/>
-        <p:nvPr/>
-      </p:nvGrpSpPr>
-      <p:grpSpPr>
-        <a:xfrm>
-          <a:off x="0" y="0"/>
-          <a:ext cx="0" cy="0"/>
-          <a:chOff x="0" y="0"/>
-          <a:chExt cx="0" cy="0"/>
-        </a:xfrm>
-      </p:grpSpPr>
-      <p:sp>
-        <p:nvSpPr>
-          <p:cNvPr id="2" name="投影片圖像版面配置區 1"/>
-          <p:cNvSpPr>
-            <a:spLocks noGrp="1" noRot="1" noChangeAspect="1"/>
-          </p:cNvSpPr>
-          <p:nvPr>
-            <p:ph type="sldImg"/>
-          </p:nvPr>
-        </p:nvSpPr>
-        <p:spPr/>
-      </p:sp>
-      <p:sp>
-        <p:nvSpPr>
-          <p:cNvPr id="3" name="備忘稿版面配置區 2"/>
-          <p:cNvSpPr>
-            <a:spLocks noGrp="1"/>
-          </p:cNvSpPr>
-          <p:nvPr>
-            <p:ph type="body" idx="1"/>
-          </p:nvPr>
-        </p:nvSpPr>
-        <p:spPr/>
-        <p:txBody>
-          <a:bodyPr/>
-          <a:lstStyle/>
-          <a:p>
-            <a:r>
-              <a:rPr lang="en-HK" dirty="0" smtClean="0"/>
-              <a:t>By VUV irradiations, all of our results</a:t>
-            </a:r>
-            <a:r>
-              <a:rPr lang="en-HK" baseline="0" dirty="0" smtClean="0"/>
-              <a:t> belongs to a one step mechanism because all of our fitting k2&gt;1 </a:t>
-            </a:r>
-          </a:p>
-          <a:p>
-            <a:r>
-              <a:rPr lang="en-HK" baseline="0" dirty="0" smtClean="0"/>
-              <a:t>This is similar to Kaiser’s one step mechanism. </a:t>
-            </a:r>
-            <a:endParaRPr lang="en-US" dirty="0"/>
-          </a:p>
-        </p:txBody>
-      </p:sp>
-      <p:sp>
-        <p:nvSpPr>
-          <p:cNvPr id="4" name="投影片編號版面配置區 3"/>
-          <p:cNvSpPr>
-            <a:spLocks noGrp="1"/>
-          </p:cNvSpPr>
-          <p:nvPr>
-            <p:ph type="sldNum" sz="quarter" idx="10"/>
-          </p:nvPr>
-        </p:nvSpPr>
-        <p:spPr/>
-        <p:txBody>
-          <a:bodyPr/>
-          <a:lstStyle/>
-          <a:p>
-            <a:fld id="{874434F2-FA75-4BA9-89CC-608830E041CF}" type="slidenum">
-              <a:rPr lang="en-US" smtClean="0"/>
-              <a:t>18</a:t>
-            </a:fld>
-            <a:endParaRPr lang="en-US"/>
-          </a:p>
-        </p:txBody>
-      </p:sp>
-    </p:spTree>
-    <p:extLst>
-      <p:ext uri="{BB962C8B-B14F-4D97-AF65-F5344CB8AC3E}">
-        <p14:creationId xmlns:p14="http://schemas.microsoft.com/office/powerpoint/2010/main" val="51012674"/>
-      </p:ext>
-    </p:extLst>
-  </p:cSld>
-  <p:clrMapOvr>
-    <a:masterClrMapping/>
-  </p:clrMapOvr>
-</p:notes>
-</file>
-
 <file path=ppt/notesSlides/notesSlide9.xml><?xml version="1.0" encoding="utf-8"?>
 <p:notes xmlns:a="http://schemas.openxmlformats.org/drawingml/2006/main" xmlns:r="http://schemas.openxmlformats.org/officeDocument/2006/relationships" xmlns:p="http://schemas.openxmlformats.org/presentationml/2006/main">
   <p:cSld>
@@ -1776,34 +1886,20 @@
           <a:bodyPr/>
           <a:lstStyle/>
           <a:p>
-            <a:pPr marL="0" marR="0" indent="0" algn="l" defTabSz="914400" rtl="0" eaLnBrk="1" fontAlgn="auto" latinLnBrk="0" hangingPunct="1">
-              <a:lnSpc>
-                <a:spcPct val="100000"/>
-              </a:lnSpc>
-              <a:spcBef>
-                <a:spcPts val="0"/>
-              </a:spcBef>
-              <a:spcAft>
-                <a:spcPts val="0"/>
-              </a:spcAft>
-              <a:buClrTx/>
-              <a:buSzTx/>
-              <a:buFontTx/>
-              <a:buNone/>
-              <a:tabLst/>
-              <a:defRPr/>
-            </a:pPr>
             <a:r>
               <a:rPr lang="en-HK" dirty="0" smtClean="0"/>
               <a:t>By VUV irradiations, all of our results</a:t>
             </a:r>
             <a:r>
               <a:rPr lang="en-HK" baseline="0" dirty="0" smtClean="0"/>
-              <a:t> belongs to a one step mechanism because all of our fitting has a k2&gt;1</a:t>
-            </a:r>
-            <a:endParaRPr lang="en-US" dirty="0" smtClean="0"/>
-          </a:p>
-          <a:p>
+              <a:t> belongs to a one step mechanism because all of our fitting k2&gt;1 </a:t>
+            </a:r>
+          </a:p>
+          <a:p>
+            <a:r>
+              <a:rPr lang="en-HK" baseline="0" dirty="0" smtClean="0"/>
+              <a:t>This is similar to Kaiser’s one step mechanism. </a:t>
+            </a:r>
             <a:endParaRPr lang="en-US" dirty="0"/>
           </a:p>
         </p:txBody>
@@ -1825,7 +1921,7 @@
           <a:p>
             <a:fld id="{874434F2-FA75-4BA9-89CC-608830E041CF}" type="slidenum">
               <a:rPr lang="en-US" smtClean="0"/>
-              <a:t>19</a:t>
+              <a:t>18</a:t>
             </a:fld>
             <a:endParaRPr lang="en-US"/>
           </a:p>
@@ -1834,7 +1930,7 @@
     </p:spTree>
     <p:extLst>
       <p:ext uri="{BB962C8B-B14F-4D97-AF65-F5344CB8AC3E}">
-        <p14:creationId xmlns:p14="http://schemas.microsoft.com/office/powerpoint/2010/main" val="779149219"/>
+        <p14:creationId xmlns:p14="http://schemas.microsoft.com/office/powerpoint/2010/main" val="51012674"/>
       </p:ext>
     </p:extLst>
   </p:cSld>
@@ -5812,15 +5908,51 @@
             </a:r>
             <a:r>
               <a:rPr lang="en-HK" altLang="zh-TW" sz="2400" dirty="0" smtClean="0"/>
-              <a:t>) and </a:t>
-            </a:r>
+              <a:t>) </a:t>
+            </a:r>
+            <a:r>
+              <a:rPr lang="en-HK" altLang="zh-TW" sz="2400" dirty="0" smtClean="0"/>
+              <a:t>(5 </a:t>
+            </a:r>
+            <a:r>
+              <a:rPr lang="en-HK" altLang="zh-TW" sz="2400" dirty="0" err="1" smtClean="0"/>
+              <a:t>keV</a:t>
+            </a:r>
+            <a:r>
+              <a:rPr lang="en-HK" altLang="zh-TW" sz="2400" dirty="0" smtClean="0"/>
+              <a:t> e</a:t>
+            </a:r>
+            <a:r>
+              <a:rPr lang="en-HK" altLang="zh-TW" sz="2400" baseline="30000" dirty="0" smtClean="0"/>
+              <a:t>-</a:t>
+            </a:r>
+            <a:r>
+              <a:rPr lang="en-HK" altLang="zh-TW" sz="2400" dirty="0" smtClean="0"/>
+              <a:t>)</a:t>
+            </a:r>
+            <a:endParaRPr lang="en-HK" altLang="zh-TW" sz="2400" dirty="0" smtClean="0"/>
+          </a:p>
+          <a:p>
+            <a:pPr lvl="1"/>
             <a:r>
               <a:rPr lang="en-HK" altLang="zh-TW" sz="2400" dirty="0" err="1" smtClean="0"/>
               <a:t>Kundy</a:t>
             </a:r>
             <a:r>
               <a:rPr lang="en-HK" altLang="zh-TW" sz="2400" dirty="0" smtClean="0"/>
-              <a:t> et al. (2017) (</a:t>
+              <a:t> </a:t>
+            </a:r>
+            <a:r>
+              <a:rPr lang="en-HK" altLang="zh-TW" sz="2400" dirty="0" smtClean="0"/>
+              <a:t>et al</a:t>
+            </a:r>
+            <a:r>
+              <a:rPr lang="en-HK" altLang="zh-TW" sz="2400" dirty="0" smtClean="0"/>
+              <a:t>. </a:t>
+            </a:r>
+            <a:r>
+              <a:rPr lang="en-HK" altLang="zh-TW" sz="2400" dirty="0" smtClean="0"/>
+              <a:t>(</a:t>
             </a:r>
             <a:r>
               <a:rPr lang="en-HK" sz="2400" dirty="0" smtClean="0"/>
@@ -5852,14 +5984,75 @@
             </a:r>
             <a:r>
               <a:rPr lang="en-HK" altLang="zh-TW" sz="2400" dirty="0" smtClean="0"/>
-              <a:t>) </a:t>
-            </a:r>
+              <a:t>)  (1-90 eV e</a:t>
+            </a:r>
+            <a:r>
+              <a:rPr lang="en-HK" altLang="zh-TW" sz="2400" baseline="30000" dirty="0" smtClean="0"/>
+              <a:t>-</a:t>
+            </a:r>
+            <a:r>
+              <a:rPr lang="en-HK" altLang="zh-TW" sz="2400" dirty="0" smtClean="0"/>
+              <a:t>)</a:t>
+            </a:r>
+            <a:endParaRPr lang="en-HK" altLang="zh-TW" sz="2400" dirty="0" smtClean="0"/>
           </a:p>
           <a:p>
             <a:pPr lvl="1"/>
             <a:r>
               <a:rPr lang="en-HK" sz="2400" dirty="0" smtClean="0"/>
-              <a:t>We perform experiment of </a:t>
+              <a:t>We perform </a:t>
+            </a:r>
+            <a:r>
+              <a:rPr lang="en-HK" sz="2400" dirty="0"/>
+              <a:t>(</a:t>
+            </a:r>
+            <a:r>
+              <a:rPr lang="en-HK" sz="2400" dirty="0" smtClean="0">
+                <a:solidFill>
+                  <a:schemeClr val="tx1"/>
+                </a:solidFill>
+              </a:rPr>
+              <a:t>CH</a:t>
+            </a:r>
+            <a:r>
+              <a:rPr lang="en-HK" sz="2400" baseline="-25000" dirty="0" smtClean="0">
+                <a:solidFill>
+                  <a:schemeClr val="tx1"/>
+                </a:solidFill>
+              </a:rPr>
+              <a:t>4</a:t>
+            </a:r>
+            <a:r>
+              <a:rPr lang="en-HK" sz="2400" dirty="0" smtClean="0">
+                <a:solidFill>
+                  <a:schemeClr val="tx1"/>
+                </a:solidFill>
+              </a:rPr>
+              <a:t>:</a:t>
+            </a:r>
+            <a:r>
+              <a:rPr lang="en-HK" sz="2400" dirty="0" smtClean="0">
+                <a:solidFill>
+                  <a:schemeClr val="tx1"/>
+                </a:solidFill>
+              </a:rPr>
+              <a:t>NH</a:t>
+            </a:r>
+            <a:r>
+              <a:rPr lang="en-HK" sz="2400" baseline="-25000" dirty="0" smtClean="0">
+                <a:solidFill>
+                  <a:schemeClr val="tx1"/>
+                </a:solidFill>
+              </a:rPr>
+              <a:t>3</a:t>
+            </a:r>
+            <a:r>
+              <a:rPr lang="en-HK" sz="2400" dirty="0" smtClean="0">
+                <a:solidFill>
+                  <a:schemeClr val="tx1"/>
+                </a:solidFill>
+              </a:rPr>
+              <a:t> </a:t>
             </a:r>
             <a:r>
               <a:rPr lang="en-HK" sz="2400" dirty="0" smtClean="0">
@@ -5867,62 +6060,23 @@
                   <a:srgbClr val="0070C0"/>
                 </a:solidFill>
               </a:rPr>
-              <a:t>CH</a:t>
-            </a:r>
-            <a:r>
-              <a:rPr lang="en-HK" sz="2400" baseline="-25000" dirty="0" smtClean="0">
+              <a:t>3:2</a:t>
+            </a:r>
+            <a:r>
+              <a:rPr lang="en-HK" sz="2400" dirty="0" smtClean="0">
+                <a:solidFill>
+                  <a:schemeClr val="tx1"/>
+                </a:solidFill>
+              </a:rPr>
+              <a:t>)</a:t>
+            </a:r>
+            <a:r>
+              <a:rPr lang="en-HK" sz="2400" dirty="0">
                 <a:solidFill>
                   <a:srgbClr val="0070C0"/>
                 </a:solidFill>
               </a:rPr>
-              <a:t>4</a:t>
-            </a:r>
-            <a:r>
-              <a:rPr lang="en-HK" sz="2400" dirty="0" smtClean="0">
-                <a:solidFill>
-                  <a:srgbClr val="0070C0"/>
-                </a:solidFill>
-              </a:rPr>
-              <a:t>+NH</a:t>
-            </a:r>
-            <a:r>
-              <a:rPr lang="en-HK" sz="2400" baseline="-25000" dirty="0" smtClean="0">
-                <a:solidFill>
-                  <a:srgbClr val="0070C0"/>
-                </a:solidFill>
-              </a:rPr>
-              <a:t>3</a:t>
-            </a:r>
-            <a:r>
-              <a:rPr lang="en-HK" sz="2400" dirty="0" smtClean="0">
-                <a:solidFill>
-                  <a:srgbClr val="0070C0"/>
-                </a:solidFill>
-              </a:rPr>
-              <a:t> = 3:2 </a:t>
-            </a:r>
-          </a:p>
-          <a:p>
-            <a:pPr lvl="1"/>
-            <a:r>
-              <a:rPr lang="en-HK" sz="2400" dirty="0" smtClean="0"/>
-              <a:t>Use different </a:t>
-            </a:r>
-            <a:r>
-              <a:rPr lang="en-HK" sz="2400" dirty="0" smtClean="0">
-                <a:solidFill>
-                  <a:srgbClr val="0070C0"/>
-                </a:solidFill>
-              </a:rPr>
-              <a:t>photon</a:t>
-            </a:r>
-            <a:r>
-              <a:rPr lang="en-HK" sz="2400" dirty="0" smtClean="0"/>
-              <a:t> sources: VUV and </a:t>
-            </a:r>
-            <a:r>
-              <a:rPr lang="en-HK" sz="2400" dirty="0"/>
-              <a:t>EUV </a:t>
+              <a:t> </a:t>
             </a:r>
             <a:endParaRPr lang="en-HK" sz="2400" dirty="0" smtClean="0">
               <a:solidFill>
@@ -5931,24 +6085,51 @@
             </a:endParaRPr>
           </a:p>
           <a:p>
-            <a:r>
-              <a:rPr lang="en-HK" sz="2400" dirty="0" smtClean="0"/>
-              <a:t>2. To simulate the </a:t>
-            </a:r>
+            <a:pPr marL="397764" lvl="1" indent="0">
+              <a:buNone/>
+            </a:pPr>
             <a:r>
               <a:rPr lang="en-HK" sz="2400" dirty="0" smtClean="0">
                 <a:solidFill>
                   <a:srgbClr val="0070C0"/>
                 </a:solidFill>
               </a:rPr>
-              <a:t>surface of Charon</a:t>
-            </a:r>
-          </a:p>
-          <a:p>
-            <a:pPr lvl="1"/>
+              <a:t>photon</a:t>
+            </a:r>
             <a:r>
               <a:rPr lang="en-HK" sz="2400" dirty="0" smtClean="0"/>
-              <a:t>Different relative proportion of </a:t>
+              <a:t> </a:t>
+            </a:r>
+            <a:r>
+              <a:rPr lang="en-HK" sz="2400" dirty="0" smtClean="0"/>
+              <a:t>sources: </a:t>
+            </a:r>
+            <a:r>
+              <a:rPr lang="en-HK" sz="2400" dirty="0" smtClean="0"/>
+              <a:t>VUV (9.27 eV) </a:t>
+            </a:r>
+            <a:r>
+              <a:rPr lang="en-HK" sz="2400" dirty="0" smtClean="0"/>
+              <a:t>and </a:t>
+            </a:r>
+            <a:r>
+              <a:rPr lang="en-HK" sz="2400" dirty="0"/>
+              <a:t>EUV </a:t>
+            </a:r>
+            <a:r>
+              <a:rPr lang="en-HK" sz="2400" dirty="0" smtClean="0"/>
+              <a:t>(40.8 eV)</a:t>
+            </a:r>
+            <a:endParaRPr lang="en-HK" sz="2400" dirty="0" smtClean="0">
+              <a:solidFill>
+                <a:srgbClr val="0070C0"/>
+              </a:solidFill>
+            </a:endParaRPr>
+          </a:p>
+          <a:p>
+            <a:r>
+              <a:rPr lang="en-HK" sz="2400" dirty="0" smtClean="0"/>
+              <a:t>2. To simulate the </a:t>
             </a:r>
             <a:r>
               <a:rPr lang="en-HK" sz="2400" dirty="0" smtClean="0">
@@ -5956,6 +6137,27 @@
                   <a:srgbClr val="0070C0"/>
                 </a:solidFill>
               </a:rPr>
+              <a:t>surface of Charon</a:t>
+            </a:r>
+          </a:p>
+          <a:p>
+            <a:pPr lvl="1"/>
+            <a:r>
+              <a:rPr lang="en-HK" sz="2400" dirty="0" smtClean="0"/>
+              <a:t>Different relative proportion of </a:t>
+            </a:r>
+            <a:endParaRPr lang="en-HK" sz="2400" dirty="0" smtClean="0"/>
+          </a:p>
+          <a:p>
+            <a:pPr marL="397764" lvl="1" indent="0">
+              <a:buNone/>
+            </a:pPr>
+            <a:r>
+              <a:rPr lang="en-HK" sz="2400" dirty="0" smtClean="0">
+                <a:solidFill>
+                  <a:srgbClr val="0070C0"/>
+                </a:solidFill>
+              </a:rPr>
               <a:t>CH</a:t>
             </a:r>
             <a:r>
@@ -5967,20 +6169,12 @@
               <a:t>4</a:t>
             </a:r>
             <a:r>
-              <a:rPr lang="en-HK" sz="2400" dirty="0">
-                <a:solidFill>
-                  <a:srgbClr val="0070C0"/>
-                </a:solidFill>
-              </a:rPr>
-              <a:t>:</a:t>
-            </a:r>
-            <a:r>
               <a:rPr lang="en-HK" sz="2400" dirty="0" smtClean="0">
                 <a:solidFill>
                   <a:srgbClr val="0070C0"/>
                 </a:solidFill>
               </a:rPr>
-              <a:t>NH</a:t>
+              <a:t>:NH</a:t>
             </a:r>
             <a:r>
               <a:rPr lang="en-HK" sz="2400" baseline="-25000" dirty="0" smtClean="0">
@@ -5996,7 +6190,15 @@
                   <a:srgbClr val="0070C0"/>
                 </a:solidFill>
               </a:rPr>
-              <a:t> =1:5, 1:10, 1:20</a:t>
+              <a:t> 1:5</a:t>
+            </a:r>
+            <a:r>
+              <a:rPr lang="en-HK" sz="2400" dirty="0" smtClean="0">
+                <a:solidFill>
+                  <a:srgbClr val="0070C0"/>
+                </a:solidFill>
+              </a:rPr>
+              <a:t>, 1:10, 1:20</a:t>
             </a:r>
           </a:p>
         </p:txBody>
@@ -6211,14 +6413,14 @@
             <p:ph idx="1"/>
             <p:extLst>
               <p:ext uri="{D42A27DB-BD31-4B8C-83A1-F6EECF244321}">
-                <p14:modId xmlns:p14="http://schemas.microsoft.com/office/powerpoint/2010/main" val="2994696995"/>
+                <p14:modId xmlns:p14="http://schemas.microsoft.com/office/powerpoint/2010/main" val="1979973024"/>
               </p:ext>
             </p:extLst>
           </p:nvPr>
         </p:nvGraphicFramePr>
         <p:xfrm>
-          <a:off x="755576" y="1414252"/>
-          <a:ext cx="7998731" cy="3797385"/>
+          <a:off x="755576" y="1414253"/>
+          <a:ext cx="7998731" cy="3309450"/>
         </p:xfrm>
         <a:graphic>
           <a:graphicData uri="http://schemas.openxmlformats.org/drawingml/2006/table">
@@ -6270,7 +6472,7 @@
                   </a:extLst>
                 </a:gridCol>
               </a:tblGrid>
-              <a:tr h="619269">
+              <a:tr h="635035">
                 <a:tc rowSpan="2">
                   <a:txBody>
                     <a:bodyPr/>
@@ -6484,7 +6686,7 @@
                   </a:ext>
                 </a:extLst>
               </a:tr>
-              <a:tr h="619269">
+              <a:tr h="521682">
                 <a:tc vMerge="1">
                   <a:txBody>
                     <a:bodyPr/>
@@ -6604,7 +6806,7 @@
                   </a:ext>
                 </a:extLst>
               </a:tr>
-              <a:tr h="619269">
+              <a:tr h="521682">
                 <a:tc rowSpan="2">
                   <a:txBody>
                     <a:bodyPr/>
@@ -6660,7 +6862,7 @@
                       <a:r>
                         <a:rPr lang="en-HK" sz="2000" dirty="0" smtClean="0">
                           <a:solidFill>
-                            <a:srgbClr val="0070C0"/>
+                            <a:schemeClr val="tx1"/>
                           </a:solidFill>
                         </a:rPr>
                         <a:t>900</a:t>
@@ -6678,14 +6880,14 @@
                       <a:r>
                         <a:rPr lang="en-HK" sz="2000" dirty="0" smtClean="0">
                           <a:solidFill>
-                            <a:srgbClr val="0070C0"/>
+                            <a:schemeClr val="tx1"/>
                           </a:solidFill>
                         </a:rPr>
                         <a:t>120</a:t>
                       </a:r>
                       <a:endParaRPr lang="en-US" sz="2000" dirty="0">
                         <a:solidFill>
-                          <a:srgbClr val="0070C0"/>
+                          <a:schemeClr val="tx1"/>
                         </a:solidFill>
                       </a:endParaRPr>
                     </a:p>
@@ -6728,7 +6930,7 @@
                   </a:ext>
                 </a:extLst>
               </a:tr>
-              <a:tr h="619269">
+              <a:tr h="521682">
                 <a:tc vMerge="1">
                   <a:txBody>
                     <a:bodyPr/>
@@ -6811,10 +7013,18 @@
                     <a:p>
                       <a:pPr algn="ctr"/>
                       <a:r>
-                        <a:rPr lang="en-HK" sz="2000" dirty="0" smtClean="0"/>
+                        <a:rPr lang="en-HK" sz="2000" dirty="0" smtClean="0">
+                          <a:solidFill>
+                            <a:srgbClr val="0070C0"/>
+                          </a:solidFill>
+                        </a:rPr>
                         <a:t>600</a:t>
                       </a:r>
-                      <a:endParaRPr lang="en-US" sz="2000" dirty="0"/>
+                      <a:endParaRPr lang="en-US" sz="2000" dirty="0">
+                        <a:solidFill>
+                          <a:srgbClr val="0070C0"/>
+                        </a:solidFill>
+                      </a:endParaRPr>
                     </a:p>
                   </a:txBody>
                   <a:tcPr anchor="ctr"/>
@@ -6826,10 +7036,18 @@
                     <a:p>
                       <a:pPr algn="ctr"/>
                       <a:r>
-                        <a:rPr lang="en-HK" sz="2000" dirty="0" smtClean="0"/>
+                        <a:rPr lang="en-HK" sz="2000" dirty="0" smtClean="0">
+                          <a:solidFill>
+                            <a:srgbClr val="0070C0"/>
+                          </a:solidFill>
+                        </a:rPr>
                         <a:t>600</a:t>
                       </a:r>
-                      <a:endParaRPr lang="en-US" sz="2000" dirty="0"/>
+                      <a:endParaRPr lang="en-US" sz="2000" dirty="0">
+                        <a:solidFill>
+                          <a:srgbClr val="0070C0"/>
+                        </a:solidFill>
+                      </a:endParaRPr>
                     </a:p>
                   </a:txBody>
                   <a:tcPr anchor="ctr"/>
@@ -6840,7 +7058,7 @@
                   </a:ext>
                 </a:extLst>
               </a:tr>
-              <a:tr h="619269">
+              <a:tr h="521682">
                 <a:tc rowSpan="2">
                   <a:txBody>
                     <a:bodyPr/>
@@ -6907,7 +7125,7 @@
                       <a:r>
                         <a:rPr lang="en-HK" sz="2000" dirty="0" smtClean="0">
                           <a:solidFill>
-                            <a:srgbClr val="0070C0"/>
+                            <a:schemeClr val="tx1"/>
                           </a:solidFill>
                         </a:rPr>
                         <a:t>900</a:t>
@@ -6925,14 +7143,14 @@
                       <a:r>
                         <a:rPr lang="en-HK" sz="2000" dirty="0" smtClean="0">
                           <a:solidFill>
-                            <a:srgbClr val="0070C0"/>
+                            <a:schemeClr val="tx1"/>
                           </a:solidFill>
                         </a:rPr>
                         <a:t>120</a:t>
                       </a:r>
                       <a:endParaRPr lang="en-US" sz="2000" dirty="0">
                         <a:solidFill>
-                          <a:srgbClr val="0070C0"/>
+                          <a:schemeClr val="tx1"/>
                         </a:solidFill>
                       </a:endParaRPr>
                     </a:p>
@@ -6975,7 +7193,7 @@
                   </a:ext>
                 </a:extLst>
               </a:tr>
-              <a:tr h="619269">
+              <a:tr h="521682">
                 <a:tc vMerge="1">
                   <a:txBody>
                     <a:bodyPr/>
@@ -7111,6 +7329,60 @@
               <a:t>12</a:t>
             </a:fld>
             <a:endParaRPr lang="zh-TW" altLang="en-US" sz="2000" dirty="0"/>
+          </a:p>
+        </p:txBody>
+      </p:sp>
+      <p:sp>
+        <p:nvSpPr>
+          <p:cNvPr id="3" name="文字方塊 2"/>
+          <p:cNvSpPr txBox="1"/>
+          <p:nvPr/>
+        </p:nvSpPr>
+        <p:spPr>
+          <a:xfrm>
+            <a:off x="539552" y="4837533"/>
+            <a:ext cx="8712968" cy="707886"/>
+          </a:xfrm>
+          <a:prstGeom prst="rect">
+            <a:avLst/>
+          </a:prstGeom>
+          <a:noFill/>
+        </p:spPr>
+        <p:txBody>
+          <a:bodyPr wrap="square" rtlCol="0">
+            <a:spAutoFit/>
+          </a:bodyPr>
+          <a:lstStyle/>
+          <a:p>
+            <a:r>
+              <a:rPr lang="en-HK" sz="2000" dirty="0" smtClean="0"/>
+              <a:t>Different initial amount of CH</a:t>
+            </a:r>
+            <a:r>
+              <a:rPr lang="en-HK" sz="2000" baseline="-25000" dirty="0" smtClean="0"/>
+              <a:t>4</a:t>
+            </a:r>
+            <a:r>
+              <a:rPr lang="en-HK" sz="2000" dirty="0" smtClean="0"/>
+              <a:t> correspond to different ratio of CH</a:t>
+            </a:r>
+            <a:r>
+              <a:rPr lang="en-HK" sz="2000" baseline="-25000" dirty="0" smtClean="0"/>
+              <a:t>4</a:t>
+            </a:r>
+            <a:r>
+              <a:rPr lang="en-HK" sz="2000" dirty="0" smtClean="0"/>
+              <a:t>:NH</a:t>
+            </a:r>
+            <a:r>
+              <a:rPr lang="en-HK" sz="2000" baseline="-25000" dirty="0" smtClean="0"/>
+              <a:t>3</a:t>
+            </a:r>
+            <a:r>
+              <a:rPr lang="en-HK" sz="2000" dirty="0" smtClean="0"/>
+              <a:t> ice mixtures</a:t>
+            </a:r>
+            <a:endParaRPr lang="en-US" sz="2000" dirty="0"/>
           </a:p>
         </p:txBody>
       </p:sp>
@@ -10827,7 +11099,7 @@
           <a:graphicData uri="http://schemas.openxmlformats.org/presentationml/2006/ole">
             <mc:AlternateContent xmlns:mc="http://schemas.openxmlformats.org/markup-compatibility/2006">
               <mc:Choice xmlns:v="urn:schemas-microsoft-com:vml" Requires="v">
-                <p:oleObj spid="_x0000_s11547" name="Graph" r:id="rId5" imgW="4754880" imgH="6583680" progId="Origin50.Graph">
+                <p:oleObj spid="_x0000_s11661" name="Graph" r:id="rId5" imgW="4754880" imgH="6583680" progId="Origin50.Graph">
                   <p:embed/>
                 </p:oleObj>
               </mc:Choice>
@@ -11014,7 +11286,7 @@
           <a:graphicData uri="http://schemas.openxmlformats.org/presentationml/2006/ole">
             <mc:AlternateContent xmlns:mc="http://schemas.openxmlformats.org/markup-compatibility/2006">
               <mc:Choice xmlns:v="urn:schemas-microsoft-com:vml" Requires="v">
-                <p:oleObj spid="_x0000_s10598" name="Graph" r:id="rId5" imgW="4754880" imgH="3108960" progId="Origin50.Graph">
+                <p:oleObj spid="_x0000_s10712" name="Graph" r:id="rId5" imgW="4754880" imgH="3108960" progId="Origin50.Graph">
                   <p:embed/>
                 </p:oleObj>
               </mc:Choice>
@@ -11295,8 +11567,8 @@
           </a:prstGeom>
         </p:spPr>
       </p:pic>
-      <mc:AlternateContent xmlns:mc="http://schemas.openxmlformats.org/markup-compatibility/2006" xmlns:a14="http://schemas.microsoft.com/office/drawing/2010/main">
-        <mc:Choice Requires="a14">
+      <mc:AlternateContent xmlns:mc="http://schemas.openxmlformats.org/markup-compatibility/2006">
+        <mc:Choice xmlns:a14="http://schemas.microsoft.com/office/drawing/2010/main" Requires="a14">
           <p:sp>
             <p:nvSpPr>
               <p:cNvPr id="11" name="內容版面配置區 2"/>
@@ -11308,7 +11580,7 @@
             <p:spPr>
               <a:xfrm>
                 <a:off x="899592" y="1239472"/>
-                <a:ext cx="3615308" cy="3071977"/>
+                <a:ext cx="5760640" cy="3071977"/>
               </a:xfrm>
               <a:prstGeom prst="rect">
                 <a:avLst/>
@@ -11517,7 +11789,7 @@
                         <m:begChr m:val="["/>
                         <m:endChr m:val="]"/>
                         <m:ctrlPr>
-                          <a:rPr lang="en-US" i="1">
+                          <a:rPr lang="en-US" sz="1800" i="1">
                             <a:latin typeface="Cambria Math" panose="02040503050406030204" pitchFamily="18" charset="0"/>
                           </a:rPr>
                         </m:ctrlPr>
@@ -11526,20 +11798,20 @@
                         <m:sSup>
                           <m:sSupPr>
                             <m:ctrlPr>
-                              <a:rPr lang="en-US" i="1" smtClean="0">
+                              <a:rPr lang="en-US" sz="1800" i="1" smtClean="0">
                                 <a:latin typeface="Cambria Math" panose="02040503050406030204" pitchFamily="18" charset="0"/>
                               </a:rPr>
                             </m:ctrlPr>
                           </m:sSupPr>
                           <m:e>
                             <m:r>
-                              <a:rPr lang="en-US" i="1">
+                              <a:rPr lang="en-US" sz="1800" i="1">
                                 <a:latin typeface="Cambria Math" panose="02040503050406030204" pitchFamily="18" charset="0"/>
                               </a:rPr>
                               <m:t>𝐶</m:t>
                             </m:r>
                             <m:r>
-                              <a:rPr lang="en-HK" i="1">
+                              <a:rPr lang="en-HK" sz="1800" i="1">
                                 <a:latin typeface="Cambria Math" panose="02040503050406030204" pitchFamily="18" charset="0"/>
                               </a:rPr>
                               <m:t>𝑁</m:t>
@@ -11547,7 +11819,7 @@
                           </m:e>
                           <m:sup>
                             <m:r>
-                              <a:rPr lang="en-HK" i="1" smtClean="0">
+                              <a:rPr lang="en-HK" sz="1800" i="1" smtClean="0">
                                 <a:latin typeface="Cambria Math" panose="02040503050406030204" pitchFamily="18" charset="0"/>
                               </a:rPr>
                               <m:t>−</m:t>
@@ -11557,7 +11829,7 @@
                       </m:e>
                     </m:d>
                     <m:r>
-                      <a:rPr lang="en-US" i="1">
+                      <a:rPr lang="en-US" sz="1800" i="1">
                         <a:latin typeface="Cambria Math" panose="02040503050406030204" pitchFamily="18" charset="0"/>
                       </a:rPr>
                       <m:t>=</m:t>
@@ -11565,14 +11837,14 @@
                     <m:d>
                       <m:dPr>
                         <m:ctrlPr>
-                          <a:rPr lang="en-US" i="1">
+                          <a:rPr lang="en-US" sz="1800" i="1">
                             <a:latin typeface="Cambria Math" panose="02040503050406030204" pitchFamily="18" charset="0"/>
                           </a:rPr>
                         </m:ctrlPr>
                       </m:dPr>
                       <m:e>
                         <m:r>
-                          <a:rPr lang="en-US" i="1">
+                          <a:rPr lang="en-US" sz="1800" i="1">
                             <a:latin typeface="Cambria Math" panose="02040503050406030204" pitchFamily="18" charset="0"/>
                           </a:rPr>
                           <m:t>1+</m:t>
@@ -11580,7 +11852,7 @@
                         <m:f>
                           <m:fPr>
                             <m:ctrlPr>
-                              <a:rPr lang="en-US" i="1">
+                              <a:rPr lang="en-US" sz="1800" i="1">
                                 <a:latin typeface="Cambria Math" panose="02040503050406030204" pitchFamily="18" charset="0"/>
                               </a:rPr>
                             </m:ctrlPr>
@@ -11589,7 +11861,7 @@
                             <m:sSup>
                               <m:sSupPr>
                                 <m:ctrlPr>
-                                  <a:rPr lang="en-US" i="1">
+                                  <a:rPr lang="en-US" sz="1800" i="1">
                                     <a:latin typeface="Cambria Math" panose="02040503050406030204" pitchFamily="18" charset="0"/>
                                   </a:rPr>
                                 </m:ctrlPr>
@@ -11598,14 +11870,14 @@
                                 <m:sSub>
                                   <m:sSubPr>
                                     <m:ctrlPr>
-                                      <a:rPr lang="en-US" i="1">
+                                      <a:rPr lang="en-US" sz="1800" i="1">
                                         <a:latin typeface="Cambria Math" panose="02040503050406030204" pitchFamily="18" charset="0"/>
                                       </a:rPr>
                                     </m:ctrlPr>
                                   </m:sSubPr>
                                   <m:e>
                                     <m:r>
-                                      <a:rPr lang="en-US" i="1">
+                                      <a:rPr lang="en-US" sz="1800" i="1">
                                         <a:latin typeface="Cambria Math" panose="02040503050406030204" pitchFamily="18" charset="0"/>
                                       </a:rPr>
                                       <m:t>𝑘</m:t>
@@ -11613,7 +11885,7 @@
                                   </m:e>
                                   <m:sub>
                                     <m:r>
-                                      <a:rPr lang="en-US" i="1">
+                                      <a:rPr lang="en-US" sz="1800" i="1">
                                         <a:latin typeface="Cambria Math" panose="02040503050406030204" pitchFamily="18" charset="0"/>
                                       </a:rPr>
                                       <m:t>1</m:t>
@@ -11621,7 +11893,7 @@
                                   </m:sub>
                                 </m:sSub>
                                 <m:r>
-                                  <a:rPr lang="en-US" i="1">
+                                  <a:rPr lang="en-US" sz="1800" i="1">
                                     <a:latin typeface="Cambria Math" panose="02040503050406030204" pitchFamily="18" charset="0"/>
                                   </a:rPr>
                                   <m:t>𝑒</m:t>
@@ -11629,7 +11901,7 @@
                               </m:e>
                               <m:sup>
                                 <m:r>
-                                  <a:rPr lang="en-US" i="1">
+                                  <a:rPr lang="en-US" sz="1800" i="1">
                                     <a:latin typeface="Cambria Math" panose="02040503050406030204" pitchFamily="18" charset="0"/>
                                   </a:rPr>
                                   <m:t>−</m:t>
@@ -11637,14 +11909,14 @@
                                 <m:sSub>
                                   <m:sSubPr>
                                     <m:ctrlPr>
-                                      <a:rPr lang="en-US" i="1">
+                                      <a:rPr lang="en-US" sz="1800" i="1">
                                         <a:latin typeface="Cambria Math" panose="02040503050406030204" pitchFamily="18" charset="0"/>
                                       </a:rPr>
                                     </m:ctrlPr>
                                   </m:sSubPr>
                                   <m:e>
                                     <m:r>
-                                      <a:rPr lang="en-US" i="1">
+                                      <a:rPr lang="en-US" sz="1800" i="1">
                                         <a:latin typeface="Cambria Math" panose="02040503050406030204" pitchFamily="18" charset="0"/>
                                       </a:rPr>
                                       <m:t>𝑘</m:t>
@@ -11652,7 +11924,7 @@
                                   </m:e>
                                   <m:sub>
                                     <m:r>
-                                      <a:rPr lang="en-US" i="1">
+                                      <a:rPr lang="en-US" sz="1800" i="1">
                                         <a:latin typeface="Cambria Math" panose="02040503050406030204" pitchFamily="18" charset="0"/>
                                       </a:rPr>
                                       <m:t>2</m:t>
@@ -11660,7 +11932,7 @@
                                   </m:sub>
                                 </m:sSub>
                                 <m:r>
-                                  <a:rPr lang="en-US" i="1">
+                                  <a:rPr lang="en-US" sz="1800" i="1">
                                     <a:latin typeface="Cambria Math" panose="02040503050406030204" pitchFamily="18" charset="0"/>
                                   </a:rPr>
                                   <m:t>𝑡</m:t>
@@ -11672,14 +11944,14 @@
                             <m:sSub>
                               <m:sSubPr>
                                 <m:ctrlPr>
-                                  <a:rPr lang="en-US" i="1">
+                                  <a:rPr lang="en-US" sz="1800" i="1">
                                     <a:latin typeface="Cambria Math" panose="02040503050406030204" pitchFamily="18" charset="0"/>
                                   </a:rPr>
                                 </m:ctrlPr>
                               </m:sSubPr>
                               <m:e>
                                 <m:r>
-                                  <a:rPr lang="en-US" i="1">
+                                  <a:rPr lang="en-US" sz="1800" i="1">
                                     <a:latin typeface="Cambria Math" panose="02040503050406030204" pitchFamily="18" charset="0"/>
                                   </a:rPr>
                                   <m:t>𝑘</m:t>
@@ -11687,7 +11959,7 @@
                               </m:e>
                               <m:sub>
                                 <m:r>
-                                  <a:rPr lang="en-US" i="1">
+                                  <a:rPr lang="en-US" sz="1800" i="1">
                                     <a:latin typeface="Cambria Math" panose="02040503050406030204" pitchFamily="18" charset="0"/>
                                   </a:rPr>
                                   <m:t>2</m:t>
@@ -11695,7 +11967,7 @@
                               </m:sub>
                             </m:sSub>
                             <m:r>
-                              <a:rPr lang="en-US" i="1">
+                              <a:rPr lang="en-US" sz="1800" i="1">
                                 <a:latin typeface="Cambria Math" panose="02040503050406030204" pitchFamily="18" charset="0"/>
                               </a:rPr>
                               <m:t>−</m:t>
@@ -11703,14 +11975,14 @@
                             <m:sSub>
                               <m:sSubPr>
                                 <m:ctrlPr>
-                                  <a:rPr lang="en-US" i="1">
+                                  <a:rPr lang="en-US" sz="1800" i="1">
                                     <a:latin typeface="Cambria Math" panose="02040503050406030204" pitchFamily="18" charset="0"/>
                                   </a:rPr>
                                 </m:ctrlPr>
                               </m:sSubPr>
                               <m:e>
                                 <m:r>
-                                  <a:rPr lang="en-US" i="1">
+                                  <a:rPr lang="en-US" sz="1800" i="1">
                                     <a:latin typeface="Cambria Math" panose="02040503050406030204" pitchFamily="18" charset="0"/>
                                   </a:rPr>
                                   <m:t>𝑘</m:t>
@@ -11718,7 +11990,7 @@
                               </m:e>
                               <m:sub>
                                 <m:r>
-                                  <a:rPr lang="en-US" i="1">
+                                  <a:rPr lang="en-US" sz="1800" i="1">
                                     <a:latin typeface="Cambria Math" panose="02040503050406030204" pitchFamily="18" charset="0"/>
                                   </a:rPr>
                                   <m:t>1</m:t>
@@ -11728,7 +12000,7 @@
                           </m:den>
                         </m:f>
                         <m:r>
-                          <a:rPr lang="en-HK" i="1" smtClean="0">
+                          <a:rPr lang="en-HK" sz="1800" i="1" smtClean="0">
                             <a:latin typeface="Cambria Math" panose="02040503050406030204" pitchFamily="18" charset="0"/>
                           </a:rPr>
                           <m:t>−</m:t>
@@ -11736,7 +12008,7 @@
                         <m:f>
                           <m:fPr>
                             <m:ctrlPr>
-                              <a:rPr lang="en-HK" i="1" smtClean="0">
+                              <a:rPr lang="en-HK" sz="1800" i="1" smtClean="0">
                                 <a:latin typeface="Cambria Math" panose="02040503050406030204" pitchFamily="18" charset="0"/>
                               </a:rPr>
                             </m:ctrlPr>
@@ -11745,7 +12017,7 @@
                             <m:sSup>
                               <m:sSupPr>
                                 <m:ctrlPr>
-                                  <a:rPr lang="en-US" i="1">
+                                  <a:rPr lang="en-US" sz="1800" i="1">
                                     <a:latin typeface="Cambria Math" panose="02040503050406030204" pitchFamily="18" charset="0"/>
                                   </a:rPr>
                                 </m:ctrlPr>
@@ -11754,14 +12026,14 @@
                                 <m:sSub>
                                   <m:sSubPr>
                                     <m:ctrlPr>
-                                      <a:rPr lang="en-US" i="1">
+                                      <a:rPr lang="en-US" sz="1800" i="1">
                                         <a:latin typeface="Cambria Math" panose="02040503050406030204" pitchFamily="18" charset="0"/>
                                       </a:rPr>
                                     </m:ctrlPr>
                                   </m:sSubPr>
                                   <m:e>
                                     <m:r>
-                                      <a:rPr lang="en-US" i="1">
+                                      <a:rPr lang="en-US" sz="1800" i="1">
                                         <a:latin typeface="Cambria Math" panose="02040503050406030204" pitchFamily="18" charset="0"/>
                                       </a:rPr>
                                       <m:t>𝑘</m:t>
@@ -11769,7 +12041,7 @@
                                   </m:e>
                                   <m:sub>
                                     <m:r>
-                                      <a:rPr lang="en-US" i="1">
+                                      <a:rPr lang="en-US" sz="1800" i="1">
                                         <a:latin typeface="Cambria Math" panose="02040503050406030204" pitchFamily="18" charset="0"/>
                                       </a:rPr>
                                       <m:t>2</m:t>
@@ -11777,7 +12049,7 @@
                                   </m:sub>
                                 </m:sSub>
                                 <m:r>
-                                  <a:rPr lang="en-US" i="1">
+                                  <a:rPr lang="en-US" sz="1800" i="1">
                                     <a:latin typeface="Cambria Math" panose="02040503050406030204" pitchFamily="18" charset="0"/>
                                   </a:rPr>
                                   <m:t>𝑒</m:t>
@@ -11785,7 +12057,7 @@
                               </m:e>
                               <m:sup>
                                 <m:r>
-                                  <a:rPr lang="en-US" i="1">
+                                  <a:rPr lang="en-US" sz="1800" i="1">
                                     <a:latin typeface="Cambria Math" panose="02040503050406030204" pitchFamily="18" charset="0"/>
                                   </a:rPr>
                                   <m:t>−</m:t>
@@ -11793,14 +12065,14 @@
                                 <m:sSub>
                                   <m:sSubPr>
                                     <m:ctrlPr>
-                                      <a:rPr lang="en-US" i="1">
+                                      <a:rPr lang="en-US" sz="1800" i="1">
                                         <a:latin typeface="Cambria Math" panose="02040503050406030204" pitchFamily="18" charset="0"/>
                                       </a:rPr>
                                     </m:ctrlPr>
                                   </m:sSubPr>
                                   <m:e>
                                     <m:r>
-                                      <a:rPr lang="en-US" i="1">
+                                      <a:rPr lang="en-US" sz="1800" i="1">
                                         <a:latin typeface="Cambria Math" panose="02040503050406030204" pitchFamily="18" charset="0"/>
                                       </a:rPr>
                                       <m:t>𝑘</m:t>
@@ -11808,7 +12080,7 @@
                                   </m:e>
                                   <m:sub>
                                     <m:r>
-                                      <a:rPr lang="en-US" i="1">
+                                      <a:rPr lang="en-US" sz="1800" i="1">
                                         <a:latin typeface="Cambria Math" panose="02040503050406030204" pitchFamily="18" charset="0"/>
                                       </a:rPr>
                                       <m:t>1</m:t>
@@ -11816,7 +12088,7 @@
                                   </m:sub>
                                 </m:sSub>
                                 <m:r>
-                                  <a:rPr lang="en-US" i="1">
+                                  <a:rPr lang="en-US" sz="1800" i="1">
                                     <a:latin typeface="Cambria Math" panose="02040503050406030204" pitchFamily="18" charset="0"/>
                                   </a:rPr>
                                   <m:t>𝑡</m:t>
@@ -11828,14 +12100,14 @@
                             <m:sSub>
                               <m:sSubPr>
                                 <m:ctrlPr>
-                                  <a:rPr lang="en-US" i="1">
+                                  <a:rPr lang="en-US" sz="1800" i="1">
                                     <a:latin typeface="Cambria Math" panose="02040503050406030204" pitchFamily="18" charset="0"/>
                                   </a:rPr>
                                 </m:ctrlPr>
                               </m:sSubPr>
                               <m:e>
                                 <m:r>
-                                  <a:rPr lang="en-US" i="1">
+                                  <a:rPr lang="en-US" sz="1800" i="1">
                                     <a:latin typeface="Cambria Math" panose="02040503050406030204" pitchFamily="18" charset="0"/>
                                   </a:rPr>
                                   <m:t>𝑘</m:t>
@@ -11843,7 +12115,7 @@
                               </m:e>
                               <m:sub>
                                 <m:r>
-                                  <a:rPr lang="en-US" i="1">
+                                  <a:rPr lang="en-US" sz="1800" i="1">
                                     <a:latin typeface="Cambria Math" panose="02040503050406030204" pitchFamily="18" charset="0"/>
                                   </a:rPr>
                                   <m:t>2</m:t>
@@ -11851,7 +12123,7 @@
                               </m:sub>
                             </m:sSub>
                             <m:r>
-                              <a:rPr lang="en-US" i="1">
+                              <a:rPr lang="en-US" sz="1800" i="1">
                                 <a:latin typeface="Cambria Math" panose="02040503050406030204" pitchFamily="18" charset="0"/>
                               </a:rPr>
                               <m:t>−</m:t>
@@ -11859,14 +12131,14 @@
                             <m:sSub>
                               <m:sSubPr>
                                 <m:ctrlPr>
-                                  <a:rPr lang="en-US" i="1">
+                                  <a:rPr lang="en-US" sz="1800" i="1">
                                     <a:latin typeface="Cambria Math" panose="02040503050406030204" pitchFamily="18" charset="0"/>
                                   </a:rPr>
                                 </m:ctrlPr>
                               </m:sSubPr>
                               <m:e>
                                 <m:r>
-                                  <a:rPr lang="en-US" i="1">
+                                  <a:rPr lang="en-US" sz="1800" i="1">
                                     <a:latin typeface="Cambria Math" panose="02040503050406030204" pitchFamily="18" charset="0"/>
                                   </a:rPr>
                                   <m:t>𝑘</m:t>
@@ -11874,7 +12146,7 @@
                               </m:e>
                               <m:sub>
                                 <m:r>
-                                  <a:rPr lang="en-US" i="1">
+                                  <a:rPr lang="en-US" sz="1800" i="1">
                                     <a:latin typeface="Cambria Math" panose="02040503050406030204" pitchFamily="18" charset="0"/>
                                   </a:rPr>
                                   <m:t>1</m:t>
@@ -11888,26 +12160,26 @@
                     <m:sSub>
                       <m:sSubPr>
                         <m:ctrlPr>
-                          <a:rPr lang="en-US" i="1">
+                          <a:rPr lang="en-US" sz="1800" i="1">
                             <a:latin typeface="Cambria Math" panose="02040503050406030204" pitchFamily="18" charset="0"/>
                           </a:rPr>
                         </m:ctrlPr>
                       </m:sSubPr>
                       <m:e>
                         <m:r>
-                          <a:rPr lang="en-US" i="1">
+                          <a:rPr lang="en-US" sz="1800" i="1">
                             <a:latin typeface="Cambria Math" panose="02040503050406030204" pitchFamily="18" charset="0"/>
                           </a:rPr>
                           <m:t>[</m:t>
                         </m:r>
                         <m:r>
-                          <a:rPr lang="en-US" i="1">
+                          <a:rPr lang="en-US" sz="1800" i="1">
                             <a:latin typeface="Cambria Math" panose="02040503050406030204" pitchFamily="18" charset="0"/>
                           </a:rPr>
                           <m:t>𝐴</m:t>
                         </m:r>
                         <m:r>
-                          <a:rPr lang="en-US" i="1">
+                          <a:rPr lang="en-US" sz="1800" i="1">
                             <a:latin typeface="Cambria Math" panose="02040503050406030204" pitchFamily="18" charset="0"/>
                           </a:rPr>
                           <m:t>]</m:t>
@@ -11915,7 +12187,7 @@
                       </m:e>
                       <m:sub>
                         <m:r>
-                          <a:rPr lang="en-US" i="1">
+                          <a:rPr lang="en-US" sz="1800" i="1">
                             <a:latin typeface="Cambria Math" panose="02040503050406030204" pitchFamily="18" charset="0"/>
                           </a:rPr>
                           <m:t>𝑜</m:t>
@@ -11924,12 +12196,12 @@
                     </m:sSub>
                   </m:oMath>
                 </a14:m>
-                <a:endParaRPr lang="en-US" dirty="0" smtClean="0"/>
+                <a:endParaRPr lang="en-US" sz="1800" dirty="0" smtClean="0"/>
               </a:p>
             </p:txBody>
           </p:sp>
         </mc:Choice>
-        <mc:Fallback xmlns="">
+        <mc:Fallback>
           <p:sp>
             <p:nvSpPr>
               <p:cNvPr id="11" name="內容版面配置區 2"/>
@@ -11941,7 +12213,7 @@
             <p:spPr>
               <a:xfrm>
                 <a:off x="899592" y="1239472"/>
-                <a:ext cx="3615308" cy="3071977"/>
+                <a:ext cx="5760640" cy="3071977"/>
               </a:xfrm>
               <a:prstGeom prst="rect">
                 <a:avLst/>
@@ -11949,7 +12221,7 @@
               <a:blipFill>
                 <a:blip r:embed="rId4"/>
                 <a:stretch>
-                  <a:fillRect l="-506"/>
+                  <a:fillRect/>
                 </a:stretch>
               </a:blipFill>
             </p:spPr>
@@ -11976,7 +12248,7 @@
         </p:nvSpPr>
         <p:spPr>
           <a:xfrm>
-            <a:off x="6372200" y="2047477"/>
+            <a:off x="6336196" y="1952892"/>
             <a:ext cx="1656184" cy="2160240"/>
           </a:xfrm>
           <a:prstGeom prst="ellipse">
@@ -15285,8 +15557,8 @@
         </p:nvSpPr>
         <p:spPr>
           <a:xfrm>
-            <a:off x="595403" y="4676881"/>
-            <a:ext cx="3600400" cy="1200329"/>
+            <a:off x="539552" y="4697334"/>
+            <a:ext cx="4464496" cy="923330"/>
           </a:xfrm>
           <a:prstGeom prst="rect">
             <a:avLst/>
@@ -15300,39 +15572,73 @@
           <a:lstStyle/>
           <a:p>
             <a:r>
-              <a:rPr lang="en-HK" dirty="0"/>
+              <a:rPr lang="en-HK" dirty="0">
+                <a:latin typeface="Times New Roman" panose="02020603050405020304" pitchFamily="18" charset="0"/>
+                <a:cs typeface="Times New Roman" panose="02020603050405020304" pitchFamily="18" charset="0"/>
+              </a:rPr>
               <a:t>Concentration of CN</a:t>
             </a:r>
             <a:r>
-              <a:rPr lang="en-HK" baseline="30000" dirty="0"/>
+              <a:rPr lang="en-HK" baseline="30000" dirty="0">
+                <a:latin typeface="Times New Roman" panose="02020603050405020304" pitchFamily="18" charset="0"/>
+                <a:cs typeface="Times New Roman" panose="02020603050405020304" pitchFamily="18" charset="0"/>
+              </a:rPr>
               <a:t>-</a:t>
             </a:r>
             <a:r>
-              <a:rPr lang="en-HK" dirty="0"/>
+              <a:rPr lang="en-HK" dirty="0">
+                <a:latin typeface="Times New Roman" panose="02020603050405020304" pitchFamily="18" charset="0"/>
+                <a:cs typeface="Times New Roman" panose="02020603050405020304" pitchFamily="18" charset="0"/>
+              </a:rPr>
               <a:t> is not proportional to initial </a:t>
             </a:r>
             <a:r>
-              <a:rPr lang="en-HK" dirty="0" smtClean="0"/>
+              <a:rPr lang="en-HK" dirty="0" smtClean="0">
+                <a:latin typeface="Times New Roman" panose="02020603050405020304" pitchFamily="18" charset="0"/>
+                <a:cs typeface="Times New Roman" panose="02020603050405020304" pitchFamily="18" charset="0"/>
+              </a:rPr>
               <a:t>amount of CH</a:t>
             </a:r>
             <a:r>
-              <a:rPr lang="en-HK" baseline="-25000" dirty="0" smtClean="0"/>
+              <a:rPr lang="en-HK" baseline="-25000" dirty="0" smtClean="0">
+                <a:latin typeface="Times New Roman" panose="02020603050405020304" pitchFamily="18" charset="0"/>
+                <a:cs typeface="Times New Roman" panose="02020603050405020304" pitchFamily="18" charset="0"/>
+              </a:rPr>
               <a:t>4</a:t>
             </a:r>
             <a:r>
-              <a:rPr lang="en-HK" dirty="0" smtClean="0"/>
+              <a:rPr lang="en-HK" dirty="0" smtClean="0">
+                <a:latin typeface="Times New Roman" panose="02020603050405020304" pitchFamily="18" charset="0"/>
+                <a:cs typeface="Times New Roman" panose="02020603050405020304" pitchFamily="18" charset="0"/>
+              </a:rPr>
               <a:t> </a:t>
             </a:r>
             <a:r>
-              <a:rPr lang="en-HK" dirty="0"/>
-              <a:t>when CH</a:t>
-            </a:r>
-            <a:r>
-              <a:rPr lang="en-HK" baseline="-25000" dirty="0"/>
+              <a:rPr lang="en-HK" dirty="0" smtClean="0">
+                <a:latin typeface="Times New Roman" panose="02020603050405020304" pitchFamily="18" charset="0"/>
+                <a:cs typeface="Times New Roman" panose="02020603050405020304" pitchFamily="18" charset="0"/>
+              </a:rPr>
+              <a:t>when </a:t>
+            </a:r>
+            <a:r>
+              <a:rPr lang="en-HK" dirty="0">
+                <a:latin typeface="Times New Roman" panose="02020603050405020304" pitchFamily="18" charset="0"/>
+                <a:cs typeface="Times New Roman" panose="02020603050405020304" pitchFamily="18" charset="0"/>
+              </a:rPr>
+              <a:t>CH</a:t>
+            </a:r>
+            <a:r>
+              <a:rPr lang="en-HK" baseline="-25000" dirty="0">
+                <a:latin typeface="Times New Roman" panose="02020603050405020304" pitchFamily="18" charset="0"/>
+                <a:cs typeface="Times New Roman" panose="02020603050405020304" pitchFamily="18" charset="0"/>
+              </a:rPr>
               <a:t>4</a:t>
             </a:r>
             <a:r>
-              <a:rPr lang="en-HK" dirty="0"/>
+              <a:rPr lang="en-HK" dirty="0">
+                <a:latin typeface="Times New Roman" panose="02020603050405020304" pitchFamily="18" charset="0"/>
+                <a:cs typeface="Times New Roman" panose="02020603050405020304" pitchFamily="18" charset="0"/>
+              </a:rPr>
               <a:t> is in excess.</a:t>
             </a:r>
           </a:p>
@@ -15363,7 +15669,7 @@
           <a:graphicData uri="http://schemas.openxmlformats.org/presentationml/2006/ole">
             <mc:AlternateContent xmlns:mc="http://schemas.openxmlformats.org/markup-compatibility/2006">
               <mc:Choice xmlns:v="urn:schemas-microsoft-com:vml" Requires="v">
-                <p:oleObj spid="_x0000_s1865" name="Graph" r:id="rId3" imgW="4754880" imgH="3108960" progId="Origin50.Graph">
+                <p:oleObj spid="_x0000_s1979" name="Graph" r:id="rId3" imgW="4754880" imgH="3108960" progId="Origin50.Graph">
                   <p:embed/>
                 </p:oleObj>
               </mc:Choice>
@@ -15447,450 +15753,20 @@
         </p:nvSpPr>
         <p:spPr/>
         <p:txBody>
-          <a:bodyPr>
-            <a:normAutofit fontScale="90000"/>
-          </a:bodyPr>
-          <a:lstStyle/>
-          <a:p>
-            <a:r>
-              <a:rPr lang="en-HK" dirty="0" smtClean="0"/>
-              <a:t>3. Energy needed for forming radicals by </a:t>
-            </a:r>
-            <a:r>
-              <a:rPr lang="en-HK" dirty="0"/>
-              <a:t>EUV </a:t>
-            </a:r>
-            <a:r>
-              <a:rPr lang="en-HK" dirty="0" smtClean="0"/>
-              <a:t>(40.1 eV) and VUV (</a:t>
-            </a:r>
-            <a:r>
-              <a:rPr lang="en-HK" dirty="0" smtClean="0">
-                <a:solidFill>
-                  <a:srgbClr val="0070C0"/>
-                </a:solidFill>
-              </a:rPr>
-              <a:t>9.27</a:t>
-            </a:r>
-            <a:r>
-              <a:rPr lang="en-HK" dirty="0" smtClean="0"/>
-              <a:t> eV)</a:t>
-            </a:r>
-            <a:endParaRPr lang="en-US" dirty="0"/>
-          </a:p>
-        </p:txBody>
-      </p:sp>
-      <p:graphicFrame>
-        <p:nvGraphicFramePr>
-          <p:cNvPr id="7" name="內容版面配置區 6"/>
-          <p:cNvGraphicFramePr>
-            <a:graphicFrameLocks noGrp="1"/>
-          </p:cNvGraphicFramePr>
-          <p:nvPr>
-            <p:ph idx="1"/>
-            <p:extLst>
-              <p:ext uri="{D42A27DB-BD31-4B8C-83A1-F6EECF244321}">
-                <p14:modId xmlns:p14="http://schemas.microsoft.com/office/powerpoint/2010/main" val="4057121118"/>
-              </p:ext>
-            </p:extLst>
-          </p:nvPr>
-        </p:nvGraphicFramePr>
-        <p:xfrm>
-          <a:off x="1028700" y="1905000"/>
-          <a:ext cx="7200897" cy="3211521"/>
-        </p:xfrm>
-        <a:graphic>
-          <a:graphicData uri="http://schemas.openxmlformats.org/drawingml/2006/table">
-            <a:tbl>
-              <a:tblPr firstRow="1" bandRow="1">
-                <a:tableStyleId>{5C22544A-7EE6-4342-B048-85BDC9FD1C3A}</a:tableStyleId>
-              </a:tblPr>
-              <a:tblGrid>
-                <a:gridCol w="2400299">
-                  <a:extLst>
-                    <a:ext uri="{9D8B030D-6E8A-4147-A177-3AD203B41FA5}">
-                      <a16:colId xmlns:a16="http://schemas.microsoft.com/office/drawing/2014/main" val="3148882185"/>
-                    </a:ext>
-                  </a:extLst>
-                </a:gridCol>
-                <a:gridCol w="2400299">
-                  <a:extLst>
-                    <a:ext uri="{9D8B030D-6E8A-4147-A177-3AD203B41FA5}">
-                      <a16:colId xmlns:a16="http://schemas.microsoft.com/office/drawing/2014/main" val="2229743084"/>
-                    </a:ext>
-                  </a:extLst>
-                </a:gridCol>
-                <a:gridCol w="2400299">
-                  <a:extLst>
-                    <a:ext uri="{9D8B030D-6E8A-4147-A177-3AD203B41FA5}">
-                      <a16:colId xmlns:a16="http://schemas.microsoft.com/office/drawing/2014/main" val="1174113647"/>
-                    </a:ext>
-                  </a:extLst>
-                </a:gridCol>
-              </a:tblGrid>
-              <a:tr h="796187">
-                <a:tc>
-                  <a:txBody>
-                    <a:bodyPr/>
-                    <a:lstStyle/>
-                    <a:p>
-                      <a:pPr algn="l"/>
-                      <a:r>
-                        <a:rPr lang="en-US" sz="2400" dirty="0" smtClean="0"/>
-                        <a:t>Radicals                  species</a:t>
-                      </a:r>
-                      <a:endParaRPr lang="en-US" sz="2400" dirty="0"/>
-                    </a:p>
-                  </a:txBody>
-                  <a:tcPr marL="90325" marR="90325" anchor="ctr"/>
-                </a:tc>
-                <a:tc>
-                  <a:txBody>
-                    <a:bodyPr/>
-                    <a:lstStyle/>
-                    <a:p>
-                      <a:pPr algn="ctr"/>
-                      <a:r>
-                        <a:rPr lang="en-HK" sz="2400" dirty="0" smtClean="0"/>
-                        <a:t>CH</a:t>
-                      </a:r>
-                      <a:r>
-                        <a:rPr lang="en-HK" sz="2400" baseline="-25000" dirty="0" smtClean="0"/>
-                        <a:t>4</a:t>
-                      </a:r>
-                      <a:endParaRPr lang="en-US" sz="2400" baseline="-25000" dirty="0"/>
-                    </a:p>
-                  </a:txBody>
-                  <a:tcPr marL="90325" marR="90325" anchor="ctr"/>
-                </a:tc>
-                <a:tc>
-                  <a:txBody>
-                    <a:bodyPr/>
-                    <a:lstStyle/>
-                    <a:p>
-                      <a:pPr algn="ctr"/>
-                      <a:r>
-                        <a:rPr lang="en-HK" sz="2400" dirty="0" smtClean="0"/>
-                        <a:t>NH</a:t>
-                      </a:r>
-                      <a:r>
-                        <a:rPr lang="en-HK" sz="2400" baseline="-25000" dirty="0" smtClean="0"/>
-                        <a:t>3</a:t>
-                      </a:r>
-                      <a:endParaRPr lang="en-US" sz="2400" baseline="-25000" dirty="0"/>
-                    </a:p>
-                  </a:txBody>
-                  <a:tcPr marL="90325" marR="90325" anchor="ctr"/>
-                </a:tc>
-                <a:extLst>
-                  <a:ext uri="{0D108BD9-81ED-4DB2-BD59-A6C34878D82A}">
-                    <a16:rowId xmlns:a16="http://schemas.microsoft.com/office/drawing/2014/main" val="4089148868"/>
-                  </a:ext>
-                </a:extLst>
-              </a:tr>
-              <a:tr h="796187">
-                <a:tc>
-                  <a:txBody>
-                    <a:bodyPr/>
-                    <a:lstStyle/>
-                    <a:p>
-                      <a:pPr algn="ctr"/>
-                      <a:r>
-                        <a:rPr lang="en-HK" sz="2400" dirty="0" smtClean="0"/>
-                        <a:t>- 1 H</a:t>
-                      </a:r>
-                      <a:endParaRPr lang="en-US" sz="2400" dirty="0"/>
-                    </a:p>
-                  </a:txBody>
-                  <a:tcPr marL="90325" marR="90325" anchor="ctr"/>
-                </a:tc>
-                <a:tc>
-                  <a:txBody>
-                    <a:bodyPr/>
-                    <a:lstStyle/>
-                    <a:p>
-                      <a:pPr algn="ctr"/>
-                      <a:r>
-                        <a:rPr lang="en-HK" sz="2400" dirty="0" smtClean="0"/>
-                        <a:t>4.55 eV</a:t>
-                      </a:r>
-                      <a:endParaRPr lang="en-US" sz="2400" dirty="0"/>
-                    </a:p>
-                  </a:txBody>
-                  <a:tcPr marL="90325" marR="90325" anchor="ctr"/>
-                </a:tc>
-                <a:tc>
-                  <a:txBody>
-                    <a:bodyPr/>
-                    <a:lstStyle/>
-                    <a:p>
-                      <a:pPr algn="ctr"/>
-                      <a:r>
-                        <a:rPr lang="en-HK" sz="2400" dirty="0" smtClean="0"/>
-                        <a:t>4.67 eV</a:t>
-                      </a:r>
-                      <a:endParaRPr lang="en-US" sz="2400" dirty="0"/>
-                    </a:p>
-                  </a:txBody>
-                  <a:tcPr marL="90325" marR="90325" anchor="ctr"/>
-                </a:tc>
-                <a:extLst>
-                  <a:ext uri="{0D108BD9-81ED-4DB2-BD59-A6C34878D82A}">
-                    <a16:rowId xmlns:a16="http://schemas.microsoft.com/office/drawing/2014/main" val="3250587630"/>
-                  </a:ext>
-                </a:extLst>
-              </a:tr>
-              <a:tr h="796187">
-                <a:tc>
-                  <a:txBody>
-                    <a:bodyPr/>
-                    <a:lstStyle/>
-                    <a:p>
-                      <a:pPr algn="ctr"/>
-                      <a:r>
-                        <a:rPr lang="en-HK" sz="2400" dirty="0" smtClean="0"/>
-                        <a:t>-2 H</a:t>
-                      </a:r>
-                      <a:endParaRPr lang="en-US" sz="2400" dirty="0"/>
-                    </a:p>
-                  </a:txBody>
-                  <a:tcPr marL="90325" marR="90325" anchor="ctr"/>
-                </a:tc>
-                <a:tc>
-                  <a:txBody>
-                    <a:bodyPr/>
-                    <a:lstStyle/>
-                    <a:p>
-                      <a:pPr algn="ctr"/>
-                      <a:r>
-                        <a:rPr lang="en-HK" sz="2400" dirty="0" smtClean="0"/>
-                        <a:t>4.78 eV</a:t>
-                      </a:r>
-                      <a:endParaRPr lang="en-US" sz="2400" dirty="0"/>
-                    </a:p>
-                  </a:txBody>
-                  <a:tcPr marL="90325" marR="90325" anchor="ctr"/>
-                </a:tc>
-                <a:tc>
-                  <a:txBody>
-                    <a:bodyPr/>
-                    <a:lstStyle/>
-                    <a:p>
-                      <a:pPr algn="ctr"/>
-                      <a:r>
-                        <a:rPr lang="en-HK" sz="2400" dirty="0" smtClean="0"/>
-                        <a:t>4.38  eV</a:t>
-                      </a:r>
-                      <a:endParaRPr lang="en-US" sz="2400" dirty="0"/>
-                    </a:p>
-                  </a:txBody>
-                  <a:tcPr marL="90325" marR="90325" anchor="ctr"/>
-                </a:tc>
-                <a:extLst>
-                  <a:ext uri="{0D108BD9-81ED-4DB2-BD59-A6C34878D82A}">
-                    <a16:rowId xmlns:a16="http://schemas.microsoft.com/office/drawing/2014/main" val="36223453"/>
-                  </a:ext>
-                </a:extLst>
-              </a:tr>
-              <a:tr h="796187">
-                <a:tc>
-                  <a:txBody>
-                    <a:bodyPr/>
-                    <a:lstStyle/>
-                    <a:p>
-                      <a:pPr algn="ctr"/>
-                      <a:r>
-                        <a:rPr lang="en-HK" sz="2400" dirty="0" smtClean="0"/>
-                        <a:t>-3 H</a:t>
-                      </a:r>
-                      <a:endParaRPr lang="en-US" sz="2400" dirty="0"/>
-                    </a:p>
-                  </a:txBody>
-                  <a:tcPr marL="90325" marR="90325" anchor="ctr"/>
-                </a:tc>
-                <a:tc>
-                  <a:txBody>
-                    <a:bodyPr/>
-                    <a:lstStyle/>
-                    <a:p>
-                      <a:pPr algn="ctr"/>
-                      <a:r>
-                        <a:rPr lang="en-HK" sz="2400" dirty="0" smtClean="0">
-                          <a:solidFill>
-                            <a:srgbClr val="0070C0"/>
-                          </a:solidFill>
-                        </a:rPr>
-                        <a:t>9.19 eV</a:t>
-                      </a:r>
-                      <a:endParaRPr lang="en-US" sz="2400" dirty="0">
-                        <a:solidFill>
-                          <a:srgbClr val="0070C0"/>
-                        </a:solidFill>
-                      </a:endParaRPr>
-                    </a:p>
-                  </a:txBody>
-                  <a:tcPr marL="90325" marR="90325" anchor="ctr"/>
-                </a:tc>
-                <a:tc>
-                  <a:txBody>
-                    <a:bodyPr/>
-                    <a:lstStyle/>
-                    <a:p>
-                      <a:pPr algn="ctr"/>
-                      <a:r>
-                        <a:rPr lang="en-HK" sz="2400" dirty="0" smtClean="0">
-                          <a:solidFill>
-                            <a:srgbClr val="0070C0"/>
-                          </a:solidFill>
-                        </a:rPr>
-                        <a:t>7.</a:t>
-                      </a:r>
-                      <a:r>
-                        <a:rPr lang="en-HK" sz="2400" baseline="0" dirty="0" smtClean="0">
-                          <a:solidFill>
-                            <a:srgbClr val="0070C0"/>
-                          </a:solidFill>
-                        </a:rPr>
-                        <a:t>63 eV</a:t>
-                      </a:r>
-                      <a:endParaRPr lang="en-US" sz="2400" dirty="0">
-                        <a:solidFill>
-                          <a:srgbClr val="0070C0"/>
-                        </a:solidFill>
-                      </a:endParaRPr>
-                    </a:p>
-                  </a:txBody>
-                  <a:tcPr marL="90325" marR="90325" anchor="ctr"/>
-                </a:tc>
-                <a:extLst>
-                  <a:ext uri="{0D108BD9-81ED-4DB2-BD59-A6C34878D82A}">
-                    <a16:rowId xmlns:a16="http://schemas.microsoft.com/office/drawing/2014/main" val="1330999748"/>
-                  </a:ext>
-                </a:extLst>
-              </a:tr>
-            </a:tbl>
-          </a:graphicData>
-        </a:graphic>
-      </p:graphicFrame>
-      <p:sp>
-        <p:nvSpPr>
-          <p:cNvPr id="4" name="投影片編號版面配置區 3"/>
-          <p:cNvSpPr>
-            <a:spLocks noGrp="1"/>
-          </p:cNvSpPr>
-          <p:nvPr>
-            <p:ph type="sldNum" sz="quarter" idx="12"/>
-          </p:nvPr>
-        </p:nvSpPr>
-        <p:spPr/>
-        <p:txBody>
           <a:bodyPr/>
           <a:lstStyle/>
           <a:p>
-            <a:fld id="{B646D8CA-B2C0-41A8-8514-369D0B0735D6}" type="slidenum">
-              <a:rPr lang="zh-TW" altLang="en-US" sz="2000" smtClean="0"/>
-              <a:t>24</a:t>
-            </a:fld>
-            <a:endParaRPr lang="zh-TW" altLang="en-US" sz="2000" dirty="0"/>
-          </a:p>
-        </p:txBody>
-      </p:sp>
-      <p:sp>
-        <p:nvSpPr>
-          <p:cNvPr id="3" name="矩形 2"/>
-          <p:cNvSpPr/>
-          <p:nvPr/>
-        </p:nvSpPr>
-        <p:spPr>
-          <a:xfrm>
-            <a:off x="4283968" y="5083531"/>
-            <a:ext cx="3197222" cy="256480"/>
-          </a:xfrm>
-          <a:prstGeom prst="rect">
-            <a:avLst/>
-          </a:prstGeom>
-        </p:spPr>
-        <p:txBody>
-          <a:bodyPr wrap="none">
-            <a:spAutoFit/>
-          </a:bodyPr>
-          <a:lstStyle/>
-          <a:p>
-            <a:pPr lvl="2"/>
-            <a:r>
-              <a:rPr lang="en-HK" sz="1600" baseline="-25000" dirty="0"/>
-              <a:t>(quoted from </a:t>
-            </a:r>
-            <a:r>
-              <a:rPr lang="en-HK" sz="1600" baseline="-25000" dirty="0" err="1"/>
-              <a:t>Kundu</a:t>
-            </a:r>
-            <a:r>
-              <a:rPr lang="en-HK" sz="1600" baseline="-25000" dirty="0"/>
-              <a:t> et al. (2017))</a:t>
-            </a:r>
-          </a:p>
-        </p:txBody>
-      </p:sp>
-    </p:spTree>
-    <p:extLst>
-      <p:ext uri="{BB962C8B-B14F-4D97-AF65-F5344CB8AC3E}">
-        <p14:creationId xmlns:p14="http://schemas.microsoft.com/office/powerpoint/2010/main" val="882420126"/>
-      </p:ext>
-    </p:extLst>
-  </p:cSld>
-  <p:clrMapOvr>
-    <a:masterClrMapping/>
-  </p:clrMapOvr>
-  <p:timing>
-    <p:tnLst>
-      <p:par>
-        <p:cTn id="1" dur="indefinite" restart="never" nodeType="tmRoot"/>
-      </p:par>
-    </p:tnLst>
-  </p:timing>
-</p:sld>
-</file>
-
-<file path=ppt/slides/slide25.xml><?xml version="1.0" encoding="utf-8"?>
-<p:sld xmlns:a="http://schemas.openxmlformats.org/drawingml/2006/main" xmlns:r="http://schemas.openxmlformats.org/officeDocument/2006/relationships" xmlns:p="http://schemas.openxmlformats.org/presentationml/2006/main">
-  <p:cSld>
-    <p:spTree>
-      <p:nvGrpSpPr>
-        <p:cNvPr id="1" name=""/>
-        <p:cNvGrpSpPr/>
-        <p:nvPr/>
-      </p:nvGrpSpPr>
-      <p:grpSpPr>
-        <a:xfrm>
-          <a:off x="0" y="0"/>
-          <a:ext cx="0" cy="0"/>
-          <a:chOff x="0" y="0"/>
-          <a:chExt cx="0" cy="0"/>
-        </a:xfrm>
-      </p:grpSpPr>
-      <p:sp>
-        <p:nvSpPr>
-          <p:cNvPr id="2" name="標題 1"/>
-          <p:cNvSpPr>
-            <a:spLocks noGrp="1"/>
-          </p:cNvSpPr>
-          <p:nvPr>
-            <p:ph type="title"/>
-          </p:nvPr>
-        </p:nvSpPr>
-        <p:spPr/>
-        <p:txBody>
-          <a:bodyPr/>
-          <a:lstStyle/>
-          <a:p>
             <a:r>
               <a:rPr lang="en-HK" dirty="0" smtClean="0"/>
-              <a:t>3. Destruction cross-section of </a:t>
+              <a:t>3. </a:t>
+            </a:r>
+            <a:r>
+              <a:rPr lang="en-HK" dirty="0" smtClean="0"/>
+              <a:t>Rate constant of reactants by EUV </a:t>
             </a:r>
             <a:r>
               <a:rPr lang="en-HK" dirty="0"/>
-              <a:t>EUV (40.1 eV) and VUV (9.27 eV)</a:t>
+              <a:t>(40.1 eV) and VUV (9.27 eV)</a:t>
             </a:r>
             <a:endParaRPr lang="en-US" dirty="0"/>
           </a:p>
@@ -15949,7 +15825,15 @@
             </a:r>
             <a:r>
               <a:rPr lang="en-HK" sz="2000" dirty="0" smtClean="0"/>
-              <a:t>(pseudo first order kinetics)</a:t>
+              <a:t>(first </a:t>
+            </a:r>
+            <a:r>
+              <a:rPr lang="en-HK" sz="2000" dirty="0" smtClean="0"/>
+              <a:t>order </a:t>
+            </a:r>
+            <a:r>
+              <a:rPr lang="en-HK" sz="2000" dirty="0" smtClean="0"/>
+              <a:t>decay)</a:t>
             </a:r>
             <a:endParaRPr lang="en-HK" dirty="0" smtClean="0"/>
           </a:p>
@@ -15994,7 +15878,7 @@
           <a:p>
             <a:fld id="{B646D8CA-B2C0-41A8-8514-369D0B0735D6}" type="slidenum">
               <a:rPr lang="zh-TW" altLang="en-US" sz="2000" smtClean="0"/>
-              <a:t>25</a:t>
+              <a:t>24</a:t>
             </a:fld>
             <a:endParaRPr lang="zh-TW" altLang="en-US" sz="2000" dirty="0"/>
           </a:p>
@@ -16022,7 +15906,7 @@
           <a:graphicData uri="http://schemas.openxmlformats.org/presentationml/2006/ole">
             <mc:AlternateContent xmlns:mc="http://schemas.openxmlformats.org/markup-compatibility/2006">
               <mc:Choice xmlns:v="urn:schemas-microsoft-com:vml" Requires="v">
-                <p:oleObj spid="_x0000_s13514" name="Graph" r:id="rId3" imgW="4754880" imgH="3108960" progId="Origin50.Graph">
+                <p:oleObj spid="_x0000_s13742" name="Graph" r:id="rId3" imgW="4754880" imgH="3108960" progId="Origin50.Graph">
                   <p:embed/>
                 </p:oleObj>
               </mc:Choice>
@@ -16079,7 +15963,7 @@
           <a:graphicData uri="http://schemas.openxmlformats.org/presentationml/2006/ole">
             <mc:AlternateContent xmlns:mc="http://schemas.openxmlformats.org/markup-compatibility/2006">
               <mc:Choice xmlns:v="urn:schemas-microsoft-com:vml" Requires="v">
-                <p:oleObj spid="_x0000_s13515" name="Graph" r:id="rId5" imgW="4754880" imgH="3108960" progId="Origin50.Graph">
+                <p:oleObj spid="_x0000_s13743" name="Graph" r:id="rId5" imgW="4754880" imgH="3108960" progId="Origin50.Graph">
                   <p:embed/>
                 </p:oleObj>
               </mc:Choice>
@@ -16134,7 +16018,7 @@
 </p:sld>
 </file>
 
-<file path=ppt/slides/slide26.xml><?xml version="1.0" encoding="utf-8"?>
+<file path=ppt/slides/slide25.xml><?xml version="1.0" encoding="utf-8"?>
 <p:sld xmlns:a="http://schemas.openxmlformats.org/drawingml/2006/main" xmlns:r="http://schemas.openxmlformats.org/officeDocument/2006/relationships" xmlns:p="http://schemas.openxmlformats.org/presentationml/2006/main">
   <p:cSld>
     <p:spTree>
@@ -16203,7 +16087,7 @@
           <a:p>
             <a:fld id="{B646D8CA-B2C0-41A8-8514-369D0B0735D6}" type="slidenum">
               <a:rPr lang="zh-TW" altLang="en-US" sz="2000" smtClean="0"/>
-              <a:t>26</a:t>
+              <a:t>25</a:t>
             </a:fld>
             <a:endParaRPr lang="zh-TW" altLang="en-US" sz="2000" dirty="0"/>
           </a:p>
@@ -16219,7 +16103,7 @@
             <p:ph idx="1"/>
             <p:extLst>
               <p:ext uri="{D42A27DB-BD31-4B8C-83A1-F6EECF244321}">
-                <p14:modId xmlns:p14="http://schemas.microsoft.com/office/powerpoint/2010/main" val="287181430"/>
+                <p14:modId xmlns:p14="http://schemas.microsoft.com/office/powerpoint/2010/main" val="2403186586"/>
               </p:ext>
             </p:extLst>
           </p:nvPr>
@@ -16782,7 +16666,7 @@
                         <a:rPr lang="en-US" sz="1400" u="none" strike="noStrike" baseline="0" dirty="0" smtClean="0">
                           <a:effectLst/>
                         </a:rPr>
-                        <a:t>to</a:t>
+                        <a:t>:</a:t>
                       </a:r>
                       <a:r>
                         <a:rPr lang="en-US" sz="1400" u="none" strike="noStrike" baseline="-25000" dirty="0" smtClean="0">
@@ -16868,13 +16752,7 @@
                         <a:rPr lang="en-US" sz="1400" u="none" strike="noStrike" baseline="0" dirty="0" smtClean="0">
                           <a:effectLst/>
                         </a:rPr>
-                        <a:t>to</a:t>
-                      </a:r>
-                      <a:r>
-                        <a:rPr lang="en-US" sz="1400" u="none" strike="noStrike" baseline="-25000" dirty="0" smtClean="0">
-                          <a:effectLst/>
-                        </a:rPr>
-                        <a:t> </a:t>
+                        <a:t>: </a:t>
                       </a:r>
                       <a:r>
                         <a:rPr lang="en-US" sz="1400" u="none" strike="noStrike" dirty="0" smtClean="0">
@@ -17231,7 +17109,7 @@
           <a:graphicData uri="http://schemas.openxmlformats.org/presentationml/2006/ole">
             <mc:AlternateContent xmlns:mc="http://schemas.openxmlformats.org/markup-compatibility/2006">
               <mc:Choice xmlns:v="urn:schemas-microsoft-com:vml" Requires="v">
-                <p:oleObj spid="_x0000_s3718" name="Graph" r:id="rId3" imgW="4754880" imgH="3108960" progId="Origin50.Graph">
+                <p:oleObj spid="_x0000_s3832" name="Graph" r:id="rId3" imgW="4754880" imgH="3108960" progId="Origin50.Graph">
                   <p:embed/>
                 </p:oleObj>
               </mc:Choice>
@@ -17286,6 +17164,449 @@
 </p:sld>
 </file>
 
+<file path=ppt/slides/slide26.xml><?xml version="1.0" encoding="utf-8"?>
+<p:sld xmlns:a="http://schemas.openxmlformats.org/drawingml/2006/main" xmlns:r="http://schemas.openxmlformats.org/officeDocument/2006/relationships" xmlns:p="http://schemas.openxmlformats.org/presentationml/2006/main">
+  <p:cSld>
+    <p:spTree>
+      <p:nvGrpSpPr>
+        <p:cNvPr id="1" name=""/>
+        <p:cNvGrpSpPr/>
+        <p:nvPr/>
+      </p:nvGrpSpPr>
+      <p:grpSpPr>
+        <a:xfrm>
+          <a:off x="0" y="0"/>
+          <a:ext cx="0" cy="0"/>
+          <a:chOff x="0" y="0"/>
+          <a:chExt cx="0" cy="0"/>
+        </a:xfrm>
+      </p:grpSpPr>
+      <p:sp>
+        <p:nvSpPr>
+          <p:cNvPr id="2" name="標題 1"/>
+          <p:cNvSpPr>
+            <a:spLocks noGrp="1"/>
+          </p:cNvSpPr>
+          <p:nvPr>
+            <p:ph type="title"/>
+          </p:nvPr>
+        </p:nvSpPr>
+        <p:spPr/>
+        <p:txBody>
+          <a:bodyPr>
+            <a:normAutofit fontScale="90000"/>
+          </a:bodyPr>
+          <a:lstStyle/>
+          <a:p>
+            <a:r>
+              <a:rPr lang="en-HK" dirty="0" smtClean="0"/>
+              <a:t>3. Energy needed for forming radicals by </a:t>
+            </a:r>
+            <a:r>
+              <a:rPr lang="en-HK" dirty="0"/>
+              <a:t>EUV </a:t>
+            </a:r>
+            <a:r>
+              <a:rPr lang="en-HK" dirty="0" smtClean="0"/>
+              <a:t>(40.1 eV) and VUV (</a:t>
+            </a:r>
+            <a:r>
+              <a:rPr lang="en-HK" dirty="0" smtClean="0">
+                <a:solidFill>
+                  <a:srgbClr val="0070C0"/>
+                </a:solidFill>
+              </a:rPr>
+              <a:t>9.27</a:t>
+            </a:r>
+            <a:r>
+              <a:rPr lang="en-HK" dirty="0" smtClean="0"/>
+              <a:t> eV)</a:t>
+            </a:r>
+            <a:endParaRPr lang="en-US" dirty="0"/>
+          </a:p>
+        </p:txBody>
+      </p:sp>
+      <p:graphicFrame>
+        <p:nvGraphicFramePr>
+          <p:cNvPr id="7" name="內容版面配置區 6"/>
+          <p:cNvGraphicFramePr>
+            <a:graphicFrameLocks noGrp="1"/>
+          </p:cNvGraphicFramePr>
+          <p:nvPr>
+            <p:ph idx="1"/>
+            <p:extLst>
+              <p:ext uri="{D42A27DB-BD31-4B8C-83A1-F6EECF244321}">
+                <p14:modId xmlns:p14="http://schemas.microsoft.com/office/powerpoint/2010/main" val="4057121118"/>
+              </p:ext>
+            </p:extLst>
+          </p:nvPr>
+        </p:nvGraphicFramePr>
+        <p:xfrm>
+          <a:off x="1028700" y="1905000"/>
+          <a:ext cx="7200897" cy="3211521"/>
+        </p:xfrm>
+        <a:graphic>
+          <a:graphicData uri="http://schemas.openxmlformats.org/drawingml/2006/table">
+            <a:tbl>
+              <a:tblPr firstRow="1" bandRow="1">
+                <a:tableStyleId>{5C22544A-7EE6-4342-B048-85BDC9FD1C3A}</a:tableStyleId>
+              </a:tblPr>
+              <a:tblGrid>
+                <a:gridCol w="2400299">
+                  <a:extLst>
+                    <a:ext uri="{9D8B030D-6E8A-4147-A177-3AD203B41FA5}">
+                      <a16:colId xmlns:a16="http://schemas.microsoft.com/office/drawing/2014/main" val="3148882185"/>
+                    </a:ext>
+                  </a:extLst>
+                </a:gridCol>
+                <a:gridCol w="2400299">
+                  <a:extLst>
+                    <a:ext uri="{9D8B030D-6E8A-4147-A177-3AD203B41FA5}">
+                      <a16:colId xmlns:a16="http://schemas.microsoft.com/office/drawing/2014/main" val="2229743084"/>
+                    </a:ext>
+                  </a:extLst>
+                </a:gridCol>
+                <a:gridCol w="2400299">
+                  <a:extLst>
+                    <a:ext uri="{9D8B030D-6E8A-4147-A177-3AD203B41FA5}">
+                      <a16:colId xmlns:a16="http://schemas.microsoft.com/office/drawing/2014/main" val="1174113647"/>
+                    </a:ext>
+                  </a:extLst>
+                </a:gridCol>
+              </a:tblGrid>
+              <a:tr h="796187">
+                <a:tc>
+                  <a:txBody>
+                    <a:bodyPr/>
+                    <a:lstStyle/>
+                    <a:p>
+                      <a:pPr algn="l"/>
+                      <a:r>
+                        <a:rPr lang="en-US" sz="2400" dirty="0" smtClean="0"/>
+                        <a:t>Radicals                  species</a:t>
+                      </a:r>
+                      <a:endParaRPr lang="en-US" sz="2400" dirty="0"/>
+                    </a:p>
+                  </a:txBody>
+                  <a:tcPr marL="90325" marR="90325" anchor="ctr"/>
+                </a:tc>
+                <a:tc>
+                  <a:txBody>
+                    <a:bodyPr/>
+                    <a:lstStyle/>
+                    <a:p>
+                      <a:pPr algn="ctr"/>
+                      <a:r>
+                        <a:rPr lang="en-HK" sz="2400" dirty="0" smtClean="0"/>
+                        <a:t>CH</a:t>
+                      </a:r>
+                      <a:r>
+                        <a:rPr lang="en-HK" sz="2400" baseline="-25000" dirty="0" smtClean="0"/>
+                        <a:t>4</a:t>
+                      </a:r>
+                      <a:endParaRPr lang="en-US" sz="2400" baseline="-25000" dirty="0"/>
+                    </a:p>
+                  </a:txBody>
+                  <a:tcPr marL="90325" marR="90325" anchor="ctr"/>
+                </a:tc>
+                <a:tc>
+                  <a:txBody>
+                    <a:bodyPr/>
+                    <a:lstStyle/>
+                    <a:p>
+                      <a:pPr algn="ctr"/>
+                      <a:r>
+                        <a:rPr lang="en-HK" sz="2400" dirty="0" smtClean="0"/>
+                        <a:t>NH</a:t>
+                      </a:r>
+                      <a:r>
+                        <a:rPr lang="en-HK" sz="2400" baseline="-25000" dirty="0" smtClean="0"/>
+                        <a:t>3</a:t>
+                      </a:r>
+                      <a:endParaRPr lang="en-US" sz="2400" baseline="-25000" dirty="0"/>
+                    </a:p>
+                  </a:txBody>
+                  <a:tcPr marL="90325" marR="90325" anchor="ctr"/>
+                </a:tc>
+                <a:extLst>
+                  <a:ext uri="{0D108BD9-81ED-4DB2-BD59-A6C34878D82A}">
+                    <a16:rowId xmlns:a16="http://schemas.microsoft.com/office/drawing/2014/main" val="4089148868"/>
+                  </a:ext>
+                </a:extLst>
+              </a:tr>
+              <a:tr h="796187">
+                <a:tc>
+                  <a:txBody>
+                    <a:bodyPr/>
+                    <a:lstStyle/>
+                    <a:p>
+                      <a:pPr algn="ctr"/>
+                      <a:r>
+                        <a:rPr lang="en-HK" sz="2400" dirty="0" smtClean="0"/>
+                        <a:t>- 1 H</a:t>
+                      </a:r>
+                      <a:endParaRPr lang="en-US" sz="2400" dirty="0"/>
+                    </a:p>
+                  </a:txBody>
+                  <a:tcPr marL="90325" marR="90325" anchor="ctr"/>
+                </a:tc>
+                <a:tc>
+                  <a:txBody>
+                    <a:bodyPr/>
+                    <a:lstStyle/>
+                    <a:p>
+                      <a:pPr algn="ctr"/>
+                      <a:r>
+                        <a:rPr lang="en-HK" sz="2400" dirty="0" smtClean="0"/>
+                        <a:t>4.55 eV</a:t>
+                      </a:r>
+                      <a:endParaRPr lang="en-US" sz="2400" dirty="0"/>
+                    </a:p>
+                  </a:txBody>
+                  <a:tcPr marL="90325" marR="90325" anchor="ctr"/>
+                </a:tc>
+                <a:tc>
+                  <a:txBody>
+                    <a:bodyPr/>
+                    <a:lstStyle/>
+                    <a:p>
+                      <a:pPr algn="ctr"/>
+                      <a:r>
+                        <a:rPr lang="en-HK" sz="2400" dirty="0" smtClean="0"/>
+                        <a:t>4.67 eV</a:t>
+                      </a:r>
+                      <a:endParaRPr lang="en-US" sz="2400" dirty="0"/>
+                    </a:p>
+                  </a:txBody>
+                  <a:tcPr marL="90325" marR="90325" anchor="ctr"/>
+                </a:tc>
+                <a:extLst>
+                  <a:ext uri="{0D108BD9-81ED-4DB2-BD59-A6C34878D82A}">
+                    <a16:rowId xmlns:a16="http://schemas.microsoft.com/office/drawing/2014/main" val="3250587630"/>
+                  </a:ext>
+                </a:extLst>
+              </a:tr>
+              <a:tr h="796187">
+                <a:tc>
+                  <a:txBody>
+                    <a:bodyPr/>
+                    <a:lstStyle/>
+                    <a:p>
+                      <a:pPr algn="ctr"/>
+                      <a:r>
+                        <a:rPr lang="en-HK" sz="2400" dirty="0" smtClean="0"/>
+                        <a:t>-2 H</a:t>
+                      </a:r>
+                      <a:endParaRPr lang="en-US" sz="2400" dirty="0"/>
+                    </a:p>
+                  </a:txBody>
+                  <a:tcPr marL="90325" marR="90325" anchor="ctr"/>
+                </a:tc>
+                <a:tc>
+                  <a:txBody>
+                    <a:bodyPr/>
+                    <a:lstStyle/>
+                    <a:p>
+                      <a:pPr algn="ctr"/>
+                      <a:r>
+                        <a:rPr lang="en-HK" sz="2400" dirty="0" smtClean="0"/>
+                        <a:t>4.78 eV</a:t>
+                      </a:r>
+                      <a:endParaRPr lang="en-US" sz="2400" dirty="0"/>
+                    </a:p>
+                  </a:txBody>
+                  <a:tcPr marL="90325" marR="90325" anchor="ctr"/>
+                </a:tc>
+                <a:tc>
+                  <a:txBody>
+                    <a:bodyPr/>
+                    <a:lstStyle/>
+                    <a:p>
+                      <a:pPr algn="ctr"/>
+                      <a:r>
+                        <a:rPr lang="en-HK" sz="2400" dirty="0" smtClean="0"/>
+                        <a:t>4.38  eV</a:t>
+                      </a:r>
+                      <a:endParaRPr lang="en-US" sz="2400" dirty="0"/>
+                    </a:p>
+                  </a:txBody>
+                  <a:tcPr marL="90325" marR="90325" anchor="ctr"/>
+                </a:tc>
+                <a:extLst>
+                  <a:ext uri="{0D108BD9-81ED-4DB2-BD59-A6C34878D82A}">
+                    <a16:rowId xmlns:a16="http://schemas.microsoft.com/office/drawing/2014/main" val="36223453"/>
+                  </a:ext>
+                </a:extLst>
+              </a:tr>
+              <a:tr h="796187">
+                <a:tc>
+                  <a:txBody>
+                    <a:bodyPr/>
+                    <a:lstStyle/>
+                    <a:p>
+                      <a:pPr algn="ctr"/>
+                      <a:r>
+                        <a:rPr lang="en-HK" sz="2400" dirty="0" smtClean="0"/>
+                        <a:t>-3 H</a:t>
+                      </a:r>
+                      <a:endParaRPr lang="en-US" sz="2400" dirty="0"/>
+                    </a:p>
+                  </a:txBody>
+                  <a:tcPr marL="90325" marR="90325" anchor="ctr"/>
+                </a:tc>
+                <a:tc>
+                  <a:txBody>
+                    <a:bodyPr/>
+                    <a:lstStyle/>
+                    <a:p>
+                      <a:pPr algn="ctr"/>
+                      <a:r>
+                        <a:rPr lang="en-HK" sz="2400" dirty="0" smtClean="0">
+                          <a:solidFill>
+                            <a:srgbClr val="0070C0"/>
+                          </a:solidFill>
+                        </a:rPr>
+                        <a:t>9.19 eV</a:t>
+                      </a:r>
+                      <a:endParaRPr lang="en-US" sz="2400" dirty="0">
+                        <a:solidFill>
+                          <a:srgbClr val="0070C0"/>
+                        </a:solidFill>
+                      </a:endParaRPr>
+                    </a:p>
+                  </a:txBody>
+                  <a:tcPr marL="90325" marR="90325" anchor="ctr"/>
+                </a:tc>
+                <a:tc>
+                  <a:txBody>
+                    <a:bodyPr/>
+                    <a:lstStyle/>
+                    <a:p>
+                      <a:pPr algn="ctr"/>
+                      <a:r>
+                        <a:rPr lang="en-HK" sz="2400" dirty="0" smtClean="0">
+                          <a:solidFill>
+                            <a:srgbClr val="0070C0"/>
+                          </a:solidFill>
+                        </a:rPr>
+                        <a:t>7.</a:t>
+                      </a:r>
+                      <a:r>
+                        <a:rPr lang="en-HK" sz="2400" baseline="0" dirty="0" smtClean="0">
+                          <a:solidFill>
+                            <a:srgbClr val="0070C0"/>
+                          </a:solidFill>
+                        </a:rPr>
+                        <a:t>63 eV</a:t>
+                      </a:r>
+                      <a:endParaRPr lang="en-US" sz="2400" dirty="0">
+                        <a:solidFill>
+                          <a:srgbClr val="0070C0"/>
+                        </a:solidFill>
+                      </a:endParaRPr>
+                    </a:p>
+                  </a:txBody>
+                  <a:tcPr marL="90325" marR="90325" anchor="ctr"/>
+                </a:tc>
+                <a:extLst>
+                  <a:ext uri="{0D108BD9-81ED-4DB2-BD59-A6C34878D82A}">
+                    <a16:rowId xmlns:a16="http://schemas.microsoft.com/office/drawing/2014/main" val="1330999748"/>
+                  </a:ext>
+                </a:extLst>
+              </a:tr>
+            </a:tbl>
+          </a:graphicData>
+        </a:graphic>
+      </p:graphicFrame>
+      <p:sp>
+        <p:nvSpPr>
+          <p:cNvPr id="4" name="投影片編號版面配置區 3"/>
+          <p:cNvSpPr>
+            <a:spLocks noGrp="1"/>
+          </p:cNvSpPr>
+          <p:nvPr>
+            <p:ph type="sldNum" sz="quarter" idx="12"/>
+          </p:nvPr>
+        </p:nvSpPr>
+        <p:spPr/>
+        <p:txBody>
+          <a:bodyPr/>
+          <a:lstStyle/>
+          <a:p>
+            <a:fld id="{B646D8CA-B2C0-41A8-8514-369D0B0735D6}" type="slidenum">
+              <a:rPr lang="zh-TW" altLang="en-US" sz="2000" smtClean="0"/>
+              <a:t>26</a:t>
+            </a:fld>
+            <a:endParaRPr lang="zh-TW" altLang="en-US" sz="2000" dirty="0"/>
+          </a:p>
+        </p:txBody>
+      </p:sp>
+      <p:sp>
+        <p:nvSpPr>
+          <p:cNvPr id="3" name="矩形 2"/>
+          <p:cNvSpPr/>
+          <p:nvPr/>
+        </p:nvSpPr>
+        <p:spPr>
+          <a:xfrm>
+            <a:off x="4629148" y="5017741"/>
+            <a:ext cx="3759276" cy="297517"/>
+          </a:xfrm>
+          <a:prstGeom prst="rect">
+            <a:avLst/>
+          </a:prstGeom>
+        </p:spPr>
+        <p:txBody>
+          <a:bodyPr wrap="square">
+            <a:spAutoFit/>
+          </a:bodyPr>
+          <a:lstStyle/>
+          <a:p>
+            <a:pPr lvl="2"/>
+            <a:r>
+              <a:rPr lang="en-HK" sz="2000" baseline="-25000" dirty="0" smtClean="0"/>
+              <a:t>quoted </a:t>
+            </a:r>
+            <a:r>
+              <a:rPr lang="en-HK" sz="2000" baseline="-25000" dirty="0"/>
+              <a:t>from </a:t>
+            </a:r>
+            <a:r>
+              <a:rPr lang="en-HK" sz="2000" baseline="-25000" dirty="0" err="1"/>
+              <a:t>Kundu</a:t>
+            </a:r>
+            <a:r>
+              <a:rPr lang="en-HK" sz="2000" baseline="-25000" dirty="0"/>
+              <a:t> et al. (2017</a:t>
+            </a:r>
+            <a:r>
+              <a:rPr lang="en-HK" sz="2000" baseline="-25000" dirty="0" smtClean="0"/>
+              <a:t>)</a:t>
+            </a:r>
+            <a:endParaRPr lang="en-HK" sz="2000" baseline="-25000" dirty="0"/>
+          </a:p>
+        </p:txBody>
+      </p:sp>
+    </p:spTree>
+    <p:extLst>
+      <p:ext uri="{BB962C8B-B14F-4D97-AF65-F5344CB8AC3E}">
+        <p14:creationId xmlns:p14="http://schemas.microsoft.com/office/powerpoint/2010/main" val="882420126"/>
+      </p:ext>
+    </p:extLst>
+  </p:cSld>
+  <p:clrMapOvr>
+    <a:masterClrMapping/>
+  </p:clrMapOvr>
+  <p:timing>
+    <p:tnLst>
+      <p:par>
+        <p:cTn id="1" dur="indefinite" restart="never" nodeType="tmRoot"/>
+      </p:par>
+    </p:tnLst>
+  </p:timing>
+</p:sld>
+</file>
+
 <file path=ppt/slides/slide27.xml><?xml version="1.0" encoding="utf-8"?>
 <p:sld xmlns:a="http://schemas.openxmlformats.org/drawingml/2006/main" xmlns:r="http://schemas.openxmlformats.org/officeDocument/2006/relationships" xmlns:p="http://schemas.openxmlformats.org/presentationml/2006/main">
   <p:cSld>
@@ -17325,7 +17646,11 @@
           <a:p>
             <a:r>
               <a:rPr lang="en-HK" dirty="0"/>
-              <a:t>Astrophysical implications</a:t>
+              <a:t>Astrophysical </a:t>
+            </a:r>
+            <a:r>
+              <a:rPr lang="en-HK" dirty="0" smtClean="0"/>
+              <a:t>Implications</a:t>
             </a:r>
             <a:endParaRPr lang="en-US" dirty="0"/>
           </a:p>
@@ -17404,7 +17729,7 @@
         <p:spPr/>
         <p:txBody>
           <a:bodyPr>
-            <a:normAutofit/>
+            <a:normAutofit fontScale="90000"/>
           </a:bodyPr>
           <a:lstStyle/>
           <a:p>
@@ -17417,24 +17742,35 @@
               </a:spcBef>
             </a:pPr>
             <a:r>
+              <a:rPr lang="en-HK" sz="3300" kern="1200" dirty="0" smtClean="0">
+                <a:solidFill>
+                  <a:schemeClr val="tx2"/>
+                </a:solidFill>
+                <a:latin typeface="Times New Roman" panose="02020603050405020304" pitchFamily="18" charset="0"/>
+                <a:ea typeface="+mj-ea"/>
+                <a:cs typeface="Times New Roman" panose="02020603050405020304" pitchFamily="18" charset="0"/>
+              </a:rPr>
+              <a:t>Estimate the column density of </a:t>
+            </a:r>
+            <a:r>
               <a:rPr lang="en-HK" sz="3300" kern="1200" dirty="0">
                 <a:solidFill>
                   <a:schemeClr val="tx2"/>
                 </a:solidFill>
-                <a:latin typeface="+mj-lt"/>
+                <a:latin typeface="Times New Roman" panose="02020603050405020304" pitchFamily="18" charset="0"/>
                 <a:ea typeface="+mj-ea"/>
-                <a:cs typeface="+mj-cs"/>
-              </a:rPr>
-              <a:t>Understand CN</a:t>
+                <a:cs typeface="Times New Roman" panose="02020603050405020304" pitchFamily="18" charset="0"/>
+              </a:rPr>
+              <a:t>CN</a:t>
             </a:r>
             <a:r>
               <a:rPr lang="en-HK" sz="3300" kern="1200" baseline="30000" dirty="0">
                 <a:solidFill>
                   <a:schemeClr val="tx2"/>
                 </a:solidFill>
-                <a:latin typeface="+mj-lt"/>
+                <a:latin typeface="Times New Roman" panose="02020603050405020304" pitchFamily="18" charset="0"/>
                 <a:ea typeface="+mj-ea"/>
-                <a:cs typeface="+mj-cs"/>
+                <a:cs typeface="Times New Roman" panose="02020603050405020304" pitchFamily="18" charset="0"/>
               </a:rPr>
               <a:t>-</a:t>
             </a:r>
@@ -17443,12 +17779,53 @@
                 <a:solidFill>
                   <a:schemeClr val="tx2"/>
                 </a:solidFill>
-                <a:latin typeface="+mj-lt"/>
+                <a:latin typeface="Times New Roman" panose="02020603050405020304" pitchFamily="18" charset="0"/>
                 <a:ea typeface="+mj-ea"/>
-                <a:cs typeface="+mj-cs"/>
-              </a:rPr>
-              <a:t> formation after winter on surface of Charon</a:t>
-            </a:r>
+                <a:cs typeface="Times New Roman" panose="02020603050405020304" pitchFamily="18" charset="0"/>
+              </a:rPr>
+              <a:t> </a:t>
+            </a:r>
+            <a:r>
+              <a:rPr lang="en-HK" sz="3300" kern="1200" dirty="0" smtClean="0">
+                <a:solidFill>
+                  <a:schemeClr val="tx2"/>
+                </a:solidFill>
+                <a:latin typeface="Times New Roman" panose="02020603050405020304" pitchFamily="18" charset="0"/>
+                <a:ea typeface="+mj-ea"/>
+                <a:cs typeface="Times New Roman" panose="02020603050405020304" pitchFamily="18" charset="0"/>
+              </a:rPr>
+              <a:t>formed </a:t>
+            </a:r>
+            <a:r>
+              <a:rPr lang="en-HK" sz="3300" kern="1200" dirty="0">
+                <a:solidFill>
+                  <a:schemeClr val="tx2"/>
+                </a:solidFill>
+                <a:latin typeface="Times New Roman" panose="02020603050405020304" pitchFamily="18" charset="0"/>
+                <a:ea typeface="+mj-ea"/>
+                <a:cs typeface="Times New Roman" panose="02020603050405020304" pitchFamily="18" charset="0"/>
+              </a:rPr>
+              <a:t>after </a:t>
+            </a:r>
+            <a:r>
+              <a:rPr lang="en-HK" sz="3300" kern="1200" dirty="0" smtClean="0">
+                <a:solidFill>
+                  <a:schemeClr val="tx2"/>
+                </a:solidFill>
+                <a:latin typeface="Times New Roman" panose="02020603050405020304" pitchFamily="18" charset="0"/>
+                <a:ea typeface="+mj-ea"/>
+                <a:cs typeface="Times New Roman" panose="02020603050405020304" pitchFamily="18" charset="0"/>
+              </a:rPr>
+              <a:t>winter on Charon (from result 2)</a:t>
+            </a:r>
+            <a:endParaRPr lang="en-HK" sz="3300" kern="1200" dirty="0">
+              <a:solidFill>
+                <a:schemeClr val="tx2"/>
+              </a:solidFill>
+              <a:latin typeface="Times New Roman" panose="02020603050405020304" pitchFamily="18" charset="0"/>
+              <a:ea typeface="+mj-ea"/>
+              <a:cs typeface="Times New Roman" panose="02020603050405020304" pitchFamily="18" charset="0"/>
+            </a:endParaRPr>
           </a:p>
         </p:txBody>
       </p:sp>
@@ -17464,8 +17841,8 @@
         </p:nvSpPr>
         <p:spPr>
           <a:xfrm>
-            <a:off x="179512" y="1561356"/>
-            <a:ext cx="4176464" cy="2425933"/>
+            <a:off x="-108520" y="1417340"/>
+            <a:ext cx="4241005" cy="2425933"/>
           </a:xfrm>
         </p:spPr>
         <p:txBody>
@@ -17474,142 +17851,205 @@
           </a:bodyPr>
           <a:lstStyle/>
           <a:p>
-            <a:pPr marL="397764" lvl="1" indent="0">
-              <a:buNone/>
-            </a:pPr>
-            <a:r>
-              <a:rPr lang="en-HK" dirty="0" smtClean="0"/>
-              <a:t>Surface composition after </a:t>
-            </a:r>
-            <a:r>
-              <a:rPr lang="en-HK" dirty="0"/>
-              <a:t>1 Pluto winter:</a:t>
-            </a:r>
-          </a:p>
-          <a:p>
-            <a:pPr lvl="2"/>
-            <a:r>
-              <a:rPr lang="en-HK" dirty="0"/>
-              <a:t>Ly α exposure: 1.9 x 10</a:t>
-            </a:r>
-            <a:r>
-              <a:rPr lang="en-HK" baseline="30000" dirty="0"/>
-              <a:t>9</a:t>
-            </a:r>
-            <a:r>
-              <a:rPr lang="en-HK" dirty="0"/>
-              <a:t> eV cm</a:t>
-            </a:r>
-            <a:r>
-              <a:rPr lang="en-HK" baseline="30000" dirty="0"/>
-              <a:t>-2</a:t>
-            </a:r>
-            <a:r>
-              <a:rPr lang="en-HK" dirty="0"/>
-              <a:t> s</a:t>
-            </a:r>
-            <a:r>
-              <a:rPr lang="en-HK" baseline="30000" dirty="0"/>
-              <a:t>-1</a:t>
-            </a:r>
-            <a:r>
-              <a:rPr lang="en-HK" dirty="0"/>
-              <a:t> </a:t>
-            </a:r>
-            <a:r>
-              <a:rPr lang="en-HK" dirty="0" smtClean="0"/>
-              <a:t>(Grundy et al. 2016)</a:t>
-            </a:r>
-            <a:endParaRPr lang="en-HK" dirty="0"/>
-          </a:p>
-          <a:p>
             <a:pPr marL="740664" lvl="2" indent="0">
               <a:buNone/>
             </a:pPr>
             <a:r>
-              <a:rPr lang="en-HK" dirty="0" smtClean="0"/>
-              <a:t>→photon dose: </a:t>
-            </a:r>
-            <a:r>
-              <a:rPr lang="en-US" altLang="zh-CN" dirty="0" smtClean="0">
+              <a:rPr lang="en-HK" sz="1800" dirty="0" smtClean="0">
+                <a:latin typeface="Times New Roman" panose="02020603050405020304" pitchFamily="18" charset="0"/>
+                <a:cs typeface="Times New Roman" panose="02020603050405020304" pitchFamily="18" charset="0"/>
+              </a:rPr>
+              <a:t>Ly-α flux: </a:t>
+            </a:r>
+            <a:r>
+              <a:rPr lang="en-HK" sz="1800" dirty="0">
+                <a:latin typeface="Times New Roman" panose="02020603050405020304" pitchFamily="18" charset="0"/>
+                <a:cs typeface="Times New Roman" panose="02020603050405020304" pitchFamily="18" charset="0"/>
+              </a:rPr>
+              <a:t>1.9 x 10</a:t>
+            </a:r>
+            <a:r>
+              <a:rPr lang="en-HK" sz="1800" baseline="30000" dirty="0">
+                <a:latin typeface="Times New Roman" panose="02020603050405020304" pitchFamily="18" charset="0"/>
+                <a:cs typeface="Times New Roman" panose="02020603050405020304" pitchFamily="18" charset="0"/>
+              </a:rPr>
+              <a:t>9</a:t>
+            </a:r>
+            <a:r>
+              <a:rPr lang="en-HK" sz="1800" dirty="0">
+                <a:latin typeface="Times New Roman" panose="02020603050405020304" pitchFamily="18" charset="0"/>
+                <a:cs typeface="Times New Roman" panose="02020603050405020304" pitchFamily="18" charset="0"/>
+              </a:rPr>
+              <a:t> eV cm</a:t>
+            </a:r>
+            <a:r>
+              <a:rPr lang="en-HK" sz="1800" baseline="30000" dirty="0">
+                <a:latin typeface="Times New Roman" panose="02020603050405020304" pitchFamily="18" charset="0"/>
+                <a:cs typeface="Times New Roman" panose="02020603050405020304" pitchFamily="18" charset="0"/>
+              </a:rPr>
+              <a:t>-2</a:t>
+            </a:r>
+            <a:r>
+              <a:rPr lang="en-HK" sz="1800" dirty="0">
+                <a:latin typeface="Times New Roman" panose="02020603050405020304" pitchFamily="18" charset="0"/>
+                <a:cs typeface="Times New Roman" panose="02020603050405020304" pitchFamily="18" charset="0"/>
+              </a:rPr>
+              <a:t> s</a:t>
+            </a:r>
+            <a:r>
+              <a:rPr lang="en-HK" sz="1800" baseline="30000" dirty="0">
+                <a:latin typeface="Times New Roman" panose="02020603050405020304" pitchFamily="18" charset="0"/>
+                <a:cs typeface="Times New Roman" panose="02020603050405020304" pitchFamily="18" charset="0"/>
+              </a:rPr>
+              <a:t>-1</a:t>
+            </a:r>
+            <a:r>
+              <a:rPr lang="en-HK" sz="1800" dirty="0">
+                <a:latin typeface="Times New Roman" panose="02020603050405020304" pitchFamily="18" charset="0"/>
+                <a:cs typeface="Times New Roman" panose="02020603050405020304" pitchFamily="18" charset="0"/>
+              </a:rPr>
+              <a:t> </a:t>
+            </a:r>
+            <a:r>
+              <a:rPr lang="en-HK" sz="1800" dirty="0" smtClean="0">
+                <a:latin typeface="Times New Roman" panose="02020603050405020304" pitchFamily="18" charset="0"/>
+                <a:cs typeface="Times New Roman" panose="02020603050405020304" pitchFamily="18" charset="0"/>
+              </a:rPr>
+              <a:t>(Grundy et al. 2016)</a:t>
+            </a:r>
+            <a:endParaRPr lang="en-HK" sz="1800" dirty="0">
+              <a:latin typeface="Times New Roman" panose="02020603050405020304" pitchFamily="18" charset="0"/>
+              <a:cs typeface="Times New Roman" panose="02020603050405020304" pitchFamily="18" charset="0"/>
+            </a:endParaRPr>
+          </a:p>
+          <a:p>
+            <a:pPr marL="740664" lvl="2" indent="0">
+              <a:buNone/>
+            </a:pPr>
+            <a:r>
+              <a:rPr lang="en-HK" sz="1800" dirty="0" smtClean="0">
+                <a:latin typeface="Times New Roman" panose="02020603050405020304" pitchFamily="18" charset="0"/>
+                <a:cs typeface="Times New Roman" panose="02020603050405020304" pitchFamily="18" charset="0"/>
+              </a:rPr>
+              <a:t>→photon </a:t>
+            </a:r>
+            <a:r>
+              <a:rPr lang="en-HK" sz="1800" dirty="0" smtClean="0">
+                <a:latin typeface="Times New Roman" panose="02020603050405020304" pitchFamily="18" charset="0"/>
+                <a:cs typeface="Times New Roman" panose="02020603050405020304" pitchFamily="18" charset="0"/>
+              </a:rPr>
+              <a:t>dose after 1 </a:t>
+            </a:r>
+            <a:r>
+              <a:rPr lang="en-HK" sz="1800" dirty="0">
+                <a:latin typeface="Times New Roman" panose="02020603050405020304" pitchFamily="18" charset="0"/>
+                <a:cs typeface="Times New Roman" panose="02020603050405020304" pitchFamily="18" charset="0"/>
+              </a:rPr>
+              <a:t>P</a:t>
+            </a:r>
+            <a:r>
+              <a:rPr lang="en-HK" sz="1800" dirty="0" smtClean="0">
+                <a:latin typeface="Times New Roman" panose="02020603050405020304" pitchFamily="18" charset="0"/>
+                <a:cs typeface="Times New Roman" panose="02020603050405020304" pitchFamily="18" charset="0"/>
+              </a:rPr>
+              <a:t>luto winter </a:t>
+            </a:r>
+            <a:r>
+              <a:rPr lang="en-US" altLang="zh-CN" sz="1800" dirty="0" smtClean="0">
                 <a:solidFill>
                   <a:srgbClr val="0070C0"/>
                 </a:solidFill>
+                <a:latin typeface="Times New Roman" panose="02020603050405020304" pitchFamily="18" charset="0"/>
+                <a:cs typeface="Times New Roman" panose="02020603050405020304" pitchFamily="18" charset="0"/>
               </a:rPr>
               <a:t>7.64 </a:t>
             </a:r>
             <a:r>
-              <a:rPr lang="en-HK" dirty="0" smtClean="0">
+              <a:rPr lang="en-HK" sz="1800" dirty="0" smtClean="0">
                 <a:solidFill>
                   <a:srgbClr val="0070C0"/>
                 </a:solidFill>
+                <a:latin typeface="Times New Roman" panose="02020603050405020304" pitchFamily="18" charset="0"/>
+                <a:cs typeface="Times New Roman" panose="02020603050405020304" pitchFamily="18" charset="0"/>
               </a:rPr>
               <a:t>x </a:t>
             </a:r>
             <a:r>
-              <a:rPr lang="en-HK" dirty="0">
+              <a:rPr lang="en-HK" sz="1800" dirty="0">
                 <a:solidFill>
                   <a:srgbClr val="0070C0"/>
                 </a:solidFill>
+                <a:latin typeface="Times New Roman" panose="02020603050405020304" pitchFamily="18" charset="0"/>
+                <a:cs typeface="Times New Roman" panose="02020603050405020304" pitchFamily="18" charset="0"/>
               </a:rPr>
               <a:t>10 </a:t>
             </a:r>
             <a:r>
-              <a:rPr lang="en-HK" baseline="30000" dirty="0">
+              <a:rPr lang="en-HK" sz="1800" baseline="30000" dirty="0">
                 <a:solidFill>
                   <a:srgbClr val="0070C0"/>
                 </a:solidFill>
+                <a:latin typeface="Times New Roman" panose="02020603050405020304" pitchFamily="18" charset="0"/>
+                <a:cs typeface="Times New Roman" panose="02020603050405020304" pitchFamily="18" charset="0"/>
               </a:rPr>
               <a:t>17</a:t>
             </a:r>
             <a:r>
-              <a:rPr lang="en-HK" dirty="0">
+              <a:rPr lang="en-HK" sz="1800" dirty="0">
                 <a:solidFill>
                   <a:srgbClr val="0070C0"/>
                 </a:solidFill>
+                <a:latin typeface="Times New Roman" panose="02020603050405020304" pitchFamily="18" charset="0"/>
+                <a:cs typeface="Times New Roman" panose="02020603050405020304" pitchFamily="18" charset="0"/>
               </a:rPr>
               <a:t>  </a:t>
             </a:r>
             <a:r>
-              <a:rPr lang="en-HK" dirty="0"/>
+              <a:rPr lang="en-HK" sz="1800" dirty="0">
+                <a:latin typeface="Times New Roman" panose="02020603050405020304" pitchFamily="18" charset="0"/>
+                <a:cs typeface="Times New Roman" panose="02020603050405020304" pitchFamily="18" charset="0"/>
+              </a:rPr>
               <a:t>photons cm</a:t>
             </a:r>
             <a:r>
-              <a:rPr lang="en-HK" baseline="30000" dirty="0"/>
+              <a:rPr lang="en-HK" sz="1800" baseline="30000" dirty="0">
+                <a:latin typeface="Times New Roman" panose="02020603050405020304" pitchFamily="18" charset="0"/>
+                <a:cs typeface="Times New Roman" panose="02020603050405020304" pitchFamily="18" charset="0"/>
+              </a:rPr>
               <a:t>-2</a:t>
             </a:r>
-          </a:p>
-          <a:p>
-            <a:pPr lvl="2"/>
-            <a:r>
-              <a:rPr lang="en-HK" dirty="0"/>
-              <a:t>CH</a:t>
-            </a:r>
-            <a:r>
-              <a:rPr lang="en-HK" baseline="-25000" dirty="0"/>
-              <a:t>4</a:t>
-            </a:r>
-            <a:r>
-              <a:rPr lang="en-HK" dirty="0"/>
-              <a:t> deposition rate: </a:t>
-            </a:r>
-            <a:endParaRPr lang="en-HK" dirty="0" smtClean="0"/>
           </a:p>
           <a:p>
             <a:pPr marL="740664" lvl="2" indent="0">
               <a:buNone/>
             </a:pPr>
             <a:r>
-              <a:rPr lang="en-US" altLang="zh-TW" dirty="0" smtClean="0"/>
-              <a:t>(</a:t>
-            </a:r>
-            <a:r>
-              <a:rPr lang="en-HK" altLang="zh-CN" dirty="0" err="1" smtClean="0"/>
-              <a:t>Hoey</a:t>
-            </a:r>
-            <a:r>
-              <a:rPr lang="en-HK" altLang="zh-CN" dirty="0" smtClean="0"/>
-              <a:t> et al. 2017)</a:t>
+              <a:rPr lang="en-HK" sz="1800" dirty="0">
+                <a:latin typeface="Times New Roman" panose="02020603050405020304" pitchFamily="18" charset="0"/>
+                <a:cs typeface="Times New Roman" panose="02020603050405020304" pitchFamily="18" charset="0"/>
+              </a:rPr>
+              <a:t>CH</a:t>
+            </a:r>
+            <a:r>
+              <a:rPr lang="en-HK" sz="1800" baseline="-25000" dirty="0">
+                <a:latin typeface="Times New Roman" panose="02020603050405020304" pitchFamily="18" charset="0"/>
+                <a:cs typeface="Times New Roman" panose="02020603050405020304" pitchFamily="18" charset="0"/>
+              </a:rPr>
+              <a:t>4</a:t>
+            </a:r>
+            <a:r>
+              <a:rPr lang="en-HK" sz="1800" dirty="0">
+                <a:latin typeface="Times New Roman" panose="02020603050405020304" pitchFamily="18" charset="0"/>
+                <a:cs typeface="Times New Roman" panose="02020603050405020304" pitchFamily="18" charset="0"/>
+              </a:rPr>
+              <a:t> </a:t>
+            </a:r>
+            <a:r>
+              <a:rPr lang="en-HK" sz="1800" dirty="0" smtClean="0">
+                <a:latin typeface="Times New Roman" panose="02020603050405020304" pitchFamily="18" charset="0"/>
+                <a:cs typeface="Times New Roman" panose="02020603050405020304" pitchFamily="18" charset="0"/>
+              </a:rPr>
+              <a:t>after winter ~173 ML </a:t>
             </a:r>
           </a:p>
           <a:p>
@@ -17617,17 +18057,30 @@
               <a:buNone/>
             </a:pPr>
             <a:r>
-              <a:rPr lang="en-HK" dirty="0"/>
-              <a:t>→ </a:t>
-            </a:r>
-            <a:r>
-              <a:rPr lang="en-HK" dirty="0" smtClean="0"/>
-              <a:t>~110-150 </a:t>
-            </a:r>
-            <a:r>
-              <a:rPr lang="en-HK" dirty="0"/>
-              <a:t>ML in 130 earth years</a:t>
-            </a:r>
+              <a:rPr lang="en-HK" sz="1800" dirty="0" smtClean="0">
+                <a:latin typeface="Times New Roman" panose="02020603050405020304" pitchFamily="18" charset="0"/>
+                <a:cs typeface="Times New Roman" panose="02020603050405020304" pitchFamily="18" charset="0"/>
+              </a:rPr>
+              <a:t>Assume the column density of NH</a:t>
+            </a:r>
+            <a:r>
+              <a:rPr lang="en-HK" sz="1800" baseline="-25000" dirty="0" smtClean="0">
+                <a:latin typeface="Times New Roman" panose="02020603050405020304" pitchFamily="18" charset="0"/>
+                <a:cs typeface="Times New Roman" panose="02020603050405020304" pitchFamily="18" charset="0"/>
+              </a:rPr>
+              <a:t>3</a:t>
+            </a:r>
+            <a:r>
+              <a:rPr lang="en-HK" sz="1800" dirty="0" smtClean="0">
+                <a:latin typeface="Times New Roman" panose="02020603050405020304" pitchFamily="18" charset="0"/>
+                <a:cs typeface="Times New Roman" panose="02020603050405020304" pitchFamily="18" charset="0"/>
+              </a:rPr>
+              <a:t> is 600 ML</a:t>
+            </a:r>
+            <a:endParaRPr lang="en-HK" sz="1800" dirty="0" smtClean="0">
+              <a:latin typeface="Times New Roman" panose="02020603050405020304" pitchFamily="18" charset="0"/>
+              <a:cs typeface="Times New Roman" panose="02020603050405020304" pitchFamily="18" charset="0"/>
+            </a:endParaRPr>
           </a:p>
           <a:p>
             <a:pPr marL="0" indent="0">
@@ -17709,13 +18162,13 @@
           <p:nvPr>
             <p:extLst>
               <p:ext uri="{D42A27DB-BD31-4B8C-83A1-F6EECF244321}">
-                <p14:modId xmlns:p14="http://schemas.microsoft.com/office/powerpoint/2010/main" val="4196203954"/>
+                <p14:modId xmlns:p14="http://schemas.microsoft.com/office/powerpoint/2010/main" val="176475262"/>
               </p:ext>
             </p:extLst>
           </p:nvPr>
         </p:nvGraphicFramePr>
         <p:xfrm>
-          <a:off x="971600" y="3543327"/>
+          <a:off x="1115616" y="3728720"/>
           <a:ext cx="2464047" cy="1986280"/>
         </p:xfrm>
         <a:graphic>
@@ -17725,14 +18178,14 @@
                 <a:tableStyleId>{5C22544A-7EE6-4342-B048-85BDC9FD1C3A}</a:tableStyleId>
               </a:tblPr>
               <a:tblGrid>
-                <a:gridCol w="821349">
+                <a:gridCol w="936104">
                   <a:extLst>
                     <a:ext uri="{9D8B030D-6E8A-4147-A177-3AD203B41FA5}">
                       <a16:colId xmlns:a16="http://schemas.microsoft.com/office/drawing/2014/main" val="235585659"/>
                     </a:ext>
                   </a:extLst>
                 </a:gridCol>
-                <a:gridCol w="821349">
+                <a:gridCol w="706594">
                   <a:extLst>
                     <a:ext uri="{9D8B030D-6E8A-4147-A177-3AD203B41FA5}">
                       <a16:colId xmlns:a16="http://schemas.microsoft.com/office/drawing/2014/main" val="1433694795"/>
@@ -17762,8 +18215,12 @@
                         <a:t>4</a:t>
                       </a:r>
                       <a:r>
+                        <a:rPr lang="en-HK" baseline="0" dirty="0" smtClean="0"/>
+                        <a:t>:</a:t>
+                      </a:r>
+                      <a:r>
                         <a:rPr lang="en-HK" dirty="0" smtClean="0"/>
-                        <a:t>+NH</a:t>
+                        <a:t>NH</a:t>
                       </a:r>
                       <a:r>
                         <a:rPr lang="en-HK" baseline="-25000" dirty="0" smtClean="0"/>
@@ -17846,7 +18303,7 @@
                     <a:p>
                       <a:r>
                         <a:rPr lang="en-HK" dirty="0" smtClean="0"/>
-                        <a:t>110</a:t>
+                        <a:t>120</a:t>
                       </a:r>
                       <a:endParaRPr lang="en-US" dirty="0"/>
                     </a:p>
@@ -18033,20 +18490,20 @@
           <p:nvPr>
             <p:extLst>
               <p:ext uri="{D42A27DB-BD31-4B8C-83A1-F6EECF244321}">
-                <p14:modId xmlns:p14="http://schemas.microsoft.com/office/powerpoint/2010/main" val="3534765628"/>
+                <p14:modId xmlns:p14="http://schemas.microsoft.com/office/powerpoint/2010/main" val="1804400980"/>
               </p:ext>
             </p:extLst>
           </p:nvPr>
         </p:nvGraphicFramePr>
         <p:xfrm>
-          <a:off x="4139952" y="2065412"/>
-          <a:ext cx="5344368" cy="3493912"/>
+          <a:off x="3851920" y="1809750"/>
+          <a:ext cx="5704408" cy="3729290"/>
         </p:xfrm>
         <a:graphic>
           <a:graphicData uri="http://schemas.openxmlformats.org/presentationml/2006/ole">
             <mc:AlternateContent xmlns:mc="http://schemas.openxmlformats.org/markup-compatibility/2006">
               <mc:Choice xmlns:v="urn:schemas-microsoft-com:vml" Requires="v">
-                <p:oleObj spid="_x0000_s2826" name="Graph" r:id="rId3" imgW="4754880" imgH="3108960" progId="Origin50.Graph">
+                <p:oleObj spid="_x0000_s2940" name="Graph" r:id="rId3" imgW="4754880" imgH="3108960" progId="Origin50.Graph">
                   <p:embed/>
                 </p:oleObj>
               </mc:Choice>
@@ -18067,8 +18524,8 @@
                     </p:blipFill>
                     <p:spPr>
                       <a:xfrm>
-                        <a:off x="4139952" y="2065412"/>
-                        <a:ext cx="5344368" cy="3493912"/>
+                        <a:off x="3851920" y="1809750"/>
+                        <a:ext cx="5704408" cy="3729290"/>
                       </a:xfrm>
                       <a:prstGeom prst="rect">
                         <a:avLst/>
@@ -18128,16 +18585,119 @@
             <p:ph type="title"/>
           </p:nvPr>
         </p:nvSpPr>
-        <p:spPr/>
+        <p:spPr>
+          <a:xfrm>
+            <a:off x="1028700" y="571500"/>
+            <a:ext cx="7863780" cy="1238250"/>
+          </a:xfrm>
+        </p:spPr>
         <p:txBody>
-          <a:bodyPr/>
+          <a:bodyPr>
+            <a:normAutofit/>
+          </a:bodyPr>
           <a:lstStyle/>
           <a:p>
             <a:r>
-              <a:rPr lang="en-HK" dirty="0" smtClean="0"/>
-              <a:t>Astrophysical implications</a:t>
-            </a:r>
-            <a:endParaRPr lang="en-US" dirty="0"/>
+              <a:rPr lang="en-HK" dirty="0">
+                <a:solidFill>
+                  <a:schemeClr val="tx1"/>
+                </a:solidFill>
+                <a:latin typeface="Times New Roman" panose="02020603050405020304" pitchFamily="18" charset="0"/>
+                <a:cs typeface="Times New Roman" panose="02020603050405020304" pitchFamily="18" charset="0"/>
+              </a:rPr>
+              <a:t>Ly</a:t>
+            </a:r>
+            <a:r>
+              <a:rPr lang="en-US" altLang="zh-TW" dirty="0">
+                <a:solidFill>
+                  <a:schemeClr val="tx1"/>
+                </a:solidFill>
+                <a:latin typeface="Times New Roman" panose="02020603050405020304" pitchFamily="18" charset="0"/>
+                <a:cs typeface="Times New Roman" panose="02020603050405020304" pitchFamily="18" charset="0"/>
+              </a:rPr>
+              <a:t>-</a:t>
+            </a:r>
+            <a:r>
+              <a:rPr lang="en-HK" dirty="0">
+                <a:solidFill>
+                  <a:schemeClr val="tx1"/>
+                </a:solidFill>
+                <a:latin typeface="Times New Roman" panose="02020603050405020304" pitchFamily="18" charset="0"/>
+                <a:cs typeface="Times New Roman" panose="02020603050405020304" pitchFamily="18" charset="0"/>
+              </a:rPr>
+              <a:t>α </a:t>
+            </a:r>
+            <a:r>
+              <a:rPr lang="en-HK" dirty="0" smtClean="0">
+                <a:solidFill>
+                  <a:schemeClr val="tx1"/>
+                </a:solidFill>
+                <a:latin typeface="Times New Roman" panose="02020603050405020304" pitchFamily="18" charset="0"/>
+                <a:cs typeface="Times New Roman" panose="02020603050405020304" pitchFamily="18" charset="0"/>
+              </a:rPr>
+              <a:t>is the main photon source to produce CN</a:t>
+            </a:r>
+            <a:r>
+              <a:rPr lang="en-HK" baseline="30000" dirty="0" smtClean="0">
+                <a:solidFill>
+                  <a:schemeClr val="tx1"/>
+                </a:solidFill>
+                <a:latin typeface="Times New Roman" panose="02020603050405020304" pitchFamily="18" charset="0"/>
+                <a:cs typeface="Times New Roman" panose="02020603050405020304" pitchFamily="18" charset="0"/>
+              </a:rPr>
+              <a:t>-</a:t>
+            </a:r>
+            <a:r>
+              <a:rPr lang="en-HK" dirty="0" smtClean="0">
+                <a:solidFill>
+                  <a:schemeClr val="tx1"/>
+                </a:solidFill>
+                <a:latin typeface="Times New Roman" panose="02020603050405020304" pitchFamily="18" charset="0"/>
+                <a:cs typeface="Times New Roman" panose="02020603050405020304" pitchFamily="18" charset="0"/>
+              </a:rPr>
+              <a:t> </a:t>
+            </a:r>
+            <a:r>
+              <a:rPr lang="en-HK" dirty="0">
+                <a:solidFill>
+                  <a:schemeClr val="tx1"/>
+                </a:solidFill>
+                <a:latin typeface="Times New Roman" panose="02020603050405020304" pitchFamily="18" charset="0"/>
+                <a:cs typeface="Times New Roman" panose="02020603050405020304" pitchFamily="18" charset="0"/>
+              </a:rPr>
+              <a:t>on </a:t>
+            </a:r>
+            <a:r>
+              <a:rPr lang="en-HK" dirty="0" smtClean="0">
+                <a:solidFill>
+                  <a:schemeClr val="tx1"/>
+                </a:solidFill>
+                <a:latin typeface="Times New Roman" panose="02020603050405020304" pitchFamily="18" charset="0"/>
+                <a:cs typeface="Times New Roman" panose="02020603050405020304" pitchFamily="18" charset="0"/>
+              </a:rPr>
+              <a:t>Charon</a:t>
+            </a:r>
+            <a:r>
+              <a:rPr lang="en-HK" dirty="0" smtClean="0">
+                <a:solidFill>
+                  <a:srgbClr val="0070C0"/>
+                </a:solidFill>
+                <a:latin typeface="Times New Roman" panose="02020603050405020304" pitchFamily="18" charset="0"/>
+                <a:cs typeface="Times New Roman" panose="02020603050405020304" pitchFamily="18" charset="0"/>
+              </a:rPr>
+              <a:t> </a:t>
+            </a:r>
+            <a:r>
+              <a:rPr lang="en-HK" dirty="0" smtClean="0">
+                <a:latin typeface="Times New Roman" panose="02020603050405020304" pitchFamily="18" charset="0"/>
+                <a:cs typeface="Times New Roman" panose="02020603050405020304" pitchFamily="18" charset="0"/>
+              </a:rPr>
+              <a:t>(from result 3)</a:t>
+            </a:r>
+            <a:endParaRPr lang="en-US" dirty="0">
+              <a:latin typeface="Times New Roman" panose="02020603050405020304" pitchFamily="18" charset="0"/>
+              <a:cs typeface="Times New Roman" panose="02020603050405020304" pitchFamily="18" charset="0"/>
+            </a:endParaRPr>
           </a:p>
         </p:txBody>
       </p:sp>
@@ -18153,8 +18713,8 @@
         </p:nvSpPr>
         <p:spPr>
           <a:xfrm>
-            <a:off x="539552" y="1201316"/>
-            <a:ext cx="3888432" cy="3752962"/>
+            <a:off x="107504" y="1484953"/>
+            <a:ext cx="4032448" cy="3752962"/>
           </a:xfrm>
         </p:spPr>
         <p:txBody>
@@ -18165,41 +18725,255 @@
           <a:p>
             <a:pPr lvl="1"/>
             <a:r>
-              <a:rPr lang="en-HK" sz="2000" dirty="0" smtClean="0"/>
-              <a:t>VUV is </a:t>
+              <a:rPr lang="en-HK" sz="2000" dirty="0" smtClean="0">
+                <a:latin typeface="Times New Roman" panose="02020603050405020304" pitchFamily="18" charset="0"/>
+                <a:cs typeface="Times New Roman" panose="02020603050405020304" pitchFamily="18" charset="0"/>
+              </a:rPr>
+              <a:t>VUV(19.1% </a:t>
+            </a:r>
+            <a:r>
+              <a:rPr lang="en-HK" sz="2000" dirty="0" smtClean="0">
+                <a:latin typeface="Times New Roman" panose="02020603050405020304" pitchFamily="18" charset="0"/>
+                <a:cs typeface="Times New Roman" panose="02020603050405020304" pitchFamily="18" charset="0"/>
+              </a:rPr>
+              <a:t>of which is</a:t>
+            </a:r>
+            <a:r>
+              <a:rPr lang="en-HK" sz="2000" dirty="0" smtClean="0">
+                <a:latin typeface="Times New Roman" panose="02020603050405020304" pitchFamily="18" charset="0"/>
+                <a:cs typeface="Times New Roman" panose="02020603050405020304" pitchFamily="18" charset="0"/>
+              </a:rPr>
+              <a:t> </a:t>
+            </a:r>
+            <a:r>
+              <a:rPr lang="en-HK" sz="2000" dirty="0" smtClean="0">
+                <a:latin typeface="Times New Roman" panose="02020603050405020304" pitchFamily="18" charset="0"/>
+                <a:cs typeface="Times New Roman" panose="02020603050405020304" pitchFamily="18" charset="0"/>
+              </a:rPr>
+              <a:t>L</a:t>
+            </a:r>
+            <a:r>
+              <a:rPr lang="en-HK" sz="2000" dirty="0" smtClean="0">
+                <a:latin typeface="Times New Roman" panose="02020603050405020304" pitchFamily="18" charset="0"/>
+                <a:cs typeface="Times New Roman" panose="02020603050405020304" pitchFamily="18" charset="0"/>
+              </a:rPr>
+              <a:t>y-</a:t>
+            </a:r>
+            <a:r>
+              <a:rPr lang="en-HK" sz="2000" dirty="0" smtClean="0">
+                <a:solidFill>
+                  <a:schemeClr val="tx1"/>
+                </a:solidFill>
+                <a:latin typeface="Times New Roman" panose="02020603050405020304" pitchFamily="18" charset="0"/>
+                <a:cs typeface="Times New Roman" panose="02020603050405020304" pitchFamily="18" charset="0"/>
+              </a:rPr>
+              <a:t> α) will</a:t>
+            </a:r>
+            <a:r>
+              <a:rPr lang="en-HK" sz="2000" dirty="0" smtClean="0">
+                <a:latin typeface="Times New Roman" panose="02020603050405020304" pitchFamily="18" charset="0"/>
+                <a:cs typeface="Times New Roman" panose="02020603050405020304" pitchFamily="18" charset="0"/>
+              </a:rPr>
+              <a:t> produce CN</a:t>
+            </a:r>
+            <a:r>
+              <a:rPr lang="en-HK" sz="2000" baseline="30000" dirty="0" smtClean="0">
+                <a:latin typeface="Times New Roman" panose="02020603050405020304" pitchFamily="18" charset="0"/>
+                <a:cs typeface="Times New Roman" panose="02020603050405020304" pitchFamily="18" charset="0"/>
+              </a:rPr>
+              <a:t>-</a:t>
+            </a:r>
+            <a:r>
+              <a:rPr lang="en-HK" sz="2000" dirty="0" smtClean="0">
+                <a:latin typeface="Times New Roman" panose="02020603050405020304" pitchFamily="18" charset="0"/>
+                <a:cs typeface="Times New Roman" panose="02020603050405020304" pitchFamily="18" charset="0"/>
+              </a:rPr>
+              <a:t> </a:t>
             </a:r>
             <a:r>
               <a:rPr lang="en-HK" sz="2000" dirty="0" smtClean="0">
                 <a:solidFill>
                   <a:srgbClr val="0070C0"/>
                 </a:solidFill>
-              </a:rPr>
-              <a:t>3.06 to 4.28 times more efficient </a:t>
-            </a:r>
-            <a:r>
-              <a:rPr lang="en-HK" sz="2000" dirty="0" smtClean="0"/>
-              <a:t>than EUV</a:t>
-            </a:r>
-            <a:endParaRPr lang="en-HK" sz="2000" dirty="0"/>
-          </a:p>
-          <a:p>
-            <a:pPr lvl="1"/>
-            <a:r>
-              <a:rPr lang="en-HK" sz="2000" dirty="0" smtClean="0"/>
-              <a:t>VUV flux is </a:t>
+                <a:latin typeface="Times New Roman" panose="02020603050405020304" pitchFamily="18" charset="0"/>
+                <a:cs typeface="Times New Roman" panose="02020603050405020304" pitchFamily="18" charset="0"/>
+              </a:rPr>
+              <a:t>3.06 </a:t>
             </a:r>
             <a:r>
               <a:rPr lang="en-HK" sz="2000" dirty="0" smtClean="0">
                 <a:solidFill>
                   <a:srgbClr val="0070C0"/>
                 </a:solidFill>
+                <a:latin typeface="Times New Roman" panose="02020603050405020304" pitchFamily="18" charset="0"/>
+                <a:cs typeface="Times New Roman" panose="02020603050405020304" pitchFamily="18" charset="0"/>
+              </a:rPr>
+              <a:t>- </a:t>
+            </a:r>
+            <a:r>
+              <a:rPr lang="en-HK" sz="2000" dirty="0" smtClean="0">
+                <a:solidFill>
+                  <a:srgbClr val="0070C0"/>
+                </a:solidFill>
+                <a:latin typeface="Times New Roman" panose="02020603050405020304" pitchFamily="18" charset="0"/>
+                <a:cs typeface="Times New Roman" panose="02020603050405020304" pitchFamily="18" charset="0"/>
+              </a:rPr>
+              <a:t>4.28 times more efficient </a:t>
+            </a:r>
+            <a:r>
+              <a:rPr lang="en-HK" sz="2000" dirty="0" smtClean="0">
+                <a:latin typeface="Times New Roman" panose="02020603050405020304" pitchFamily="18" charset="0"/>
+                <a:cs typeface="Times New Roman" panose="02020603050405020304" pitchFamily="18" charset="0"/>
+              </a:rPr>
+              <a:t>than </a:t>
+            </a:r>
+            <a:r>
+              <a:rPr lang="en-HK" sz="2000" dirty="0" smtClean="0">
+                <a:latin typeface="Times New Roman" panose="02020603050405020304" pitchFamily="18" charset="0"/>
+                <a:cs typeface="Times New Roman" panose="02020603050405020304" pitchFamily="18" charset="0"/>
+              </a:rPr>
+              <a:t>EUV</a:t>
+            </a:r>
+          </a:p>
+          <a:p>
+            <a:pPr lvl="1"/>
+            <a:r>
+              <a:rPr lang="en-HK" sz="2000" dirty="0" smtClean="0">
+                <a:solidFill>
+                  <a:schemeClr val="tx1"/>
+                </a:solidFill>
+                <a:latin typeface="Times New Roman" panose="02020603050405020304" pitchFamily="18" charset="0"/>
+                <a:cs typeface="Times New Roman" panose="02020603050405020304" pitchFamily="18" charset="0"/>
+              </a:rPr>
+              <a:t>It is expected that </a:t>
+            </a:r>
+            <a:r>
+              <a:rPr lang="en-HK" sz="2000" dirty="0">
+                <a:latin typeface="Times New Roman" panose="02020603050405020304" pitchFamily="18" charset="0"/>
+                <a:cs typeface="Times New Roman" panose="02020603050405020304" pitchFamily="18" charset="0"/>
+              </a:rPr>
+              <a:t>Ly-</a:t>
+            </a:r>
+            <a:r>
+              <a:rPr lang="en-HK" sz="2000" dirty="0">
+                <a:solidFill>
+                  <a:schemeClr val="tx1"/>
+                </a:solidFill>
+                <a:latin typeface="Times New Roman" panose="02020603050405020304" pitchFamily="18" charset="0"/>
+                <a:cs typeface="Times New Roman" panose="02020603050405020304" pitchFamily="18" charset="0"/>
+              </a:rPr>
+              <a:t> </a:t>
+            </a:r>
+            <a:r>
+              <a:rPr lang="en-HK" sz="2000" dirty="0" smtClean="0">
+                <a:solidFill>
+                  <a:schemeClr val="tx1"/>
+                </a:solidFill>
+                <a:latin typeface="Times New Roman" panose="02020603050405020304" pitchFamily="18" charset="0"/>
+                <a:cs typeface="Times New Roman" panose="02020603050405020304" pitchFamily="18" charset="0"/>
+              </a:rPr>
+              <a:t>α will produce CN</a:t>
+            </a:r>
+            <a:r>
+              <a:rPr lang="en-HK" sz="2000" baseline="30000" dirty="0" smtClean="0">
+                <a:solidFill>
+                  <a:schemeClr val="tx1"/>
+                </a:solidFill>
+                <a:latin typeface="Times New Roman" panose="02020603050405020304" pitchFamily="18" charset="0"/>
+                <a:cs typeface="Times New Roman" panose="02020603050405020304" pitchFamily="18" charset="0"/>
+              </a:rPr>
+              <a:t>-</a:t>
+            </a:r>
+            <a:r>
+              <a:rPr lang="en-HK" sz="2000" dirty="0" smtClean="0">
+                <a:solidFill>
+                  <a:schemeClr val="tx1"/>
+                </a:solidFill>
+                <a:latin typeface="Times New Roman" panose="02020603050405020304" pitchFamily="18" charset="0"/>
+                <a:cs typeface="Times New Roman" panose="02020603050405020304" pitchFamily="18" charset="0"/>
+              </a:rPr>
+              <a:t> more efficient than EUV</a:t>
+            </a:r>
+            <a:endParaRPr lang="en-HK" sz="2000" dirty="0">
+              <a:latin typeface="Times New Roman" panose="02020603050405020304" pitchFamily="18" charset="0"/>
+              <a:cs typeface="Times New Roman" panose="02020603050405020304" pitchFamily="18" charset="0"/>
+            </a:endParaRPr>
+          </a:p>
+          <a:p>
+            <a:pPr lvl="1"/>
+            <a:r>
+              <a:rPr lang="en-HK" sz="2000" dirty="0">
+                <a:latin typeface="Times New Roman" panose="02020603050405020304" pitchFamily="18" charset="0"/>
+                <a:cs typeface="Times New Roman" panose="02020603050405020304" pitchFamily="18" charset="0"/>
+              </a:rPr>
+              <a:t>Ly-</a:t>
+            </a:r>
+            <a:r>
+              <a:rPr lang="en-HK" sz="2000" dirty="0">
+                <a:solidFill>
+                  <a:schemeClr val="tx1"/>
+                </a:solidFill>
+                <a:latin typeface="Times New Roman" panose="02020603050405020304" pitchFamily="18" charset="0"/>
+                <a:cs typeface="Times New Roman" panose="02020603050405020304" pitchFamily="18" charset="0"/>
+              </a:rPr>
+              <a:t> α</a:t>
+            </a:r>
+            <a:r>
+              <a:rPr lang="en-HK" sz="2000" dirty="0" smtClean="0">
+                <a:latin typeface="Times New Roman" panose="02020603050405020304" pitchFamily="18" charset="0"/>
+                <a:cs typeface="Times New Roman" panose="02020603050405020304" pitchFamily="18" charset="0"/>
+              </a:rPr>
+              <a:t> </a:t>
+            </a:r>
+            <a:r>
+              <a:rPr lang="en-HK" sz="2000" dirty="0" smtClean="0">
+                <a:latin typeface="Times New Roman" panose="02020603050405020304" pitchFamily="18" charset="0"/>
+                <a:cs typeface="Times New Roman" panose="02020603050405020304" pitchFamily="18" charset="0"/>
+              </a:rPr>
+              <a:t>flux is </a:t>
+            </a:r>
+            <a:r>
+              <a:rPr lang="en-HK" sz="2000" dirty="0" smtClean="0">
+                <a:solidFill>
+                  <a:srgbClr val="0070C0"/>
+                </a:solidFill>
+                <a:latin typeface="Times New Roman" panose="02020603050405020304" pitchFamily="18" charset="0"/>
+                <a:cs typeface="Times New Roman" panose="02020603050405020304" pitchFamily="18" charset="0"/>
               </a:rPr>
               <a:t>1 order of magnitude</a:t>
             </a:r>
             <a:r>
-              <a:rPr lang="en-HK" sz="2000" dirty="0" smtClean="0"/>
-              <a:t> more intense than EUV irradiations (Grundy et al. 2016)</a:t>
-            </a:r>
+              <a:rPr lang="en-HK" sz="2000" dirty="0" smtClean="0">
+                <a:latin typeface="Times New Roman" panose="02020603050405020304" pitchFamily="18" charset="0"/>
+                <a:cs typeface="Times New Roman" panose="02020603050405020304" pitchFamily="18" charset="0"/>
+              </a:rPr>
+              <a:t> more intense than EUV irradiations </a:t>
+            </a:r>
+            <a:r>
+              <a:rPr lang="en-HK" sz="2000" dirty="0" smtClean="0">
+                <a:latin typeface="Times New Roman" panose="02020603050405020304" pitchFamily="18" charset="0"/>
+                <a:cs typeface="Times New Roman" panose="02020603050405020304" pitchFamily="18" charset="0"/>
+              </a:rPr>
+              <a:t>at 39.1 A.U. (Grundy </a:t>
+            </a:r>
+            <a:r>
+              <a:rPr lang="en-HK" sz="2000" dirty="0" smtClean="0">
+                <a:latin typeface="Times New Roman" panose="02020603050405020304" pitchFamily="18" charset="0"/>
+                <a:cs typeface="Times New Roman" panose="02020603050405020304" pitchFamily="18" charset="0"/>
+              </a:rPr>
+              <a:t>et al. 2016</a:t>
+            </a:r>
+            <a:r>
+              <a:rPr lang="en-HK" sz="2000" dirty="0" smtClean="0">
+                <a:latin typeface="Times New Roman" panose="02020603050405020304" pitchFamily="18" charset="0"/>
+                <a:cs typeface="Times New Roman" panose="02020603050405020304" pitchFamily="18" charset="0"/>
+              </a:rPr>
+              <a:t>)</a:t>
+            </a:r>
+            <a:endParaRPr lang="en-HK" sz="2000" dirty="0" smtClean="0">
+              <a:latin typeface="Times New Roman" panose="02020603050405020304" pitchFamily="18" charset="0"/>
+              <a:cs typeface="Times New Roman" panose="02020603050405020304" pitchFamily="18" charset="0"/>
+            </a:endParaRPr>
           </a:p>
           <a:p>
             <a:pPr marL="973836" lvl="3">
@@ -18208,43 +18982,87 @@
               </a:spcBef>
             </a:pPr>
             <a:r>
-              <a:rPr lang="en-HK" sz="1800" dirty="0" smtClean="0"/>
+              <a:rPr lang="en-HK" sz="1800" dirty="0" smtClean="0">
+                <a:latin typeface="Times New Roman" panose="02020603050405020304" pitchFamily="18" charset="0"/>
+                <a:cs typeface="Times New Roman" panose="02020603050405020304" pitchFamily="18" charset="0"/>
+              </a:rPr>
               <a:t>Ly</a:t>
             </a:r>
             <a:r>
-              <a:rPr lang="en-US" altLang="zh-TW" sz="1800" dirty="0" smtClean="0"/>
+              <a:rPr lang="en-US" altLang="zh-TW" sz="1800" dirty="0" smtClean="0">
+                <a:latin typeface="Times New Roman" panose="02020603050405020304" pitchFamily="18" charset="0"/>
+                <a:cs typeface="Times New Roman" panose="02020603050405020304" pitchFamily="18" charset="0"/>
+              </a:rPr>
               <a:t>-</a:t>
             </a:r>
             <a:r>
-              <a:rPr lang="en-HK" sz="1800" dirty="0" smtClean="0"/>
+              <a:rPr lang="en-HK" sz="1800" dirty="0" smtClean="0">
+                <a:latin typeface="Times New Roman" panose="02020603050405020304" pitchFamily="18" charset="0"/>
+                <a:cs typeface="Times New Roman" panose="02020603050405020304" pitchFamily="18" charset="0"/>
+              </a:rPr>
               <a:t>α </a:t>
             </a:r>
             <a:r>
-              <a:rPr lang="en-HK" sz="1800" dirty="0"/>
-              <a:t>exposure: 1.9 x 10</a:t>
-            </a:r>
-            <a:r>
-              <a:rPr lang="en-HK" sz="1800" baseline="30000" dirty="0"/>
+              <a:rPr lang="en-HK" sz="1800" dirty="0" smtClean="0">
+                <a:latin typeface="Times New Roman" panose="02020603050405020304" pitchFamily="18" charset="0"/>
+                <a:cs typeface="Times New Roman" panose="02020603050405020304" pitchFamily="18" charset="0"/>
+              </a:rPr>
+              <a:t>flux</a:t>
+            </a:r>
+            <a:r>
+              <a:rPr lang="en-HK" sz="1800" dirty="0" smtClean="0">
+                <a:latin typeface="Times New Roman" panose="02020603050405020304" pitchFamily="18" charset="0"/>
+                <a:cs typeface="Times New Roman" panose="02020603050405020304" pitchFamily="18" charset="0"/>
+              </a:rPr>
+              <a:t>: </a:t>
+            </a:r>
+            <a:r>
+              <a:rPr lang="en-HK" sz="1800" dirty="0">
+                <a:latin typeface="Times New Roman" panose="02020603050405020304" pitchFamily="18" charset="0"/>
+                <a:cs typeface="Times New Roman" panose="02020603050405020304" pitchFamily="18" charset="0"/>
+              </a:rPr>
+              <a:t>1.9 x 10</a:t>
+            </a:r>
+            <a:r>
+              <a:rPr lang="en-HK" sz="1800" baseline="30000" dirty="0">
+                <a:latin typeface="Times New Roman" panose="02020603050405020304" pitchFamily="18" charset="0"/>
+                <a:cs typeface="Times New Roman" panose="02020603050405020304" pitchFamily="18" charset="0"/>
+              </a:rPr>
               <a:t>9</a:t>
             </a:r>
             <a:r>
-              <a:rPr lang="en-HK" sz="1800" dirty="0"/>
+              <a:rPr lang="en-HK" sz="1800" dirty="0">
+                <a:latin typeface="Times New Roman" panose="02020603050405020304" pitchFamily="18" charset="0"/>
+                <a:cs typeface="Times New Roman" panose="02020603050405020304" pitchFamily="18" charset="0"/>
+              </a:rPr>
               <a:t> eV cm</a:t>
             </a:r>
             <a:r>
-              <a:rPr lang="en-HK" sz="1800" baseline="30000" dirty="0"/>
+              <a:rPr lang="en-HK" sz="1800" baseline="30000" dirty="0">
+                <a:latin typeface="Times New Roman" panose="02020603050405020304" pitchFamily="18" charset="0"/>
+                <a:cs typeface="Times New Roman" panose="02020603050405020304" pitchFamily="18" charset="0"/>
+              </a:rPr>
               <a:t>-2</a:t>
             </a:r>
             <a:r>
-              <a:rPr lang="en-HK" sz="1800" dirty="0"/>
+              <a:rPr lang="en-HK" sz="1800" dirty="0">
+                <a:latin typeface="Times New Roman" panose="02020603050405020304" pitchFamily="18" charset="0"/>
+                <a:cs typeface="Times New Roman" panose="02020603050405020304" pitchFamily="18" charset="0"/>
+              </a:rPr>
               <a:t> </a:t>
             </a:r>
             <a:r>
-              <a:rPr lang="en-HK" sz="1800" dirty="0" smtClean="0"/>
+              <a:rPr lang="en-HK" sz="1800" dirty="0" smtClean="0">
+                <a:latin typeface="Times New Roman" panose="02020603050405020304" pitchFamily="18" charset="0"/>
+                <a:cs typeface="Times New Roman" panose="02020603050405020304" pitchFamily="18" charset="0"/>
+              </a:rPr>
               <a:t>s</a:t>
             </a:r>
             <a:r>
-              <a:rPr lang="en-HK" sz="1800" baseline="30000" dirty="0" smtClean="0"/>
+              <a:rPr lang="en-HK" sz="1800" baseline="30000" dirty="0" smtClean="0">
+                <a:latin typeface="Times New Roman" panose="02020603050405020304" pitchFamily="18" charset="0"/>
+                <a:cs typeface="Times New Roman" panose="02020603050405020304" pitchFamily="18" charset="0"/>
+              </a:rPr>
               <a:t>-1</a:t>
             </a:r>
           </a:p>
@@ -18255,31 +19073,66 @@
               </a:spcBef>
             </a:pPr>
             <a:r>
-              <a:rPr lang="en-HK" sz="1800" dirty="0" smtClean="0"/>
-              <a:t>EUV exposure: 8.7 x 10</a:t>
-            </a:r>
-            <a:r>
-              <a:rPr lang="en-HK" sz="1800" baseline="30000" dirty="0" smtClean="0"/>
+              <a:rPr lang="en-HK" sz="1800" dirty="0" smtClean="0">
+                <a:latin typeface="Times New Roman" panose="02020603050405020304" pitchFamily="18" charset="0"/>
+                <a:cs typeface="Times New Roman" panose="02020603050405020304" pitchFamily="18" charset="0"/>
+              </a:rPr>
+              <a:t>EUV </a:t>
+            </a:r>
+            <a:r>
+              <a:rPr lang="en-HK" sz="1800" dirty="0" smtClean="0">
+                <a:latin typeface="Times New Roman" panose="02020603050405020304" pitchFamily="18" charset="0"/>
+                <a:cs typeface="Times New Roman" panose="02020603050405020304" pitchFamily="18" charset="0"/>
+              </a:rPr>
+              <a:t>flux: </a:t>
+            </a:r>
+            <a:r>
+              <a:rPr lang="en-HK" sz="1800" dirty="0" smtClean="0">
+                <a:latin typeface="Times New Roman" panose="02020603050405020304" pitchFamily="18" charset="0"/>
+                <a:cs typeface="Times New Roman" panose="02020603050405020304" pitchFamily="18" charset="0"/>
+              </a:rPr>
+              <a:t>8.7 x 10</a:t>
+            </a:r>
+            <a:r>
+              <a:rPr lang="en-HK" sz="1800" baseline="30000" dirty="0" smtClean="0">
+                <a:latin typeface="Times New Roman" panose="02020603050405020304" pitchFamily="18" charset="0"/>
+                <a:cs typeface="Times New Roman" panose="02020603050405020304" pitchFamily="18" charset="0"/>
+              </a:rPr>
               <a:t>7</a:t>
             </a:r>
             <a:r>
-              <a:rPr lang="en-HK" sz="1800" dirty="0" smtClean="0"/>
+              <a:rPr lang="en-HK" sz="1800" dirty="0" smtClean="0">
+                <a:latin typeface="Times New Roman" panose="02020603050405020304" pitchFamily="18" charset="0"/>
+                <a:cs typeface="Times New Roman" panose="02020603050405020304" pitchFamily="18" charset="0"/>
+              </a:rPr>
               <a:t> eV </a:t>
             </a:r>
             <a:r>
-              <a:rPr lang="en-HK" sz="1800" dirty="0"/>
+              <a:rPr lang="en-HK" sz="1800" dirty="0">
+                <a:latin typeface="Times New Roman" panose="02020603050405020304" pitchFamily="18" charset="0"/>
+                <a:cs typeface="Times New Roman" panose="02020603050405020304" pitchFamily="18" charset="0"/>
+              </a:rPr>
               <a:t>cm</a:t>
             </a:r>
             <a:r>
-              <a:rPr lang="en-HK" sz="1800" baseline="30000" dirty="0"/>
+              <a:rPr lang="en-HK" sz="1800" baseline="30000" dirty="0">
+                <a:latin typeface="Times New Roman" panose="02020603050405020304" pitchFamily="18" charset="0"/>
+                <a:cs typeface="Times New Roman" panose="02020603050405020304" pitchFamily="18" charset="0"/>
+              </a:rPr>
               <a:t>-2</a:t>
             </a:r>
             <a:r>
-              <a:rPr lang="en-HK" sz="1800" dirty="0"/>
+              <a:rPr lang="en-HK" sz="1800" dirty="0">
+                <a:latin typeface="Times New Roman" panose="02020603050405020304" pitchFamily="18" charset="0"/>
+                <a:cs typeface="Times New Roman" panose="02020603050405020304" pitchFamily="18" charset="0"/>
+              </a:rPr>
               <a:t> s</a:t>
             </a:r>
             <a:r>
-              <a:rPr lang="en-HK" sz="1800" baseline="30000" dirty="0"/>
+              <a:rPr lang="en-HK" sz="1800" baseline="30000" dirty="0">
+                <a:latin typeface="Times New Roman" panose="02020603050405020304" pitchFamily="18" charset="0"/>
+                <a:cs typeface="Times New Roman" panose="02020603050405020304" pitchFamily="18" charset="0"/>
+              </a:rPr>
               <a:t>-1</a:t>
             </a:r>
           </a:p>
@@ -18328,20 +19181,20 @@
           <p:nvPr>
             <p:extLst>
               <p:ext uri="{D42A27DB-BD31-4B8C-83A1-F6EECF244321}">
-                <p14:modId xmlns:p14="http://schemas.microsoft.com/office/powerpoint/2010/main" val="4039815914"/>
+                <p14:modId xmlns:p14="http://schemas.microsoft.com/office/powerpoint/2010/main" val="2875099988"/>
               </p:ext>
             </p:extLst>
           </p:nvPr>
         </p:nvGraphicFramePr>
         <p:xfrm>
-          <a:off x="4539598" y="1856139"/>
-          <a:ext cx="5035225" cy="3291810"/>
+          <a:off x="3995936" y="1561356"/>
+          <a:ext cx="5506879" cy="3600157"/>
         </p:xfrm>
         <a:graphic>
           <a:graphicData uri="http://schemas.openxmlformats.org/presentationml/2006/ole">
             <mc:AlternateContent xmlns:mc="http://schemas.openxmlformats.org/markup-compatibility/2006">
               <mc:Choice xmlns:v="urn:schemas-microsoft-com:vml" Requires="v">
-                <p:oleObj spid="_x0000_s5711" name="Graph" r:id="rId3" imgW="4754880" imgH="3108960" progId="Origin50.Graph">
+                <p:oleObj spid="_x0000_s5825" name="Graph" r:id="rId3" imgW="4754880" imgH="3108960" progId="Origin50.Graph">
                   <p:embed/>
                 </p:oleObj>
               </mc:Choice>
@@ -18362,8 +19215,8 @@
                     </p:blipFill>
                     <p:spPr>
                       <a:xfrm>
-                        <a:off x="4539598" y="1856139"/>
-                        <a:ext cx="5035225" cy="3291810"/>
+                        <a:off x="3995936" y="1561356"/>
+                        <a:ext cx="5506879" cy="3600157"/>
                       </a:xfrm>
                       <a:prstGeom prst="rect">
                         <a:avLst/>
@@ -18376,70 +19229,6 @@
           </a:graphicData>
         </a:graphic>
       </p:graphicFrame>
-      <p:sp>
-        <p:nvSpPr>
-          <p:cNvPr id="3" name="矩形 2"/>
-          <p:cNvSpPr/>
-          <p:nvPr/>
-        </p:nvSpPr>
-        <p:spPr>
-          <a:xfrm>
-            <a:off x="1028700" y="4824783"/>
-            <a:ext cx="4572000" cy="646331"/>
-          </a:xfrm>
-          <a:prstGeom prst="rect">
-            <a:avLst/>
-          </a:prstGeom>
-        </p:spPr>
-        <p:txBody>
-          <a:bodyPr>
-            <a:spAutoFit/>
-          </a:bodyPr>
-          <a:lstStyle/>
-          <a:p>
-            <a:r>
-              <a:rPr lang="en-HK" dirty="0">
-                <a:solidFill>
-                  <a:srgbClr val="0070C0"/>
-                </a:solidFill>
-              </a:rPr>
-              <a:t>Ly</a:t>
-            </a:r>
-            <a:r>
-              <a:rPr lang="en-US" altLang="zh-TW" dirty="0">
-                <a:solidFill>
-                  <a:srgbClr val="0070C0"/>
-                </a:solidFill>
-              </a:rPr>
-              <a:t>-</a:t>
-            </a:r>
-            <a:r>
-              <a:rPr lang="en-HK" dirty="0">
-                <a:solidFill>
-                  <a:srgbClr val="0070C0"/>
-                </a:solidFill>
-              </a:rPr>
-              <a:t>α is the main energy source to produce CN</a:t>
-            </a:r>
-            <a:r>
-              <a:rPr lang="en-HK" baseline="30000" dirty="0">
-                <a:solidFill>
-                  <a:srgbClr val="0070C0"/>
-                </a:solidFill>
-              </a:rPr>
-              <a:t>-</a:t>
-            </a:r>
-            <a:r>
-              <a:rPr lang="en-HK" dirty="0">
-                <a:solidFill>
-                  <a:srgbClr val="0070C0"/>
-                </a:solidFill>
-              </a:rPr>
-              <a:t> on Charon</a:t>
-            </a:r>
-          </a:p>
-        </p:txBody>
-      </p:sp>
     </p:spTree>
     <p:extLst>
       <p:ext uri="{BB962C8B-B14F-4D97-AF65-F5344CB8AC3E}">
@@ -18605,10 +19394,16 @@
           <a:lstStyle/>
           <a:p>
             <a:r>
-              <a:rPr lang="en-HK" dirty="0" smtClean="0"/>
+              <a:rPr lang="en-HK" dirty="0" smtClean="0">
+                <a:latin typeface="Times New Roman" panose="02020603050405020304" pitchFamily="18" charset="0"/>
+                <a:cs typeface="Times New Roman" panose="02020603050405020304" pitchFamily="18" charset="0"/>
+              </a:rPr>
               <a:t>Conclusion</a:t>
             </a:r>
-            <a:endParaRPr lang="en-US" dirty="0"/>
+            <a:endParaRPr lang="en-US" dirty="0">
+              <a:latin typeface="Times New Roman" panose="02020603050405020304" pitchFamily="18" charset="0"/>
+              <a:cs typeface="Times New Roman" panose="02020603050405020304" pitchFamily="18" charset="0"/>
+            </a:endParaRPr>
           </a:p>
         </p:txBody>
       </p:sp>
@@ -18625,7 +19420,7 @@
         <p:spPr>
           <a:xfrm>
             <a:off x="1017458" y="1489348"/>
-            <a:ext cx="7200900" cy="2984500"/>
+            <a:ext cx="7586990" cy="3600400"/>
           </a:xfrm>
         </p:spPr>
         <p:txBody>
@@ -18635,7 +19430,10 @@
           <a:lstStyle/>
           <a:p>
             <a:r>
-              <a:rPr lang="en-HK" sz="2000" dirty="0" smtClean="0"/>
+              <a:rPr lang="en-HK" sz="2000" dirty="0" smtClean="0">
+                <a:latin typeface="Times New Roman" panose="02020603050405020304" pitchFamily="18" charset="0"/>
+                <a:cs typeface="Times New Roman" panose="02020603050405020304" pitchFamily="18" charset="0"/>
+              </a:rPr>
               <a:t>1. Detection of methylamine implies that </a:t>
             </a:r>
             <a:r>
@@ -18643,6 +19441,8 @@
                 <a:solidFill>
                   <a:srgbClr val="0070C0"/>
                 </a:solidFill>
+                <a:latin typeface="Times New Roman" panose="02020603050405020304" pitchFamily="18" charset="0"/>
+                <a:cs typeface="Times New Roman" panose="02020603050405020304" pitchFamily="18" charset="0"/>
               </a:rPr>
               <a:t>CN</a:t>
             </a:r>
@@ -18651,6 +19451,8 @@
                 <a:solidFill>
                   <a:srgbClr val="0070C0"/>
                 </a:solidFill>
+                <a:latin typeface="Times New Roman" panose="02020603050405020304" pitchFamily="18" charset="0"/>
+                <a:cs typeface="Times New Roman" panose="02020603050405020304" pitchFamily="18" charset="0"/>
               </a:rPr>
               <a:t>-</a:t>
             </a:r>
@@ -18659,121 +19461,337 @@
                 <a:solidFill>
                   <a:srgbClr val="0070C0"/>
                 </a:solidFill>
+                <a:latin typeface="Times New Roman" panose="02020603050405020304" pitchFamily="18" charset="0"/>
+                <a:cs typeface="Times New Roman" panose="02020603050405020304" pitchFamily="18" charset="0"/>
               </a:rPr>
               <a:t> is formed via a 2 step mechanism.</a:t>
             </a:r>
           </a:p>
           <a:p>
             <a:r>
-              <a:rPr lang="en-HK" sz="2000" dirty="0" smtClean="0"/>
-              <a:t>2.  Concentration of CN</a:t>
-            </a:r>
-            <a:r>
-              <a:rPr lang="en-HK" sz="2000" baseline="30000" dirty="0" smtClean="0"/>
+              <a:rPr lang="en-HK" sz="2000" dirty="0" smtClean="0">
+                <a:latin typeface="Times New Roman" panose="02020603050405020304" pitchFamily="18" charset="0"/>
+                <a:cs typeface="Times New Roman" panose="02020603050405020304" pitchFamily="18" charset="0"/>
+              </a:rPr>
+              <a:t>2. </a:t>
+            </a:r>
+            <a:r>
+              <a:rPr lang="en-HK" sz="2000" dirty="0" smtClean="0">
+                <a:latin typeface="Times New Roman" panose="02020603050405020304" pitchFamily="18" charset="0"/>
+                <a:cs typeface="Times New Roman" panose="02020603050405020304" pitchFamily="18" charset="0"/>
+              </a:rPr>
+              <a:t>Formation of </a:t>
+            </a:r>
+            <a:r>
+              <a:rPr lang="en-HK" sz="2000" dirty="0" smtClean="0">
+                <a:latin typeface="Times New Roman" panose="02020603050405020304" pitchFamily="18" charset="0"/>
+                <a:cs typeface="Times New Roman" panose="02020603050405020304" pitchFamily="18" charset="0"/>
+              </a:rPr>
+              <a:t>CN</a:t>
+            </a:r>
+            <a:r>
+              <a:rPr lang="en-HK" sz="2000" baseline="30000" dirty="0" smtClean="0">
+                <a:latin typeface="Times New Roman" panose="02020603050405020304" pitchFamily="18" charset="0"/>
+                <a:cs typeface="Times New Roman" panose="02020603050405020304" pitchFamily="18" charset="0"/>
+              </a:rPr>
               <a:t>-</a:t>
             </a:r>
             <a:r>
-              <a:rPr lang="en-HK" sz="2000" dirty="0" smtClean="0"/>
-              <a:t> is </a:t>
+              <a:rPr lang="en-HK" sz="2000" dirty="0" smtClean="0">
+                <a:latin typeface="Times New Roman" panose="02020603050405020304" pitchFamily="18" charset="0"/>
+                <a:cs typeface="Times New Roman" panose="02020603050405020304" pitchFamily="18" charset="0"/>
+              </a:rPr>
+              <a:t> </a:t>
             </a:r>
             <a:r>
               <a:rPr lang="en-HK" sz="2000" dirty="0" smtClean="0">
                 <a:solidFill>
                   <a:srgbClr val="0070C0"/>
                 </a:solidFill>
-              </a:rPr>
-              <a:t>not proportional to the initial amount </a:t>
-            </a:r>
-            <a:r>
-              <a:rPr lang="en-HK" sz="2000" dirty="0" smtClean="0"/>
-              <a:t>of CH</a:t>
-            </a:r>
-            <a:r>
-              <a:rPr lang="en-HK" sz="2000" baseline="-25000" dirty="0" smtClean="0"/>
-              <a:t>4</a:t>
-            </a:r>
-            <a:r>
-              <a:rPr lang="en-HK" sz="2000" dirty="0" smtClean="0"/>
-              <a:t> when CH</a:t>
-            </a:r>
-            <a:r>
-              <a:rPr lang="en-HK" sz="2000" baseline="-25000" dirty="0" smtClean="0"/>
-              <a:t>4</a:t>
-            </a:r>
-            <a:r>
-              <a:rPr lang="en-HK" sz="2000" dirty="0" smtClean="0"/>
-              <a:t> is in excess. </a:t>
-            </a:r>
-          </a:p>
-          <a:p>
-            <a:pPr lvl="1"/>
-            <a:r>
-              <a:rPr lang="en-HK" sz="2000" dirty="0" smtClean="0"/>
-              <a:t>This implies that we have to </a:t>
+                <a:latin typeface="Times New Roman" panose="02020603050405020304" pitchFamily="18" charset="0"/>
+                <a:cs typeface="Times New Roman" panose="02020603050405020304" pitchFamily="18" charset="0"/>
+              </a:rPr>
+              <a:t>is</a:t>
+            </a:r>
+            <a:r>
+              <a:rPr lang="en-HK" sz="2000" dirty="0" smtClean="0">
+                <a:latin typeface="Times New Roman" panose="02020603050405020304" pitchFamily="18" charset="0"/>
+                <a:cs typeface="Times New Roman" panose="02020603050405020304" pitchFamily="18" charset="0"/>
+              </a:rPr>
+              <a:t> </a:t>
             </a:r>
             <a:r>
               <a:rPr lang="en-HK" sz="2000" dirty="0" smtClean="0">
                 <a:solidFill>
                   <a:srgbClr val="0070C0"/>
                 </a:solidFill>
-              </a:rPr>
-              <a:t>experimentally simulate </a:t>
-            </a:r>
-            <a:r>
-              <a:rPr lang="en-HK" sz="2000" dirty="0" smtClean="0"/>
-              <a:t>the amount of CN</a:t>
-            </a:r>
-            <a:r>
-              <a:rPr lang="en-HK" sz="2000" baseline="30000" dirty="0" smtClean="0"/>
-              <a:t>-</a:t>
-            </a:r>
-            <a:r>
-              <a:rPr lang="en-HK" sz="2000" dirty="0" smtClean="0"/>
-              <a:t> after Charon winter for further investigations.</a:t>
-            </a:r>
-          </a:p>
-          <a:p>
-            <a:r>
-              <a:rPr lang="en-HK" sz="2000" dirty="0" smtClean="0"/>
-              <a:t>3. The </a:t>
+                <a:latin typeface="Times New Roman" panose="02020603050405020304" pitchFamily="18" charset="0"/>
+                <a:cs typeface="Times New Roman" panose="02020603050405020304" pitchFamily="18" charset="0"/>
+              </a:rPr>
+              <a:t>not proportional to the initial </a:t>
             </a:r>
             <a:r>
               <a:rPr lang="en-HK" sz="2000" dirty="0" smtClean="0">
                 <a:solidFill>
                   <a:srgbClr val="0070C0"/>
                 </a:solidFill>
-              </a:rPr>
-              <a:t>reduced destruction cross-section </a:t>
-            </a:r>
-            <a:r>
-              <a:rPr lang="en-HK" sz="2000" dirty="0" smtClean="0"/>
-              <a:t>of EUV 30.4nm irradiation is the main factor of slowing the rate of formations. </a:t>
+                <a:latin typeface="Times New Roman" panose="02020603050405020304" pitchFamily="18" charset="0"/>
+                <a:cs typeface="Times New Roman" panose="02020603050405020304" pitchFamily="18" charset="0"/>
+              </a:rPr>
+              <a:t>column density </a:t>
+            </a:r>
+            <a:r>
+              <a:rPr lang="en-HK" sz="2000" dirty="0" smtClean="0">
+                <a:latin typeface="Times New Roman" panose="02020603050405020304" pitchFamily="18" charset="0"/>
+                <a:cs typeface="Times New Roman" panose="02020603050405020304" pitchFamily="18" charset="0"/>
+              </a:rPr>
+              <a:t>of CH</a:t>
+            </a:r>
+            <a:r>
+              <a:rPr lang="en-HK" sz="2000" baseline="-25000" dirty="0" smtClean="0">
+                <a:latin typeface="Times New Roman" panose="02020603050405020304" pitchFamily="18" charset="0"/>
+                <a:cs typeface="Times New Roman" panose="02020603050405020304" pitchFamily="18" charset="0"/>
+              </a:rPr>
+              <a:t>4</a:t>
+            </a:r>
+            <a:r>
+              <a:rPr lang="en-HK" sz="2000" dirty="0" smtClean="0">
+                <a:latin typeface="Times New Roman" panose="02020603050405020304" pitchFamily="18" charset="0"/>
+                <a:cs typeface="Times New Roman" panose="02020603050405020304" pitchFamily="18" charset="0"/>
+              </a:rPr>
+              <a:t> when CH</a:t>
+            </a:r>
+            <a:r>
+              <a:rPr lang="en-HK" sz="2000" baseline="-25000" dirty="0" smtClean="0">
+                <a:latin typeface="Times New Roman" panose="02020603050405020304" pitchFamily="18" charset="0"/>
+                <a:cs typeface="Times New Roman" panose="02020603050405020304" pitchFamily="18" charset="0"/>
+              </a:rPr>
+              <a:t>4</a:t>
+            </a:r>
+            <a:r>
+              <a:rPr lang="en-HK" sz="2000" dirty="0" smtClean="0">
+                <a:latin typeface="Times New Roman" panose="02020603050405020304" pitchFamily="18" charset="0"/>
+                <a:cs typeface="Times New Roman" panose="02020603050405020304" pitchFamily="18" charset="0"/>
+              </a:rPr>
+              <a:t> is in excess. </a:t>
             </a:r>
           </a:p>
           <a:p>
             <a:pPr lvl="1"/>
             <a:r>
-              <a:rPr lang="en-HK" sz="2000" dirty="0" smtClean="0"/>
-              <a:t>This implies that Ly-α is the </a:t>
+              <a:rPr lang="en-HK" sz="2000" dirty="0" smtClean="0">
+                <a:latin typeface="Times New Roman" panose="02020603050405020304" pitchFamily="18" charset="0"/>
+                <a:cs typeface="Times New Roman" panose="02020603050405020304" pitchFamily="18" charset="0"/>
+              </a:rPr>
+              <a:t>This implies that we have to </a:t>
             </a:r>
             <a:r>
               <a:rPr lang="en-HK" sz="2000" dirty="0" smtClean="0">
                 <a:solidFill>
                   <a:srgbClr val="0070C0"/>
                 </a:solidFill>
-              </a:rPr>
-              <a:t>main energy source </a:t>
-            </a:r>
-            <a:r>
-              <a:rPr lang="en-HK" sz="2000" dirty="0" smtClean="0"/>
+                <a:latin typeface="Times New Roman" panose="02020603050405020304" pitchFamily="18" charset="0"/>
+                <a:cs typeface="Times New Roman" panose="02020603050405020304" pitchFamily="18" charset="0"/>
+              </a:rPr>
+              <a:t>experimentally </a:t>
+            </a:r>
+            <a:r>
+              <a:rPr lang="en-HK" sz="2000" dirty="0" smtClean="0">
+                <a:solidFill>
+                  <a:srgbClr val="0070C0"/>
+                </a:solidFill>
+                <a:latin typeface="Times New Roman" panose="02020603050405020304" pitchFamily="18" charset="0"/>
+                <a:cs typeface="Times New Roman" panose="02020603050405020304" pitchFamily="18" charset="0"/>
+              </a:rPr>
+              <a:t>estimate </a:t>
+            </a:r>
+            <a:r>
+              <a:rPr lang="en-HK" sz="2000" dirty="0" smtClean="0">
+                <a:latin typeface="Times New Roman" panose="02020603050405020304" pitchFamily="18" charset="0"/>
+                <a:cs typeface="Times New Roman" panose="02020603050405020304" pitchFamily="18" charset="0"/>
+              </a:rPr>
+              <a:t>the </a:t>
+            </a:r>
+            <a:r>
+              <a:rPr lang="en-HK" sz="2000" dirty="0" smtClean="0">
+                <a:latin typeface="Times New Roman" panose="02020603050405020304" pitchFamily="18" charset="0"/>
+                <a:cs typeface="Times New Roman" panose="02020603050405020304" pitchFamily="18" charset="0"/>
+              </a:rPr>
+              <a:t>column density </a:t>
+            </a:r>
+            <a:r>
+              <a:rPr lang="en-HK" sz="2000" dirty="0" smtClean="0">
+                <a:latin typeface="Times New Roman" panose="02020603050405020304" pitchFamily="18" charset="0"/>
+                <a:cs typeface="Times New Roman" panose="02020603050405020304" pitchFamily="18" charset="0"/>
+              </a:rPr>
+              <a:t>of CN</a:t>
+            </a:r>
+            <a:r>
+              <a:rPr lang="en-HK" sz="2000" baseline="30000" dirty="0" smtClean="0">
+                <a:latin typeface="Times New Roman" panose="02020603050405020304" pitchFamily="18" charset="0"/>
+                <a:cs typeface="Times New Roman" panose="02020603050405020304" pitchFamily="18" charset="0"/>
+              </a:rPr>
+              <a:t>-</a:t>
+            </a:r>
+            <a:r>
+              <a:rPr lang="en-HK" sz="2000" dirty="0" smtClean="0">
+                <a:latin typeface="Times New Roman" panose="02020603050405020304" pitchFamily="18" charset="0"/>
+                <a:cs typeface="Times New Roman" panose="02020603050405020304" pitchFamily="18" charset="0"/>
+              </a:rPr>
+              <a:t> after Charon winter for further investigations.</a:t>
+            </a:r>
+          </a:p>
+          <a:p>
+            <a:r>
+              <a:rPr lang="en-HK" sz="2000" dirty="0" smtClean="0">
+                <a:latin typeface="Times New Roman" panose="02020603050405020304" pitchFamily="18" charset="0"/>
+                <a:cs typeface="Times New Roman" panose="02020603050405020304" pitchFamily="18" charset="0"/>
+              </a:rPr>
+              <a:t>3. The </a:t>
+            </a:r>
+            <a:r>
+              <a:rPr lang="en-HK" sz="2000" dirty="0" smtClean="0">
+                <a:solidFill>
+                  <a:srgbClr val="0070C0"/>
+                </a:solidFill>
+                <a:latin typeface="Times New Roman" panose="02020603050405020304" pitchFamily="18" charset="0"/>
+                <a:cs typeface="Times New Roman" panose="02020603050405020304" pitchFamily="18" charset="0"/>
+              </a:rPr>
+              <a:t>reduced destruction cross-section </a:t>
+            </a:r>
+            <a:r>
+              <a:rPr lang="en-HK" sz="2000" dirty="0" smtClean="0">
+                <a:latin typeface="Times New Roman" panose="02020603050405020304" pitchFamily="18" charset="0"/>
+                <a:cs typeface="Times New Roman" panose="02020603050405020304" pitchFamily="18" charset="0"/>
+              </a:rPr>
+              <a:t>of EUV </a:t>
+            </a:r>
+            <a:r>
+              <a:rPr lang="en-HK" sz="2000" dirty="0" smtClean="0">
+                <a:latin typeface="Times New Roman" panose="02020603050405020304" pitchFamily="18" charset="0"/>
+                <a:cs typeface="Times New Roman" panose="02020603050405020304" pitchFamily="18" charset="0"/>
+              </a:rPr>
+              <a:t>(30.4nm) </a:t>
+            </a:r>
+            <a:r>
+              <a:rPr lang="en-HK" sz="2000" dirty="0" smtClean="0">
+                <a:latin typeface="Times New Roman" panose="02020603050405020304" pitchFamily="18" charset="0"/>
+                <a:cs typeface="Times New Roman" panose="02020603050405020304" pitchFamily="18" charset="0"/>
+              </a:rPr>
+              <a:t>irradiation is the main factor of </a:t>
+            </a:r>
+            <a:r>
+              <a:rPr lang="en-HK" sz="2000" dirty="0" smtClean="0">
+                <a:latin typeface="Times New Roman" panose="02020603050405020304" pitchFamily="18" charset="0"/>
+                <a:cs typeface="Times New Roman" panose="02020603050405020304" pitchFamily="18" charset="0"/>
+              </a:rPr>
+              <a:t>reducing </a:t>
+            </a:r>
+            <a:r>
+              <a:rPr lang="en-HK" sz="2000" dirty="0" smtClean="0">
+                <a:latin typeface="Times New Roman" panose="02020603050405020304" pitchFamily="18" charset="0"/>
+                <a:cs typeface="Times New Roman" panose="02020603050405020304" pitchFamily="18" charset="0"/>
+              </a:rPr>
+              <a:t>the </a:t>
+            </a:r>
+            <a:r>
+              <a:rPr lang="en-HK" sz="2000" dirty="0" smtClean="0">
+                <a:latin typeface="Times New Roman" panose="02020603050405020304" pitchFamily="18" charset="0"/>
+                <a:cs typeface="Times New Roman" panose="02020603050405020304" pitchFamily="18" charset="0"/>
+              </a:rPr>
+              <a:t>formation rate of CN</a:t>
+            </a:r>
+            <a:r>
+              <a:rPr lang="en-HK" sz="2000" baseline="30000" dirty="0" smtClean="0">
+                <a:latin typeface="Times New Roman" panose="02020603050405020304" pitchFamily="18" charset="0"/>
+                <a:cs typeface="Times New Roman" panose="02020603050405020304" pitchFamily="18" charset="0"/>
+              </a:rPr>
+              <a:t>-</a:t>
+            </a:r>
+            <a:r>
+              <a:rPr lang="en-HK" sz="2000" dirty="0" smtClean="0">
+                <a:latin typeface="Times New Roman" panose="02020603050405020304" pitchFamily="18" charset="0"/>
+                <a:cs typeface="Times New Roman" panose="02020603050405020304" pitchFamily="18" charset="0"/>
+              </a:rPr>
+              <a:t>. </a:t>
+            </a:r>
+            <a:endParaRPr lang="en-HK" sz="2000" dirty="0" smtClean="0">
+              <a:latin typeface="Times New Roman" panose="02020603050405020304" pitchFamily="18" charset="0"/>
+              <a:cs typeface="Times New Roman" panose="02020603050405020304" pitchFamily="18" charset="0"/>
+            </a:endParaRPr>
+          </a:p>
+          <a:p>
+            <a:pPr lvl="1"/>
+            <a:r>
+              <a:rPr lang="en-HK" sz="2000" dirty="0" smtClean="0">
+                <a:latin typeface="Times New Roman" panose="02020603050405020304" pitchFamily="18" charset="0"/>
+                <a:cs typeface="Times New Roman" panose="02020603050405020304" pitchFamily="18" charset="0"/>
+              </a:rPr>
+              <a:t>This implies that </a:t>
+            </a:r>
+            <a:r>
+              <a:rPr lang="en-HK" sz="2000" dirty="0" smtClean="0">
+                <a:latin typeface="Times New Roman" panose="02020603050405020304" pitchFamily="18" charset="0"/>
+                <a:cs typeface="Times New Roman" panose="02020603050405020304" pitchFamily="18" charset="0"/>
+              </a:rPr>
+              <a:t>Ly-α (VUV) </a:t>
+            </a:r>
+            <a:r>
+              <a:rPr lang="en-HK" sz="2000" dirty="0" smtClean="0">
+                <a:latin typeface="Times New Roman" panose="02020603050405020304" pitchFamily="18" charset="0"/>
+                <a:cs typeface="Times New Roman" panose="02020603050405020304" pitchFamily="18" charset="0"/>
+              </a:rPr>
+              <a:t>is the </a:t>
+            </a:r>
+            <a:r>
+              <a:rPr lang="en-HK" sz="2000" dirty="0" smtClean="0">
+                <a:solidFill>
+                  <a:srgbClr val="0070C0"/>
+                </a:solidFill>
+                <a:latin typeface="Times New Roman" panose="02020603050405020304" pitchFamily="18" charset="0"/>
+                <a:cs typeface="Times New Roman" panose="02020603050405020304" pitchFamily="18" charset="0"/>
+              </a:rPr>
+              <a:t>main </a:t>
+            </a:r>
+            <a:r>
+              <a:rPr lang="en-HK" sz="2000" dirty="0" smtClean="0">
+                <a:solidFill>
+                  <a:srgbClr val="0070C0"/>
+                </a:solidFill>
+                <a:latin typeface="Times New Roman" panose="02020603050405020304" pitchFamily="18" charset="0"/>
+                <a:cs typeface="Times New Roman" panose="02020603050405020304" pitchFamily="18" charset="0"/>
+              </a:rPr>
+              <a:t>photon </a:t>
+            </a:r>
+            <a:r>
+              <a:rPr lang="en-HK" sz="2000" dirty="0" smtClean="0">
+                <a:solidFill>
+                  <a:srgbClr val="0070C0"/>
+                </a:solidFill>
+                <a:latin typeface="Times New Roman" panose="02020603050405020304" pitchFamily="18" charset="0"/>
+                <a:cs typeface="Times New Roman" panose="02020603050405020304" pitchFamily="18" charset="0"/>
+              </a:rPr>
+              <a:t>source </a:t>
+            </a:r>
+            <a:r>
+              <a:rPr lang="en-HK" sz="2000" dirty="0" smtClean="0">
+                <a:latin typeface="Times New Roman" panose="02020603050405020304" pitchFamily="18" charset="0"/>
+                <a:cs typeface="Times New Roman" panose="02020603050405020304" pitchFamily="18" charset="0"/>
+              </a:rPr>
               <a:t>to produce CN</a:t>
             </a:r>
             <a:r>
-              <a:rPr lang="en-HK" sz="2000" baseline="30000" dirty="0" smtClean="0"/>
+              <a:rPr lang="en-HK" sz="2000" baseline="30000" dirty="0" smtClean="0">
+                <a:latin typeface="Times New Roman" panose="02020603050405020304" pitchFamily="18" charset="0"/>
+                <a:cs typeface="Times New Roman" panose="02020603050405020304" pitchFamily="18" charset="0"/>
+              </a:rPr>
               <a:t>-</a:t>
             </a:r>
             <a:r>
-              <a:rPr lang="en-HK" sz="2000" dirty="0" smtClean="0"/>
+              <a:rPr lang="en-HK" sz="2000" dirty="0" smtClean="0">
+                <a:latin typeface="Times New Roman" panose="02020603050405020304" pitchFamily="18" charset="0"/>
+                <a:cs typeface="Times New Roman" panose="02020603050405020304" pitchFamily="18" charset="0"/>
+              </a:rPr>
               <a:t> on Charon.</a:t>
             </a:r>
           </a:p>
@@ -18940,7 +19958,12 @@
             <p:ph type="title"/>
           </p:nvPr>
         </p:nvSpPr>
-        <p:spPr/>
+        <p:spPr>
+          <a:xfrm>
+            <a:off x="1028700" y="571500"/>
+            <a:ext cx="7719764" cy="1238250"/>
+          </a:xfrm>
+        </p:spPr>
         <p:txBody>
           <a:bodyPr/>
           <a:lstStyle/>
@@ -18965,7 +19988,7 @@
         </p:nvSpPr>
         <p:spPr>
           <a:xfrm>
-            <a:off x="1028700" y="1905000"/>
+            <a:off x="812676" y="2033325"/>
             <a:ext cx="2823220" cy="2984500"/>
           </a:xfrm>
         </p:spPr>
@@ -19034,7 +20057,7 @@
           <a:graphicData uri="http://schemas.openxmlformats.org/presentationml/2006/ole">
             <mc:AlternateContent xmlns:mc="http://schemas.openxmlformats.org/markup-compatibility/2006">
               <mc:Choice xmlns:v="urn:schemas-microsoft-com:vml" Requires="v">
-                <p:oleObj spid="_x0000_s12565" name="Graph" r:id="rId3" imgW="4754880" imgH="3108960" progId="Origin50.Graph">
+                <p:oleObj spid="_x0000_s12679" name="Graph" r:id="rId3" imgW="4754880" imgH="3108960" progId="Origin50.Graph">
                   <p:embed/>
                 </p:oleObj>
               </mc:Choice>

</xml_diff>

<commit_message>
added 1:5 reduction reactant
</commit_message>
<xml_diff>
--- a/doc/VUV and EUV irradiation of CH4 + NH3.pptx
+++ b/doc/VUV and EUV irradiation of CH4 + NH3.pptx
@@ -243,7 +243,7 @@
           <a:p>
             <a:fld id="{2EA0F8EA-CEC5-4CE5-8335-1847FEAEEDDD}" type="datetimeFigureOut">
               <a:rPr lang="en-US" smtClean="0"/>
-              <a:t>12/20/2017</a:t>
+              <a:t>12/21/2017</a:t>
             </a:fld>
             <a:endParaRPr lang="en-US"/>
           </a:p>
@@ -409,7 +409,7 @@
           <a:p>
             <a:fld id="{485A2760-9D7F-48DB-88C5-C946BBEDB216}" type="datetimeFigureOut">
               <a:rPr lang="en-US" smtClean="0"/>
-              <a:t>12/20/2017</a:t>
+              <a:t>12/21/2017</a:t>
             </a:fld>
             <a:endParaRPr lang="en-US"/>
           </a:p>
@@ -2101,7 +2101,7 @@
           <a:p>
             <a:fld id="{F90847E2-8F69-4C53-BB9F-CB399597B8E8}" type="datetime1">
               <a:rPr lang="zh-TW" altLang="en-US" smtClean="0"/>
-              <a:t>2017/12/20</a:t>
+              <a:t>2017/12/21</a:t>
             </a:fld>
             <a:endParaRPr lang="zh-TW" altLang="en-US"/>
           </a:p>
@@ -2431,7 +2431,7 @@
           <a:p>
             <a:fld id="{11C4423E-F743-4479-B3EB-A3D436046571}" type="datetime1">
               <a:rPr lang="zh-TW" altLang="en-US" smtClean="0"/>
-              <a:t>2017/12/20</a:t>
+              <a:t>2017/12/21</a:t>
             </a:fld>
             <a:endParaRPr lang="zh-TW" altLang="en-US"/>
           </a:p>
@@ -2611,7 +2611,7 @@
           <a:p>
             <a:fld id="{11B51FCE-FEB1-4FC0-A33D-32F157D56EC2}" type="datetime1">
               <a:rPr lang="zh-TW" altLang="en-US" smtClean="0"/>
-              <a:t>2017/12/20</a:t>
+              <a:t>2017/12/21</a:t>
             </a:fld>
             <a:endParaRPr lang="zh-TW" altLang="en-US"/>
           </a:p>
@@ -2781,7 +2781,7 @@
           <a:p>
             <a:fld id="{475DDED0-7635-44DC-872F-8F10003FF3C1}" type="datetime1">
               <a:rPr lang="zh-TW" altLang="en-US" smtClean="0"/>
-              <a:t>2017/12/20</a:t>
+              <a:t>2017/12/21</a:t>
             </a:fld>
             <a:endParaRPr lang="zh-TW" altLang="en-US"/>
           </a:p>
@@ -3053,7 +3053,7 @@
           <a:p>
             <a:fld id="{B2815EC9-7E98-4BA3-884F-F6C03BB50BFA}" type="datetime1">
               <a:rPr lang="zh-TW" altLang="en-US" smtClean="0"/>
-              <a:t>2017/12/20</a:t>
+              <a:t>2017/12/21</a:t>
             </a:fld>
             <a:endParaRPr lang="zh-TW" altLang="en-US"/>
           </a:p>
@@ -3447,7 +3447,7 @@
           <a:p>
             <a:fld id="{5223AADA-D673-4559-BD2E-EC3C46E8C00D}" type="datetime1">
               <a:rPr lang="zh-TW" altLang="en-US" smtClean="0"/>
-              <a:t>2017/12/20</a:t>
+              <a:t>2017/12/21</a:t>
             </a:fld>
             <a:endParaRPr lang="zh-TW" altLang="en-US"/>
           </a:p>
@@ -3929,7 +3929,7 @@
           <a:p>
             <a:fld id="{21C10B86-884B-453B-8517-A1967275045C}" type="datetime1">
               <a:rPr lang="zh-TW" altLang="en-US" smtClean="0"/>
-              <a:t>2017/12/20</a:t>
+              <a:t>2017/12/21</a:t>
             </a:fld>
             <a:endParaRPr lang="zh-TW" altLang="en-US"/>
           </a:p>
@@ -4052,7 +4052,7 @@
           <a:p>
             <a:fld id="{15C72905-AFF2-4EEA-9BB9-F2B95D2C9E1C}" type="datetime1">
               <a:rPr lang="zh-TW" altLang="en-US" smtClean="0"/>
-              <a:t>2017/12/20</a:t>
+              <a:t>2017/12/21</a:t>
             </a:fld>
             <a:endParaRPr lang="zh-TW" altLang="en-US"/>
           </a:p>
@@ -4147,7 +4147,7 @@
           <a:p>
             <a:fld id="{C6990B7C-105C-42AD-BA19-566921AC31BD}" type="datetime1">
               <a:rPr lang="zh-TW" altLang="en-US" smtClean="0"/>
-              <a:t>2017/12/20</a:t>
+              <a:t>2017/12/21</a:t>
             </a:fld>
             <a:endParaRPr lang="zh-TW" altLang="en-US"/>
           </a:p>
@@ -4493,7 +4493,7 @@
           <a:p>
             <a:fld id="{B625F561-7C9C-4AEC-BFE7-3048C9D5BDFE}" type="datetime1">
               <a:rPr lang="zh-TW" altLang="en-US" smtClean="0"/>
-              <a:t>2017/12/20</a:t>
+              <a:t>2017/12/21</a:t>
             </a:fld>
             <a:endParaRPr lang="zh-TW" altLang="en-US"/>
           </a:p>
@@ -4886,7 +4886,7 @@
           <a:p>
             <a:fld id="{88629391-B82E-422F-9FAF-B3505E5FF86F}" type="datetime1">
               <a:rPr lang="zh-TW" altLang="en-US" smtClean="0"/>
-              <a:t>2017/12/20</a:t>
+              <a:t>2017/12/21</a:t>
             </a:fld>
             <a:endParaRPr lang="zh-TW" altLang="en-US"/>
           </a:p>
@@ -5164,7 +5164,7 @@
           <a:p>
             <a:fld id="{D97037BB-E1F0-4A3F-86E5-F51BAFB86BDA}" type="datetime1">
               <a:rPr lang="zh-TW" altLang="en-US" smtClean="0"/>
-              <a:t>2017/12/20</a:t>
+              <a:t>2017/12/21</a:t>
             </a:fld>
             <a:endParaRPr lang="zh-TW" altLang="en-US"/>
           </a:p>
@@ -10793,8 +10793,8 @@
           </a:p>
         </p:txBody>
       </p:sp>
-      <mc:AlternateContent xmlns:mc="http://schemas.openxmlformats.org/markup-compatibility/2006">
-        <mc:Choice xmlns:a14="http://schemas.microsoft.com/office/drawing/2010/main" Requires="a14">
+      <mc:AlternateContent xmlns:mc="http://schemas.openxmlformats.org/markup-compatibility/2006" xmlns:a14="http://schemas.microsoft.com/office/drawing/2010/main">
+        <mc:Choice Requires="a14">
           <p:sp>
             <p:nvSpPr>
               <p:cNvPr id="3" name="內容版面配置區 2"/>
@@ -11493,15 +11493,11 @@
                   </a:rPr>
                   <a:t>)</a:t>
                 </a:r>
-                <a:endParaRPr lang="en-US" sz="2000" dirty="0" smtClean="0">
-                  <a:latin typeface="Times New Roman" panose="02020603050405020304" pitchFamily="18" charset="0"/>
-                  <a:cs typeface="Times New Roman" panose="02020603050405020304" pitchFamily="18" charset="0"/>
-                </a:endParaRPr>
               </a:p>
             </p:txBody>
           </p:sp>
         </mc:Choice>
-        <mc:Fallback>
+        <mc:Fallback xmlns="">
           <p:sp>
             <p:nvSpPr>
               <p:cNvPr id="3" name="內容版面配置區 2"/>
@@ -11870,7 +11866,7 @@
           <a:graphicData uri="http://schemas.openxmlformats.org/presentationml/2006/ole">
             <mc:AlternateContent xmlns:mc="http://schemas.openxmlformats.org/markup-compatibility/2006">
               <mc:Choice xmlns:v="urn:schemas-microsoft-com:vml" Requires="v">
-                <p:oleObj spid="_x0000_s10729" name="Graph" r:id="rId5" imgW="4754880" imgH="3108960" progId="Origin50.Graph">
+                <p:oleObj spid="_x0000_s10747" name="Graph" r:id="rId5" imgW="4754880" imgH="3108960" progId="Origin50.Graph">
                   <p:embed/>
                 </p:oleObj>
               </mc:Choice>
@@ -12166,8 +12162,8 @@
           </a:prstGeom>
         </p:spPr>
       </p:pic>
-      <mc:AlternateContent xmlns:mc="http://schemas.openxmlformats.org/markup-compatibility/2006">
-        <mc:Choice xmlns:a14="http://schemas.microsoft.com/office/drawing/2010/main" Requires="a14">
+      <mc:AlternateContent xmlns:mc="http://schemas.openxmlformats.org/markup-compatibility/2006" xmlns:a14="http://schemas.microsoft.com/office/drawing/2010/main">
+        <mc:Choice Requires="a14">
           <p:sp>
             <p:nvSpPr>
               <p:cNvPr id="11" name="內容版面配置區 2"/>
@@ -12803,7 +12799,7 @@
             </p:txBody>
           </p:sp>
         </mc:Choice>
-        <mc:Fallback>
+        <mc:Fallback xmlns="">
           <p:sp>
             <p:nvSpPr>
               <p:cNvPr id="11" name="內容版面配置區 2"/>
@@ -16769,7 +16765,7 @@
           <a:graphicData uri="http://schemas.openxmlformats.org/presentationml/2006/ole">
             <mc:AlternateContent xmlns:mc="http://schemas.openxmlformats.org/markup-compatibility/2006">
               <mc:Choice xmlns:v="urn:schemas-microsoft-com:vml" Requires="v">
-                <p:oleObj spid="_x0000_s1996" name="Graph" r:id="rId3" imgW="4754880" imgH="3108960" progId="Origin50.Graph">
+                <p:oleObj spid="_x0000_s2014" name="Graph" r:id="rId3" imgW="4754880" imgH="3108960" progId="Origin50.Graph">
                   <p:embed/>
                 </p:oleObj>
               </mc:Choice>
@@ -16841,6 +16837,36 @@
           <a:chExt cx="0" cy="0"/>
         </a:xfrm>
       </p:grpSpPr>
+      <p:pic>
+        <p:nvPicPr>
+          <p:cNvPr id="7" name="圖片 6"/>
+          <p:cNvPicPr>
+            <a:picLocks noChangeAspect="1"/>
+          </p:cNvPicPr>
+          <p:nvPr/>
+        </p:nvPicPr>
+        <p:blipFill>
+          <a:blip r:embed="rId2" cstate="print">
+            <a:extLst>
+              <a:ext uri="{28A0092B-C50C-407E-A947-70E740481C1C}">
+                <a14:useLocalDpi xmlns:a14="http://schemas.microsoft.com/office/drawing/2010/main" val="0"/>
+              </a:ext>
+            </a:extLst>
+          </a:blip>
+          <a:stretch>
+            <a:fillRect/>
+          </a:stretch>
+        </p:blipFill>
+        <p:spPr>
+          <a:xfrm>
+            <a:off x="4824000" y="2371067"/>
+            <a:ext cx="4561104" cy="2982261"/>
+          </a:xfrm>
+          <a:prstGeom prst="rect">
+            <a:avLst/>
+          </a:prstGeom>
+        </p:spPr>
+      </p:pic>
       <p:sp>
         <p:nvSpPr>
           <p:cNvPr id="2" name="標題 1"/>
@@ -16944,34 +16970,15 @@
                 <a:latin typeface="Times New Roman" panose="02020603050405020304" pitchFamily="18" charset="0"/>
                 <a:cs typeface="Times New Roman" panose="02020603050405020304" pitchFamily="18" charset="0"/>
               </a:rPr>
-              <a:t>(first order decay)</a:t>
-            </a:r>
-            <a:endParaRPr lang="en-HK" dirty="0" smtClean="0">
-              <a:latin typeface="Times New Roman" panose="02020603050405020304" pitchFamily="18" charset="0"/>
-              <a:cs typeface="Times New Roman" panose="02020603050405020304" pitchFamily="18" charset="0"/>
-            </a:endParaRPr>
-          </a:p>
-          <a:p>
-            <a:pPr marL="0" indent="0">
-              <a:buNone/>
-            </a:pPr>
-            <a:r>
-              <a:rPr lang="en-HK" dirty="0" smtClean="0"/>
-              <a:t>CH</a:t>
-            </a:r>
-            <a:r>
-              <a:rPr lang="en-HK" baseline="-25000" dirty="0" smtClean="0"/>
-              <a:t>4</a:t>
-            </a:r>
-            <a:r>
-              <a:rPr lang="en-HK" dirty="0" smtClean="0"/>
-              <a:t>						NH</a:t>
-            </a:r>
-            <a:r>
-              <a:rPr lang="en-HK" baseline="-25000" dirty="0" smtClean="0"/>
-              <a:t>3</a:t>
-            </a:r>
-            <a:endParaRPr lang="en-US" baseline="-25000" dirty="0"/>
+              <a:t>(first order decay</a:t>
+            </a:r>
+            <a:r>
+              <a:rPr lang="en-HK" sz="2000" dirty="0" smtClean="0">
+                <a:latin typeface="Times New Roman" panose="02020603050405020304" pitchFamily="18" charset="0"/>
+                <a:cs typeface="Times New Roman" panose="02020603050405020304" pitchFamily="18" charset="0"/>
+              </a:rPr>
+              <a:t>)</a:t>
+            </a:r>
           </a:p>
         </p:txBody>
       </p:sp>
@@ -17000,246 +17007,21 @@
       </p:sp>
       <p:graphicFrame>
         <p:nvGraphicFramePr>
-          <p:cNvPr id="10" name="物件 9"/>
+          <p:cNvPr id="5" name="表格 4"/>
           <p:cNvGraphicFramePr>
-            <a:graphicFrameLocks noChangeAspect="1"/>
+            <a:graphicFrameLocks noGrp="1"/>
           </p:cNvGraphicFramePr>
           <p:nvPr>
             <p:extLst>
               <p:ext uri="{D42A27DB-BD31-4B8C-83A1-F6EECF244321}">
-                <p14:modId xmlns:p14="http://schemas.microsoft.com/office/powerpoint/2010/main" val="2486833983"/>
+                <p14:modId xmlns:p14="http://schemas.microsoft.com/office/powerpoint/2010/main" val="3133024490"/>
               </p:ext>
             </p:extLst>
           </p:nvPr>
         </p:nvGraphicFramePr>
         <p:xfrm>
-          <a:off x="4727270" y="2348410"/>
-          <a:ext cx="4754563" cy="3108325"/>
-        </p:xfrm>
-        <a:graphic>
-          <a:graphicData uri="http://schemas.openxmlformats.org/presentationml/2006/ole">
-            <mc:AlternateContent xmlns:mc="http://schemas.openxmlformats.org/markup-compatibility/2006">
-              <mc:Choice xmlns:v="urn:schemas-microsoft-com:vml" Requires="v">
-                <p:oleObj spid="_x0000_s13776" name="Graph" r:id="rId3" imgW="4754880" imgH="3108960" progId="Origin50.Graph">
-                  <p:embed/>
-                </p:oleObj>
-              </mc:Choice>
-              <mc:Fallback>
-                <p:oleObj name="Graph" r:id="rId3" imgW="4754880" imgH="3108960" progId="Origin50.Graph">
-                  <p:embed/>
-                  <p:pic>
-                    <p:nvPicPr>
-                      <p:cNvPr id="0" name=""/>
-                      <p:cNvPicPr/>
-                      <p:nvPr/>
-                    </p:nvPicPr>
-                    <p:blipFill>
-                      <a:blip r:embed="rId4"/>
-                      <a:stretch>
-                        <a:fillRect/>
-                      </a:stretch>
-                    </p:blipFill>
-                    <p:spPr>
-                      <a:xfrm>
-                        <a:off x="4727270" y="2348410"/>
-                        <a:ext cx="4754563" cy="3108325"/>
-                      </a:xfrm>
-                      <a:prstGeom prst="rect">
-                        <a:avLst/>
-                      </a:prstGeom>
-                    </p:spPr>
-                  </p:pic>
-                </p:oleObj>
-              </mc:Fallback>
-            </mc:AlternateContent>
-          </a:graphicData>
-        </a:graphic>
-      </p:graphicFrame>
-      <p:graphicFrame>
-        <p:nvGraphicFramePr>
-          <p:cNvPr id="11" name="物件 10"/>
-          <p:cNvGraphicFramePr>
-            <a:graphicFrameLocks noChangeAspect="1"/>
-          </p:cNvGraphicFramePr>
-          <p:nvPr>
-            <p:extLst>
-              <p:ext uri="{D42A27DB-BD31-4B8C-83A1-F6EECF244321}">
-                <p14:modId xmlns:p14="http://schemas.microsoft.com/office/powerpoint/2010/main" val="69187059"/>
-              </p:ext>
-            </p:extLst>
-          </p:nvPr>
-        </p:nvGraphicFramePr>
-        <p:xfrm>
-          <a:off x="539552" y="2443660"/>
-          <a:ext cx="4754563" cy="3108325"/>
-        </p:xfrm>
-        <a:graphic>
-          <a:graphicData uri="http://schemas.openxmlformats.org/presentationml/2006/ole">
-            <mc:AlternateContent xmlns:mc="http://schemas.openxmlformats.org/markup-compatibility/2006">
-              <mc:Choice xmlns:v="urn:schemas-microsoft-com:vml" Requires="v">
-                <p:oleObj spid="_x0000_s13777" name="Graph" r:id="rId5" imgW="4754880" imgH="3108960" progId="Origin50.Graph">
-                  <p:embed/>
-                </p:oleObj>
-              </mc:Choice>
-              <mc:Fallback>
-                <p:oleObj name="Graph" r:id="rId5" imgW="4754880" imgH="3108960" progId="Origin50.Graph">
-                  <p:embed/>
-                  <p:pic>
-                    <p:nvPicPr>
-                      <p:cNvPr id="0" name=""/>
-                      <p:cNvPicPr/>
-                      <p:nvPr/>
-                    </p:nvPicPr>
-                    <p:blipFill>
-                      <a:blip r:embed="rId6"/>
-                      <a:stretch>
-                        <a:fillRect/>
-                      </a:stretch>
-                    </p:blipFill>
-                    <p:spPr>
-                      <a:xfrm>
-                        <a:off x="539552" y="2443660"/>
-                        <a:ext cx="4754563" cy="3108325"/>
-                      </a:xfrm>
-                      <a:prstGeom prst="rect">
-                        <a:avLst/>
-                      </a:prstGeom>
-                    </p:spPr>
-                  </p:pic>
-                </p:oleObj>
-              </mc:Fallback>
-            </mc:AlternateContent>
-          </a:graphicData>
-        </a:graphic>
-      </p:graphicFrame>
-    </p:spTree>
-    <p:extLst>
-      <p:ext uri="{BB962C8B-B14F-4D97-AF65-F5344CB8AC3E}">
-        <p14:creationId xmlns:p14="http://schemas.microsoft.com/office/powerpoint/2010/main" val="3500628853"/>
-      </p:ext>
-    </p:extLst>
-  </p:cSld>
-  <p:clrMapOvr>
-    <a:masterClrMapping/>
-  </p:clrMapOvr>
-  <p:timing>
-    <p:tnLst>
-      <p:par>
-        <p:cTn id="1" dur="indefinite" restart="never" nodeType="tmRoot"/>
-      </p:par>
-    </p:tnLst>
-  </p:timing>
-</p:sld>
-</file>
-
-<file path=ppt/slides/slide25.xml><?xml version="1.0" encoding="utf-8"?>
-<p:sld xmlns:a="http://schemas.openxmlformats.org/drawingml/2006/main" xmlns:r="http://schemas.openxmlformats.org/officeDocument/2006/relationships" xmlns:p="http://schemas.openxmlformats.org/presentationml/2006/main">
-  <p:cSld>
-    <p:spTree>
-      <p:nvGrpSpPr>
-        <p:cNvPr id="1" name=""/>
-        <p:cNvGrpSpPr/>
-        <p:nvPr/>
-      </p:nvGrpSpPr>
-      <p:grpSpPr>
-        <a:xfrm>
-          <a:off x="0" y="0"/>
-          <a:ext cx="0" cy="0"/>
-          <a:chOff x="0" y="0"/>
-          <a:chExt cx="0" cy="0"/>
-        </a:xfrm>
-      </p:grpSpPr>
-      <p:sp>
-        <p:nvSpPr>
-          <p:cNvPr id="2" name="標題 1"/>
-          <p:cNvSpPr>
-            <a:spLocks noGrp="1"/>
-          </p:cNvSpPr>
-          <p:nvPr>
-            <p:ph type="title"/>
-          </p:nvPr>
-        </p:nvSpPr>
-        <p:spPr/>
-        <p:txBody>
-          <a:bodyPr/>
-          <a:lstStyle/>
-          <a:p>
-            <a:r>
-              <a:rPr lang="en-HK" dirty="0" smtClean="0">
-                <a:latin typeface="Times New Roman" panose="02020603050405020304" pitchFamily="18" charset="0"/>
-                <a:cs typeface="Times New Roman" panose="02020603050405020304" pitchFamily="18" charset="0"/>
-              </a:rPr>
-              <a:t>3. CN</a:t>
-            </a:r>
-            <a:r>
-              <a:rPr lang="en-HK" baseline="30000" dirty="0" smtClean="0">
-                <a:latin typeface="Times New Roman" panose="02020603050405020304" pitchFamily="18" charset="0"/>
-                <a:cs typeface="Times New Roman" panose="02020603050405020304" pitchFamily="18" charset="0"/>
-              </a:rPr>
-              <a:t>-</a:t>
-            </a:r>
-            <a:r>
-              <a:rPr lang="en-HK" dirty="0" smtClean="0">
-                <a:latin typeface="Times New Roman" panose="02020603050405020304" pitchFamily="18" charset="0"/>
-                <a:cs typeface="Times New Roman" panose="02020603050405020304" pitchFamily="18" charset="0"/>
-              </a:rPr>
-              <a:t> </a:t>
-            </a:r>
-            <a:r>
-              <a:rPr lang="en-HK" dirty="0">
-                <a:latin typeface="Times New Roman" panose="02020603050405020304" pitchFamily="18" charset="0"/>
-                <a:cs typeface="Times New Roman" panose="02020603050405020304" pitchFamily="18" charset="0"/>
-              </a:rPr>
-              <a:t>formation efficiency of EUV (40.1 eV) and VUV (9.27 eV)</a:t>
-            </a:r>
-            <a:endParaRPr lang="en-US" dirty="0">
-              <a:latin typeface="Times New Roman" panose="02020603050405020304" pitchFamily="18" charset="0"/>
-              <a:cs typeface="Times New Roman" panose="02020603050405020304" pitchFamily="18" charset="0"/>
-            </a:endParaRPr>
-          </a:p>
-        </p:txBody>
-      </p:sp>
-      <p:sp>
-        <p:nvSpPr>
-          <p:cNvPr id="4" name="投影片編號版面配置區 3"/>
-          <p:cNvSpPr>
-            <a:spLocks noGrp="1"/>
-          </p:cNvSpPr>
-          <p:nvPr>
-            <p:ph type="sldNum" sz="quarter" idx="12"/>
-          </p:nvPr>
-        </p:nvSpPr>
-        <p:spPr/>
-        <p:txBody>
-          <a:bodyPr/>
-          <a:lstStyle/>
-          <a:p>
-            <a:fld id="{B646D8CA-B2C0-41A8-8514-369D0B0735D6}" type="slidenum">
-              <a:rPr lang="zh-TW" altLang="en-US" sz="2000" smtClean="0"/>
-              <a:t>25</a:t>
-            </a:fld>
-            <a:endParaRPr lang="zh-TW" altLang="en-US" sz="2000" dirty="0"/>
-          </a:p>
-        </p:txBody>
-      </p:sp>
-      <p:graphicFrame>
-        <p:nvGraphicFramePr>
-          <p:cNvPr id="10" name="內容版面配置區 9"/>
-          <p:cNvGraphicFramePr>
-            <a:graphicFrameLocks noGrp="1"/>
-          </p:cNvGraphicFramePr>
-          <p:nvPr>
-            <p:ph idx="1"/>
-            <p:extLst>
-              <p:ext uri="{D42A27DB-BD31-4B8C-83A1-F6EECF244321}">
-                <p14:modId xmlns:p14="http://schemas.microsoft.com/office/powerpoint/2010/main" val="70236835"/>
-              </p:ext>
-            </p:extLst>
-          </p:nvPr>
-        </p:nvGraphicFramePr>
-        <p:xfrm>
-          <a:off x="569727" y="1628893"/>
-          <a:ext cx="3969871" cy="3823151"/>
+          <a:off x="683568" y="2650270"/>
+          <a:ext cx="4320481" cy="2717911"/>
         </p:xfrm>
         <a:graphic>
           <a:graphicData uri="http://schemas.openxmlformats.org/drawingml/2006/table">
@@ -17248,28 +17030,256 @@
                 <a:tableStyleId>{5C22544A-7EE6-4342-B048-85BDC9FD1C3A}</a:tableStyleId>
               </a:tblPr>
               <a:tblGrid>
-                <a:gridCol w="1409985">
+                <a:gridCol w="1008112">
                   <a:extLst>
                     <a:ext uri="{9D8B030D-6E8A-4147-A177-3AD203B41FA5}">
-                      <a16:colId xmlns:a16="http://schemas.microsoft.com/office/drawing/2014/main" val="1809679188"/>
+                      <a16:colId xmlns:a16="http://schemas.microsoft.com/office/drawing/2014/main" val="2835078529"/>
                     </a:ext>
                   </a:extLst>
                 </a:gridCol>
-                <a:gridCol w="1224136">
+                <a:gridCol w="792088">
                   <a:extLst>
                     <a:ext uri="{9D8B030D-6E8A-4147-A177-3AD203B41FA5}">
-                      <a16:colId xmlns:a16="http://schemas.microsoft.com/office/drawing/2014/main" val="1032193202"/>
+                      <a16:colId xmlns:a16="http://schemas.microsoft.com/office/drawing/2014/main" val="2828882670"/>
                     </a:ext>
                   </a:extLst>
                 </a:gridCol>
-                <a:gridCol w="1335750">
+                <a:gridCol w="776715">
                   <a:extLst>
                     <a:ext uri="{9D8B030D-6E8A-4147-A177-3AD203B41FA5}">
-                      <a16:colId xmlns:a16="http://schemas.microsoft.com/office/drawing/2014/main" val="2853513134"/>
+                      <a16:colId xmlns:a16="http://schemas.microsoft.com/office/drawing/2014/main" val="1210125572"/>
+                    </a:ext>
+                  </a:extLst>
+                </a:gridCol>
+                <a:gridCol w="867060">
+                  <a:extLst>
+                    <a:ext uri="{9D8B030D-6E8A-4147-A177-3AD203B41FA5}">
+                      <a16:colId xmlns:a16="http://schemas.microsoft.com/office/drawing/2014/main" val="1324622419"/>
+                    </a:ext>
+                  </a:extLst>
+                </a:gridCol>
+                <a:gridCol w="876506">
+                  <a:extLst>
+                    <a:ext uri="{9D8B030D-6E8A-4147-A177-3AD203B41FA5}">
+                      <a16:colId xmlns:a16="http://schemas.microsoft.com/office/drawing/2014/main" val="2108499636"/>
                     </a:ext>
                   </a:extLst>
                 </a:gridCol>
               </a:tblGrid>
+              <a:tr h="495262">
+                <a:tc>
+                  <a:txBody>
+                    <a:bodyPr/>
+                    <a:lstStyle/>
+                    <a:p>
+                      <a:pPr marL="0" marR="0" indent="0" algn="ctr" defTabSz="685800" rtl="0" eaLnBrk="1" fontAlgn="ctr" latinLnBrk="0" hangingPunct="1">
+                        <a:lnSpc>
+                          <a:spcPct val="100000"/>
+                        </a:lnSpc>
+                        <a:spcBef>
+                          <a:spcPts val="0"/>
+                        </a:spcBef>
+                        <a:spcAft>
+                          <a:spcPts val="0"/>
+                        </a:spcAft>
+                        <a:buClrTx/>
+                        <a:buSzTx/>
+                        <a:buFontTx/>
+                        <a:buNone/>
+                        <a:tabLst/>
+                        <a:defRPr/>
+                      </a:pPr>
+                      <a:r>
+                        <a:rPr lang="en-HK" sz="1400" b="0" i="0" u="none" strike="noStrike" dirty="0" smtClean="0">
+                          <a:solidFill>
+                            <a:srgbClr val="000000"/>
+                          </a:solidFill>
+                          <a:effectLst/>
+                          <a:latin typeface="Times New Roman" panose="02020603050405020304" pitchFamily="18" charset="0"/>
+                          <a:cs typeface="Times New Roman" panose="02020603050405020304" pitchFamily="18" charset="0"/>
+                        </a:rPr>
+                        <a:t>Ratio of CH</a:t>
+                      </a:r>
+                      <a:r>
+                        <a:rPr lang="en-HK" sz="1400" b="0" i="0" u="none" strike="noStrike" baseline="-25000" dirty="0" smtClean="0">
+                          <a:solidFill>
+                            <a:srgbClr val="000000"/>
+                          </a:solidFill>
+                          <a:effectLst/>
+                          <a:latin typeface="Times New Roman" panose="02020603050405020304" pitchFamily="18" charset="0"/>
+                          <a:cs typeface="Times New Roman" panose="02020603050405020304" pitchFamily="18" charset="0"/>
+                        </a:rPr>
+                        <a:t>4</a:t>
+                      </a:r>
+                      <a:r>
+                        <a:rPr lang="en-HK" sz="1400" b="0" i="0" u="none" strike="noStrike" dirty="0" smtClean="0">
+                          <a:solidFill>
+                            <a:srgbClr val="000000"/>
+                          </a:solidFill>
+                          <a:effectLst/>
+                          <a:latin typeface="Times New Roman" panose="02020603050405020304" pitchFamily="18" charset="0"/>
+                          <a:cs typeface="Times New Roman" panose="02020603050405020304" pitchFamily="18" charset="0"/>
+                        </a:rPr>
+                        <a:t>+NH</a:t>
+                      </a:r>
+                      <a:r>
+                        <a:rPr lang="en-HK" sz="1400" b="0" i="0" u="none" strike="noStrike" baseline="-25000" dirty="0" smtClean="0">
+                          <a:solidFill>
+                            <a:srgbClr val="000000"/>
+                          </a:solidFill>
+                          <a:effectLst/>
+                          <a:latin typeface="Times New Roman" panose="02020603050405020304" pitchFamily="18" charset="0"/>
+                          <a:cs typeface="Times New Roman" panose="02020603050405020304" pitchFamily="18" charset="0"/>
+                        </a:rPr>
+                        <a:t>3</a:t>
+                      </a:r>
+                      <a:endParaRPr lang="en-US" sz="1400" b="0" i="0" u="none" strike="noStrike" baseline="-25000" dirty="0" smtClean="0">
+                        <a:solidFill>
+                          <a:srgbClr val="000000"/>
+                        </a:solidFill>
+                        <a:effectLst/>
+                        <a:latin typeface="Times New Roman" panose="02020603050405020304" pitchFamily="18" charset="0"/>
+                        <a:cs typeface="Times New Roman" panose="02020603050405020304" pitchFamily="18" charset="0"/>
+                      </a:endParaRPr>
+                    </a:p>
+                  </a:txBody>
+                  <a:tcPr marL="6830" marR="6830" marT="6830" marB="0" anchor="ctr">
+                    <a:solidFill>
+                      <a:schemeClr val="accent3">
+                        <a:lumMod val="40000"/>
+                        <a:lumOff val="60000"/>
+                      </a:schemeClr>
+                    </a:solidFill>
+                  </a:tcPr>
+                </a:tc>
+                <a:tc gridSpan="2">
+                  <a:txBody>
+                    <a:bodyPr/>
+                    <a:lstStyle/>
+                    <a:p>
+                      <a:pPr algn="ctr" rtl="0" fontAlgn="ctr"/>
+                      <a:r>
+                        <a:rPr lang="en-HK" sz="1400" b="0" i="0" u="none" strike="noStrike" dirty="0" smtClean="0">
+                          <a:solidFill>
+                            <a:srgbClr val="000000"/>
+                          </a:solidFill>
+                          <a:effectLst/>
+                          <a:latin typeface="Times New Roman" panose="02020603050405020304" pitchFamily="18" charset="0"/>
+                          <a:cs typeface="Times New Roman" panose="02020603050405020304" pitchFamily="18" charset="0"/>
+                        </a:rPr>
+                        <a:t>3:2</a:t>
+                      </a:r>
+                      <a:endParaRPr lang="en-US" sz="1400" b="0" i="0" u="none" strike="noStrike" dirty="0">
+                        <a:solidFill>
+                          <a:srgbClr val="000000"/>
+                        </a:solidFill>
+                        <a:effectLst/>
+                        <a:latin typeface="Times New Roman" panose="02020603050405020304" pitchFamily="18" charset="0"/>
+                        <a:cs typeface="Times New Roman" panose="02020603050405020304" pitchFamily="18" charset="0"/>
+                      </a:endParaRPr>
+                    </a:p>
+                  </a:txBody>
+                  <a:tcPr marL="6830" marR="6830" marT="6830" marB="0" anchor="ctr">
+                    <a:solidFill>
+                      <a:schemeClr val="accent3">
+                        <a:lumMod val="40000"/>
+                        <a:lumOff val="60000"/>
+                      </a:schemeClr>
+                    </a:solidFill>
+                  </a:tcPr>
+                </a:tc>
+                <a:tc hMerge="1">
+                  <a:txBody>
+                    <a:bodyPr/>
+                    <a:lstStyle/>
+                    <a:p>
+                      <a:pPr algn="ctr" rtl="0" fontAlgn="ctr"/>
+                      <a:endParaRPr lang="en-US" sz="1400" b="0" i="0" u="none" strike="noStrike" dirty="0">
+                        <a:solidFill>
+                          <a:srgbClr val="000000"/>
+                        </a:solidFill>
+                        <a:effectLst/>
+                        <a:latin typeface="Times New Roman" panose="02020603050405020304" pitchFamily="18" charset="0"/>
+                        <a:cs typeface="Times New Roman" panose="02020603050405020304" pitchFamily="18" charset="0"/>
+                      </a:endParaRPr>
+                    </a:p>
+                  </a:txBody>
+                  <a:tcPr marL="6830" marR="6830" marT="6830" marB="0" anchor="ctr">
+                    <a:solidFill>
+                      <a:schemeClr val="accent3">
+                        <a:lumMod val="40000"/>
+                        <a:lumOff val="60000"/>
+                      </a:schemeClr>
+                    </a:solidFill>
+                  </a:tcPr>
+                </a:tc>
+                <a:tc gridSpan="2">
+                  <a:txBody>
+                    <a:bodyPr/>
+                    <a:lstStyle/>
+                    <a:p>
+                      <a:pPr algn="ctr" rtl="0" fontAlgn="ctr"/>
+                      <a:r>
+                        <a:rPr lang="en-HK" sz="1400" b="0" i="0" u="none" strike="noStrike" dirty="0" smtClean="0">
+                          <a:solidFill>
+                            <a:srgbClr val="000000"/>
+                          </a:solidFill>
+                          <a:effectLst/>
+                          <a:latin typeface="Times New Roman" panose="02020603050405020304" pitchFamily="18" charset="0"/>
+                          <a:cs typeface="Times New Roman" panose="02020603050405020304" pitchFamily="18" charset="0"/>
+                        </a:rPr>
+                        <a:t>1:5</a:t>
+                      </a:r>
+                      <a:endParaRPr lang="en-US" sz="1400" b="0" i="0" u="none" strike="noStrike" dirty="0">
+                        <a:solidFill>
+                          <a:srgbClr val="000000"/>
+                        </a:solidFill>
+                        <a:effectLst/>
+                        <a:latin typeface="Times New Roman" panose="02020603050405020304" pitchFamily="18" charset="0"/>
+                        <a:cs typeface="Times New Roman" panose="02020603050405020304" pitchFamily="18" charset="0"/>
+                      </a:endParaRPr>
+                    </a:p>
+                  </a:txBody>
+                  <a:tcPr marL="6830" marR="6830" marT="6830" marB="0" anchor="ctr">
+                    <a:solidFill>
+                      <a:schemeClr val="accent3">
+                        <a:lumMod val="40000"/>
+                        <a:lumOff val="60000"/>
+                      </a:schemeClr>
+                    </a:solidFill>
+                  </a:tcPr>
+                </a:tc>
+                <a:tc hMerge="1">
+                  <a:txBody>
+                    <a:bodyPr/>
+                    <a:lstStyle/>
+                    <a:p>
+                      <a:pPr algn="ctr" rtl="0" fontAlgn="ctr"/>
+                      <a:endParaRPr lang="en-US" sz="1400" b="0" i="0" u="none" strike="noStrike" dirty="0">
+                        <a:solidFill>
+                          <a:srgbClr val="000000"/>
+                        </a:solidFill>
+                        <a:effectLst/>
+                        <a:latin typeface="Times New Roman" panose="02020603050405020304" pitchFamily="18" charset="0"/>
+                        <a:cs typeface="Times New Roman" panose="02020603050405020304" pitchFamily="18" charset="0"/>
+                      </a:endParaRPr>
+                    </a:p>
+                  </a:txBody>
+                  <a:tcPr marL="6830" marR="6830" marT="6830" marB="0" anchor="ctr">
+                    <a:solidFill>
+                      <a:schemeClr val="accent3">
+                        <a:lumMod val="40000"/>
+                        <a:lumOff val="60000"/>
+                      </a:schemeClr>
+                    </a:solidFill>
+                  </a:tcPr>
+                </a:tc>
+                <a:extLst>
+                  <a:ext uri="{0D108BD9-81ED-4DB2-BD59-A6C34878D82A}">
+                    <a16:rowId xmlns:a16="http://schemas.microsoft.com/office/drawing/2014/main" val="2569293393"/>
+                  </a:ext>
+                </a:extLst>
+              </a:tr>
               <a:tr h="612404">
                 <a:tc>
                   <a:txBody>
@@ -17301,13 +17311,45 @@
                         </a:rPr>
                         <a:t>k </a:t>
                       </a:r>
+                      <a:endParaRPr lang="en-US" sz="1400" u="none" strike="noStrike" dirty="0" smtClean="0">
+                        <a:effectLst/>
+                        <a:latin typeface="Times New Roman" panose="02020603050405020304" pitchFamily="18" charset="0"/>
+                        <a:cs typeface="Times New Roman" panose="02020603050405020304" pitchFamily="18" charset="0"/>
+                      </a:endParaRPr>
+                    </a:p>
+                    <a:p>
+                      <a:pPr marL="0" marR="0" indent="0" algn="ctr" defTabSz="685800" rtl="0" eaLnBrk="1" fontAlgn="ctr" latinLnBrk="0" hangingPunct="1">
+                        <a:lnSpc>
+                          <a:spcPct val="100000"/>
+                        </a:lnSpc>
+                        <a:spcBef>
+                          <a:spcPts val="0"/>
+                        </a:spcBef>
+                        <a:spcAft>
+                          <a:spcPts val="0"/>
+                        </a:spcAft>
+                        <a:buClrTx/>
+                        <a:buSzTx/>
+                        <a:buFontTx/>
+                        <a:buNone/>
+                        <a:tabLst/>
+                        <a:defRPr/>
+                      </a:pPr>
                       <a:r>
                         <a:rPr lang="en-US" sz="1400" u="none" strike="noStrike" dirty="0" smtClean="0">
                           <a:effectLst/>
                           <a:latin typeface="Times New Roman" panose="02020603050405020304" pitchFamily="18" charset="0"/>
                           <a:cs typeface="Times New Roman" panose="02020603050405020304" pitchFamily="18" charset="0"/>
                         </a:rPr>
-                        <a:t>(photons</a:t>
+                        <a:t>(</a:t>
+                      </a:r>
+                      <a:r>
+                        <a:rPr lang="en-US" sz="1400" u="none" strike="noStrike" dirty="0" smtClean="0">
+                          <a:effectLst/>
+                          <a:latin typeface="Times New Roman" panose="02020603050405020304" pitchFamily="18" charset="0"/>
+                          <a:cs typeface="Times New Roman" panose="02020603050405020304" pitchFamily="18" charset="0"/>
+                        </a:rPr>
+                        <a:t>photons</a:t>
                       </a:r>
                       <a:r>
                         <a:rPr lang="en-US" sz="1400" u="none" strike="noStrike" baseline="30000" dirty="0" smtClean="0">
@@ -17367,7 +17409,7 @@
                     <a:p>
                       <a:pPr algn="ctr" rtl="0" fontAlgn="ctr"/>
                       <a:r>
-                        <a:rPr lang="en-US" sz="1400" u="none" strike="noStrike" dirty="0">
+                        <a:rPr lang="en-US" sz="1400" u="none" strike="noStrike" dirty="0" smtClean="0">
                           <a:effectLst/>
                           <a:latin typeface="Times New Roman" panose="02020603050405020304" pitchFamily="18" charset="0"/>
                           <a:cs typeface="Times New Roman" panose="02020603050405020304" pitchFamily="18" charset="0"/>
@@ -17375,12 +17417,23 @@
                         <a:t>CH</a:t>
                       </a:r>
                       <a:r>
-                        <a:rPr lang="en-US" sz="1400" u="none" strike="noStrike" baseline="-25000" dirty="0">
+                        <a:rPr lang="en-US" sz="1400" u="none" strike="noStrike" baseline="-25000" dirty="0" smtClean="0">
                           <a:effectLst/>
                           <a:latin typeface="Times New Roman" panose="02020603050405020304" pitchFamily="18" charset="0"/>
                           <a:cs typeface="Times New Roman" panose="02020603050405020304" pitchFamily="18" charset="0"/>
                         </a:rPr>
                         <a:t>4</a:t>
+                      </a:r>
+                    </a:p>
+                    <a:p>
+                      <a:pPr algn="ctr" rtl="0" fontAlgn="ctr"/>
+                      <a:r>
+                        <a:rPr lang="en-US" sz="1400" u="none" strike="noStrike" dirty="0" smtClean="0">
+                          <a:effectLst/>
+                          <a:latin typeface="Times New Roman" panose="02020603050405020304" pitchFamily="18" charset="0"/>
+                          <a:cs typeface="Times New Roman" panose="02020603050405020304" pitchFamily="18" charset="0"/>
+                        </a:rPr>
+                        <a:t>(</a:t>
                       </a:r>
                       <a:r>
                         <a:rPr lang="en-US" sz="1400" u="none" strike="noStrike" dirty="0">
@@ -17388,7 +17441,159 @@
                           <a:latin typeface="Times New Roman" panose="02020603050405020304" pitchFamily="18" charset="0"/>
                           <a:cs typeface="Times New Roman" panose="02020603050405020304" pitchFamily="18" charset="0"/>
                         </a:rPr>
-                        <a:t>(x 10</a:t>
+                        <a:t>x 10</a:t>
+                      </a:r>
+                      <a:r>
+                        <a:rPr lang="en-US" sz="1400" u="none" strike="noStrike" baseline="30000" dirty="0">
+                          <a:effectLst/>
+                          <a:latin typeface="Times New Roman" panose="02020603050405020304" pitchFamily="18" charset="0"/>
+                          <a:cs typeface="Times New Roman" panose="02020603050405020304" pitchFamily="18" charset="0"/>
+                        </a:rPr>
+                        <a:t>-18</a:t>
+                      </a:r>
+                      <a:r>
+                        <a:rPr lang="en-US" sz="1400" u="none" strike="noStrike" dirty="0">
+                          <a:effectLst/>
+                          <a:latin typeface="Times New Roman" panose="02020603050405020304" pitchFamily="18" charset="0"/>
+                          <a:cs typeface="Times New Roman" panose="02020603050405020304" pitchFamily="18" charset="0"/>
+                        </a:rPr>
+                        <a:t>)</a:t>
+                      </a:r>
+                      <a:endParaRPr lang="en-US" sz="1400" b="0" i="0" u="none" strike="noStrike" dirty="0">
+                        <a:solidFill>
+                          <a:srgbClr val="000000"/>
+                        </a:solidFill>
+                        <a:effectLst/>
+                        <a:latin typeface="Times New Roman" panose="02020603050405020304" pitchFamily="18" charset="0"/>
+                        <a:cs typeface="Times New Roman" panose="02020603050405020304" pitchFamily="18" charset="0"/>
+                      </a:endParaRPr>
+                    </a:p>
+                  </a:txBody>
+                  <a:tcPr marL="6830" marR="6830" marT="6830" marB="0" anchor="ctr">
+                    <a:solidFill>
+                      <a:schemeClr val="accent3">
+                        <a:lumMod val="40000"/>
+                        <a:lumOff val="60000"/>
+                      </a:schemeClr>
+                    </a:solidFill>
+                  </a:tcPr>
+                </a:tc>
+                <a:tc>
+                  <a:txBody>
+                    <a:bodyPr/>
+                    <a:lstStyle/>
+                    <a:p>
+                      <a:pPr algn="ctr" rtl="0" fontAlgn="ctr"/>
+                      <a:r>
+                        <a:rPr lang="en-US" sz="1400" u="none" strike="noStrike" dirty="0" smtClean="0">
+                          <a:effectLst/>
+                          <a:latin typeface="Times New Roman" panose="02020603050405020304" pitchFamily="18" charset="0"/>
+                          <a:cs typeface="Times New Roman" panose="02020603050405020304" pitchFamily="18" charset="0"/>
+                        </a:rPr>
+                        <a:t>NH</a:t>
+                      </a:r>
+                      <a:r>
+                        <a:rPr lang="en-US" sz="1400" u="none" strike="noStrike" baseline="-25000" dirty="0" smtClean="0">
+                          <a:effectLst/>
+                          <a:latin typeface="Times New Roman" panose="02020603050405020304" pitchFamily="18" charset="0"/>
+                          <a:cs typeface="Times New Roman" panose="02020603050405020304" pitchFamily="18" charset="0"/>
+                        </a:rPr>
+                        <a:t>3</a:t>
+                      </a:r>
+                    </a:p>
+                    <a:p>
+                      <a:pPr algn="ctr" rtl="0" fontAlgn="ctr"/>
+                      <a:r>
+                        <a:rPr lang="en-US" sz="1400" u="none" strike="noStrike" dirty="0" smtClean="0">
+                          <a:effectLst/>
+                          <a:latin typeface="Times New Roman" panose="02020603050405020304" pitchFamily="18" charset="0"/>
+                          <a:cs typeface="Times New Roman" panose="02020603050405020304" pitchFamily="18" charset="0"/>
+                        </a:rPr>
+                        <a:t> </a:t>
+                      </a:r>
+                      <a:r>
+                        <a:rPr lang="en-US" sz="1400" u="none" strike="noStrike" dirty="0">
+                          <a:effectLst/>
+                          <a:latin typeface="Times New Roman" panose="02020603050405020304" pitchFamily="18" charset="0"/>
+                          <a:cs typeface="Times New Roman" panose="02020603050405020304" pitchFamily="18" charset="0"/>
+                        </a:rPr>
+                        <a:t>(x10</a:t>
+                      </a:r>
+                      <a:r>
+                        <a:rPr lang="en-US" sz="1400" u="none" strike="noStrike" baseline="30000" dirty="0">
+                          <a:effectLst/>
+                          <a:latin typeface="Times New Roman" panose="02020603050405020304" pitchFamily="18" charset="0"/>
+                          <a:cs typeface="Times New Roman" panose="02020603050405020304" pitchFamily="18" charset="0"/>
+                        </a:rPr>
+                        <a:t>-18</a:t>
+                      </a:r>
+                      <a:r>
+                        <a:rPr lang="en-US" sz="1400" u="none" strike="noStrike" dirty="0">
+                          <a:effectLst/>
+                          <a:latin typeface="Times New Roman" panose="02020603050405020304" pitchFamily="18" charset="0"/>
+                          <a:cs typeface="Times New Roman" panose="02020603050405020304" pitchFamily="18" charset="0"/>
+                        </a:rPr>
+                        <a:t>)</a:t>
+                      </a:r>
+                      <a:endParaRPr lang="en-US" sz="1400" b="0" i="0" u="none" strike="noStrike" dirty="0">
+                        <a:solidFill>
+                          <a:srgbClr val="000000"/>
+                        </a:solidFill>
+                        <a:effectLst/>
+                        <a:latin typeface="Times New Roman" panose="02020603050405020304" pitchFamily="18" charset="0"/>
+                        <a:cs typeface="Times New Roman" panose="02020603050405020304" pitchFamily="18" charset="0"/>
+                      </a:endParaRPr>
+                    </a:p>
+                  </a:txBody>
+                  <a:tcPr marL="6830" marR="6830" marT="6830" marB="0" anchor="ctr">
+                    <a:solidFill>
+                      <a:schemeClr val="accent3">
+                        <a:lumMod val="40000"/>
+                        <a:lumOff val="60000"/>
+                      </a:schemeClr>
+                    </a:solidFill>
+                  </a:tcPr>
+                </a:tc>
+                <a:tc>
+                  <a:txBody>
+                    <a:bodyPr/>
+                    <a:lstStyle/>
+                    <a:p>
+                      <a:pPr algn="ctr" rtl="0" fontAlgn="ctr"/>
+                      <a:r>
+                        <a:rPr lang="en-US" sz="1400" u="none" strike="noStrike" dirty="0" smtClean="0">
+                          <a:effectLst/>
+                          <a:latin typeface="Times New Roman" panose="02020603050405020304" pitchFamily="18" charset="0"/>
+                          <a:cs typeface="Times New Roman" panose="02020603050405020304" pitchFamily="18" charset="0"/>
+                        </a:rPr>
+                        <a:t>CH</a:t>
+                      </a:r>
+                      <a:r>
+                        <a:rPr lang="en-US" sz="1400" u="none" strike="noStrike" baseline="-25000" dirty="0" smtClean="0">
+                          <a:effectLst/>
+                          <a:latin typeface="Times New Roman" panose="02020603050405020304" pitchFamily="18" charset="0"/>
+                          <a:cs typeface="Times New Roman" panose="02020603050405020304" pitchFamily="18" charset="0"/>
+                        </a:rPr>
+                        <a:t>4</a:t>
+                      </a:r>
+                    </a:p>
+                    <a:p>
+                      <a:pPr algn="ctr" rtl="0" fontAlgn="ctr"/>
+                      <a:r>
+                        <a:rPr lang="en-US" sz="1400" u="none" strike="noStrike" dirty="0" smtClean="0">
+                          <a:effectLst/>
+                          <a:latin typeface="Times New Roman" panose="02020603050405020304" pitchFamily="18" charset="0"/>
+                          <a:cs typeface="Times New Roman" panose="02020603050405020304" pitchFamily="18" charset="0"/>
+                        </a:rPr>
+                        <a:t>(</a:t>
+                      </a:r>
+                      <a:r>
+                        <a:rPr lang="en-US" sz="1400" u="none" strike="noStrike" dirty="0">
+                          <a:effectLst/>
+                          <a:latin typeface="Times New Roman" panose="02020603050405020304" pitchFamily="18" charset="0"/>
+                          <a:cs typeface="Times New Roman" panose="02020603050405020304" pitchFamily="18" charset="0"/>
+                        </a:rPr>
+                        <a:t>x 10</a:t>
                       </a:r>
                       <a:r>
                         <a:rPr lang="en-US" sz="1400" u="none" strike="noStrike" baseline="30000" dirty="0">
@@ -17453,7 +17658,31 @@
                           <a:latin typeface="Times New Roman" panose="02020603050405020304" pitchFamily="18" charset="0"/>
                           <a:cs typeface="Times New Roman" panose="02020603050405020304" pitchFamily="18" charset="0"/>
                         </a:rPr>
-                        <a:t> (x10</a:t>
+                        <a:t> </a:t>
+                      </a:r>
+                      <a:endParaRPr lang="en-US" sz="1400" u="none" strike="noStrike" dirty="0" smtClean="0">
+                        <a:effectLst/>
+                        <a:latin typeface="Times New Roman" panose="02020603050405020304" pitchFamily="18" charset="0"/>
+                        <a:cs typeface="Times New Roman" panose="02020603050405020304" pitchFamily="18" charset="0"/>
+                      </a:endParaRPr>
+                    </a:p>
+                    <a:p>
+                      <a:pPr algn="ctr" rtl="0" fontAlgn="ctr"/>
+                      <a:r>
+                        <a:rPr lang="en-US" sz="1400" u="none" strike="noStrike" dirty="0" smtClean="0">
+                          <a:effectLst/>
+                          <a:latin typeface="Times New Roman" panose="02020603050405020304" pitchFamily="18" charset="0"/>
+                          <a:cs typeface="Times New Roman" panose="02020603050405020304" pitchFamily="18" charset="0"/>
+                        </a:rPr>
+                        <a:t>(</a:t>
+                      </a:r>
+                      <a:r>
+                        <a:rPr lang="en-US" sz="1400" u="none" strike="noStrike" dirty="0">
+                          <a:effectLst/>
+                          <a:latin typeface="Times New Roman" panose="02020603050405020304" pitchFamily="18" charset="0"/>
+                          <a:cs typeface="Times New Roman" panose="02020603050405020304" pitchFamily="18" charset="0"/>
+                        </a:rPr>
+                        <a:t>x10</a:t>
                       </a:r>
                       <a:r>
                         <a:rPr lang="en-US" sz="1400" u="none" strike="noStrike" baseline="30000" dirty="0">
@@ -17492,7 +17721,7 @@
                 </a:tc>
                 <a:extLst>
                   <a:ext uri="{0D108BD9-81ED-4DB2-BD59-A6C34878D82A}">
-                    <a16:rowId xmlns:a16="http://schemas.microsoft.com/office/drawing/2014/main" val="1278195264"/>
+                    <a16:rowId xmlns:a16="http://schemas.microsoft.com/office/drawing/2014/main" val="876074147"/>
                   </a:ext>
                 </a:extLst>
               </a:tr>
@@ -17575,9 +17804,61 @@
                   </a:txBody>
                   <a:tcPr marL="6830" marR="6830" marT="6830" marB="0" anchor="ctr"/>
                 </a:tc>
+                <a:tc>
+                  <a:txBody>
+                    <a:bodyPr/>
+                    <a:lstStyle/>
+                    <a:p>
+                      <a:pPr algn="ctr" rtl="0" fontAlgn="ctr"/>
+                      <a:r>
+                        <a:rPr lang="en-US" sz="1400" u="none" strike="noStrike" dirty="0" smtClean="0">
+                          <a:effectLst/>
+                          <a:latin typeface="Times New Roman" panose="02020603050405020304" pitchFamily="18" charset="0"/>
+                          <a:cs typeface="Times New Roman" panose="02020603050405020304" pitchFamily="18" charset="0"/>
+                        </a:rPr>
+                        <a:t>2.70±0.07</a:t>
+                      </a:r>
+                      <a:endParaRPr lang="en-US" sz="1400" b="0" i="0" u="none" strike="noStrike" dirty="0">
+                        <a:solidFill>
+                          <a:srgbClr val="000000"/>
+                        </a:solidFill>
+                        <a:effectLst/>
+                        <a:latin typeface="Times New Roman" panose="02020603050405020304" pitchFamily="18" charset="0"/>
+                        <a:cs typeface="Times New Roman" panose="02020603050405020304" pitchFamily="18" charset="0"/>
+                      </a:endParaRPr>
+                    </a:p>
+                  </a:txBody>
+                  <a:tcPr marL="6830" marR="6830" marT="6830" marB="0" anchor="ctr"/>
+                </a:tc>
+                <a:tc>
+                  <a:txBody>
+                    <a:bodyPr/>
+                    <a:lstStyle/>
+                    <a:p>
+                      <a:pPr algn="ctr" rtl="0" fontAlgn="ctr"/>
+                      <a:r>
+                        <a:rPr lang="en-US" sz="1400" u="none" strike="noStrike" dirty="0" smtClean="0">
+                          <a:effectLst/>
+                          <a:latin typeface="Times New Roman" panose="02020603050405020304" pitchFamily="18" charset="0"/>
+                          <a:cs typeface="Times New Roman" panose="02020603050405020304" pitchFamily="18" charset="0"/>
+                        </a:rPr>
+                        <a:t>1.17±0.12</a:t>
+                      </a:r>
+                      <a:endParaRPr lang="en-US" sz="1400" b="0" i="0" u="none" strike="noStrike" dirty="0">
+                        <a:solidFill>
+                          <a:srgbClr val="000000"/>
+                        </a:solidFill>
+                        <a:effectLst/>
+                        <a:latin typeface="Times New Roman" panose="02020603050405020304" pitchFamily="18" charset="0"/>
+                        <a:cs typeface="Times New Roman" panose="02020603050405020304" pitchFamily="18" charset="0"/>
+                      </a:endParaRPr>
+                    </a:p>
+                  </a:txBody>
+                  <a:tcPr marL="6830" marR="6830" marT="6830" marB="0" anchor="ctr"/>
+                </a:tc>
                 <a:extLst>
                   <a:ext uri="{0D108BD9-81ED-4DB2-BD59-A6C34878D82A}">
-                    <a16:rowId xmlns:a16="http://schemas.microsoft.com/office/drawing/2014/main" val="2829530235"/>
+                    <a16:rowId xmlns:a16="http://schemas.microsoft.com/office/drawing/2014/main" val="1706566355"/>
                   </a:ext>
                 </a:extLst>
               </a:tr>
@@ -17660,9 +17941,61 @@
                   </a:txBody>
                   <a:tcPr marL="6830" marR="6830" marT="6830" marB="0" anchor="ctr"/>
                 </a:tc>
+                <a:tc>
+                  <a:txBody>
+                    <a:bodyPr/>
+                    <a:lstStyle/>
+                    <a:p>
+                      <a:pPr algn="ctr" rtl="0" fontAlgn="ctr"/>
+                      <a:r>
+                        <a:rPr lang="en-US" sz="1400" u="none" strike="noStrike" dirty="0" smtClean="0">
+                          <a:effectLst/>
+                          <a:latin typeface="Times New Roman" panose="02020603050405020304" pitchFamily="18" charset="0"/>
+                          <a:cs typeface="Times New Roman" panose="02020603050405020304" pitchFamily="18" charset="0"/>
+                        </a:rPr>
+                        <a:t>0.49±0.02</a:t>
+                      </a:r>
+                      <a:endParaRPr lang="en-US" sz="1400" b="0" i="0" u="none" strike="noStrike" dirty="0">
+                        <a:solidFill>
+                          <a:srgbClr val="000000"/>
+                        </a:solidFill>
+                        <a:effectLst/>
+                        <a:latin typeface="Times New Roman" panose="02020603050405020304" pitchFamily="18" charset="0"/>
+                        <a:cs typeface="Times New Roman" panose="02020603050405020304" pitchFamily="18" charset="0"/>
+                      </a:endParaRPr>
+                    </a:p>
+                  </a:txBody>
+                  <a:tcPr marL="6830" marR="6830" marT="6830" marB="0" anchor="ctr"/>
+                </a:tc>
+                <a:tc>
+                  <a:txBody>
+                    <a:bodyPr/>
+                    <a:lstStyle/>
+                    <a:p>
+                      <a:pPr algn="ctr" rtl="0" fontAlgn="ctr"/>
+                      <a:r>
+                        <a:rPr lang="en-US" sz="1400" u="none" strike="noStrike" dirty="0" smtClean="0">
+                          <a:effectLst/>
+                          <a:latin typeface="Times New Roman" panose="02020603050405020304" pitchFamily="18" charset="0"/>
+                          <a:cs typeface="Times New Roman" panose="02020603050405020304" pitchFamily="18" charset="0"/>
+                        </a:rPr>
+                        <a:t>0.56±0.06</a:t>
+                      </a:r>
+                      <a:endParaRPr lang="en-US" sz="1400" b="0" i="0" u="none" strike="noStrike" dirty="0">
+                        <a:solidFill>
+                          <a:srgbClr val="000000"/>
+                        </a:solidFill>
+                        <a:effectLst/>
+                        <a:latin typeface="Times New Roman" panose="02020603050405020304" pitchFamily="18" charset="0"/>
+                        <a:cs typeface="Times New Roman" panose="02020603050405020304" pitchFamily="18" charset="0"/>
+                      </a:endParaRPr>
+                    </a:p>
+                  </a:txBody>
+                  <a:tcPr marL="6830" marR="6830" marT="6830" marB="0" anchor="ctr"/>
+                </a:tc>
                 <a:extLst>
                   <a:ext uri="{0D108BD9-81ED-4DB2-BD59-A6C34878D82A}">
-                    <a16:rowId xmlns:a16="http://schemas.microsoft.com/office/drawing/2014/main" val="4139367451"/>
+                    <a16:rowId xmlns:a16="http://schemas.microsoft.com/office/drawing/2014/main" val="446624062"/>
                   </a:ext>
                 </a:extLst>
               </a:tr>
@@ -17775,12 +18108,246 @@
                     </a:solidFill>
                   </a:tcPr>
                 </a:tc>
+                <a:tc>
+                  <a:txBody>
+                    <a:bodyPr/>
+                    <a:lstStyle/>
+                    <a:p>
+                      <a:pPr algn="ctr" rtl="0" fontAlgn="ctr"/>
+                      <a:r>
+                        <a:rPr lang="en-US" sz="1400" u="none" strike="noStrike" dirty="0" smtClean="0">
+                          <a:solidFill>
+                            <a:srgbClr val="FF0000"/>
+                          </a:solidFill>
+                          <a:effectLst/>
+                          <a:latin typeface="Times New Roman" panose="02020603050405020304" pitchFamily="18" charset="0"/>
+                          <a:cs typeface="Times New Roman" panose="02020603050405020304" pitchFamily="18" charset="0"/>
+                        </a:rPr>
+                        <a:t>5.52±0.07</a:t>
+                      </a:r>
+                      <a:endParaRPr lang="en-US" sz="1400" b="0" i="0" u="none" strike="noStrike" dirty="0">
+                        <a:solidFill>
+                          <a:srgbClr val="FF0000"/>
+                        </a:solidFill>
+                        <a:effectLst/>
+                        <a:latin typeface="Times New Roman" panose="02020603050405020304" pitchFamily="18" charset="0"/>
+                        <a:cs typeface="Times New Roman" panose="02020603050405020304" pitchFamily="18" charset="0"/>
+                      </a:endParaRPr>
+                    </a:p>
+                  </a:txBody>
+                  <a:tcPr marL="6830" marR="6830" marT="6830" marB="0" anchor="ctr">
+                    <a:solidFill>
+                      <a:schemeClr val="accent3">
+                        <a:lumMod val="40000"/>
+                        <a:lumOff val="60000"/>
+                      </a:schemeClr>
+                    </a:solidFill>
+                  </a:tcPr>
+                </a:tc>
+                <a:tc>
+                  <a:txBody>
+                    <a:bodyPr/>
+                    <a:lstStyle/>
+                    <a:p>
+                      <a:pPr algn="ctr" rtl="0" fontAlgn="ctr"/>
+                      <a:r>
+                        <a:rPr lang="en-US" sz="1400" u="none" strike="noStrike" dirty="0" smtClean="0">
+                          <a:solidFill>
+                            <a:srgbClr val="FF0000"/>
+                          </a:solidFill>
+                          <a:effectLst/>
+                          <a:latin typeface="Times New Roman" panose="02020603050405020304" pitchFamily="18" charset="0"/>
+                          <a:cs typeface="Times New Roman" panose="02020603050405020304" pitchFamily="18" charset="0"/>
+                        </a:rPr>
+                        <a:t>2.07±0.13</a:t>
+                      </a:r>
+                      <a:endParaRPr lang="en-US" sz="1400" b="0" i="0" u="none" strike="noStrike" dirty="0">
+                        <a:solidFill>
+                          <a:srgbClr val="FF0000"/>
+                        </a:solidFill>
+                        <a:effectLst/>
+                        <a:latin typeface="Times New Roman" panose="02020603050405020304" pitchFamily="18" charset="0"/>
+                        <a:cs typeface="Times New Roman" panose="02020603050405020304" pitchFamily="18" charset="0"/>
+                      </a:endParaRPr>
+                    </a:p>
+                  </a:txBody>
+                  <a:tcPr marL="6830" marR="6830" marT="6830" marB="0" anchor="ctr">
+                    <a:solidFill>
+                      <a:schemeClr val="accent3">
+                        <a:lumMod val="40000"/>
+                        <a:lumOff val="60000"/>
+                      </a:schemeClr>
+                    </a:solidFill>
+                  </a:tcPr>
+                </a:tc>
                 <a:extLst>
                   <a:ext uri="{0D108BD9-81ED-4DB2-BD59-A6C34878D82A}">
-                    <a16:rowId xmlns:a16="http://schemas.microsoft.com/office/drawing/2014/main" val="1951447026"/>
+                    <a16:rowId xmlns:a16="http://schemas.microsoft.com/office/drawing/2014/main" val="2566119498"/>
                   </a:ext>
                 </a:extLst>
               </a:tr>
+            </a:tbl>
+          </a:graphicData>
+        </a:graphic>
+      </p:graphicFrame>
+    </p:spTree>
+    <p:extLst>
+      <p:ext uri="{BB962C8B-B14F-4D97-AF65-F5344CB8AC3E}">
+        <p14:creationId xmlns:p14="http://schemas.microsoft.com/office/powerpoint/2010/main" val="3500628853"/>
+      </p:ext>
+    </p:extLst>
+  </p:cSld>
+  <p:clrMapOvr>
+    <a:masterClrMapping/>
+  </p:clrMapOvr>
+  <p:timing>
+    <p:tnLst>
+      <p:par>
+        <p:cTn id="1" dur="indefinite" restart="never" nodeType="tmRoot"/>
+      </p:par>
+    </p:tnLst>
+  </p:timing>
+</p:sld>
+</file>
+
+<file path=ppt/slides/slide25.xml><?xml version="1.0" encoding="utf-8"?>
+<p:sld xmlns:a="http://schemas.openxmlformats.org/drawingml/2006/main" xmlns:r="http://schemas.openxmlformats.org/officeDocument/2006/relationships" xmlns:p="http://schemas.openxmlformats.org/presentationml/2006/main">
+  <p:cSld>
+    <p:spTree>
+      <p:nvGrpSpPr>
+        <p:cNvPr id="1" name=""/>
+        <p:cNvGrpSpPr/>
+        <p:nvPr/>
+      </p:nvGrpSpPr>
+      <p:grpSpPr>
+        <a:xfrm>
+          <a:off x="0" y="0"/>
+          <a:ext cx="0" cy="0"/>
+          <a:chOff x="0" y="0"/>
+          <a:chExt cx="0" cy="0"/>
+        </a:xfrm>
+      </p:grpSpPr>
+      <p:sp>
+        <p:nvSpPr>
+          <p:cNvPr id="2" name="標題 1"/>
+          <p:cNvSpPr>
+            <a:spLocks noGrp="1"/>
+          </p:cNvSpPr>
+          <p:nvPr>
+            <p:ph type="title"/>
+          </p:nvPr>
+        </p:nvSpPr>
+        <p:spPr/>
+        <p:txBody>
+          <a:bodyPr/>
+          <a:lstStyle/>
+          <a:p>
+            <a:r>
+              <a:rPr lang="en-HK" dirty="0" smtClean="0">
+                <a:latin typeface="Times New Roman" panose="02020603050405020304" pitchFamily="18" charset="0"/>
+                <a:cs typeface="Times New Roman" panose="02020603050405020304" pitchFamily="18" charset="0"/>
+              </a:rPr>
+              <a:t>3. CN</a:t>
+            </a:r>
+            <a:r>
+              <a:rPr lang="en-HK" baseline="30000" dirty="0" smtClean="0">
+                <a:latin typeface="Times New Roman" panose="02020603050405020304" pitchFamily="18" charset="0"/>
+                <a:cs typeface="Times New Roman" panose="02020603050405020304" pitchFamily="18" charset="0"/>
+              </a:rPr>
+              <a:t>-</a:t>
+            </a:r>
+            <a:r>
+              <a:rPr lang="en-HK" dirty="0" smtClean="0">
+                <a:latin typeface="Times New Roman" panose="02020603050405020304" pitchFamily="18" charset="0"/>
+                <a:cs typeface="Times New Roman" panose="02020603050405020304" pitchFamily="18" charset="0"/>
+              </a:rPr>
+              <a:t> </a:t>
+            </a:r>
+            <a:r>
+              <a:rPr lang="en-HK" dirty="0">
+                <a:latin typeface="Times New Roman" panose="02020603050405020304" pitchFamily="18" charset="0"/>
+                <a:cs typeface="Times New Roman" panose="02020603050405020304" pitchFamily="18" charset="0"/>
+              </a:rPr>
+              <a:t>formation efficiency of EUV (40.1 eV) and VUV (9.27 eV)</a:t>
+            </a:r>
+            <a:endParaRPr lang="en-US" dirty="0">
+              <a:latin typeface="Times New Roman" panose="02020603050405020304" pitchFamily="18" charset="0"/>
+              <a:cs typeface="Times New Roman" panose="02020603050405020304" pitchFamily="18" charset="0"/>
+            </a:endParaRPr>
+          </a:p>
+        </p:txBody>
+      </p:sp>
+      <p:sp>
+        <p:nvSpPr>
+          <p:cNvPr id="4" name="投影片編號版面配置區 3"/>
+          <p:cNvSpPr>
+            <a:spLocks noGrp="1"/>
+          </p:cNvSpPr>
+          <p:nvPr>
+            <p:ph type="sldNum" sz="quarter" idx="12"/>
+          </p:nvPr>
+        </p:nvSpPr>
+        <p:spPr/>
+        <p:txBody>
+          <a:bodyPr/>
+          <a:lstStyle/>
+          <a:p>
+            <a:fld id="{B646D8CA-B2C0-41A8-8514-369D0B0735D6}" type="slidenum">
+              <a:rPr lang="zh-TW" altLang="en-US" sz="2000" smtClean="0"/>
+              <a:t>25</a:t>
+            </a:fld>
+            <a:endParaRPr lang="zh-TW" altLang="en-US" sz="2000" dirty="0"/>
+          </a:p>
+        </p:txBody>
+      </p:sp>
+      <p:graphicFrame>
+        <p:nvGraphicFramePr>
+          <p:cNvPr id="10" name="內容版面配置區 9"/>
+          <p:cNvGraphicFramePr>
+            <a:graphicFrameLocks noGrp="1"/>
+          </p:cNvGraphicFramePr>
+          <p:nvPr>
+            <p:ph idx="1"/>
+            <p:extLst>
+              <p:ext uri="{D42A27DB-BD31-4B8C-83A1-F6EECF244321}">
+                <p14:modId xmlns:p14="http://schemas.microsoft.com/office/powerpoint/2010/main" val="607023026"/>
+              </p:ext>
+            </p:extLst>
+          </p:nvPr>
+        </p:nvGraphicFramePr>
+        <p:xfrm>
+          <a:off x="569727" y="2076018"/>
+          <a:ext cx="3969871" cy="2852052"/>
+        </p:xfrm>
+        <a:graphic>
+          <a:graphicData uri="http://schemas.openxmlformats.org/drawingml/2006/table">
+            <a:tbl>
+              <a:tblPr>
+                <a:tableStyleId>{5C22544A-7EE6-4342-B048-85BDC9FD1C3A}</a:tableStyleId>
+              </a:tblPr>
+              <a:tblGrid>
+                <a:gridCol w="1698017">
+                  <a:extLst>
+                    <a:ext uri="{9D8B030D-6E8A-4147-A177-3AD203B41FA5}">
+                      <a16:colId xmlns:a16="http://schemas.microsoft.com/office/drawing/2014/main" val="1809679188"/>
+                    </a:ext>
+                  </a:extLst>
+                </a:gridCol>
+                <a:gridCol w="1080120">
+                  <a:extLst>
+                    <a:ext uri="{9D8B030D-6E8A-4147-A177-3AD203B41FA5}">
+                      <a16:colId xmlns:a16="http://schemas.microsoft.com/office/drawing/2014/main" val="1032193202"/>
+                    </a:ext>
+                  </a:extLst>
+                </a:gridCol>
+                <a:gridCol w="1191734">
+                  <a:extLst>
+                    <a:ext uri="{9D8B030D-6E8A-4147-A177-3AD203B41FA5}">
+                      <a16:colId xmlns:a16="http://schemas.microsoft.com/office/drawing/2014/main" val="2853513134"/>
+                    </a:ext>
+                  </a:extLst>
+                </a:gridCol>
+              </a:tblGrid>
               <a:tr h="533666">
                 <a:tc>
                   <a:txBody>
@@ -18360,6 +18927,360 @@
                   </a:ext>
                 </a:extLst>
               </a:tr>
+              <a:tr h="533666">
+                <a:tc>
+                  <a:txBody>
+                    <a:bodyPr/>
+                    <a:lstStyle/>
+                    <a:p>
+                      <a:pPr algn="ctr" rtl="0" fontAlgn="ctr"/>
+                      <a:r>
+                        <a:rPr lang="en-US" sz="1400" u="none" strike="noStrike" dirty="0" smtClean="0">
+                          <a:solidFill>
+                            <a:srgbClr val="FF0000"/>
+                          </a:solidFill>
+                          <a:effectLst/>
+                          <a:latin typeface="Times New Roman" panose="02020603050405020304" pitchFamily="18" charset="0"/>
+                          <a:cs typeface="Times New Roman" panose="02020603050405020304" pitchFamily="18" charset="0"/>
+                        </a:rPr>
+                        <a:t>Destruction cross-section ratio (CH</a:t>
+                      </a:r>
+                      <a:r>
+                        <a:rPr lang="en-US" sz="1400" u="none" strike="noStrike" baseline="-25000" dirty="0" smtClean="0">
+                          <a:solidFill>
+                            <a:srgbClr val="FF0000"/>
+                          </a:solidFill>
+                          <a:effectLst/>
+                          <a:latin typeface="Times New Roman" panose="02020603050405020304" pitchFamily="18" charset="0"/>
+                          <a:cs typeface="Times New Roman" panose="02020603050405020304" pitchFamily="18" charset="0"/>
+                        </a:rPr>
+                        <a:t>4</a:t>
+                      </a:r>
+                      <a:r>
+                        <a:rPr lang="en-US" sz="1400" u="none" strike="noStrike" dirty="0" smtClean="0">
+                          <a:solidFill>
+                            <a:srgbClr val="FF0000"/>
+                          </a:solidFill>
+                          <a:effectLst/>
+                          <a:latin typeface="Times New Roman" panose="02020603050405020304" pitchFamily="18" charset="0"/>
+                          <a:cs typeface="Times New Roman" panose="02020603050405020304" pitchFamily="18" charset="0"/>
+                        </a:rPr>
+                        <a:t>)</a:t>
+                      </a:r>
+                      <a:endParaRPr lang="en-US" sz="1400" b="0" i="0" u="none" strike="noStrike" dirty="0">
+                        <a:solidFill>
+                          <a:srgbClr val="0070C0"/>
+                        </a:solidFill>
+                        <a:effectLst/>
+                        <a:latin typeface="Times New Roman" panose="02020603050405020304" pitchFamily="18" charset="0"/>
+                        <a:cs typeface="Times New Roman" panose="02020603050405020304" pitchFamily="18" charset="0"/>
+                      </a:endParaRPr>
+                    </a:p>
+                  </a:txBody>
+                  <a:tcPr marL="6830" marR="6830" marT="6830" marB="0" anchor="ctr">
+                    <a:solidFill>
+                      <a:schemeClr val="accent3">
+                        <a:lumMod val="40000"/>
+                        <a:lumOff val="60000"/>
+                      </a:schemeClr>
+                    </a:solidFill>
+                  </a:tcPr>
+                </a:tc>
+                <a:tc>
+                  <a:txBody>
+                    <a:bodyPr/>
+                    <a:lstStyle/>
+                    <a:p>
+                      <a:pPr marL="0" marR="0" indent="0" algn="ctr" defTabSz="685800" rtl="0" eaLnBrk="1" fontAlgn="ctr" latinLnBrk="0" hangingPunct="1">
+                        <a:lnSpc>
+                          <a:spcPct val="100000"/>
+                        </a:lnSpc>
+                        <a:spcBef>
+                          <a:spcPts val="0"/>
+                        </a:spcBef>
+                        <a:spcAft>
+                          <a:spcPts val="0"/>
+                        </a:spcAft>
+                        <a:buClrTx/>
+                        <a:buSzTx/>
+                        <a:buFontTx/>
+                        <a:buNone/>
+                        <a:tabLst/>
+                        <a:defRPr/>
+                      </a:pPr>
+                      <a:r>
+                        <a:rPr lang="en-US" sz="1400" u="none" strike="noStrike" dirty="0" smtClean="0">
+                          <a:solidFill>
+                            <a:srgbClr val="FF0000"/>
+                          </a:solidFill>
+                          <a:effectLst/>
+                          <a:latin typeface="Times New Roman" panose="02020603050405020304" pitchFamily="18" charset="0"/>
+                          <a:cs typeface="Times New Roman" panose="02020603050405020304" pitchFamily="18" charset="0"/>
+                        </a:rPr>
+                        <a:t>6.06±0.07</a:t>
+                      </a:r>
+                      <a:endParaRPr lang="en-US" sz="1400" b="0" i="0" u="none" strike="noStrike" dirty="0" smtClean="0">
+                        <a:solidFill>
+                          <a:srgbClr val="FF0000"/>
+                        </a:solidFill>
+                        <a:effectLst/>
+                        <a:latin typeface="Times New Roman" panose="02020603050405020304" pitchFamily="18" charset="0"/>
+                        <a:cs typeface="Times New Roman" panose="02020603050405020304" pitchFamily="18" charset="0"/>
+                      </a:endParaRPr>
+                    </a:p>
+                  </a:txBody>
+                  <a:tcPr marL="6830" marR="6830" marT="6830" marB="0" anchor="ctr">
+                    <a:solidFill>
+                      <a:schemeClr val="accent3">
+                        <a:lumMod val="40000"/>
+                        <a:lumOff val="60000"/>
+                      </a:schemeClr>
+                    </a:solidFill>
+                  </a:tcPr>
+                </a:tc>
+                <a:tc>
+                  <a:txBody>
+                    <a:bodyPr/>
+                    <a:lstStyle/>
+                    <a:p>
+                      <a:pPr marL="0" marR="0" indent="0" algn="ctr" defTabSz="685800" rtl="0" eaLnBrk="1" fontAlgn="ctr" latinLnBrk="0" hangingPunct="1">
+                        <a:lnSpc>
+                          <a:spcPct val="100000"/>
+                        </a:lnSpc>
+                        <a:spcBef>
+                          <a:spcPts val="0"/>
+                        </a:spcBef>
+                        <a:spcAft>
+                          <a:spcPts val="0"/>
+                        </a:spcAft>
+                        <a:buClrTx/>
+                        <a:buSzTx/>
+                        <a:buFontTx/>
+                        <a:buNone/>
+                        <a:tabLst/>
+                        <a:defRPr/>
+                      </a:pPr>
+                      <a:r>
+                        <a:rPr lang="en-US" sz="1400" u="none" strike="noStrike" dirty="0" smtClean="0">
+                          <a:solidFill>
+                            <a:srgbClr val="FF0000"/>
+                          </a:solidFill>
+                          <a:effectLst/>
+                          <a:latin typeface="Times New Roman" panose="02020603050405020304" pitchFamily="18" charset="0"/>
+                          <a:cs typeface="Times New Roman" panose="02020603050405020304" pitchFamily="18" charset="0"/>
+                        </a:rPr>
+                        <a:t>5.52±0.07</a:t>
+                      </a:r>
+                      <a:endParaRPr lang="en-US" sz="1400" b="0" i="0" u="none" strike="noStrike" dirty="0" smtClean="0">
+                        <a:solidFill>
+                          <a:srgbClr val="FF0000"/>
+                        </a:solidFill>
+                        <a:effectLst/>
+                        <a:latin typeface="Times New Roman" panose="02020603050405020304" pitchFamily="18" charset="0"/>
+                        <a:cs typeface="Times New Roman" panose="02020603050405020304" pitchFamily="18" charset="0"/>
+                      </a:endParaRPr>
+                    </a:p>
+                  </a:txBody>
+                  <a:tcPr marL="6830" marR="6830" marT="6830" marB="0" anchor="ctr">
+                    <a:solidFill>
+                      <a:schemeClr val="accent3">
+                        <a:lumMod val="40000"/>
+                        <a:lumOff val="60000"/>
+                      </a:schemeClr>
+                    </a:solidFill>
+                  </a:tcPr>
+                </a:tc>
+                <a:extLst>
+                  <a:ext uri="{0D108BD9-81ED-4DB2-BD59-A6C34878D82A}">
+                    <a16:rowId xmlns:a16="http://schemas.microsoft.com/office/drawing/2014/main" val="3530938289"/>
+                  </a:ext>
+                </a:extLst>
+              </a:tr>
+              <a:tr h="533666">
+                <a:tc>
+                  <a:txBody>
+                    <a:bodyPr/>
+                    <a:lstStyle/>
+                    <a:p>
+                      <a:pPr marL="0" marR="0" indent="0" algn="ctr" defTabSz="685800" rtl="0" eaLnBrk="1" fontAlgn="ctr" latinLnBrk="0" hangingPunct="1">
+                        <a:lnSpc>
+                          <a:spcPct val="100000"/>
+                        </a:lnSpc>
+                        <a:spcBef>
+                          <a:spcPts val="0"/>
+                        </a:spcBef>
+                        <a:spcAft>
+                          <a:spcPts val="0"/>
+                        </a:spcAft>
+                        <a:buClrTx/>
+                        <a:buSzTx/>
+                        <a:buFontTx/>
+                        <a:buNone/>
+                        <a:tabLst/>
+                        <a:defRPr/>
+                      </a:pPr>
+                      <a:r>
+                        <a:rPr lang="en-US" sz="1400" u="none" strike="noStrike" dirty="0" smtClean="0">
+                          <a:solidFill>
+                            <a:schemeClr val="tx1"/>
+                          </a:solidFill>
+                          <a:effectLst/>
+                          <a:latin typeface="Times New Roman" panose="02020603050405020304" pitchFamily="18" charset="0"/>
+                          <a:cs typeface="Times New Roman" panose="02020603050405020304" pitchFamily="18" charset="0"/>
+                        </a:rPr>
+                        <a:t>Destruction cross-section ratio (NH</a:t>
+                      </a:r>
+                      <a:r>
+                        <a:rPr lang="en-US" sz="1400" u="none" strike="noStrike" baseline="-25000" dirty="0" smtClean="0">
+                          <a:solidFill>
+                            <a:schemeClr val="tx1"/>
+                          </a:solidFill>
+                          <a:effectLst/>
+                          <a:latin typeface="Times New Roman" panose="02020603050405020304" pitchFamily="18" charset="0"/>
+                          <a:cs typeface="Times New Roman" panose="02020603050405020304" pitchFamily="18" charset="0"/>
+                        </a:rPr>
+                        <a:t>3</a:t>
+                      </a:r>
+                      <a:r>
+                        <a:rPr lang="en-US" sz="1400" u="none" strike="noStrike" dirty="0" smtClean="0">
+                          <a:solidFill>
+                            <a:schemeClr val="tx1"/>
+                          </a:solidFill>
+                          <a:effectLst/>
+                          <a:latin typeface="Times New Roman" panose="02020603050405020304" pitchFamily="18" charset="0"/>
+                          <a:cs typeface="Times New Roman" panose="02020603050405020304" pitchFamily="18" charset="0"/>
+                        </a:rPr>
+                        <a:t>)</a:t>
+                      </a:r>
+                      <a:endParaRPr lang="en-US" sz="1400" b="0" i="0" u="none" strike="noStrike" dirty="0" smtClean="0">
+                        <a:solidFill>
+                          <a:schemeClr val="tx1"/>
+                        </a:solidFill>
+                        <a:effectLst/>
+                        <a:latin typeface="Times New Roman" panose="02020603050405020304" pitchFamily="18" charset="0"/>
+                        <a:cs typeface="Times New Roman" panose="02020603050405020304" pitchFamily="18" charset="0"/>
+                      </a:endParaRPr>
+                    </a:p>
+                  </a:txBody>
+                  <a:tcPr marL="6830" marR="6830" marT="6830" marB="0" anchor="ctr">
+                    <a:solidFill>
+                      <a:schemeClr val="accent3">
+                        <a:lumMod val="40000"/>
+                        <a:lumOff val="60000"/>
+                      </a:schemeClr>
+                    </a:solidFill>
+                  </a:tcPr>
+                </a:tc>
+                <a:tc>
+                  <a:txBody>
+                    <a:bodyPr/>
+                    <a:lstStyle/>
+                    <a:p>
+                      <a:pPr marL="0" marR="0" indent="0" algn="ctr" defTabSz="685800" rtl="0" eaLnBrk="1" fontAlgn="ctr" latinLnBrk="0" hangingPunct="1">
+                        <a:lnSpc>
+                          <a:spcPct val="100000"/>
+                        </a:lnSpc>
+                        <a:spcBef>
+                          <a:spcPts val="0"/>
+                        </a:spcBef>
+                        <a:spcAft>
+                          <a:spcPts val="0"/>
+                        </a:spcAft>
+                        <a:buClrTx/>
+                        <a:buSzTx/>
+                        <a:buFontTx/>
+                        <a:buNone/>
+                        <a:tabLst/>
+                        <a:defRPr/>
+                      </a:pPr>
+                      <a:r>
+                        <a:rPr lang="en-US" sz="1400" u="none" strike="noStrike" dirty="0" smtClean="0">
+                          <a:solidFill>
+                            <a:schemeClr val="tx1"/>
+                          </a:solidFill>
+                          <a:effectLst/>
+                          <a:latin typeface="Times New Roman" panose="02020603050405020304" pitchFamily="18" charset="0"/>
+                          <a:cs typeface="Times New Roman" panose="02020603050405020304" pitchFamily="18" charset="0"/>
+                        </a:rPr>
+                        <a:t>3.18±0.12</a:t>
+                      </a:r>
+                      <a:endParaRPr lang="en-US" sz="1400" b="0" i="0" u="none" strike="noStrike" dirty="0" smtClean="0">
+                        <a:solidFill>
+                          <a:schemeClr val="tx1"/>
+                        </a:solidFill>
+                        <a:effectLst/>
+                        <a:latin typeface="Times New Roman" panose="02020603050405020304" pitchFamily="18" charset="0"/>
+                        <a:cs typeface="Times New Roman" panose="02020603050405020304" pitchFamily="18" charset="0"/>
+                      </a:endParaRPr>
+                    </a:p>
+                  </a:txBody>
+                  <a:tcPr marL="6830" marR="6830" marT="6830" marB="0" anchor="ctr">
+                    <a:solidFill>
+                      <a:schemeClr val="accent3">
+                        <a:lumMod val="40000"/>
+                        <a:lumOff val="60000"/>
+                      </a:schemeClr>
+                    </a:solidFill>
+                  </a:tcPr>
+                </a:tc>
+                <a:tc>
+                  <a:txBody>
+                    <a:bodyPr/>
+                    <a:lstStyle/>
+                    <a:p>
+                      <a:pPr marL="0" marR="0" indent="0" algn="ctr" defTabSz="685800" rtl="0" eaLnBrk="1" fontAlgn="ctr" latinLnBrk="0" hangingPunct="1">
+                        <a:lnSpc>
+                          <a:spcPct val="100000"/>
+                        </a:lnSpc>
+                        <a:spcBef>
+                          <a:spcPts val="0"/>
+                        </a:spcBef>
+                        <a:spcAft>
+                          <a:spcPts val="0"/>
+                        </a:spcAft>
+                        <a:buClrTx/>
+                        <a:buSzTx/>
+                        <a:buFontTx/>
+                        <a:buNone/>
+                        <a:tabLst/>
+                        <a:defRPr/>
+                      </a:pPr>
+                      <a:r>
+                        <a:rPr lang="en-US" sz="1400" u="none" strike="noStrike" dirty="0" smtClean="0">
+                          <a:solidFill>
+                            <a:schemeClr val="tx1"/>
+                          </a:solidFill>
+                          <a:effectLst/>
+                          <a:latin typeface="Times New Roman" panose="02020603050405020304" pitchFamily="18" charset="0"/>
+                          <a:cs typeface="Times New Roman" panose="02020603050405020304" pitchFamily="18" charset="0"/>
+                        </a:rPr>
+                        <a:t>2.07±0.13</a:t>
+                      </a:r>
+                      <a:endParaRPr lang="en-US" sz="1400" b="0" i="0" u="none" strike="noStrike" dirty="0" smtClean="0">
+                        <a:solidFill>
+                          <a:schemeClr val="tx1"/>
+                        </a:solidFill>
+                        <a:effectLst/>
+                        <a:latin typeface="Times New Roman" panose="02020603050405020304" pitchFamily="18" charset="0"/>
+                        <a:cs typeface="Times New Roman" panose="02020603050405020304" pitchFamily="18" charset="0"/>
+                      </a:endParaRPr>
+                    </a:p>
+                  </a:txBody>
+                  <a:tcPr marL="6830" marR="6830" marT="6830" marB="0" anchor="ctr">
+                    <a:solidFill>
+                      <a:schemeClr val="accent3">
+                        <a:lumMod val="40000"/>
+                        <a:lumOff val="60000"/>
+                      </a:schemeClr>
+                    </a:solidFill>
+                  </a:tcPr>
+                </a:tc>
+                <a:extLst>
+                  <a:ext uri="{0D108BD9-81ED-4DB2-BD59-A6C34878D82A}">
+                    <a16:rowId xmlns:a16="http://schemas.microsoft.com/office/drawing/2014/main" val="64277223"/>
+                  </a:ext>
+                </a:extLst>
+              </a:tr>
             </a:tbl>
           </a:graphicData>
         </a:graphic>
@@ -18386,7 +19307,7 @@
           <a:graphicData uri="http://schemas.openxmlformats.org/presentationml/2006/ole">
             <mc:AlternateContent xmlns:mc="http://schemas.openxmlformats.org/markup-compatibility/2006">
               <mc:Choice xmlns:v="urn:schemas-microsoft-com:vml" Requires="v">
-                <p:oleObj spid="_x0000_s3849" name="Graph" r:id="rId3" imgW="4754880" imgH="3108960" progId="Origin50.Graph">
+                <p:oleObj spid="_x0000_s3867" name="Graph" r:id="rId3" imgW="4754880" imgH="3108960" progId="Origin50.Graph">
                   <p:embed/>
                 </p:oleObj>
               </mc:Choice>
@@ -20003,7 +20924,7 @@
           <a:graphicData uri="http://schemas.openxmlformats.org/presentationml/2006/ole">
             <mc:AlternateContent xmlns:mc="http://schemas.openxmlformats.org/markup-compatibility/2006">
               <mc:Choice xmlns:v="urn:schemas-microsoft-com:vml" Requires="v">
-                <p:oleObj spid="_x0000_s2957" name="Graph" r:id="rId3" imgW="4754880" imgH="3108960" progId="Origin50.Graph">
+                <p:oleObj spid="_x0000_s2975" name="Graph" r:id="rId3" imgW="4754880" imgH="3108960" progId="Origin50.Graph">
                   <p:embed/>
                 </p:oleObj>
               </mc:Choice>
@@ -20579,7 +21500,7 @@
           <a:graphicData uri="http://schemas.openxmlformats.org/presentationml/2006/ole">
             <mc:AlternateContent xmlns:mc="http://schemas.openxmlformats.org/markup-compatibility/2006">
               <mc:Choice xmlns:v="urn:schemas-microsoft-com:vml" Requires="v">
-                <p:oleObj spid="_x0000_s5842" name="Graph" r:id="rId3" imgW="4754880" imgH="3108960" progId="Origin50.Graph">
+                <p:oleObj spid="_x0000_s5860" name="Graph" r:id="rId3" imgW="4754880" imgH="3108960" progId="Origin50.Graph">
                   <p:embed/>
                 </p:oleObj>
               </mc:Choice>
@@ -21350,7 +22271,7 @@
           <a:graphicData uri="http://schemas.openxmlformats.org/presentationml/2006/ole">
             <mc:AlternateContent xmlns:mc="http://schemas.openxmlformats.org/markup-compatibility/2006">
               <mc:Choice xmlns:v="urn:schemas-microsoft-com:vml" Requires="v">
-                <p:oleObj spid="_x0000_s12696" name="Graph" r:id="rId3" imgW="4754880" imgH="3108960" progId="Origin50.Graph">
+                <p:oleObj spid="_x0000_s12714" name="Graph" r:id="rId3" imgW="4754880" imgH="3108960" progId="Origin50.Graph">
                   <p:embed/>
                 </p:oleObj>
               </mc:Choice>
@@ -23765,8 +24686,8 @@
           </a:p>
         </p:txBody>
       </p:sp>
-      <mc:AlternateContent xmlns:mc="http://schemas.openxmlformats.org/markup-compatibility/2006">
-        <mc:Choice xmlns:a14="http://schemas.microsoft.com/office/drawing/2010/main" Requires="a14">
+      <mc:AlternateContent xmlns:mc="http://schemas.openxmlformats.org/markup-compatibility/2006" xmlns:a14="http://schemas.microsoft.com/office/drawing/2010/main">
+        <mc:Choice Requires="a14">
           <p:sp>
             <p:nvSpPr>
               <p:cNvPr id="7" name="矩形 6"/>
@@ -24017,7 +24938,7 @@
             </p:txBody>
           </p:sp>
         </mc:Choice>
-        <mc:Fallback>
+        <mc:Fallback xmlns="">
           <p:sp>
             <p:nvSpPr>
               <p:cNvPr id="7" name="矩形 6"/>
@@ -24136,8 +25057,8 @@
           </a:p>
         </p:txBody>
       </p:sp>
-      <mc:AlternateContent xmlns:mc="http://schemas.openxmlformats.org/markup-compatibility/2006">
-        <mc:Choice xmlns:a14="http://schemas.microsoft.com/office/drawing/2010/main" Requires="a14">
+      <mc:AlternateContent xmlns:mc="http://schemas.openxmlformats.org/markup-compatibility/2006" xmlns:a14="http://schemas.microsoft.com/office/drawing/2010/main">
+        <mc:Choice Requires="a14">
           <p:sp>
             <p:nvSpPr>
               <p:cNvPr id="3" name="內容版面配置區 2"/>
@@ -24924,7 +25845,7 @@
             </p:txBody>
           </p:sp>
         </mc:Choice>
-        <mc:Fallback>
+        <mc:Fallback xmlns="">
           <p:sp>
             <p:nvSpPr>
               <p:cNvPr id="3" name="內容版面配置區 2"/>

</xml_diff>

<commit_message>
change table of p.25
</commit_message>
<xml_diff>
--- a/doc/VUV and EUV irradiation of CH4 + NH3.pptx
+++ b/doc/VUV and EUV irradiation of CH4 + NH3.pptx
@@ -11866,7 +11866,7 @@
           <a:graphicData uri="http://schemas.openxmlformats.org/presentationml/2006/ole">
             <mc:AlternateContent xmlns:mc="http://schemas.openxmlformats.org/markup-compatibility/2006">
               <mc:Choice xmlns:v="urn:schemas-microsoft-com:vml" Requires="v">
-                <p:oleObj spid="_x0000_s10747" name="Graph" r:id="rId5" imgW="4754880" imgH="3108960" progId="Origin50.Graph">
+                <p:oleObj spid="_x0000_s10765" name="Graph" r:id="rId5" imgW="4754880" imgH="3108960" progId="Origin50.Graph">
                   <p:embed/>
                 </p:oleObj>
               </mc:Choice>
@@ -12138,30 +12138,6 @@
           </a:p>
         </p:txBody>
       </p:sp>
-      <p:pic>
-        <p:nvPicPr>
-          <p:cNvPr id="5" name="圖片 4"/>
-          <p:cNvPicPr>
-            <a:picLocks noChangeAspect="1"/>
-          </p:cNvPicPr>
-          <p:nvPr/>
-        </p:nvPicPr>
-        <p:blipFill>
-          <a:blip r:embed="rId3"/>
-          <a:stretch>
-            <a:fillRect/>
-          </a:stretch>
-        </p:blipFill>
-        <p:spPr>
-          <a:xfrm>
-            <a:off x="1403648" y="1970189"/>
-            <a:ext cx="7449546" cy="3407633"/>
-          </a:xfrm>
-          <a:prstGeom prst="rect">
-            <a:avLst/>
-          </a:prstGeom>
-        </p:spPr>
-      </p:pic>
       <mc:AlternateContent xmlns:mc="http://schemas.openxmlformats.org/markup-compatibility/2006" xmlns:a14="http://schemas.microsoft.com/office/drawing/2010/main">
         <mc:Choice Requires="a14">
           <p:sp>
@@ -12838,6 +12814,515 @@
           </p:sp>
         </mc:Fallback>
       </mc:AlternateContent>
+      <p:graphicFrame>
+        <p:nvGraphicFramePr>
+          <p:cNvPr id="6" name="表格 5"/>
+          <p:cNvGraphicFramePr>
+            <a:graphicFrameLocks noGrp="1"/>
+          </p:cNvGraphicFramePr>
+          <p:nvPr>
+            <p:extLst>
+              <p:ext uri="{D42A27DB-BD31-4B8C-83A1-F6EECF244321}">
+                <p14:modId xmlns:p14="http://schemas.microsoft.com/office/powerpoint/2010/main" val="1528449047"/>
+              </p:ext>
+            </p:extLst>
+          </p:nvPr>
+        </p:nvGraphicFramePr>
+        <p:xfrm>
+          <a:off x="1213633" y="1952893"/>
+          <a:ext cx="6489528" cy="3026528"/>
+        </p:xfrm>
+        <a:graphic>
+          <a:graphicData uri="http://schemas.openxmlformats.org/drawingml/2006/table">
+            <a:tbl>
+              <a:tblPr firstRow="1" bandRow="1">
+                <a:tableStyleId>{5C22544A-7EE6-4342-B048-85BDC9FD1C3A}</a:tableStyleId>
+              </a:tblPr>
+              <a:tblGrid>
+                <a:gridCol w="1622382">
+                  <a:extLst>
+                    <a:ext uri="{9D8B030D-6E8A-4147-A177-3AD203B41FA5}">
+                      <a16:colId xmlns:a16="http://schemas.microsoft.com/office/drawing/2014/main" val="3017308944"/>
+                    </a:ext>
+                  </a:extLst>
+                </a:gridCol>
+                <a:gridCol w="1622382">
+                  <a:extLst>
+                    <a:ext uri="{9D8B030D-6E8A-4147-A177-3AD203B41FA5}">
+                      <a16:colId xmlns:a16="http://schemas.microsoft.com/office/drawing/2014/main" val="746626971"/>
+                    </a:ext>
+                  </a:extLst>
+                </a:gridCol>
+                <a:gridCol w="1622382">
+                  <a:extLst>
+                    <a:ext uri="{9D8B030D-6E8A-4147-A177-3AD203B41FA5}">
+                      <a16:colId xmlns:a16="http://schemas.microsoft.com/office/drawing/2014/main" val="877779204"/>
+                    </a:ext>
+                  </a:extLst>
+                </a:gridCol>
+                <a:gridCol w="1622382">
+                  <a:extLst>
+                    <a:ext uri="{9D8B030D-6E8A-4147-A177-3AD203B41FA5}">
+                      <a16:colId xmlns:a16="http://schemas.microsoft.com/office/drawing/2014/main" val="2307652002"/>
+                    </a:ext>
+                  </a:extLst>
+                </a:gridCol>
+              </a:tblGrid>
+              <a:tr h="766308">
+                <a:tc>
+                  <a:txBody>
+                    <a:bodyPr/>
+                    <a:lstStyle/>
+                    <a:p>
+                      <a:pPr algn="ctr"/>
+                      <a:r>
+                        <a:rPr lang="en-HK" dirty="0" smtClean="0"/>
+                        <a:t>Ratio of CH</a:t>
+                      </a:r>
+                      <a:r>
+                        <a:rPr lang="en-HK" baseline="-25000" dirty="0" smtClean="0"/>
+                        <a:t>4</a:t>
+                      </a:r>
+                      <a:r>
+                        <a:rPr lang="en-HK" dirty="0" smtClean="0"/>
+                        <a:t>+NH</a:t>
+                      </a:r>
+                      <a:r>
+                        <a:rPr lang="en-HK" baseline="-25000" dirty="0" smtClean="0"/>
+                        <a:t>3</a:t>
+                      </a:r>
+                      <a:endParaRPr lang="en-US" baseline="-25000" dirty="0"/>
+                    </a:p>
+                  </a:txBody>
+                  <a:tcPr anchor="ctr"/>
+                </a:tc>
+                <a:tc>
+                  <a:txBody>
+                    <a:bodyPr/>
+                    <a:lstStyle/>
+                    <a:p>
+                      <a:pPr algn="ctr"/>
+                      <a:r>
+                        <a:rPr lang="en-HK" dirty="0" smtClean="0"/>
+                        <a:t>A</a:t>
+                      </a:r>
+                    </a:p>
+                    <a:p>
+                      <a:pPr algn="ctr"/>
+                      <a:r>
+                        <a:rPr lang="en-HK" dirty="0" smtClean="0"/>
+                        <a:t>(x10</a:t>
+                      </a:r>
+                      <a:r>
+                        <a:rPr lang="en-HK" baseline="30000" dirty="0" smtClean="0"/>
+                        <a:t>16</a:t>
+                      </a:r>
+                      <a:r>
+                        <a:rPr lang="en-HK" dirty="0" smtClean="0"/>
+                        <a:t> molecules cm</a:t>
+                      </a:r>
+                      <a:r>
+                        <a:rPr lang="en-HK" baseline="30000" dirty="0" smtClean="0"/>
+                        <a:t>-2</a:t>
+                      </a:r>
+                      <a:r>
+                        <a:rPr lang="en-HK" dirty="0" smtClean="0"/>
+                        <a:t>)</a:t>
+                      </a:r>
+                      <a:endParaRPr lang="en-US" dirty="0"/>
+                    </a:p>
+                  </a:txBody>
+                  <a:tcPr anchor="ctr"/>
+                </a:tc>
+                <a:tc>
+                  <a:txBody>
+                    <a:bodyPr/>
+                    <a:lstStyle/>
+                    <a:p>
+                      <a:pPr algn="ctr"/>
+                      <a:r>
+                        <a:rPr lang="en-HK" dirty="0" smtClean="0"/>
+                        <a:t>k</a:t>
+                      </a:r>
+                      <a:r>
+                        <a:rPr lang="en-HK" baseline="-25000" dirty="0" smtClean="0"/>
+                        <a:t>1</a:t>
+                      </a:r>
+                      <a:r>
+                        <a:rPr lang="en-HK" baseline="0" dirty="0" smtClean="0"/>
+                        <a:t> </a:t>
+                      </a:r>
+                    </a:p>
+                    <a:p>
+                      <a:pPr algn="ctr"/>
+                      <a:r>
+                        <a:rPr lang="en-HK" baseline="0" dirty="0" smtClean="0"/>
+                        <a:t>(x10</a:t>
+                      </a:r>
+                      <a:r>
+                        <a:rPr lang="en-HK" baseline="30000" dirty="0" smtClean="0"/>
+                        <a:t>-18</a:t>
+                      </a:r>
+                      <a:r>
+                        <a:rPr lang="en-HK" baseline="0" dirty="0" smtClean="0"/>
+                        <a:t> photon</a:t>
+                      </a:r>
+                      <a:r>
+                        <a:rPr lang="en-HK" baseline="30000" dirty="0" smtClean="0"/>
+                        <a:t>-1</a:t>
+                      </a:r>
+                      <a:r>
+                        <a:rPr lang="en-HK" baseline="0" dirty="0" smtClean="0"/>
+                        <a:t>)</a:t>
+                      </a:r>
+                      <a:endParaRPr lang="en-US" dirty="0"/>
+                    </a:p>
+                  </a:txBody>
+                  <a:tcPr anchor="ctr"/>
+                </a:tc>
+                <a:tc>
+                  <a:txBody>
+                    <a:bodyPr/>
+                    <a:lstStyle/>
+                    <a:p>
+                      <a:pPr algn="ctr"/>
+                      <a:r>
+                        <a:rPr lang="en-HK" dirty="0" smtClean="0"/>
+                        <a:t>k</a:t>
+                      </a:r>
+                      <a:r>
+                        <a:rPr lang="en-HK" baseline="-25000" dirty="0" smtClean="0"/>
+                        <a:t>2</a:t>
+                      </a:r>
+                      <a:r>
+                        <a:rPr lang="en-HK" baseline="0" dirty="0" smtClean="0"/>
+                        <a:t> (photon </a:t>
+                      </a:r>
+                      <a:r>
+                        <a:rPr lang="en-HK" baseline="30000" dirty="0" smtClean="0"/>
+                        <a:t>-1</a:t>
+                      </a:r>
+                      <a:r>
+                        <a:rPr lang="en-HK" baseline="0" dirty="0" smtClean="0"/>
+                        <a:t>)</a:t>
+                      </a:r>
+                      <a:endParaRPr lang="en-US" dirty="0"/>
+                    </a:p>
+                  </a:txBody>
+                  <a:tcPr anchor="ctr"/>
+                </a:tc>
+                <a:extLst>
+                  <a:ext uri="{0D108BD9-81ED-4DB2-BD59-A6C34878D82A}">
+                    <a16:rowId xmlns:a16="http://schemas.microsoft.com/office/drawing/2014/main" val="1889651199"/>
+                  </a:ext>
+                </a:extLst>
+              </a:tr>
+              <a:tr h="565055">
+                <a:tc>
+                  <a:txBody>
+                    <a:bodyPr/>
+                    <a:lstStyle/>
+                    <a:p>
+                      <a:pPr algn="ctr"/>
+                      <a:r>
+                        <a:rPr lang="en-HK" dirty="0" smtClean="0"/>
+                        <a:t>1:20</a:t>
+                      </a:r>
+                    </a:p>
+                  </a:txBody>
+                  <a:tcPr anchor="ctr"/>
+                </a:tc>
+                <a:tc>
+                  <a:txBody>
+                    <a:bodyPr/>
+                    <a:lstStyle/>
+                    <a:p>
+                      <a:pPr algn="ctr"/>
+                      <a:r>
+                        <a:rPr lang="en-HK" dirty="0" smtClean="0"/>
+                        <a:t>4.75 ± 0.40</a:t>
+                      </a:r>
+                    </a:p>
+                  </a:txBody>
+                  <a:tcPr anchor="ctr"/>
+                </a:tc>
+                <a:tc>
+                  <a:txBody>
+                    <a:bodyPr/>
+                    <a:lstStyle/>
+                    <a:p>
+                      <a:pPr algn="ctr"/>
+                      <a:r>
+                        <a:rPr lang="en-HK" dirty="0" smtClean="0"/>
+                        <a:t>0.70 </a:t>
+                      </a:r>
+                      <a:r>
+                        <a:rPr lang="en-HK" dirty="0" smtClean="0"/>
+                        <a:t>± 0.09</a:t>
+                      </a:r>
+                      <a:endParaRPr lang="en-US" dirty="0"/>
+                    </a:p>
+                  </a:txBody>
+                  <a:tcPr anchor="ctr"/>
+                </a:tc>
+                <a:tc>
+                  <a:txBody>
+                    <a:bodyPr/>
+                    <a:lstStyle/>
+                    <a:p>
+                      <a:pPr algn="ctr"/>
+                      <a:r>
+                        <a:rPr lang="en-HK" dirty="0" smtClean="0"/>
+                        <a:t>&gt;1</a:t>
+                      </a:r>
+                      <a:endParaRPr lang="en-US" dirty="0"/>
+                    </a:p>
+                  </a:txBody>
+                  <a:tcPr anchor="ctr"/>
+                </a:tc>
+                <a:extLst>
+                  <a:ext uri="{0D108BD9-81ED-4DB2-BD59-A6C34878D82A}">
+                    <a16:rowId xmlns:a16="http://schemas.microsoft.com/office/drawing/2014/main" val="2057849896"/>
+                  </a:ext>
+                </a:extLst>
+              </a:tr>
+              <a:tr h="565055">
+                <a:tc>
+                  <a:txBody>
+                    <a:bodyPr/>
+                    <a:lstStyle/>
+                    <a:p>
+                      <a:pPr algn="ctr"/>
+                      <a:r>
+                        <a:rPr lang="en-HK" dirty="0" smtClean="0"/>
+                        <a:t>1:10</a:t>
+                      </a:r>
+                      <a:endParaRPr lang="en-US" dirty="0"/>
+                    </a:p>
+                  </a:txBody>
+                  <a:tcPr anchor="ctr"/>
+                </a:tc>
+                <a:tc>
+                  <a:txBody>
+                    <a:bodyPr/>
+                    <a:lstStyle/>
+                    <a:p>
+                      <a:pPr algn="ctr"/>
+                      <a:r>
+                        <a:rPr lang="en-HK" dirty="0" smtClean="0"/>
+                        <a:t>4.51</a:t>
+                      </a:r>
+                      <a:r>
+                        <a:rPr lang="en-HK" baseline="0" dirty="0" smtClean="0"/>
+                        <a:t> </a:t>
+                      </a:r>
+                      <a:r>
+                        <a:rPr lang="en-HK" dirty="0" smtClean="0"/>
+                        <a:t>± 0.18</a:t>
+                      </a:r>
+                      <a:endParaRPr lang="en-US" dirty="0"/>
+                    </a:p>
+                  </a:txBody>
+                  <a:tcPr anchor="ctr"/>
+                </a:tc>
+                <a:tc>
+                  <a:txBody>
+                    <a:bodyPr/>
+                    <a:lstStyle/>
+                    <a:p>
+                      <a:pPr algn="ctr"/>
+                      <a:r>
+                        <a:rPr lang="en-HK" dirty="0" smtClean="0"/>
+                        <a:t>1.33 </a:t>
+                      </a:r>
+                      <a:r>
+                        <a:rPr lang="en-HK" dirty="0" smtClean="0"/>
+                        <a:t>± 0.13</a:t>
+                      </a:r>
+                      <a:endParaRPr lang="en-US" dirty="0"/>
+                    </a:p>
+                  </a:txBody>
+                  <a:tcPr anchor="ctr"/>
+                </a:tc>
+                <a:tc>
+                  <a:txBody>
+                    <a:bodyPr/>
+                    <a:lstStyle/>
+                    <a:p>
+                      <a:pPr algn="ctr"/>
+                      <a:r>
+                        <a:rPr lang="en-HK" dirty="0" smtClean="0"/>
+                        <a:t>&gt;1</a:t>
+                      </a:r>
+                      <a:endParaRPr lang="en-US" dirty="0"/>
+                    </a:p>
+                  </a:txBody>
+                  <a:tcPr anchor="ctr"/>
+                </a:tc>
+                <a:extLst>
+                  <a:ext uri="{0D108BD9-81ED-4DB2-BD59-A6C34878D82A}">
+                    <a16:rowId xmlns:a16="http://schemas.microsoft.com/office/drawing/2014/main" val="3937389946"/>
+                  </a:ext>
+                </a:extLst>
+              </a:tr>
+              <a:tr h="565055">
+                <a:tc>
+                  <a:txBody>
+                    <a:bodyPr/>
+                    <a:lstStyle/>
+                    <a:p>
+                      <a:pPr algn="ctr"/>
+                      <a:r>
+                        <a:rPr lang="en-HK" dirty="0" smtClean="0"/>
+                        <a:t>1:5</a:t>
+                      </a:r>
+                      <a:endParaRPr lang="en-US" dirty="0"/>
+                    </a:p>
+                  </a:txBody>
+                  <a:tcPr anchor="ctr"/>
+                </a:tc>
+                <a:tc>
+                  <a:txBody>
+                    <a:bodyPr/>
+                    <a:lstStyle/>
+                    <a:p>
+                      <a:pPr algn="ctr"/>
+                      <a:r>
+                        <a:rPr lang="en-HK" dirty="0" smtClean="0"/>
+                        <a:t>4.61 </a:t>
+                      </a:r>
+                      <a:r>
+                        <a:rPr lang="en-HK" dirty="0" smtClean="0"/>
+                        <a:t>± 0.18</a:t>
+                      </a:r>
+                      <a:endParaRPr lang="en-US" dirty="0"/>
+                    </a:p>
+                  </a:txBody>
+                  <a:tcPr anchor="ctr"/>
+                </a:tc>
+                <a:tc>
+                  <a:txBody>
+                    <a:bodyPr/>
+                    <a:lstStyle/>
+                    <a:p>
+                      <a:pPr algn="ctr"/>
+                      <a:r>
+                        <a:rPr lang="en-HK" dirty="0" smtClean="0"/>
+                        <a:t>1.93 </a:t>
+                      </a:r>
+                      <a:r>
+                        <a:rPr lang="en-HK" dirty="0" smtClean="0"/>
+                        <a:t>± 0.19</a:t>
+                      </a:r>
+                      <a:endParaRPr lang="en-US" dirty="0"/>
+                    </a:p>
+                  </a:txBody>
+                  <a:tcPr anchor="ctr"/>
+                </a:tc>
+                <a:tc>
+                  <a:txBody>
+                    <a:bodyPr/>
+                    <a:lstStyle/>
+                    <a:p>
+                      <a:pPr algn="ctr"/>
+                      <a:r>
+                        <a:rPr lang="en-HK" dirty="0" smtClean="0"/>
+                        <a:t>&gt;1</a:t>
+                      </a:r>
+                      <a:endParaRPr lang="en-US" dirty="0"/>
+                    </a:p>
+                  </a:txBody>
+                  <a:tcPr anchor="ctr"/>
+                </a:tc>
+                <a:extLst>
+                  <a:ext uri="{0D108BD9-81ED-4DB2-BD59-A6C34878D82A}">
+                    <a16:rowId xmlns:a16="http://schemas.microsoft.com/office/drawing/2014/main" val="3783455059"/>
+                  </a:ext>
+                </a:extLst>
+              </a:tr>
+              <a:tr h="565055">
+                <a:tc>
+                  <a:txBody>
+                    <a:bodyPr/>
+                    <a:lstStyle/>
+                    <a:p>
+                      <a:pPr algn="ctr"/>
+                      <a:r>
+                        <a:rPr lang="en-HK" dirty="0" smtClean="0"/>
+                        <a:t>3:2</a:t>
+                      </a:r>
+                      <a:endParaRPr lang="en-US" dirty="0"/>
+                    </a:p>
+                  </a:txBody>
+                  <a:tcPr anchor="ctr"/>
+                </a:tc>
+                <a:tc>
+                  <a:txBody>
+                    <a:bodyPr/>
+                    <a:lstStyle/>
+                    <a:p>
+                      <a:pPr algn="ctr"/>
+                      <a:r>
+                        <a:rPr lang="en-HK" dirty="0" smtClean="0"/>
+                        <a:t>2.24 </a:t>
+                      </a:r>
+                      <a:r>
+                        <a:rPr lang="en-HK" dirty="0" smtClean="0"/>
+                        <a:t>± 0.03</a:t>
+                      </a:r>
+                      <a:endParaRPr lang="en-US" dirty="0"/>
+                    </a:p>
+                  </a:txBody>
+                  <a:tcPr anchor="ctr"/>
+                </a:tc>
+                <a:tc>
+                  <a:txBody>
+                    <a:bodyPr/>
+                    <a:lstStyle/>
+                    <a:p>
+                      <a:pPr algn="ctr"/>
+                      <a:r>
+                        <a:rPr lang="en-HK" dirty="0" smtClean="0"/>
+                        <a:t>8.21 </a:t>
+                      </a:r>
+                      <a:r>
+                        <a:rPr lang="en-HK" dirty="0" smtClean="0"/>
+                        <a:t>±</a:t>
+                      </a:r>
+                      <a:r>
+                        <a:rPr lang="en-HK" baseline="0" dirty="0" smtClean="0"/>
+                        <a:t> 0.70</a:t>
+                      </a:r>
+                      <a:endParaRPr lang="en-US" dirty="0"/>
+                    </a:p>
+                  </a:txBody>
+                  <a:tcPr anchor="ctr"/>
+                </a:tc>
+                <a:tc>
+                  <a:txBody>
+                    <a:bodyPr/>
+                    <a:lstStyle/>
+                    <a:p>
+                      <a:pPr algn="ctr"/>
+                      <a:r>
+                        <a:rPr lang="en-HK" dirty="0" smtClean="0"/>
+                        <a:t>&gt;1</a:t>
+                      </a:r>
+                      <a:endParaRPr lang="en-US" dirty="0"/>
+                    </a:p>
+                  </a:txBody>
+                  <a:tcPr anchor="ctr"/>
+                </a:tc>
+                <a:extLst>
+                  <a:ext uri="{0D108BD9-81ED-4DB2-BD59-A6C34878D82A}">
+                    <a16:rowId xmlns:a16="http://schemas.microsoft.com/office/drawing/2014/main" val="3851324884"/>
+                  </a:ext>
+                </a:extLst>
+              </a:tr>
+            </a:tbl>
+          </a:graphicData>
+        </a:graphic>
+      </p:graphicFrame>
       <p:sp>
         <p:nvSpPr>
           <p:cNvPr id="3" name="橢圓 2"/>
@@ -12846,7 +13331,7 @@
         </p:nvSpPr>
         <p:spPr>
           <a:xfrm>
-            <a:off x="6336196" y="1952892"/>
+            <a:off x="6046977" y="2756602"/>
             <a:ext cx="1656184" cy="2160240"/>
           </a:xfrm>
           <a:prstGeom prst="ellipse">
@@ -16765,7 +17250,7 @@
           <a:graphicData uri="http://schemas.openxmlformats.org/presentationml/2006/ole">
             <mc:AlternateContent xmlns:mc="http://schemas.openxmlformats.org/markup-compatibility/2006">
               <mc:Choice xmlns:v="urn:schemas-microsoft-com:vml" Requires="v">
-                <p:oleObj spid="_x0000_s2014" name="Graph" r:id="rId3" imgW="4754880" imgH="3108960" progId="Origin50.Graph">
+                <p:oleObj spid="_x0000_s2032" name="Graph" r:id="rId3" imgW="4754880" imgH="3108960" progId="Origin50.Graph">
                   <p:embed/>
                 </p:oleObj>
               </mc:Choice>
@@ -16859,7 +17344,7 @@
         </p:blipFill>
         <p:spPr>
           <a:xfrm>
-            <a:off x="4824000" y="2371067"/>
+            <a:off x="4824000" y="0"/>
             <a:ext cx="4561104" cy="2982261"/>
           </a:xfrm>
           <a:prstGeom prst="rect">
@@ -16877,9 +17362,16 @@
             <p:ph type="title"/>
           </p:nvPr>
         </p:nvSpPr>
-        <p:spPr/>
+        <p:spPr>
+          <a:xfrm>
+            <a:off x="1028700" y="571500"/>
+            <a:ext cx="4335388" cy="1238250"/>
+          </a:xfrm>
+        </p:spPr>
         <p:txBody>
-          <a:bodyPr/>
+          <a:bodyPr>
+            <a:normAutofit fontScale="90000"/>
+          </a:bodyPr>
           <a:lstStyle/>
           <a:p>
             <a:r>
@@ -16887,7 +17379,21 @@
                 <a:latin typeface="Times New Roman" panose="02020603050405020304" pitchFamily="18" charset="0"/>
                 <a:cs typeface="Times New Roman" panose="02020603050405020304" pitchFamily="18" charset="0"/>
               </a:rPr>
-              <a:t>3. Rate constant of reactants by EUV </a:t>
+              <a:t>3. </a:t>
+            </a:r>
+            <a:r>
+              <a:rPr lang="en-HK" dirty="0" smtClean="0">
+                <a:latin typeface="Times New Roman" panose="02020603050405020304" pitchFamily="18" charset="0"/>
+                <a:cs typeface="Times New Roman" panose="02020603050405020304" pitchFamily="18" charset="0"/>
+              </a:rPr>
+              <a:t>Decay rate </a:t>
+            </a:r>
+            <a:r>
+              <a:rPr lang="en-HK" dirty="0" smtClean="0">
+                <a:latin typeface="Times New Roman" panose="02020603050405020304" pitchFamily="18" charset="0"/>
+                <a:cs typeface="Times New Roman" panose="02020603050405020304" pitchFamily="18" charset="0"/>
+              </a:rPr>
+              <a:t>of reactants by EUV </a:t>
             </a:r>
             <a:r>
               <a:rPr lang="en-HK" dirty="0">
@@ -16913,7 +17419,12 @@
             <p:ph idx="1"/>
           </p:nvPr>
         </p:nvSpPr>
-        <p:spPr/>
+        <p:spPr>
+          <a:xfrm>
+            <a:off x="827584" y="2061511"/>
+            <a:ext cx="7200900" cy="2984500"/>
+          </a:xfrm>
+        </p:spPr>
         <p:txBody>
           <a:bodyPr/>
           <a:lstStyle/>
@@ -16963,22 +17474,22 @@
                 <a:latin typeface="Times New Roman" panose="02020603050405020304" pitchFamily="18" charset="0"/>
                 <a:cs typeface="Times New Roman" panose="02020603050405020304" pitchFamily="18" charset="0"/>
               </a:rPr>
-              <a:t> + C </a:t>
+              <a:t> + </a:t>
             </a:r>
             <a:r>
               <a:rPr lang="en-HK" sz="2000" dirty="0" smtClean="0">
-                <a:latin typeface="Times New Roman" panose="02020603050405020304" pitchFamily="18" charset="0"/>
-                <a:cs typeface="Times New Roman" panose="02020603050405020304" pitchFamily="18" charset="0"/>
-              </a:rPr>
-              <a:t>(first order decay</a:t>
-            </a:r>
-            <a:r>
-              <a:rPr lang="en-HK" sz="2000" dirty="0" smtClean="0">
-                <a:latin typeface="Times New Roman" panose="02020603050405020304" pitchFamily="18" charset="0"/>
-                <a:cs typeface="Times New Roman" panose="02020603050405020304" pitchFamily="18" charset="0"/>
-              </a:rPr>
-              <a:t>)</a:t>
-            </a:r>
+                <a:solidFill>
+                  <a:srgbClr val="0070C0"/>
+                </a:solidFill>
+                <a:latin typeface="Times New Roman" panose="02020603050405020304" pitchFamily="18" charset="0"/>
+                <a:cs typeface="Times New Roman" panose="02020603050405020304" pitchFamily="18" charset="0"/>
+              </a:rPr>
+              <a:t>C</a:t>
+            </a:r>
+            <a:endParaRPr lang="en-HK" sz="2000" dirty="0" smtClean="0">
+              <a:latin typeface="Times New Roman" panose="02020603050405020304" pitchFamily="18" charset="0"/>
+              <a:cs typeface="Times New Roman" panose="02020603050405020304" pitchFamily="18" charset="0"/>
+            </a:endParaRPr>
           </a:p>
         </p:txBody>
       </p:sp>
@@ -17014,14 +17525,14 @@
           <p:nvPr>
             <p:extLst>
               <p:ext uri="{D42A27DB-BD31-4B8C-83A1-F6EECF244321}">
-                <p14:modId xmlns:p14="http://schemas.microsoft.com/office/powerpoint/2010/main" val="3133024490"/>
+                <p14:modId xmlns:p14="http://schemas.microsoft.com/office/powerpoint/2010/main" val="2100975348"/>
               </p:ext>
             </p:extLst>
           </p:nvPr>
         </p:nvGraphicFramePr>
         <p:xfrm>
           <a:off x="683568" y="2650270"/>
-          <a:ext cx="4320481" cy="2717911"/>
+          <a:ext cx="4320481" cy="2683405"/>
         </p:xfrm>
         <a:graphic>
           <a:graphicData uri="http://schemas.openxmlformats.org/drawingml/2006/table">
@@ -17030,7 +17541,7 @@
                 <a:tableStyleId>{5C22544A-7EE6-4342-B048-85BDC9FD1C3A}</a:tableStyleId>
               </a:tblPr>
               <a:tblGrid>
-                <a:gridCol w="1008112">
+                <a:gridCol w="1152128">
                   <a:extLst>
                     <a:ext uri="{9D8B030D-6E8A-4147-A177-3AD203B41FA5}">
                       <a16:colId xmlns:a16="http://schemas.microsoft.com/office/drawing/2014/main" val="2835078529"/>
@@ -17044,21 +17555,21 @@
                     </a:ext>
                   </a:extLst>
                 </a:gridCol>
-                <a:gridCol w="776715">
+                <a:gridCol w="792088">
                   <a:extLst>
                     <a:ext uri="{9D8B030D-6E8A-4147-A177-3AD203B41FA5}">
                       <a16:colId xmlns:a16="http://schemas.microsoft.com/office/drawing/2014/main" val="1210125572"/>
                     </a:ext>
                   </a:extLst>
                 </a:gridCol>
-                <a:gridCol w="867060">
+                <a:gridCol w="720080">
                   <a:extLst>
                     <a:ext uri="{9D8B030D-6E8A-4147-A177-3AD203B41FA5}">
                       <a16:colId xmlns:a16="http://schemas.microsoft.com/office/drawing/2014/main" val="1324622419"/>
                     </a:ext>
                   </a:extLst>
                 </a:gridCol>
-                <a:gridCol w="876506">
+                <a:gridCol w="864097">
                   <a:extLst>
                     <a:ext uri="{9D8B030D-6E8A-4147-A177-3AD203B41FA5}">
                       <a16:colId xmlns:a16="http://schemas.microsoft.com/office/drawing/2014/main" val="2108499636"/>
@@ -17341,15 +17852,7 @@
                           <a:latin typeface="Times New Roman" panose="02020603050405020304" pitchFamily="18" charset="0"/>
                           <a:cs typeface="Times New Roman" panose="02020603050405020304" pitchFamily="18" charset="0"/>
                         </a:rPr>
-                        <a:t>(</a:t>
-                      </a:r>
-                      <a:r>
-                        <a:rPr lang="en-US" sz="1400" u="none" strike="noStrike" dirty="0" smtClean="0">
-                          <a:effectLst/>
-                          <a:latin typeface="Times New Roman" panose="02020603050405020304" pitchFamily="18" charset="0"/>
-                          <a:cs typeface="Times New Roman" panose="02020603050405020304" pitchFamily="18" charset="0"/>
-                        </a:rPr>
-                        <a:t>photons</a:t>
+                        <a:t>(photons</a:t>
                       </a:r>
                       <a:r>
                         <a:rPr lang="en-US" sz="1400" u="none" strike="noStrike" baseline="30000" dirty="0" smtClean="0">
@@ -18247,28 +18750,56 @@
                 <a:latin typeface="Times New Roman" panose="02020603050405020304" pitchFamily="18" charset="0"/>
                 <a:cs typeface="Times New Roman" panose="02020603050405020304" pitchFamily="18" charset="0"/>
               </a:rPr>
-              <a:t>3. CN</a:t>
-            </a:r>
-            <a:r>
-              <a:rPr lang="en-HK" baseline="30000" dirty="0" smtClean="0">
+              <a:t>3. </a:t>
+            </a:r>
+            <a:r>
+              <a:rPr lang="en-HK" dirty="0" smtClean="0">
+                <a:latin typeface="Times New Roman" panose="02020603050405020304" pitchFamily="18" charset="0"/>
+                <a:cs typeface="Times New Roman" panose="02020603050405020304" pitchFamily="18" charset="0"/>
+              </a:rPr>
+              <a:t>Formation rate </a:t>
+            </a:r>
+            <a:r>
+              <a:rPr lang="en-HK" dirty="0">
+                <a:latin typeface="Times New Roman" panose="02020603050405020304" pitchFamily="18" charset="0"/>
+                <a:cs typeface="Times New Roman" panose="02020603050405020304" pitchFamily="18" charset="0"/>
+              </a:rPr>
+              <a:t>of </a:t>
+            </a:r>
+            <a:r>
+              <a:rPr lang="en-HK" dirty="0">
+                <a:latin typeface="Times New Roman" panose="02020603050405020304" pitchFamily="18" charset="0"/>
+                <a:cs typeface="Times New Roman" panose="02020603050405020304" pitchFamily="18" charset="0"/>
+              </a:rPr>
+              <a:t>CN</a:t>
+            </a:r>
+            <a:r>
+              <a:rPr lang="en-HK" baseline="30000" dirty="0">
                 <a:latin typeface="Times New Roman" panose="02020603050405020304" pitchFamily="18" charset="0"/>
                 <a:cs typeface="Times New Roman" panose="02020603050405020304" pitchFamily="18" charset="0"/>
               </a:rPr>
               <a:t>-</a:t>
             </a:r>
             <a:r>
+              <a:rPr lang="en-HK" dirty="0">
+                <a:latin typeface="Times New Roman" panose="02020603050405020304" pitchFamily="18" charset="0"/>
+                <a:cs typeface="Times New Roman" panose="02020603050405020304" pitchFamily="18" charset="0"/>
+              </a:rPr>
+              <a:t> </a:t>
+            </a:r>
+            <a:r>
               <a:rPr lang="en-HK" dirty="0" smtClean="0">
                 <a:latin typeface="Times New Roman" panose="02020603050405020304" pitchFamily="18" charset="0"/>
                 <a:cs typeface="Times New Roman" panose="02020603050405020304" pitchFamily="18" charset="0"/>
               </a:rPr>
-              <a:t> </a:t>
+              <a:t>by EUV </a:t>
             </a:r>
             <a:r>
               <a:rPr lang="en-HK" dirty="0">
                 <a:latin typeface="Times New Roman" panose="02020603050405020304" pitchFamily="18" charset="0"/>
                 <a:cs typeface="Times New Roman" panose="02020603050405020304" pitchFamily="18" charset="0"/>
               </a:rPr>
-              <a:t>formation efficiency of EUV (40.1 eV) and VUV (9.27 eV)</a:t>
+              <a:t>(40.1 eV) and VUV (9.27 eV)</a:t>
             </a:r>
             <a:endParaRPr lang="en-US" dirty="0">
               <a:latin typeface="Times New Roman" panose="02020603050405020304" pitchFamily="18" charset="0"/>
@@ -18310,7 +18841,7 @@
             <p:ph idx="1"/>
             <p:extLst>
               <p:ext uri="{D42A27DB-BD31-4B8C-83A1-F6EECF244321}">
-                <p14:modId xmlns:p14="http://schemas.microsoft.com/office/powerpoint/2010/main" val="607023026"/>
+                <p14:modId xmlns:p14="http://schemas.microsoft.com/office/powerpoint/2010/main" val="2365638933"/>
               </p:ext>
             </p:extLst>
           </p:nvPr>
@@ -18356,12 +18887,67 @@
                     <a:p>
                       <a:pPr algn="ctr" rtl="0" fontAlgn="ctr"/>
                       <a:r>
+                        <a:rPr lang="en-US" sz="1400" u="none" strike="noStrike" dirty="0" smtClean="0">
+                          <a:solidFill>
+                            <a:srgbClr val="0070C0"/>
+                          </a:solidFill>
+                          <a:effectLst/>
+                          <a:latin typeface="Times New Roman" panose="02020603050405020304" pitchFamily="18" charset="0"/>
+                          <a:cs typeface="Times New Roman" panose="02020603050405020304" pitchFamily="18" charset="0"/>
+                        </a:rPr>
+                        <a:t>CN</a:t>
+                      </a:r>
+                      <a:r>
+                        <a:rPr lang="en-US" sz="1400" u="none" strike="noStrike" baseline="30000" dirty="0" smtClean="0">
+                          <a:solidFill>
+                            <a:srgbClr val="0070C0"/>
+                          </a:solidFill>
+                          <a:effectLst/>
+                          <a:latin typeface="Times New Roman" panose="02020603050405020304" pitchFamily="18" charset="0"/>
+                          <a:cs typeface="Times New Roman" panose="02020603050405020304" pitchFamily="18" charset="0"/>
+                        </a:rPr>
+                        <a:t>-</a:t>
+                      </a:r>
+                      <a:r>
+                        <a:rPr lang="en-US" sz="1400" u="none" strike="noStrike" dirty="0" smtClean="0">
+                          <a:solidFill>
+                            <a:srgbClr val="0070C0"/>
+                          </a:solidFill>
+                          <a:effectLst/>
+                          <a:latin typeface="Times New Roman" panose="02020603050405020304" pitchFamily="18" charset="0"/>
+                          <a:cs typeface="Times New Roman" panose="02020603050405020304" pitchFamily="18" charset="0"/>
+                        </a:rPr>
+                        <a:t> production</a:t>
+                      </a:r>
+                      <a:r>
+                        <a:rPr lang="en-US" sz="1400" u="none" strike="noStrike" baseline="0" dirty="0" smtClean="0">
+                          <a:solidFill>
+                            <a:srgbClr val="0070C0"/>
+                          </a:solidFill>
+                          <a:effectLst/>
+                          <a:latin typeface="Times New Roman" panose="02020603050405020304" pitchFamily="18" charset="0"/>
+                          <a:cs typeface="Times New Roman" panose="02020603050405020304" pitchFamily="18" charset="0"/>
+                        </a:rPr>
+                        <a:t> rate </a:t>
+                      </a:r>
+                    </a:p>
+                    <a:p>
+                      <a:pPr algn="ctr" rtl="0" fontAlgn="ctr"/>
+                      <a:r>
+                        <a:rPr lang="en-US" sz="1400" u="none" strike="noStrike" dirty="0" smtClean="0">
+                          <a:effectLst/>
+                          <a:latin typeface="Times New Roman" panose="02020603050405020304" pitchFamily="18" charset="0"/>
+                          <a:cs typeface="Times New Roman" panose="02020603050405020304" pitchFamily="18" charset="0"/>
+                        </a:rPr>
+                        <a:t>k </a:t>
+                      </a:r>
+                      <a:r>
                         <a:rPr lang="en-US" sz="1400" u="none" strike="noStrike" dirty="0">
                           <a:effectLst/>
                           <a:latin typeface="Times New Roman" panose="02020603050405020304" pitchFamily="18" charset="0"/>
                           <a:cs typeface="Times New Roman" panose="02020603050405020304" pitchFamily="18" charset="0"/>
                         </a:rPr>
-                        <a:t>k (photon </a:t>
+                        <a:t>(photon </a:t>
                       </a:r>
                       <a:r>
                         <a:rPr lang="en-US" sz="1400" u="none" strike="noStrike" baseline="30000" dirty="0">
@@ -18654,14 +19240,14 @@
                     <a:p>
                       <a:pPr algn="ctr" rtl="0" fontAlgn="ctr"/>
                       <a:r>
-                        <a:rPr lang="en-US" sz="1400" u="none" strike="noStrike">
+                        <a:rPr lang="en-US" sz="1400" u="none" strike="noStrike" dirty="0">
                           <a:effectLst/>
                           <a:latin typeface="Times New Roman" panose="02020603050405020304" pitchFamily="18" charset="0"/>
                           <a:cs typeface="Times New Roman" panose="02020603050405020304" pitchFamily="18" charset="0"/>
                         </a:rPr>
                         <a:t>8.21±0.70</a:t>
                       </a:r>
-                      <a:endParaRPr lang="en-US" sz="1400" b="0" i="0" u="none" strike="noStrike">
+                      <a:endParaRPr lang="en-US" sz="1400" b="0" i="0" u="none" strike="noStrike" dirty="0">
                         <a:solidFill>
                           <a:srgbClr val="000000"/>
                         </a:solidFill>
@@ -18713,14 +19299,14 @@
                     <a:p>
                       <a:pPr algn="ctr" rtl="0" fontAlgn="ctr"/>
                       <a:r>
-                        <a:rPr lang="en-US" sz="1400" u="none" strike="noStrike">
+                        <a:rPr lang="en-US" sz="1400" u="none" strike="noStrike" dirty="0">
                           <a:effectLst/>
                           <a:latin typeface="Times New Roman" panose="02020603050405020304" pitchFamily="18" charset="0"/>
                           <a:cs typeface="Times New Roman" panose="02020603050405020304" pitchFamily="18" charset="0"/>
                         </a:rPr>
                         <a:t>EUV (30.4nm)</a:t>
                       </a:r>
-                      <a:endParaRPr lang="en-US" sz="1400" b="0" i="0" u="none" strike="noStrike">
+                      <a:endParaRPr lang="en-US" sz="1400" b="0" i="0" u="none" strike="noStrike" dirty="0">
                         <a:solidFill>
                           <a:srgbClr val="000000"/>
                         </a:solidFill>
@@ -18739,14 +19325,14 @@
                     <a:p>
                       <a:pPr algn="ctr" rtl="0" fontAlgn="ctr"/>
                       <a:r>
-                        <a:rPr lang="en-US" sz="1400" u="none" strike="noStrike">
+                        <a:rPr lang="en-US" sz="1400" u="none" strike="noStrike" dirty="0">
                           <a:effectLst/>
                           <a:latin typeface="Times New Roman" panose="02020603050405020304" pitchFamily="18" charset="0"/>
                           <a:cs typeface="Times New Roman" panose="02020603050405020304" pitchFamily="18" charset="0"/>
                         </a:rPr>
                         <a:t>1.92±1.99</a:t>
                       </a:r>
-                      <a:endParaRPr lang="en-US" sz="1400" b="0" i="0" u="none" strike="noStrike">
+                      <a:endParaRPr lang="en-US" sz="1400" b="0" i="0" u="none" strike="noStrike" dirty="0">
                         <a:solidFill>
                           <a:srgbClr val="000000"/>
                         </a:solidFill>
@@ -18798,7 +19384,7 @@
                     <a:p>
                       <a:pPr algn="ctr" rtl="0" fontAlgn="ctr"/>
                       <a:r>
-                        <a:rPr lang="en-US" sz="1400" u="none" strike="noStrike" dirty="0">
+                        <a:rPr lang="en-US" sz="1400" u="none" strike="noStrike" baseline="0" dirty="0" smtClean="0">
                           <a:solidFill>
                             <a:srgbClr val="0070C0"/>
                           </a:solidFill>
@@ -18806,29 +19392,7 @@
                           <a:latin typeface="Times New Roman" panose="02020603050405020304" pitchFamily="18" charset="0"/>
                           <a:cs typeface="Times New Roman" panose="02020603050405020304" pitchFamily="18" charset="0"/>
                         </a:rPr>
-                        <a:t>CN</a:t>
-                      </a:r>
-                      <a:r>
-                        <a:rPr lang="en-US" sz="1400" u="none" strike="noStrike" baseline="30000" dirty="0">
-                          <a:solidFill>
-                            <a:srgbClr val="0070C0"/>
-                          </a:solidFill>
-                          <a:effectLst/>
-                          <a:latin typeface="Times New Roman" panose="02020603050405020304" pitchFamily="18" charset="0"/>
-                          <a:cs typeface="Times New Roman" panose="02020603050405020304" pitchFamily="18" charset="0"/>
-                        </a:rPr>
-                        <a:t>-</a:t>
-                      </a:r>
-                      <a:r>
-                        <a:rPr lang="en-US" sz="1400" u="none" strike="noStrike" dirty="0">
-                          <a:solidFill>
-                            <a:srgbClr val="0070C0"/>
-                          </a:solidFill>
-                          <a:effectLst/>
-                          <a:latin typeface="Times New Roman" panose="02020603050405020304" pitchFamily="18" charset="0"/>
-                          <a:cs typeface="Times New Roman" panose="02020603050405020304" pitchFamily="18" charset="0"/>
-                        </a:rPr>
-                        <a:t> production ratio</a:t>
+                        <a:t>Ratio of k (VUV/EUV)</a:t>
                       </a:r>
                       <a:endParaRPr lang="en-US" sz="1400" b="0" i="0" u="none" strike="noStrike" dirty="0">
                         <a:solidFill>
@@ -19307,7 +19871,7 @@
           <a:graphicData uri="http://schemas.openxmlformats.org/presentationml/2006/ole">
             <mc:AlternateContent xmlns:mc="http://schemas.openxmlformats.org/markup-compatibility/2006">
               <mc:Choice xmlns:v="urn:schemas-microsoft-com:vml" Requires="v">
-                <p:oleObj spid="_x0000_s3867" name="Graph" r:id="rId3" imgW="4754880" imgH="3108960" progId="Origin50.Graph">
+                <p:oleObj spid="_x0000_s3885" name="Graph" r:id="rId3" imgW="4754880" imgH="3108960" progId="Origin50.Graph">
                   <p:embed/>
                 </p:oleObj>
               </mc:Choice>
@@ -20924,7 +21488,7 @@
           <a:graphicData uri="http://schemas.openxmlformats.org/presentationml/2006/ole">
             <mc:AlternateContent xmlns:mc="http://schemas.openxmlformats.org/markup-compatibility/2006">
               <mc:Choice xmlns:v="urn:schemas-microsoft-com:vml" Requires="v">
-                <p:oleObj spid="_x0000_s2975" name="Graph" r:id="rId3" imgW="4754880" imgH="3108960" progId="Origin50.Graph">
+                <p:oleObj spid="_x0000_s2993" name="Graph" r:id="rId3" imgW="4754880" imgH="3108960" progId="Origin50.Graph">
                   <p:embed/>
                 </p:oleObj>
               </mc:Choice>
@@ -21500,7 +22064,7 @@
           <a:graphicData uri="http://schemas.openxmlformats.org/presentationml/2006/ole">
             <mc:AlternateContent xmlns:mc="http://schemas.openxmlformats.org/markup-compatibility/2006">
               <mc:Choice xmlns:v="urn:schemas-microsoft-com:vml" Requires="v">
-                <p:oleObj spid="_x0000_s5860" name="Graph" r:id="rId3" imgW="4754880" imgH="3108960" progId="Origin50.Graph">
+                <p:oleObj spid="_x0000_s5878" name="Graph" r:id="rId3" imgW="4754880" imgH="3108960" progId="Origin50.Graph">
                   <p:embed/>
                 </p:oleObj>
               </mc:Choice>
@@ -22271,7 +22835,7 @@
           <a:graphicData uri="http://schemas.openxmlformats.org/presentationml/2006/ole">
             <mc:AlternateContent xmlns:mc="http://schemas.openxmlformats.org/markup-compatibility/2006">
               <mc:Choice xmlns:v="urn:schemas-microsoft-com:vml" Requires="v">
-                <p:oleObj spid="_x0000_s12714" name="Graph" r:id="rId3" imgW="4754880" imgH="3108960" progId="Origin50.Graph">
+                <p:oleObj spid="_x0000_s12732" name="Graph" r:id="rId3" imgW="4754880" imgH="3108960" progId="Origin50.Graph">
                   <p:embed/>
                 </p:oleObj>
               </mc:Choice>

</xml_diff>

<commit_message>
added page 27 combined results
</commit_message>
<xml_diff>
--- a/doc/VUV and EUV irradiation of CH4 + NH3.pptx
+++ b/doc/VUV and EUV irradiation of CH4 + NH3.pptx
@@ -5,10 +5,10 @@
     <p:sldMasterId id="2147483845" r:id="rId1"/>
   </p:sldMasterIdLst>
   <p:notesMasterIdLst>
-    <p:notesMasterId r:id="rId35"/>
+    <p:notesMasterId r:id="rId36"/>
   </p:notesMasterIdLst>
   <p:handoutMasterIdLst>
-    <p:handoutMasterId r:id="rId36"/>
+    <p:handoutMasterId r:id="rId37"/>
   </p:handoutMasterIdLst>
   <p:sldIdLst>
     <p:sldId id="256" r:id="rId2"/>
@@ -37,13 +37,14 @@
     <p:sldId id="282" r:id="rId25"/>
     <p:sldId id="280" r:id="rId26"/>
     <p:sldId id="267" r:id="rId27"/>
-    <p:sldId id="288" r:id="rId28"/>
-    <p:sldId id="274" r:id="rId29"/>
-    <p:sldId id="271" r:id="rId30"/>
-    <p:sldId id="275" r:id="rId31"/>
-    <p:sldId id="298" r:id="rId32"/>
-    <p:sldId id="299" r:id="rId33"/>
-    <p:sldId id="302" r:id="rId34"/>
+    <p:sldId id="303" r:id="rId28"/>
+    <p:sldId id="288" r:id="rId29"/>
+    <p:sldId id="274" r:id="rId30"/>
+    <p:sldId id="271" r:id="rId31"/>
+    <p:sldId id="275" r:id="rId32"/>
+    <p:sldId id="298" r:id="rId33"/>
+    <p:sldId id="299" r:id="rId34"/>
+    <p:sldId id="302" r:id="rId35"/>
   </p:sldIdLst>
   <p:sldSz cx="9144000" cy="5715000" type="screen16x10"/>
   <p:notesSz cx="6858000" cy="9144000"/>
@@ -11866,7 +11867,7 @@
           <a:graphicData uri="http://schemas.openxmlformats.org/presentationml/2006/ole">
             <mc:AlternateContent xmlns:mc="http://schemas.openxmlformats.org/markup-compatibility/2006">
               <mc:Choice xmlns:v="urn:schemas-microsoft-com:vml" Requires="v">
-                <p:oleObj spid="_x0000_s10779" name="Graph" r:id="rId5" imgW="4754880" imgH="3108960" progId="Origin50.Graph">
+                <p:oleObj spid="_x0000_s10789" name="Graph" r:id="rId5" imgW="4754880" imgH="3108960" progId="Origin50.Graph">
                   <p:embed/>
                 </p:oleObj>
               </mc:Choice>
@@ -17226,7 +17227,7 @@
           <a:graphicData uri="http://schemas.openxmlformats.org/presentationml/2006/ole">
             <mc:AlternateContent xmlns:mc="http://schemas.openxmlformats.org/markup-compatibility/2006">
               <mc:Choice xmlns:v="urn:schemas-microsoft-com:vml" Requires="v">
-                <p:oleObj spid="_x0000_s2046" name="Graph" r:id="rId3" imgW="4754880" imgH="3108960" progId="Origin50.Graph">
+                <p:oleObj spid="_x0000_s14344" name="Graph" r:id="rId3" imgW="4754880" imgH="3108960" progId="Origin50.Graph">
                   <p:embed/>
                 </p:oleObj>
               </mc:Choice>
@@ -18648,7 +18649,7 @@
           <a:graphicData uri="http://schemas.openxmlformats.org/presentationml/2006/ole">
             <mc:AlternateContent xmlns:mc="http://schemas.openxmlformats.org/markup-compatibility/2006">
               <mc:Choice xmlns:v="urn:schemas-microsoft-com:vml" Requires="v">
-                <p:oleObj spid="_x0000_s13324" name="Graph" r:id="rId3" imgW="4754880" imgH="3108960" progId="Origin50.Graph">
+                <p:oleObj spid="_x0000_s13344" name="Graph" r:id="rId3" imgW="4754880" imgH="3108960" progId="Origin50.Graph">
                   <p:embed/>
                 </p:oleObj>
               </mc:Choice>
@@ -18705,7 +18706,7 @@
           <a:graphicData uri="http://schemas.openxmlformats.org/presentationml/2006/ole">
             <mc:AlternateContent xmlns:mc="http://schemas.openxmlformats.org/markup-compatibility/2006">
               <mc:Choice xmlns:v="urn:schemas-microsoft-com:vml" Requires="v">
-                <p:oleObj spid="_x0000_s13325" name="Graph" r:id="rId5" imgW="4754880" imgH="3108960" progId="Origin50.Graph">
+                <p:oleObj spid="_x0000_s13345" name="Graph" r:id="rId5" imgW="4754880" imgH="3108960" progId="Origin50.Graph">
                   <p:embed/>
                 </p:oleObj>
               </mc:Choice>
@@ -18874,14 +18875,14 @@
             <p:ph idx="1"/>
             <p:extLst>
               <p:ext uri="{D42A27DB-BD31-4B8C-83A1-F6EECF244321}">
-                <p14:modId xmlns:p14="http://schemas.microsoft.com/office/powerpoint/2010/main" val="1287255676"/>
+                <p14:modId xmlns:p14="http://schemas.microsoft.com/office/powerpoint/2010/main" val="1166949282"/>
               </p:ext>
             </p:extLst>
           </p:nvPr>
         </p:nvGraphicFramePr>
         <p:xfrm>
           <a:off x="569727" y="2076018"/>
-          <a:ext cx="3969871" cy="2852052"/>
+          <a:ext cx="3969871" cy="2509674"/>
         </p:xfrm>
         <a:graphic>
           <a:graphicData uri="http://schemas.openxmlformats.org/drawingml/2006/table">
@@ -18912,7 +18913,7 @@
                   </a:extLst>
                 </a:gridCol>
               </a:tblGrid>
-              <a:tr h="533666">
+              <a:tr h="750441">
                 <a:tc>
                   <a:txBody>
                     <a:bodyPr/>
@@ -19239,7 +19240,7 @@
                   </a:ext>
                 </a:extLst>
               </a:tr>
-              <a:tr h="358694">
+              <a:tr h="504396">
                 <a:tc>
                   <a:txBody>
                     <a:bodyPr/>
@@ -19324,7 +19325,7 @@
                   </a:ext>
                 </a:extLst>
               </a:tr>
-              <a:tr h="358694">
+              <a:tr h="504396">
                 <a:tc>
                   <a:txBody>
                     <a:bodyPr/>
@@ -19409,7 +19410,7 @@
                   </a:ext>
                 </a:extLst>
               </a:tr>
-              <a:tr h="533666">
+              <a:tr h="750441">
                 <a:tc>
                   <a:txBody>
                     <a:bodyPr/>
@@ -19436,10 +19437,32 @@
                           <a:latin typeface="Times New Roman" panose="02020603050405020304" pitchFamily="18" charset="0"/>
                           <a:cs typeface="Times New Roman" panose="02020603050405020304" pitchFamily="18" charset="0"/>
                         </a:rPr>
-                        <a:t>VUV to EUV</a:t>
+                        <a:t>VUV to EUV)</a:t>
                       </a:r>
                       <a:r>
-                        <a:rPr lang="en-US" sz="1400" u="none" strike="noStrike" baseline="0" dirty="0" smtClean="0">
+                        <a:rPr lang="en-US" sz="1400" u="none" strike="noStrike" dirty="0" smtClean="0">
+                          <a:solidFill>
+                            <a:srgbClr val="0070C0"/>
+                          </a:solidFill>
+                          <a:effectLst/>
+                          <a:latin typeface="Times New Roman" panose="02020603050405020304" pitchFamily="18" charset="0"/>
+                          <a:cs typeface="Times New Roman" panose="02020603050405020304" pitchFamily="18" charset="0"/>
+                        </a:rPr>
+                        <a:t> (CN</a:t>
+                      </a:r>
+                      <a:r>
+                        <a:rPr lang="en-US" sz="1400" u="none" strike="noStrike" baseline="30000" dirty="0" smtClean="0">
+                          <a:solidFill>
+                            <a:srgbClr val="0070C0"/>
+                          </a:solidFill>
+                          <a:effectLst/>
+                          <a:latin typeface="Times New Roman" panose="02020603050405020304" pitchFamily="18" charset="0"/>
+                          <a:cs typeface="Times New Roman" panose="02020603050405020304" pitchFamily="18" charset="0"/>
+                        </a:rPr>
+                        <a:t>-</a:t>
+                      </a:r>
+                      <a:r>
+                        <a:rPr lang="en-US" sz="1400" u="none" strike="noStrike" dirty="0" smtClean="0">
                           <a:solidFill>
                             <a:srgbClr val="0070C0"/>
                           </a:solidFill>
@@ -19546,360 +19569,6 @@
                   </a:ext>
                 </a:extLst>
               </a:tr>
-              <a:tr h="533666">
-                <a:tc>
-                  <a:txBody>
-                    <a:bodyPr/>
-                    <a:lstStyle/>
-                    <a:p>
-                      <a:pPr algn="ctr" rtl="0" fontAlgn="ctr"/>
-                      <a:r>
-                        <a:rPr lang="en-US" sz="1400" u="none" strike="noStrike" dirty="0" smtClean="0">
-                          <a:solidFill>
-                            <a:srgbClr val="FF0000"/>
-                          </a:solidFill>
-                          <a:effectLst/>
-                          <a:latin typeface="Times New Roman" panose="02020603050405020304" pitchFamily="18" charset="0"/>
-                          <a:cs typeface="Times New Roman" panose="02020603050405020304" pitchFamily="18" charset="0"/>
-                        </a:rPr>
-                        <a:t>Destruction cross-section ratio (CH</a:t>
-                      </a:r>
-                      <a:r>
-                        <a:rPr lang="en-US" sz="1400" u="none" strike="noStrike" baseline="-25000" dirty="0" smtClean="0">
-                          <a:solidFill>
-                            <a:srgbClr val="FF0000"/>
-                          </a:solidFill>
-                          <a:effectLst/>
-                          <a:latin typeface="Times New Roman" panose="02020603050405020304" pitchFamily="18" charset="0"/>
-                          <a:cs typeface="Times New Roman" panose="02020603050405020304" pitchFamily="18" charset="0"/>
-                        </a:rPr>
-                        <a:t>4</a:t>
-                      </a:r>
-                      <a:r>
-                        <a:rPr lang="en-US" sz="1400" u="none" strike="noStrike" dirty="0" smtClean="0">
-                          <a:solidFill>
-                            <a:srgbClr val="FF0000"/>
-                          </a:solidFill>
-                          <a:effectLst/>
-                          <a:latin typeface="Times New Roman" panose="02020603050405020304" pitchFamily="18" charset="0"/>
-                          <a:cs typeface="Times New Roman" panose="02020603050405020304" pitchFamily="18" charset="0"/>
-                        </a:rPr>
-                        <a:t>)</a:t>
-                      </a:r>
-                      <a:endParaRPr lang="en-US" sz="1400" b="0" i="0" u="none" strike="noStrike" dirty="0">
-                        <a:solidFill>
-                          <a:srgbClr val="0070C0"/>
-                        </a:solidFill>
-                        <a:effectLst/>
-                        <a:latin typeface="Times New Roman" panose="02020603050405020304" pitchFamily="18" charset="0"/>
-                        <a:cs typeface="Times New Roman" panose="02020603050405020304" pitchFamily="18" charset="0"/>
-                      </a:endParaRPr>
-                    </a:p>
-                  </a:txBody>
-                  <a:tcPr marL="6830" marR="6830" marT="6830" marB="0" anchor="ctr">
-                    <a:solidFill>
-                      <a:schemeClr val="accent3">
-                        <a:lumMod val="40000"/>
-                        <a:lumOff val="60000"/>
-                      </a:schemeClr>
-                    </a:solidFill>
-                  </a:tcPr>
-                </a:tc>
-                <a:tc>
-                  <a:txBody>
-                    <a:bodyPr/>
-                    <a:lstStyle/>
-                    <a:p>
-                      <a:pPr marL="0" marR="0" indent="0" algn="ctr" defTabSz="685800" rtl="0" eaLnBrk="1" fontAlgn="ctr" latinLnBrk="0" hangingPunct="1">
-                        <a:lnSpc>
-                          <a:spcPct val="100000"/>
-                        </a:lnSpc>
-                        <a:spcBef>
-                          <a:spcPts val="0"/>
-                        </a:spcBef>
-                        <a:spcAft>
-                          <a:spcPts val="0"/>
-                        </a:spcAft>
-                        <a:buClrTx/>
-                        <a:buSzTx/>
-                        <a:buFontTx/>
-                        <a:buNone/>
-                        <a:tabLst/>
-                        <a:defRPr/>
-                      </a:pPr>
-                      <a:r>
-                        <a:rPr lang="en-US" sz="1400" u="none" strike="noStrike" dirty="0" smtClean="0">
-                          <a:solidFill>
-                            <a:srgbClr val="FF0000"/>
-                          </a:solidFill>
-                          <a:effectLst/>
-                          <a:latin typeface="Times New Roman" panose="02020603050405020304" pitchFamily="18" charset="0"/>
-                          <a:cs typeface="Times New Roman" panose="02020603050405020304" pitchFamily="18" charset="0"/>
-                        </a:rPr>
-                        <a:t>6.06±0.07</a:t>
-                      </a:r>
-                      <a:endParaRPr lang="en-US" sz="1400" b="0" i="0" u="none" strike="noStrike" dirty="0" smtClean="0">
-                        <a:solidFill>
-                          <a:srgbClr val="FF0000"/>
-                        </a:solidFill>
-                        <a:effectLst/>
-                        <a:latin typeface="Times New Roman" panose="02020603050405020304" pitchFamily="18" charset="0"/>
-                        <a:cs typeface="Times New Roman" panose="02020603050405020304" pitchFamily="18" charset="0"/>
-                      </a:endParaRPr>
-                    </a:p>
-                  </a:txBody>
-                  <a:tcPr marL="6830" marR="6830" marT="6830" marB="0" anchor="ctr">
-                    <a:solidFill>
-                      <a:schemeClr val="accent3">
-                        <a:lumMod val="40000"/>
-                        <a:lumOff val="60000"/>
-                      </a:schemeClr>
-                    </a:solidFill>
-                  </a:tcPr>
-                </a:tc>
-                <a:tc>
-                  <a:txBody>
-                    <a:bodyPr/>
-                    <a:lstStyle/>
-                    <a:p>
-                      <a:pPr marL="0" marR="0" indent="0" algn="ctr" defTabSz="685800" rtl="0" eaLnBrk="1" fontAlgn="ctr" latinLnBrk="0" hangingPunct="1">
-                        <a:lnSpc>
-                          <a:spcPct val="100000"/>
-                        </a:lnSpc>
-                        <a:spcBef>
-                          <a:spcPts val="0"/>
-                        </a:spcBef>
-                        <a:spcAft>
-                          <a:spcPts val="0"/>
-                        </a:spcAft>
-                        <a:buClrTx/>
-                        <a:buSzTx/>
-                        <a:buFontTx/>
-                        <a:buNone/>
-                        <a:tabLst/>
-                        <a:defRPr/>
-                      </a:pPr>
-                      <a:r>
-                        <a:rPr lang="en-US" sz="1400" u="none" strike="noStrike" dirty="0" smtClean="0">
-                          <a:solidFill>
-                            <a:srgbClr val="FF0000"/>
-                          </a:solidFill>
-                          <a:effectLst/>
-                          <a:latin typeface="Times New Roman" panose="02020603050405020304" pitchFamily="18" charset="0"/>
-                          <a:cs typeface="Times New Roman" panose="02020603050405020304" pitchFamily="18" charset="0"/>
-                        </a:rPr>
-                        <a:t>5.52±0.07</a:t>
-                      </a:r>
-                      <a:endParaRPr lang="en-US" sz="1400" b="0" i="0" u="none" strike="noStrike" dirty="0" smtClean="0">
-                        <a:solidFill>
-                          <a:srgbClr val="FF0000"/>
-                        </a:solidFill>
-                        <a:effectLst/>
-                        <a:latin typeface="Times New Roman" panose="02020603050405020304" pitchFamily="18" charset="0"/>
-                        <a:cs typeface="Times New Roman" panose="02020603050405020304" pitchFamily="18" charset="0"/>
-                      </a:endParaRPr>
-                    </a:p>
-                  </a:txBody>
-                  <a:tcPr marL="6830" marR="6830" marT="6830" marB="0" anchor="ctr">
-                    <a:solidFill>
-                      <a:schemeClr val="accent3">
-                        <a:lumMod val="40000"/>
-                        <a:lumOff val="60000"/>
-                      </a:schemeClr>
-                    </a:solidFill>
-                  </a:tcPr>
-                </a:tc>
-                <a:extLst>
-                  <a:ext uri="{0D108BD9-81ED-4DB2-BD59-A6C34878D82A}">
-                    <a16:rowId xmlns:a16="http://schemas.microsoft.com/office/drawing/2014/main" val="3530938289"/>
-                  </a:ext>
-                </a:extLst>
-              </a:tr>
-              <a:tr h="533666">
-                <a:tc>
-                  <a:txBody>
-                    <a:bodyPr/>
-                    <a:lstStyle/>
-                    <a:p>
-                      <a:pPr marL="0" marR="0" indent="0" algn="ctr" defTabSz="685800" rtl="0" eaLnBrk="1" fontAlgn="ctr" latinLnBrk="0" hangingPunct="1">
-                        <a:lnSpc>
-                          <a:spcPct val="100000"/>
-                        </a:lnSpc>
-                        <a:spcBef>
-                          <a:spcPts val="0"/>
-                        </a:spcBef>
-                        <a:spcAft>
-                          <a:spcPts val="0"/>
-                        </a:spcAft>
-                        <a:buClrTx/>
-                        <a:buSzTx/>
-                        <a:buFontTx/>
-                        <a:buNone/>
-                        <a:tabLst/>
-                        <a:defRPr/>
-                      </a:pPr>
-                      <a:r>
-                        <a:rPr lang="en-US" sz="1400" u="none" strike="noStrike" dirty="0" smtClean="0">
-                          <a:solidFill>
-                            <a:schemeClr val="tx1"/>
-                          </a:solidFill>
-                          <a:effectLst/>
-                          <a:latin typeface="Times New Roman" panose="02020603050405020304" pitchFamily="18" charset="0"/>
-                          <a:cs typeface="Times New Roman" panose="02020603050405020304" pitchFamily="18" charset="0"/>
-                        </a:rPr>
-                        <a:t>Destruction cross-section ratio (NH</a:t>
-                      </a:r>
-                      <a:r>
-                        <a:rPr lang="en-US" sz="1400" u="none" strike="noStrike" baseline="-25000" dirty="0" smtClean="0">
-                          <a:solidFill>
-                            <a:schemeClr val="tx1"/>
-                          </a:solidFill>
-                          <a:effectLst/>
-                          <a:latin typeface="Times New Roman" panose="02020603050405020304" pitchFamily="18" charset="0"/>
-                          <a:cs typeface="Times New Roman" panose="02020603050405020304" pitchFamily="18" charset="0"/>
-                        </a:rPr>
-                        <a:t>3</a:t>
-                      </a:r>
-                      <a:r>
-                        <a:rPr lang="en-US" sz="1400" u="none" strike="noStrike" dirty="0" smtClean="0">
-                          <a:solidFill>
-                            <a:schemeClr val="tx1"/>
-                          </a:solidFill>
-                          <a:effectLst/>
-                          <a:latin typeface="Times New Roman" panose="02020603050405020304" pitchFamily="18" charset="0"/>
-                          <a:cs typeface="Times New Roman" panose="02020603050405020304" pitchFamily="18" charset="0"/>
-                        </a:rPr>
-                        <a:t>)</a:t>
-                      </a:r>
-                      <a:endParaRPr lang="en-US" sz="1400" b="0" i="0" u="none" strike="noStrike" dirty="0" smtClean="0">
-                        <a:solidFill>
-                          <a:schemeClr val="tx1"/>
-                        </a:solidFill>
-                        <a:effectLst/>
-                        <a:latin typeface="Times New Roman" panose="02020603050405020304" pitchFamily="18" charset="0"/>
-                        <a:cs typeface="Times New Roman" panose="02020603050405020304" pitchFamily="18" charset="0"/>
-                      </a:endParaRPr>
-                    </a:p>
-                  </a:txBody>
-                  <a:tcPr marL="6830" marR="6830" marT="6830" marB="0" anchor="ctr">
-                    <a:solidFill>
-                      <a:schemeClr val="accent3">
-                        <a:lumMod val="40000"/>
-                        <a:lumOff val="60000"/>
-                      </a:schemeClr>
-                    </a:solidFill>
-                  </a:tcPr>
-                </a:tc>
-                <a:tc>
-                  <a:txBody>
-                    <a:bodyPr/>
-                    <a:lstStyle/>
-                    <a:p>
-                      <a:pPr marL="0" marR="0" indent="0" algn="ctr" defTabSz="685800" rtl="0" eaLnBrk="1" fontAlgn="ctr" latinLnBrk="0" hangingPunct="1">
-                        <a:lnSpc>
-                          <a:spcPct val="100000"/>
-                        </a:lnSpc>
-                        <a:spcBef>
-                          <a:spcPts val="0"/>
-                        </a:spcBef>
-                        <a:spcAft>
-                          <a:spcPts val="0"/>
-                        </a:spcAft>
-                        <a:buClrTx/>
-                        <a:buSzTx/>
-                        <a:buFontTx/>
-                        <a:buNone/>
-                        <a:tabLst/>
-                        <a:defRPr/>
-                      </a:pPr>
-                      <a:r>
-                        <a:rPr lang="en-US" sz="1400" u="none" strike="noStrike" dirty="0" smtClean="0">
-                          <a:solidFill>
-                            <a:schemeClr val="tx1"/>
-                          </a:solidFill>
-                          <a:effectLst/>
-                          <a:latin typeface="Times New Roman" panose="02020603050405020304" pitchFamily="18" charset="0"/>
-                          <a:cs typeface="Times New Roman" panose="02020603050405020304" pitchFamily="18" charset="0"/>
-                        </a:rPr>
-                        <a:t>3.18±0.12</a:t>
-                      </a:r>
-                      <a:endParaRPr lang="en-US" sz="1400" b="0" i="0" u="none" strike="noStrike" dirty="0" smtClean="0">
-                        <a:solidFill>
-                          <a:schemeClr val="tx1"/>
-                        </a:solidFill>
-                        <a:effectLst/>
-                        <a:latin typeface="Times New Roman" panose="02020603050405020304" pitchFamily="18" charset="0"/>
-                        <a:cs typeface="Times New Roman" panose="02020603050405020304" pitchFamily="18" charset="0"/>
-                      </a:endParaRPr>
-                    </a:p>
-                  </a:txBody>
-                  <a:tcPr marL="6830" marR="6830" marT="6830" marB="0" anchor="ctr">
-                    <a:solidFill>
-                      <a:schemeClr val="accent3">
-                        <a:lumMod val="40000"/>
-                        <a:lumOff val="60000"/>
-                      </a:schemeClr>
-                    </a:solidFill>
-                  </a:tcPr>
-                </a:tc>
-                <a:tc>
-                  <a:txBody>
-                    <a:bodyPr/>
-                    <a:lstStyle/>
-                    <a:p>
-                      <a:pPr marL="0" marR="0" indent="0" algn="ctr" defTabSz="685800" rtl="0" eaLnBrk="1" fontAlgn="ctr" latinLnBrk="0" hangingPunct="1">
-                        <a:lnSpc>
-                          <a:spcPct val="100000"/>
-                        </a:lnSpc>
-                        <a:spcBef>
-                          <a:spcPts val="0"/>
-                        </a:spcBef>
-                        <a:spcAft>
-                          <a:spcPts val="0"/>
-                        </a:spcAft>
-                        <a:buClrTx/>
-                        <a:buSzTx/>
-                        <a:buFontTx/>
-                        <a:buNone/>
-                        <a:tabLst/>
-                        <a:defRPr/>
-                      </a:pPr>
-                      <a:r>
-                        <a:rPr lang="en-US" sz="1400" u="none" strike="noStrike" dirty="0" smtClean="0">
-                          <a:solidFill>
-                            <a:schemeClr val="tx1"/>
-                          </a:solidFill>
-                          <a:effectLst/>
-                          <a:latin typeface="Times New Roman" panose="02020603050405020304" pitchFamily="18" charset="0"/>
-                          <a:cs typeface="Times New Roman" panose="02020603050405020304" pitchFamily="18" charset="0"/>
-                        </a:rPr>
-                        <a:t>2.07±0.13</a:t>
-                      </a:r>
-                      <a:endParaRPr lang="en-US" sz="1400" b="0" i="0" u="none" strike="noStrike" dirty="0" smtClean="0">
-                        <a:solidFill>
-                          <a:schemeClr val="tx1"/>
-                        </a:solidFill>
-                        <a:effectLst/>
-                        <a:latin typeface="Times New Roman" panose="02020603050405020304" pitchFamily="18" charset="0"/>
-                        <a:cs typeface="Times New Roman" panose="02020603050405020304" pitchFamily="18" charset="0"/>
-                      </a:endParaRPr>
-                    </a:p>
-                  </a:txBody>
-                  <a:tcPr marL="6830" marR="6830" marT="6830" marB="0" anchor="ctr">
-                    <a:solidFill>
-                      <a:schemeClr val="accent3">
-                        <a:lumMod val="40000"/>
-                        <a:lumOff val="60000"/>
-                      </a:schemeClr>
-                    </a:solidFill>
-                  </a:tcPr>
-                </a:tc>
-                <a:extLst>
-                  <a:ext uri="{0D108BD9-81ED-4DB2-BD59-A6C34878D82A}">
-                    <a16:rowId xmlns:a16="http://schemas.microsoft.com/office/drawing/2014/main" val="64277223"/>
-                  </a:ext>
-                </a:extLst>
-              </a:tr>
             </a:tbl>
           </a:graphicData>
         </a:graphic>
@@ -19926,7 +19595,7 @@
           <a:graphicData uri="http://schemas.openxmlformats.org/presentationml/2006/ole">
             <mc:AlternateContent xmlns:mc="http://schemas.openxmlformats.org/markup-compatibility/2006">
               <mc:Choice xmlns:v="urn:schemas-microsoft-com:vml" Requires="v">
-                <p:oleObj spid="_x0000_s3899" name="Graph" r:id="rId3" imgW="4754880" imgH="3108960" progId="Origin50.Graph">
+                <p:oleObj spid="_x0000_s3909" name="Graph" r:id="rId3" imgW="4754880" imgH="3108960" progId="Origin50.Graph">
                   <p:embed/>
                 </p:oleObj>
               </mc:Choice>
@@ -20562,6 +20231,583 @@
             <p:ph type="title"/>
           </p:nvPr>
         </p:nvSpPr>
+        <p:spPr/>
+        <p:txBody>
+          <a:bodyPr/>
+          <a:lstStyle/>
+          <a:p>
+            <a:r>
+              <a:rPr lang="en-HK" dirty="0" smtClean="0"/>
+              <a:t>Combined results</a:t>
+            </a:r>
+            <a:endParaRPr lang="en-US" dirty="0"/>
+          </a:p>
+        </p:txBody>
+      </p:sp>
+      <p:graphicFrame>
+        <p:nvGraphicFramePr>
+          <p:cNvPr id="5" name="內容版面配置區 4"/>
+          <p:cNvGraphicFramePr>
+            <a:graphicFrameLocks noGrp="1"/>
+          </p:cNvGraphicFramePr>
+          <p:nvPr>
+            <p:ph idx="1"/>
+            <p:extLst>
+              <p:ext uri="{D42A27DB-BD31-4B8C-83A1-F6EECF244321}">
+                <p14:modId xmlns:p14="http://schemas.microsoft.com/office/powerpoint/2010/main" val="2852638419"/>
+              </p:ext>
+            </p:extLst>
+          </p:nvPr>
+        </p:nvGraphicFramePr>
+        <p:xfrm>
+          <a:off x="1650351" y="1809750"/>
+          <a:ext cx="5904656" cy="2520279"/>
+        </p:xfrm>
+        <a:graphic>
+          <a:graphicData uri="http://schemas.openxmlformats.org/drawingml/2006/table">
+            <a:tbl>
+              <a:tblPr>
+                <a:tableStyleId>{073A0DAA-6AF3-43AB-8588-CEC1D06C72B9}</a:tableStyleId>
+              </a:tblPr>
+              <a:tblGrid>
+                <a:gridCol w="2525575">
+                  <a:extLst>
+                    <a:ext uri="{9D8B030D-6E8A-4147-A177-3AD203B41FA5}">
+                      <a16:colId xmlns:a16="http://schemas.microsoft.com/office/drawing/2014/main" val="3062769187"/>
+                    </a:ext>
+                  </a:extLst>
+                </a:gridCol>
+                <a:gridCol w="1606535">
+                  <a:extLst>
+                    <a:ext uri="{9D8B030D-6E8A-4147-A177-3AD203B41FA5}">
+                      <a16:colId xmlns:a16="http://schemas.microsoft.com/office/drawing/2014/main" val="2423941493"/>
+                    </a:ext>
+                  </a:extLst>
+                </a:gridCol>
+                <a:gridCol w="1772546">
+                  <a:extLst>
+                    <a:ext uri="{9D8B030D-6E8A-4147-A177-3AD203B41FA5}">
+                      <a16:colId xmlns:a16="http://schemas.microsoft.com/office/drawing/2014/main" val="184353165"/>
+                    </a:ext>
+                  </a:extLst>
+                </a:gridCol>
+              </a:tblGrid>
+              <a:tr h="840093">
+                <a:tc>
+                  <a:txBody>
+                    <a:bodyPr/>
+                    <a:lstStyle/>
+                    <a:p>
+                      <a:pPr algn="ctr" rtl="0" fontAlgn="ctr"/>
+                      <a:r>
+                        <a:rPr lang="en-US" sz="1400" u="none" strike="noStrike" baseline="0" dirty="0" smtClean="0">
+                          <a:effectLst/>
+                        </a:rPr>
+                        <a:t>Ratio of k (VUV to EUV)</a:t>
+                      </a:r>
+                      <a:r>
+                        <a:rPr lang="en-US" sz="1400" u="none" strike="noStrike" dirty="0" smtClean="0">
+                          <a:effectLst/>
+                        </a:rPr>
+                        <a:t> (CN</a:t>
+                      </a:r>
+                      <a:r>
+                        <a:rPr lang="en-US" sz="1400" u="none" strike="noStrike" baseline="30000" dirty="0" smtClean="0">
+                          <a:effectLst/>
+                        </a:rPr>
+                        <a:t>-</a:t>
+                      </a:r>
+                      <a:r>
+                        <a:rPr lang="en-US" sz="1400" u="none" strike="noStrike" dirty="0" smtClean="0">
+                          <a:effectLst/>
+                        </a:rPr>
+                        <a:t>)</a:t>
+                      </a:r>
+                      <a:endParaRPr lang="en-US" sz="1400" b="0" i="0" u="none" strike="noStrike" dirty="0">
+                        <a:solidFill>
+                          <a:srgbClr val="0070C0"/>
+                        </a:solidFill>
+                        <a:effectLst/>
+                        <a:latin typeface="Times New Roman" panose="02020603050405020304" pitchFamily="18" charset="0"/>
+                        <a:cs typeface="Times New Roman" panose="02020603050405020304" pitchFamily="18" charset="0"/>
+                      </a:endParaRPr>
+                    </a:p>
+                  </a:txBody>
+                  <a:tcPr marL="6830" marR="6830" marT="6830" marB="0" anchor="ctr"/>
+                </a:tc>
+                <a:tc>
+                  <a:txBody>
+                    <a:bodyPr/>
+                    <a:lstStyle/>
+                    <a:p>
+                      <a:pPr algn="ctr" rtl="0" fontAlgn="ctr"/>
+                      <a:r>
+                        <a:rPr lang="en-US" sz="1400" u="none" strike="noStrike" dirty="0">
+                          <a:effectLst/>
+                        </a:rPr>
+                        <a:t>4.28</a:t>
+                      </a:r>
+                      <a:endParaRPr lang="en-US" sz="1400" b="0" i="0" u="none" strike="noStrike" dirty="0">
+                        <a:solidFill>
+                          <a:srgbClr val="0070C0"/>
+                        </a:solidFill>
+                        <a:effectLst/>
+                        <a:latin typeface="Times New Roman" panose="02020603050405020304" pitchFamily="18" charset="0"/>
+                        <a:cs typeface="Times New Roman" panose="02020603050405020304" pitchFamily="18" charset="0"/>
+                      </a:endParaRPr>
+                    </a:p>
+                  </a:txBody>
+                  <a:tcPr marL="6830" marR="6830" marT="6830" marB="0" anchor="ctr"/>
+                </a:tc>
+                <a:tc>
+                  <a:txBody>
+                    <a:bodyPr/>
+                    <a:lstStyle/>
+                    <a:p>
+                      <a:pPr algn="ctr" rtl="0" fontAlgn="ctr"/>
+                      <a:r>
+                        <a:rPr lang="en-US" sz="1400" u="none" strike="noStrike" dirty="0">
+                          <a:effectLst/>
+                        </a:rPr>
+                        <a:t>3.06</a:t>
+                      </a:r>
+                      <a:endParaRPr lang="en-US" sz="1400" b="0" i="0" u="none" strike="noStrike" dirty="0">
+                        <a:solidFill>
+                          <a:srgbClr val="0070C0"/>
+                        </a:solidFill>
+                        <a:effectLst/>
+                        <a:latin typeface="Times New Roman" panose="02020603050405020304" pitchFamily="18" charset="0"/>
+                        <a:cs typeface="Times New Roman" panose="02020603050405020304" pitchFamily="18" charset="0"/>
+                      </a:endParaRPr>
+                    </a:p>
+                  </a:txBody>
+                  <a:tcPr marL="6830" marR="6830" marT="6830" marB="0" anchor="ctr"/>
+                </a:tc>
+                <a:extLst>
+                  <a:ext uri="{0D108BD9-81ED-4DB2-BD59-A6C34878D82A}">
+                    <a16:rowId xmlns:a16="http://schemas.microsoft.com/office/drawing/2014/main" val="1303449984"/>
+                  </a:ext>
+                </a:extLst>
+              </a:tr>
+              <a:tr h="840093">
+                <a:tc>
+                  <a:txBody>
+                    <a:bodyPr/>
+                    <a:lstStyle/>
+                    <a:p>
+                      <a:pPr marL="0" marR="0" indent="0" algn="ctr" defTabSz="685800" rtl="0" eaLnBrk="1" fontAlgn="ctr" latinLnBrk="0" hangingPunct="1">
+                        <a:lnSpc>
+                          <a:spcPct val="100000"/>
+                        </a:lnSpc>
+                        <a:spcBef>
+                          <a:spcPts val="0"/>
+                        </a:spcBef>
+                        <a:spcAft>
+                          <a:spcPts val="0"/>
+                        </a:spcAft>
+                        <a:buClrTx/>
+                        <a:buSzTx/>
+                        <a:buFontTx/>
+                        <a:buNone/>
+                        <a:tabLst/>
+                        <a:defRPr/>
+                      </a:pPr>
+                      <a:r>
+                        <a:rPr lang="en-US" sz="1400" u="none" strike="noStrike" baseline="0" dirty="0" smtClean="0">
+                          <a:effectLst/>
+                        </a:rPr>
+                        <a:t>Ratio of k (VUV to EUV) </a:t>
+                      </a:r>
+                      <a:r>
+                        <a:rPr lang="en-US" sz="1400" u="none" strike="noStrike" dirty="0" smtClean="0">
+                          <a:effectLst/>
+                        </a:rPr>
+                        <a:t>(CH</a:t>
+                      </a:r>
+                      <a:r>
+                        <a:rPr lang="en-US" sz="1400" u="none" strike="noStrike" baseline="-25000" dirty="0" smtClean="0">
+                          <a:effectLst/>
+                        </a:rPr>
+                        <a:t>4</a:t>
+                      </a:r>
+                      <a:r>
+                        <a:rPr lang="en-US" sz="1400" u="none" strike="noStrike" dirty="0" smtClean="0">
+                          <a:effectLst/>
+                        </a:rPr>
+                        <a:t>)</a:t>
+                      </a:r>
+                      <a:endParaRPr lang="en-US" sz="1400" b="0" i="0" u="none" strike="noStrike" dirty="0">
+                        <a:solidFill>
+                          <a:srgbClr val="FF0000"/>
+                        </a:solidFill>
+                        <a:effectLst/>
+                        <a:latin typeface="Times New Roman" panose="02020603050405020304" pitchFamily="18" charset="0"/>
+                        <a:cs typeface="Times New Roman" panose="02020603050405020304" pitchFamily="18" charset="0"/>
+                      </a:endParaRPr>
+                    </a:p>
+                  </a:txBody>
+                  <a:tcPr marL="6830" marR="6830" marT="6830" marB="0" anchor="ctr"/>
+                </a:tc>
+                <a:tc>
+                  <a:txBody>
+                    <a:bodyPr/>
+                    <a:lstStyle/>
+                    <a:p>
+                      <a:pPr marL="0" marR="0" indent="0" algn="ctr" defTabSz="685800" rtl="0" eaLnBrk="1" fontAlgn="ctr" latinLnBrk="0" hangingPunct="1">
+                        <a:lnSpc>
+                          <a:spcPct val="100000"/>
+                        </a:lnSpc>
+                        <a:spcBef>
+                          <a:spcPts val="0"/>
+                        </a:spcBef>
+                        <a:spcAft>
+                          <a:spcPts val="0"/>
+                        </a:spcAft>
+                        <a:buClrTx/>
+                        <a:buSzTx/>
+                        <a:buFontTx/>
+                        <a:buNone/>
+                        <a:tabLst/>
+                        <a:defRPr/>
+                      </a:pPr>
+                      <a:r>
+                        <a:rPr lang="en-US" sz="1400" u="none" strike="noStrike" dirty="0" smtClean="0">
+                          <a:effectLst/>
+                        </a:rPr>
+                        <a:t>6.06±0.07</a:t>
+                      </a:r>
+                      <a:endParaRPr lang="en-US" sz="1400" b="0" i="0" u="none" strike="noStrike" dirty="0" smtClean="0">
+                        <a:solidFill>
+                          <a:srgbClr val="FF0000"/>
+                        </a:solidFill>
+                        <a:effectLst/>
+                        <a:latin typeface="Times New Roman" panose="02020603050405020304" pitchFamily="18" charset="0"/>
+                        <a:cs typeface="Times New Roman" panose="02020603050405020304" pitchFamily="18" charset="0"/>
+                      </a:endParaRPr>
+                    </a:p>
+                  </a:txBody>
+                  <a:tcPr marL="6830" marR="6830" marT="6830" marB="0" anchor="ctr"/>
+                </a:tc>
+                <a:tc>
+                  <a:txBody>
+                    <a:bodyPr/>
+                    <a:lstStyle/>
+                    <a:p>
+                      <a:pPr marL="0" marR="0" indent="0" algn="ctr" defTabSz="685800" rtl="0" eaLnBrk="1" fontAlgn="ctr" latinLnBrk="0" hangingPunct="1">
+                        <a:lnSpc>
+                          <a:spcPct val="100000"/>
+                        </a:lnSpc>
+                        <a:spcBef>
+                          <a:spcPts val="0"/>
+                        </a:spcBef>
+                        <a:spcAft>
+                          <a:spcPts val="0"/>
+                        </a:spcAft>
+                        <a:buClrTx/>
+                        <a:buSzTx/>
+                        <a:buFontTx/>
+                        <a:buNone/>
+                        <a:tabLst/>
+                        <a:defRPr/>
+                      </a:pPr>
+                      <a:r>
+                        <a:rPr lang="en-US" sz="1400" u="none" strike="noStrike" dirty="0" smtClean="0">
+                          <a:effectLst/>
+                        </a:rPr>
+                        <a:t>5.52±0.07</a:t>
+                      </a:r>
+                      <a:endParaRPr lang="en-US" sz="1400" b="0" i="0" u="none" strike="noStrike" dirty="0" smtClean="0">
+                        <a:solidFill>
+                          <a:srgbClr val="FF0000"/>
+                        </a:solidFill>
+                        <a:effectLst/>
+                        <a:latin typeface="Times New Roman" panose="02020603050405020304" pitchFamily="18" charset="0"/>
+                        <a:cs typeface="Times New Roman" panose="02020603050405020304" pitchFamily="18" charset="0"/>
+                      </a:endParaRPr>
+                    </a:p>
+                  </a:txBody>
+                  <a:tcPr marL="6830" marR="6830" marT="6830" marB="0" anchor="ctr"/>
+                </a:tc>
+                <a:extLst>
+                  <a:ext uri="{0D108BD9-81ED-4DB2-BD59-A6C34878D82A}">
+                    <a16:rowId xmlns:a16="http://schemas.microsoft.com/office/drawing/2014/main" val="2641406375"/>
+                  </a:ext>
+                </a:extLst>
+              </a:tr>
+              <a:tr h="840093">
+                <a:tc>
+                  <a:txBody>
+                    <a:bodyPr/>
+                    <a:lstStyle/>
+                    <a:p>
+                      <a:pPr marL="0" marR="0" indent="0" algn="ctr" defTabSz="685800" rtl="0" eaLnBrk="1" fontAlgn="ctr" latinLnBrk="0" hangingPunct="1">
+                        <a:lnSpc>
+                          <a:spcPct val="100000"/>
+                        </a:lnSpc>
+                        <a:spcBef>
+                          <a:spcPts val="0"/>
+                        </a:spcBef>
+                        <a:spcAft>
+                          <a:spcPts val="0"/>
+                        </a:spcAft>
+                        <a:buClrTx/>
+                        <a:buSzTx/>
+                        <a:buFontTx/>
+                        <a:buNone/>
+                        <a:tabLst/>
+                        <a:defRPr/>
+                      </a:pPr>
+                      <a:r>
+                        <a:rPr lang="en-US" sz="1400" u="none" strike="noStrike" baseline="0" dirty="0" smtClean="0">
+                          <a:effectLst/>
+                        </a:rPr>
+                        <a:t>Ratio of k (VUV to EUV) </a:t>
+                      </a:r>
+                      <a:r>
+                        <a:rPr lang="en-US" sz="1400" u="none" strike="noStrike" dirty="0" smtClean="0">
+                          <a:effectLst/>
+                        </a:rPr>
+                        <a:t>(NH</a:t>
+                      </a:r>
+                      <a:r>
+                        <a:rPr lang="en-US" sz="1400" u="none" strike="noStrike" baseline="-25000" dirty="0" smtClean="0">
+                          <a:effectLst/>
+                        </a:rPr>
+                        <a:t>3</a:t>
+                      </a:r>
+                      <a:r>
+                        <a:rPr lang="en-US" sz="1400" u="none" strike="noStrike" dirty="0" smtClean="0">
+                          <a:effectLst/>
+                        </a:rPr>
+                        <a:t>)</a:t>
+                      </a:r>
+                      <a:endParaRPr lang="en-US" sz="1400" b="0" i="0" u="none" strike="noStrike" dirty="0" smtClean="0">
+                        <a:solidFill>
+                          <a:schemeClr val="tx1"/>
+                        </a:solidFill>
+                        <a:effectLst/>
+                        <a:latin typeface="Times New Roman" panose="02020603050405020304" pitchFamily="18" charset="0"/>
+                        <a:cs typeface="Times New Roman" panose="02020603050405020304" pitchFamily="18" charset="0"/>
+                      </a:endParaRPr>
+                    </a:p>
+                  </a:txBody>
+                  <a:tcPr marL="6830" marR="6830" marT="6830" marB="0" anchor="ctr"/>
+                </a:tc>
+                <a:tc>
+                  <a:txBody>
+                    <a:bodyPr/>
+                    <a:lstStyle/>
+                    <a:p>
+                      <a:pPr marL="0" marR="0" indent="0" algn="ctr" defTabSz="685800" rtl="0" eaLnBrk="1" fontAlgn="ctr" latinLnBrk="0" hangingPunct="1">
+                        <a:lnSpc>
+                          <a:spcPct val="100000"/>
+                        </a:lnSpc>
+                        <a:spcBef>
+                          <a:spcPts val="0"/>
+                        </a:spcBef>
+                        <a:spcAft>
+                          <a:spcPts val="0"/>
+                        </a:spcAft>
+                        <a:buClrTx/>
+                        <a:buSzTx/>
+                        <a:buFontTx/>
+                        <a:buNone/>
+                        <a:tabLst/>
+                        <a:defRPr/>
+                      </a:pPr>
+                      <a:r>
+                        <a:rPr lang="en-US" sz="1400" u="none" strike="noStrike" dirty="0" smtClean="0">
+                          <a:effectLst/>
+                        </a:rPr>
+                        <a:t>3.18±0.12</a:t>
+                      </a:r>
+                      <a:endParaRPr lang="en-US" sz="1400" b="0" i="0" u="none" strike="noStrike" dirty="0" smtClean="0">
+                        <a:solidFill>
+                          <a:schemeClr val="tx1"/>
+                        </a:solidFill>
+                        <a:effectLst/>
+                        <a:latin typeface="Times New Roman" panose="02020603050405020304" pitchFamily="18" charset="0"/>
+                        <a:cs typeface="Times New Roman" panose="02020603050405020304" pitchFamily="18" charset="0"/>
+                      </a:endParaRPr>
+                    </a:p>
+                  </a:txBody>
+                  <a:tcPr marL="6830" marR="6830" marT="6830" marB="0" anchor="ctr"/>
+                </a:tc>
+                <a:tc>
+                  <a:txBody>
+                    <a:bodyPr/>
+                    <a:lstStyle/>
+                    <a:p>
+                      <a:pPr marL="0" marR="0" indent="0" algn="ctr" defTabSz="685800" rtl="0" eaLnBrk="1" fontAlgn="ctr" latinLnBrk="0" hangingPunct="1">
+                        <a:lnSpc>
+                          <a:spcPct val="100000"/>
+                        </a:lnSpc>
+                        <a:spcBef>
+                          <a:spcPts val="0"/>
+                        </a:spcBef>
+                        <a:spcAft>
+                          <a:spcPts val="0"/>
+                        </a:spcAft>
+                        <a:buClrTx/>
+                        <a:buSzTx/>
+                        <a:buFontTx/>
+                        <a:buNone/>
+                        <a:tabLst/>
+                        <a:defRPr/>
+                      </a:pPr>
+                      <a:r>
+                        <a:rPr lang="en-US" sz="1400" u="none" strike="noStrike" dirty="0" smtClean="0">
+                          <a:effectLst/>
+                        </a:rPr>
+                        <a:t>2.07±0.13</a:t>
+                      </a:r>
+                      <a:endParaRPr lang="en-US" sz="1400" b="0" i="0" u="none" strike="noStrike" dirty="0" smtClean="0">
+                        <a:solidFill>
+                          <a:schemeClr val="tx1"/>
+                        </a:solidFill>
+                        <a:effectLst/>
+                        <a:latin typeface="Times New Roman" panose="02020603050405020304" pitchFamily="18" charset="0"/>
+                        <a:cs typeface="Times New Roman" panose="02020603050405020304" pitchFamily="18" charset="0"/>
+                      </a:endParaRPr>
+                    </a:p>
+                  </a:txBody>
+                  <a:tcPr marL="6830" marR="6830" marT="6830" marB="0" anchor="ctr"/>
+                </a:tc>
+                <a:extLst>
+                  <a:ext uri="{0D108BD9-81ED-4DB2-BD59-A6C34878D82A}">
+                    <a16:rowId xmlns:a16="http://schemas.microsoft.com/office/drawing/2014/main" val="1672921810"/>
+                  </a:ext>
+                </a:extLst>
+              </a:tr>
+            </a:tbl>
+          </a:graphicData>
+        </a:graphic>
+      </p:graphicFrame>
+      <p:sp>
+        <p:nvSpPr>
+          <p:cNvPr id="4" name="投影片編號版面配置區 3"/>
+          <p:cNvSpPr>
+            <a:spLocks noGrp="1"/>
+          </p:cNvSpPr>
+          <p:nvPr>
+            <p:ph type="sldNum" sz="quarter" idx="12"/>
+          </p:nvPr>
+        </p:nvSpPr>
+        <p:spPr/>
+        <p:txBody>
+          <a:bodyPr/>
+          <a:lstStyle/>
+          <a:p>
+            <a:fld id="{B646D8CA-B2C0-41A8-8514-369D0B0735D6}" type="slidenum">
+              <a:rPr lang="zh-TW" altLang="en-US" smtClean="0"/>
+              <a:t>27</a:t>
+            </a:fld>
+            <a:endParaRPr lang="zh-TW" altLang="en-US"/>
+          </a:p>
+        </p:txBody>
+      </p:sp>
+      <p:sp>
+        <p:nvSpPr>
+          <p:cNvPr id="6" name="矩形 5"/>
+          <p:cNvSpPr/>
+          <p:nvPr/>
+        </p:nvSpPr>
+        <p:spPr>
+          <a:xfrm>
+            <a:off x="1619672" y="4623081"/>
+            <a:ext cx="6609928" cy="646331"/>
+          </a:xfrm>
+          <a:prstGeom prst="rect">
+            <a:avLst/>
+          </a:prstGeom>
+        </p:spPr>
+        <p:txBody>
+          <a:bodyPr wrap="square">
+            <a:spAutoFit/>
+          </a:bodyPr>
+          <a:lstStyle/>
+          <a:p>
+            <a:r>
+              <a:rPr lang="en-HK" dirty="0">
+                <a:latin typeface="Times New Roman" panose="02020603050405020304" pitchFamily="18" charset="0"/>
+                <a:cs typeface="Times New Roman" panose="02020603050405020304" pitchFamily="18" charset="0"/>
+              </a:rPr>
+              <a:t>The </a:t>
+            </a:r>
+            <a:r>
+              <a:rPr lang="en-HK" dirty="0">
+                <a:solidFill>
+                  <a:srgbClr val="0070C0"/>
+                </a:solidFill>
+                <a:latin typeface="Times New Roman" panose="02020603050405020304" pitchFamily="18" charset="0"/>
+                <a:cs typeface="Times New Roman" panose="02020603050405020304" pitchFamily="18" charset="0"/>
+              </a:rPr>
+              <a:t>reduced destruction cross-section </a:t>
+            </a:r>
+            <a:r>
+              <a:rPr lang="en-HK" dirty="0">
+                <a:latin typeface="Times New Roman" panose="02020603050405020304" pitchFamily="18" charset="0"/>
+                <a:cs typeface="Times New Roman" panose="02020603050405020304" pitchFamily="18" charset="0"/>
+              </a:rPr>
+              <a:t>of EUV (30.4nm) irradiation is the main factor of reducing the formation rate of CN</a:t>
+            </a:r>
+            <a:r>
+              <a:rPr lang="en-HK" baseline="30000" dirty="0">
+                <a:latin typeface="Times New Roman" panose="02020603050405020304" pitchFamily="18" charset="0"/>
+                <a:cs typeface="Times New Roman" panose="02020603050405020304" pitchFamily="18" charset="0"/>
+              </a:rPr>
+              <a:t>-</a:t>
+            </a:r>
+            <a:r>
+              <a:rPr lang="en-HK" dirty="0">
+                <a:latin typeface="Times New Roman" panose="02020603050405020304" pitchFamily="18" charset="0"/>
+                <a:cs typeface="Times New Roman" panose="02020603050405020304" pitchFamily="18" charset="0"/>
+              </a:rPr>
+              <a:t>. </a:t>
+            </a:r>
+          </a:p>
+        </p:txBody>
+      </p:sp>
+    </p:spTree>
+    <p:extLst>
+      <p:ext uri="{BB962C8B-B14F-4D97-AF65-F5344CB8AC3E}">
+        <p14:creationId xmlns:p14="http://schemas.microsoft.com/office/powerpoint/2010/main" val="1841045262"/>
+      </p:ext>
+    </p:extLst>
+  </p:cSld>
+  <p:clrMapOvr>
+    <a:masterClrMapping/>
+  </p:clrMapOvr>
+</p:sld>
+</file>
+
+<file path=ppt/slides/slide28.xml><?xml version="1.0" encoding="utf-8"?>
+<p:sld xmlns:a="http://schemas.openxmlformats.org/drawingml/2006/main" xmlns:r="http://schemas.openxmlformats.org/officeDocument/2006/relationships" xmlns:p="http://schemas.openxmlformats.org/presentationml/2006/main">
+  <p:cSld>
+    <p:spTree>
+      <p:nvGrpSpPr>
+        <p:cNvPr id="1" name=""/>
+        <p:cNvGrpSpPr/>
+        <p:nvPr/>
+      </p:nvGrpSpPr>
+      <p:grpSpPr>
+        <a:xfrm>
+          <a:off x="0" y="0"/>
+          <a:ext cx="0" cy="0"/>
+          <a:chOff x="0" y="0"/>
+          <a:chExt cx="0" cy="0"/>
+        </a:xfrm>
+      </p:grpSpPr>
+      <p:sp>
+        <p:nvSpPr>
+          <p:cNvPr id="2" name="標題 1"/>
+          <p:cNvSpPr>
+            <a:spLocks noGrp="1"/>
+          </p:cNvSpPr>
+          <p:nvPr>
+            <p:ph type="title"/>
+          </p:nvPr>
+        </p:nvSpPr>
         <p:spPr>
           <a:xfrm>
             <a:off x="2123728" y="2497460"/>
@@ -20610,7 +20856,7 @@
           <a:p>
             <a:fld id="{B646D8CA-B2C0-41A8-8514-369D0B0735D6}" type="slidenum">
               <a:rPr lang="zh-TW" altLang="en-US" sz="2000" smtClean="0"/>
-              <a:t>27</a:t>
+              <a:t>28</a:t>
             </a:fld>
             <a:endParaRPr lang="zh-TW" altLang="en-US" sz="2000" dirty="0"/>
           </a:p>
@@ -20636,7 +20882,7 @@
 </p:sld>
 </file>
 
-<file path=ppt/slides/slide28.xml><?xml version="1.0" encoding="utf-8"?>
+<file path=ppt/slides/slide29.xml><?xml version="1.0" encoding="utf-8"?>
 <p:sld xmlns:a="http://schemas.openxmlformats.org/drawingml/2006/main" xmlns:r="http://schemas.openxmlformats.org/officeDocument/2006/relationships" xmlns:p="http://schemas.openxmlformats.org/presentationml/2006/main">
   <p:cSld>
     <p:spTree>
@@ -21042,7 +21288,7 @@
           <a:p>
             <a:fld id="{B646D8CA-B2C0-41A8-8514-369D0B0735D6}" type="slidenum">
               <a:rPr lang="zh-TW" altLang="en-US" sz="2000" smtClean="0"/>
-              <a:t>28</a:t>
+              <a:t>29</a:t>
             </a:fld>
             <a:endParaRPr lang="zh-TW" altLang="en-US" sz="2000" dirty="0"/>
           </a:p>
@@ -21543,7 +21789,7 @@
           <a:graphicData uri="http://schemas.openxmlformats.org/presentationml/2006/ole">
             <mc:AlternateContent xmlns:mc="http://schemas.openxmlformats.org/markup-compatibility/2006">
               <mc:Choice xmlns:v="urn:schemas-microsoft-com:vml" Requires="v">
-                <p:oleObj spid="_x0000_s3007" name="Graph" r:id="rId3" imgW="4754880" imgH="3108960" progId="Origin50.Graph">
+                <p:oleObj spid="_x0000_s3017" name="Graph" r:id="rId3" imgW="4754880" imgH="3108960" progId="Origin50.Graph">
                   <p:embed/>
                 </p:oleObj>
               </mc:Choice>
@@ -21598,7 +21844,125 @@
 </p:sld>
 </file>
 
-<file path=ppt/slides/slide29.xml><?xml version="1.0" encoding="utf-8"?>
+<file path=ppt/slides/slide3.xml><?xml version="1.0" encoding="utf-8"?>
+<p:sld xmlns:a="http://schemas.openxmlformats.org/drawingml/2006/main" xmlns:r="http://schemas.openxmlformats.org/officeDocument/2006/relationships" xmlns:p="http://schemas.openxmlformats.org/presentationml/2006/main">
+  <p:cSld>
+    <p:spTree>
+      <p:nvGrpSpPr>
+        <p:cNvPr id="1" name=""/>
+        <p:cNvGrpSpPr/>
+        <p:nvPr/>
+      </p:nvGrpSpPr>
+      <p:grpSpPr>
+        <a:xfrm>
+          <a:off x="0" y="0"/>
+          <a:ext cx="0" cy="0"/>
+          <a:chOff x="0" y="0"/>
+          <a:chExt cx="0" cy="0"/>
+        </a:xfrm>
+      </p:grpSpPr>
+      <p:sp>
+        <p:nvSpPr>
+          <p:cNvPr id="2" name="標題 1"/>
+          <p:cNvSpPr>
+            <a:spLocks noGrp="1"/>
+          </p:cNvSpPr>
+          <p:nvPr>
+            <p:ph type="title"/>
+          </p:nvPr>
+        </p:nvSpPr>
+        <p:spPr>
+          <a:xfrm>
+            <a:off x="3504102" y="2497460"/>
+            <a:ext cx="7200900" cy="1238250"/>
+          </a:xfrm>
+        </p:spPr>
+        <p:txBody>
+          <a:bodyPr/>
+          <a:lstStyle/>
+          <a:p>
+            <a:r>
+              <a:rPr lang="en-HK" dirty="0" smtClean="0">
+                <a:latin typeface="Times New Roman" panose="02020603050405020304" pitchFamily="18" charset="0"/>
+                <a:cs typeface="Times New Roman" panose="02020603050405020304" pitchFamily="18" charset="0"/>
+              </a:rPr>
+              <a:t>Motivation</a:t>
+            </a:r>
+            <a:endParaRPr lang="en-US" dirty="0">
+              <a:latin typeface="Times New Roman" panose="02020603050405020304" pitchFamily="18" charset="0"/>
+              <a:cs typeface="Times New Roman" panose="02020603050405020304" pitchFamily="18" charset="0"/>
+            </a:endParaRPr>
+          </a:p>
+        </p:txBody>
+      </p:sp>
+      <p:sp>
+        <p:nvSpPr>
+          <p:cNvPr id="3" name="內容版面配置區 2"/>
+          <p:cNvSpPr>
+            <a:spLocks noGrp="1"/>
+          </p:cNvSpPr>
+          <p:nvPr>
+            <p:ph idx="1"/>
+          </p:nvPr>
+        </p:nvSpPr>
+        <p:spPr>
+          <a:xfrm>
+            <a:off x="899592" y="4054161"/>
+            <a:ext cx="7200900" cy="2984500"/>
+          </a:xfrm>
+        </p:spPr>
+        <p:txBody>
+          <a:bodyPr/>
+          <a:lstStyle/>
+          <a:p>
+            <a:endParaRPr lang="en-US" dirty="0"/>
+          </a:p>
+        </p:txBody>
+      </p:sp>
+      <p:sp>
+        <p:nvSpPr>
+          <p:cNvPr id="4" name="投影片編號版面配置區 3"/>
+          <p:cNvSpPr>
+            <a:spLocks noGrp="1"/>
+          </p:cNvSpPr>
+          <p:nvPr>
+            <p:ph type="sldNum" sz="quarter" idx="12"/>
+          </p:nvPr>
+        </p:nvSpPr>
+        <p:spPr/>
+        <p:txBody>
+          <a:bodyPr/>
+          <a:lstStyle/>
+          <a:p>
+            <a:fld id="{B646D8CA-B2C0-41A8-8514-369D0B0735D6}" type="slidenum">
+              <a:rPr lang="zh-TW" altLang="en-US" sz="2000" smtClean="0"/>
+              <a:t>3</a:t>
+            </a:fld>
+            <a:endParaRPr lang="zh-TW" altLang="en-US" sz="2000" dirty="0"/>
+          </a:p>
+        </p:txBody>
+      </p:sp>
+    </p:spTree>
+    <p:extLst>
+      <p:ext uri="{BB962C8B-B14F-4D97-AF65-F5344CB8AC3E}">
+        <p14:creationId xmlns:p14="http://schemas.microsoft.com/office/powerpoint/2010/main" val="4152381651"/>
+      </p:ext>
+    </p:extLst>
+  </p:cSld>
+  <p:clrMapOvr>
+    <a:masterClrMapping/>
+  </p:clrMapOvr>
+  <p:timing>
+    <p:tnLst>
+      <p:par>
+        <p:cTn id="1" dur="indefinite" restart="never" nodeType="tmRoot"/>
+      </p:par>
+    </p:tnLst>
+  </p:timing>
+</p:sld>
+</file>
+
+<file path=ppt/slides/slide30.xml><?xml version="1.0" encoding="utf-8"?>
 <p:sld xmlns:a="http://schemas.openxmlformats.org/drawingml/2006/main" xmlns:r="http://schemas.openxmlformats.org/officeDocument/2006/relationships" xmlns:p="http://schemas.openxmlformats.org/presentationml/2006/main">
   <p:cSld>
     <p:spTree>
@@ -22091,7 +22455,7 @@
           <a:p>
             <a:fld id="{B646D8CA-B2C0-41A8-8514-369D0B0735D6}" type="slidenum">
               <a:rPr lang="zh-TW" altLang="en-US" sz="2000" smtClean="0"/>
-              <a:t>29</a:t>
+              <a:t>30</a:t>
             </a:fld>
             <a:endParaRPr lang="zh-TW" altLang="en-US" sz="2000" dirty="0"/>
           </a:p>
@@ -22119,7 +22483,7 @@
           <a:graphicData uri="http://schemas.openxmlformats.org/presentationml/2006/ole">
             <mc:AlternateContent xmlns:mc="http://schemas.openxmlformats.org/markup-compatibility/2006">
               <mc:Choice xmlns:v="urn:schemas-microsoft-com:vml" Requires="v">
-                <p:oleObj spid="_x0000_s5892" name="Graph" r:id="rId3" imgW="4754880" imgH="3108960" progId="Origin50.Graph">
+                <p:oleObj spid="_x0000_s5902" name="Graph" r:id="rId3" imgW="4754880" imgH="3108960" progId="Origin50.Graph">
                   <p:embed/>
                 </p:oleObj>
               </mc:Choice>
@@ -22174,125 +22538,7 @@
 </p:sld>
 </file>
 
-<file path=ppt/slides/slide3.xml><?xml version="1.0" encoding="utf-8"?>
-<p:sld xmlns:a="http://schemas.openxmlformats.org/drawingml/2006/main" xmlns:r="http://schemas.openxmlformats.org/officeDocument/2006/relationships" xmlns:p="http://schemas.openxmlformats.org/presentationml/2006/main">
-  <p:cSld>
-    <p:spTree>
-      <p:nvGrpSpPr>
-        <p:cNvPr id="1" name=""/>
-        <p:cNvGrpSpPr/>
-        <p:nvPr/>
-      </p:nvGrpSpPr>
-      <p:grpSpPr>
-        <a:xfrm>
-          <a:off x="0" y="0"/>
-          <a:ext cx="0" cy="0"/>
-          <a:chOff x="0" y="0"/>
-          <a:chExt cx="0" cy="0"/>
-        </a:xfrm>
-      </p:grpSpPr>
-      <p:sp>
-        <p:nvSpPr>
-          <p:cNvPr id="2" name="標題 1"/>
-          <p:cNvSpPr>
-            <a:spLocks noGrp="1"/>
-          </p:cNvSpPr>
-          <p:nvPr>
-            <p:ph type="title"/>
-          </p:nvPr>
-        </p:nvSpPr>
-        <p:spPr>
-          <a:xfrm>
-            <a:off x="3504102" y="2497460"/>
-            <a:ext cx="7200900" cy="1238250"/>
-          </a:xfrm>
-        </p:spPr>
-        <p:txBody>
-          <a:bodyPr/>
-          <a:lstStyle/>
-          <a:p>
-            <a:r>
-              <a:rPr lang="en-HK" dirty="0" smtClean="0">
-                <a:latin typeface="Times New Roman" panose="02020603050405020304" pitchFamily="18" charset="0"/>
-                <a:cs typeface="Times New Roman" panose="02020603050405020304" pitchFamily="18" charset="0"/>
-              </a:rPr>
-              <a:t>Motivation</a:t>
-            </a:r>
-            <a:endParaRPr lang="en-US" dirty="0">
-              <a:latin typeface="Times New Roman" panose="02020603050405020304" pitchFamily="18" charset="0"/>
-              <a:cs typeface="Times New Roman" panose="02020603050405020304" pitchFamily="18" charset="0"/>
-            </a:endParaRPr>
-          </a:p>
-        </p:txBody>
-      </p:sp>
-      <p:sp>
-        <p:nvSpPr>
-          <p:cNvPr id="3" name="內容版面配置區 2"/>
-          <p:cNvSpPr>
-            <a:spLocks noGrp="1"/>
-          </p:cNvSpPr>
-          <p:nvPr>
-            <p:ph idx="1"/>
-          </p:nvPr>
-        </p:nvSpPr>
-        <p:spPr>
-          <a:xfrm>
-            <a:off x="899592" y="4054161"/>
-            <a:ext cx="7200900" cy="2984500"/>
-          </a:xfrm>
-        </p:spPr>
-        <p:txBody>
-          <a:bodyPr/>
-          <a:lstStyle/>
-          <a:p>
-            <a:endParaRPr lang="en-US" dirty="0"/>
-          </a:p>
-        </p:txBody>
-      </p:sp>
-      <p:sp>
-        <p:nvSpPr>
-          <p:cNvPr id="4" name="投影片編號版面配置區 3"/>
-          <p:cNvSpPr>
-            <a:spLocks noGrp="1"/>
-          </p:cNvSpPr>
-          <p:nvPr>
-            <p:ph type="sldNum" sz="quarter" idx="12"/>
-          </p:nvPr>
-        </p:nvSpPr>
-        <p:spPr/>
-        <p:txBody>
-          <a:bodyPr/>
-          <a:lstStyle/>
-          <a:p>
-            <a:fld id="{B646D8CA-B2C0-41A8-8514-369D0B0735D6}" type="slidenum">
-              <a:rPr lang="zh-TW" altLang="en-US" sz="2000" smtClean="0"/>
-              <a:t>3</a:t>
-            </a:fld>
-            <a:endParaRPr lang="zh-TW" altLang="en-US" sz="2000" dirty="0"/>
-          </a:p>
-        </p:txBody>
-      </p:sp>
-    </p:spTree>
-    <p:extLst>
-      <p:ext uri="{BB962C8B-B14F-4D97-AF65-F5344CB8AC3E}">
-        <p14:creationId xmlns:p14="http://schemas.microsoft.com/office/powerpoint/2010/main" val="4152381651"/>
-      </p:ext>
-    </p:extLst>
-  </p:cSld>
-  <p:clrMapOvr>
-    <a:masterClrMapping/>
-  </p:clrMapOvr>
-  <p:timing>
-    <p:tnLst>
-      <p:par>
-        <p:cTn id="1" dur="indefinite" restart="never" nodeType="tmRoot"/>
-      </p:par>
-    </p:tnLst>
-  </p:timing>
-</p:sld>
-</file>
-
-<file path=ppt/slides/slide30.xml><?xml version="1.0" encoding="utf-8"?>
+<file path=ppt/slides/slide31.xml><?xml version="1.0" encoding="utf-8"?>
 <p:sld xmlns:a="http://schemas.openxmlformats.org/drawingml/2006/main" xmlns:r="http://schemas.openxmlformats.org/officeDocument/2006/relationships" xmlns:p="http://schemas.openxmlformats.org/presentationml/2006/main">
   <p:cSld>
     <p:spTree>
@@ -22627,7 +22873,7 @@
           <a:p>
             <a:fld id="{B646D8CA-B2C0-41A8-8514-369D0B0735D6}" type="slidenum">
               <a:rPr lang="zh-TW" altLang="en-US" sz="2000" smtClean="0"/>
-              <a:t>30</a:t>
+              <a:t>31</a:t>
             </a:fld>
             <a:endParaRPr lang="zh-TW" altLang="en-US" sz="2000" dirty="0"/>
           </a:p>
@@ -22637,100 +22883,6 @@
     <p:extLst>
       <p:ext uri="{BB962C8B-B14F-4D97-AF65-F5344CB8AC3E}">
         <p14:creationId xmlns:p14="http://schemas.microsoft.com/office/powerpoint/2010/main" val="692006191"/>
-      </p:ext>
-    </p:extLst>
-  </p:cSld>
-  <p:clrMapOvr>
-    <a:masterClrMapping/>
-  </p:clrMapOvr>
-  <p:timing>
-    <p:tnLst>
-      <p:par>
-        <p:cTn id="1" dur="indefinite" restart="never" nodeType="tmRoot"/>
-      </p:par>
-    </p:tnLst>
-  </p:timing>
-</p:sld>
-</file>
-
-<file path=ppt/slides/slide31.xml><?xml version="1.0" encoding="utf-8"?>
-<p:sld xmlns:a="http://schemas.openxmlformats.org/drawingml/2006/main" xmlns:r="http://schemas.openxmlformats.org/officeDocument/2006/relationships" xmlns:p="http://schemas.openxmlformats.org/presentationml/2006/main">
-  <p:cSld>
-    <p:spTree>
-      <p:nvGrpSpPr>
-        <p:cNvPr id="1" name=""/>
-        <p:cNvGrpSpPr/>
-        <p:nvPr/>
-      </p:nvGrpSpPr>
-      <p:grpSpPr>
-        <a:xfrm>
-          <a:off x="0" y="0"/>
-          <a:ext cx="0" cy="0"/>
-          <a:chOff x="0" y="0"/>
-          <a:chExt cx="0" cy="0"/>
-        </a:xfrm>
-      </p:grpSpPr>
-      <p:sp>
-        <p:nvSpPr>
-          <p:cNvPr id="2" name="標題 1"/>
-          <p:cNvSpPr>
-            <a:spLocks noGrp="1"/>
-          </p:cNvSpPr>
-          <p:nvPr>
-            <p:ph type="title"/>
-          </p:nvPr>
-        </p:nvSpPr>
-        <p:spPr>
-          <a:xfrm>
-            <a:off x="3707904" y="2569468"/>
-            <a:ext cx="7200900" cy="1238250"/>
-          </a:xfrm>
-        </p:spPr>
-        <p:txBody>
-          <a:bodyPr/>
-          <a:lstStyle/>
-          <a:p>
-            <a:r>
-              <a:rPr lang="en-HK" dirty="0" smtClean="0">
-                <a:latin typeface="Times New Roman" panose="02020603050405020304" pitchFamily="18" charset="0"/>
-                <a:cs typeface="Times New Roman" panose="02020603050405020304" pitchFamily="18" charset="0"/>
-              </a:rPr>
-              <a:t>Q &amp; A</a:t>
-            </a:r>
-            <a:endParaRPr lang="en-US" dirty="0">
-              <a:latin typeface="Times New Roman" panose="02020603050405020304" pitchFamily="18" charset="0"/>
-              <a:cs typeface="Times New Roman" panose="02020603050405020304" pitchFamily="18" charset="0"/>
-            </a:endParaRPr>
-          </a:p>
-        </p:txBody>
-      </p:sp>
-      <p:sp>
-        <p:nvSpPr>
-          <p:cNvPr id="4" name="投影片編號版面配置區 3"/>
-          <p:cNvSpPr>
-            <a:spLocks noGrp="1"/>
-          </p:cNvSpPr>
-          <p:nvPr>
-            <p:ph type="sldNum" sz="quarter" idx="12"/>
-          </p:nvPr>
-        </p:nvSpPr>
-        <p:spPr/>
-        <p:txBody>
-          <a:bodyPr/>
-          <a:lstStyle/>
-          <a:p>
-            <a:fld id="{B646D8CA-B2C0-41A8-8514-369D0B0735D6}" type="slidenum">
-              <a:rPr lang="zh-TW" altLang="en-US" sz="2000" smtClean="0"/>
-              <a:t>31</a:t>
-            </a:fld>
-            <a:endParaRPr lang="zh-TW" altLang="en-US" sz="2000" dirty="0"/>
-          </a:p>
-        </p:txBody>
-      </p:sp>
-    </p:spTree>
-    <p:extLst>
-      <p:ext uri="{BB962C8B-B14F-4D97-AF65-F5344CB8AC3E}">
-        <p14:creationId xmlns:p14="http://schemas.microsoft.com/office/powerpoint/2010/main" val="1609072440"/>
       </p:ext>
     </p:extLst>
   </p:cSld>
@@ -22776,6 +22928,100 @@
         </p:nvSpPr>
         <p:spPr>
           <a:xfrm>
+            <a:off x="3707904" y="2569468"/>
+            <a:ext cx="7200900" cy="1238250"/>
+          </a:xfrm>
+        </p:spPr>
+        <p:txBody>
+          <a:bodyPr/>
+          <a:lstStyle/>
+          <a:p>
+            <a:r>
+              <a:rPr lang="en-HK" dirty="0" smtClean="0">
+                <a:latin typeface="Times New Roman" panose="02020603050405020304" pitchFamily="18" charset="0"/>
+                <a:cs typeface="Times New Roman" panose="02020603050405020304" pitchFamily="18" charset="0"/>
+              </a:rPr>
+              <a:t>Q &amp; A</a:t>
+            </a:r>
+            <a:endParaRPr lang="en-US" dirty="0">
+              <a:latin typeface="Times New Roman" panose="02020603050405020304" pitchFamily="18" charset="0"/>
+              <a:cs typeface="Times New Roman" panose="02020603050405020304" pitchFamily="18" charset="0"/>
+            </a:endParaRPr>
+          </a:p>
+        </p:txBody>
+      </p:sp>
+      <p:sp>
+        <p:nvSpPr>
+          <p:cNvPr id="4" name="投影片編號版面配置區 3"/>
+          <p:cNvSpPr>
+            <a:spLocks noGrp="1"/>
+          </p:cNvSpPr>
+          <p:nvPr>
+            <p:ph type="sldNum" sz="quarter" idx="12"/>
+          </p:nvPr>
+        </p:nvSpPr>
+        <p:spPr/>
+        <p:txBody>
+          <a:bodyPr/>
+          <a:lstStyle/>
+          <a:p>
+            <a:fld id="{B646D8CA-B2C0-41A8-8514-369D0B0735D6}" type="slidenum">
+              <a:rPr lang="zh-TW" altLang="en-US" sz="2000" smtClean="0"/>
+              <a:t>32</a:t>
+            </a:fld>
+            <a:endParaRPr lang="zh-TW" altLang="en-US" sz="2000" dirty="0"/>
+          </a:p>
+        </p:txBody>
+      </p:sp>
+    </p:spTree>
+    <p:extLst>
+      <p:ext uri="{BB962C8B-B14F-4D97-AF65-F5344CB8AC3E}">
+        <p14:creationId xmlns:p14="http://schemas.microsoft.com/office/powerpoint/2010/main" val="1609072440"/>
+      </p:ext>
+    </p:extLst>
+  </p:cSld>
+  <p:clrMapOvr>
+    <a:masterClrMapping/>
+  </p:clrMapOvr>
+  <p:timing>
+    <p:tnLst>
+      <p:par>
+        <p:cTn id="1" dur="indefinite" restart="never" nodeType="tmRoot"/>
+      </p:par>
+    </p:tnLst>
+  </p:timing>
+</p:sld>
+</file>
+
+<file path=ppt/slides/slide33.xml><?xml version="1.0" encoding="utf-8"?>
+<p:sld xmlns:a="http://schemas.openxmlformats.org/drawingml/2006/main" xmlns:r="http://schemas.openxmlformats.org/officeDocument/2006/relationships" xmlns:p="http://schemas.openxmlformats.org/presentationml/2006/main">
+  <p:cSld>
+    <p:spTree>
+      <p:nvGrpSpPr>
+        <p:cNvPr id="1" name=""/>
+        <p:cNvGrpSpPr/>
+        <p:nvPr/>
+      </p:nvGrpSpPr>
+      <p:grpSpPr>
+        <a:xfrm>
+          <a:off x="0" y="0"/>
+          <a:ext cx="0" cy="0"/>
+          <a:chOff x="0" y="0"/>
+          <a:chExt cx="0" cy="0"/>
+        </a:xfrm>
+      </p:grpSpPr>
+      <p:sp>
+        <p:nvSpPr>
+          <p:cNvPr id="2" name="標題 1"/>
+          <p:cNvSpPr>
+            <a:spLocks noGrp="1"/>
+          </p:cNvSpPr>
+          <p:nvPr>
+            <p:ph type="title"/>
+          </p:nvPr>
+        </p:nvSpPr>
+        <p:spPr>
+          <a:xfrm>
             <a:off x="1028700" y="571500"/>
             <a:ext cx="7719764" cy="1238250"/>
           </a:xfrm>
@@ -22862,7 +23108,7 @@
           <a:p>
             <a:fld id="{B646D8CA-B2C0-41A8-8514-369D0B0735D6}" type="slidenum">
               <a:rPr lang="zh-TW" altLang="en-US" sz="2000" smtClean="0"/>
-              <a:t>32</a:t>
+              <a:t>33</a:t>
             </a:fld>
             <a:endParaRPr lang="zh-TW" altLang="en-US" sz="2000" dirty="0"/>
           </a:p>
@@ -22890,7 +23136,7 @@
           <a:graphicData uri="http://schemas.openxmlformats.org/presentationml/2006/ole">
             <mc:AlternateContent xmlns:mc="http://schemas.openxmlformats.org/markup-compatibility/2006">
               <mc:Choice xmlns:v="urn:schemas-microsoft-com:vml" Requires="v">
-                <p:oleObj spid="_x0000_s12746" name="Graph" r:id="rId3" imgW="4754880" imgH="3108960" progId="Origin50.Graph">
+                <p:oleObj spid="_x0000_s12756" name="Graph" r:id="rId3" imgW="4754880" imgH="3108960" progId="Origin50.Graph">
                   <p:embed/>
                 </p:oleObj>
               </mc:Choice>
@@ -22945,7 +23191,7 @@
 </p:sld>
 </file>
 
-<file path=ppt/slides/slide33.xml><?xml version="1.0" encoding="utf-8"?>
+<file path=ppt/slides/slide34.xml><?xml version="1.0" encoding="utf-8"?>
 <p:sld xmlns:a="http://schemas.openxmlformats.org/drawingml/2006/main" xmlns:r="http://schemas.openxmlformats.org/officeDocument/2006/relationships" xmlns:p="http://schemas.openxmlformats.org/presentationml/2006/main">
   <p:cSld>
     <p:spTree>
@@ -23017,7 +23263,7 @@
           <a:p>
             <a:fld id="{B646D8CA-B2C0-41A8-8514-369D0B0735D6}" type="slidenum">
               <a:rPr lang="zh-TW" altLang="en-US" smtClean="0"/>
-              <a:t>33</a:t>
+              <a:t>34</a:t>
             </a:fld>
             <a:endParaRPr lang="zh-TW" altLang="en-US"/>
           </a:p>

</xml_diff>